<commit_message>
frontend: Setup Home Page logo, svg hover effect
</commit_message>
<xml_diff>
--- a/design/pendemic.pptx
+++ b/design/pendemic.pptx
@@ -6,6 +6,7 @@
   </p:sldMasterIdLst>
   <p:sldIdLst>
     <p:sldId id="256" r:id="rId2"/>
+    <p:sldId id="257" r:id="rId3"/>
   </p:sldIdLst>
   <p:sldSz cx="12192000" cy="6858000"/>
   <p:notesSz cx="6858000" cy="9144000"/>
@@ -4928,318 +4929,339 @@
           </p:sp>
         </p:grpSp>
       </p:grpSp>
-      <p:sp>
-        <p:nvSpPr>
-          <p:cNvPr id="2" name="Rectangle 1">
+      <p:grpSp>
+        <p:nvGrpSpPr>
+          <p:cNvPr id="3" name="Group 2">
             <a:extLst>
               <a:ext uri="{FF2B5EF4-FFF2-40B4-BE49-F238E27FC236}">
-                <a16:creationId xmlns:a16="http://schemas.microsoft.com/office/drawing/2014/main" id="{397E2EDA-3338-4704-B0BD-DE5D9286A11C}"/>
+                <a16:creationId xmlns:a16="http://schemas.microsoft.com/office/drawing/2014/main" id="{408D8560-396B-43BC-BA55-5B4E013498DC}"/>
               </a:ext>
             </a:extLst>
           </p:cNvPr>
-          <p:cNvSpPr/>
+          <p:cNvGrpSpPr/>
           <p:nvPr/>
-        </p:nvSpPr>
-        <p:spPr>
-          <a:xfrm>
-            <a:off x="251669" y="821723"/>
-            <a:ext cx="457200" cy="457200"/>
-          </a:xfrm>
-          <a:prstGeom prst="rect">
-            <a:avLst/>
-          </a:prstGeom>
-          <a:solidFill>
-            <a:srgbClr val="9966FF"/>
-          </a:solidFill>
-          <a:ln>
-            <a:noFill/>
-          </a:ln>
-        </p:spPr>
-        <p:style>
-          <a:lnRef idx="2">
-            <a:schemeClr val="accent1">
-              <a:shade val="50000"/>
-            </a:schemeClr>
-          </a:lnRef>
-          <a:fillRef idx="1">
-            <a:schemeClr val="accent1"/>
-          </a:fillRef>
-          <a:effectRef idx="0">
-            <a:schemeClr val="accent1"/>
-          </a:effectRef>
-          <a:fontRef idx="minor">
-            <a:schemeClr val="lt1"/>
-          </a:fontRef>
-        </p:style>
-        <p:txBody>
-          <a:bodyPr rtlCol="0" anchor="ctr"/>
-          <a:lstStyle/>
-          <a:p>
-            <a:pPr algn="ctr"/>
-            <a:endParaRPr lang="en-US"/>
-          </a:p>
-        </p:txBody>
-      </p:sp>
-      <p:sp>
-        <p:nvSpPr>
-          <p:cNvPr id="12" name="Rectangle 11">
-            <a:extLst>
-              <a:ext uri="{FF2B5EF4-FFF2-40B4-BE49-F238E27FC236}">
-                <a16:creationId xmlns:a16="http://schemas.microsoft.com/office/drawing/2014/main" id="{A1CA9AE8-F975-496C-8A74-CCAD759179B2}"/>
-              </a:ext>
-            </a:extLst>
-          </p:cNvPr>
-          <p:cNvSpPr/>
-          <p:nvPr/>
-        </p:nvSpPr>
-        <p:spPr>
-          <a:xfrm>
-            <a:off x="251669" y="1400505"/>
-            <a:ext cx="457200" cy="457200"/>
-          </a:xfrm>
-          <a:prstGeom prst="rect">
-            <a:avLst/>
-          </a:prstGeom>
-          <a:solidFill>
-            <a:srgbClr val="814EE7"/>
-          </a:solidFill>
-          <a:ln>
-            <a:noFill/>
-          </a:ln>
-        </p:spPr>
-        <p:style>
-          <a:lnRef idx="2">
-            <a:schemeClr val="accent1">
-              <a:shade val="50000"/>
-            </a:schemeClr>
-          </a:lnRef>
-          <a:fillRef idx="1">
-            <a:schemeClr val="accent1"/>
-          </a:fillRef>
-          <a:effectRef idx="0">
-            <a:schemeClr val="accent1"/>
-          </a:effectRef>
-          <a:fontRef idx="minor">
-            <a:schemeClr val="lt1"/>
-          </a:fontRef>
-        </p:style>
-        <p:txBody>
-          <a:bodyPr rtlCol="0" anchor="ctr"/>
-          <a:lstStyle/>
-          <a:p>
-            <a:pPr algn="ctr"/>
-            <a:endParaRPr lang="en-US"/>
-          </a:p>
-        </p:txBody>
-      </p:sp>
-      <p:sp>
-        <p:nvSpPr>
-          <p:cNvPr id="13" name="Rectangle 12">
-            <a:extLst>
-              <a:ext uri="{FF2B5EF4-FFF2-40B4-BE49-F238E27FC236}">
-                <a16:creationId xmlns:a16="http://schemas.microsoft.com/office/drawing/2014/main" id="{3DE62F1C-1EE7-4E36-97DF-38CF0BE1A23F}"/>
-              </a:ext>
-            </a:extLst>
-          </p:cNvPr>
-          <p:cNvSpPr/>
-          <p:nvPr/>
-        </p:nvSpPr>
-        <p:spPr>
+        </p:nvGrpSpPr>
+        <p:grpSpPr>
           <a:xfrm>
             <a:off x="251669" y="242939"/>
-            <a:ext cx="457200" cy="457200"/>
+            <a:ext cx="457200" cy="3351112"/>
+            <a:chOff x="251669" y="242939"/>
+            <a:chExt cx="457200" cy="3351112"/>
           </a:xfrm>
-          <a:prstGeom prst="rect">
-            <a:avLst/>
-          </a:prstGeom>
-          <a:solidFill>
-            <a:srgbClr val="B17EFF"/>
-          </a:solidFill>
-          <a:ln>
-            <a:noFill/>
-          </a:ln>
-        </p:spPr>
-        <p:style>
-          <a:lnRef idx="2">
-            <a:schemeClr val="accent1">
-              <a:shade val="50000"/>
-            </a:schemeClr>
-          </a:lnRef>
-          <a:fillRef idx="1">
-            <a:schemeClr val="accent1"/>
-          </a:fillRef>
-          <a:effectRef idx="0">
-            <a:schemeClr val="accent1"/>
-          </a:effectRef>
-          <a:fontRef idx="minor">
-            <a:schemeClr val="lt1"/>
-          </a:fontRef>
-        </p:style>
-        <p:txBody>
-          <a:bodyPr rtlCol="0" anchor="ctr"/>
-          <a:lstStyle/>
-          <a:p>
-            <a:pPr algn="ctr"/>
-            <a:endParaRPr lang="en-US"/>
-          </a:p>
-        </p:txBody>
-      </p:sp>
-      <p:sp>
-        <p:nvSpPr>
-          <p:cNvPr id="14" name="Rectangle 13">
-            <a:extLst>
-              <a:ext uri="{FF2B5EF4-FFF2-40B4-BE49-F238E27FC236}">
-                <a16:creationId xmlns:a16="http://schemas.microsoft.com/office/drawing/2014/main" id="{0FBCC31B-6405-4DEA-8029-061E23E5AA34}"/>
-              </a:ext>
-            </a:extLst>
-          </p:cNvPr>
-          <p:cNvSpPr/>
-          <p:nvPr/>
-        </p:nvSpPr>
-        <p:spPr>
-          <a:xfrm>
-            <a:off x="251669" y="2558069"/>
-            <a:ext cx="457200" cy="457200"/>
-          </a:xfrm>
-          <a:prstGeom prst="rect">
-            <a:avLst/>
-          </a:prstGeom>
-          <a:solidFill>
-            <a:srgbClr val="FFC000"/>
-          </a:solidFill>
-          <a:ln>
-            <a:noFill/>
-          </a:ln>
-        </p:spPr>
-        <p:style>
-          <a:lnRef idx="2">
-            <a:schemeClr val="accent1">
-              <a:shade val="50000"/>
-            </a:schemeClr>
-          </a:lnRef>
-          <a:fillRef idx="1">
-            <a:schemeClr val="accent1"/>
-          </a:fillRef>
-          <a:effectRef idx="0">
-            <a:schemeClr val="accent1"/>
-          </a:effectRef>
-          <a:fontRef idx="minor">
-            <a:schemeClr val="lt1"/>
-          </a:fontRef>
-        </p:style>
-        <p:txBody>
-          <a:bodyPr rtlCol="0" anchor="ctr"/>
-          <a:lstStyle/>
-          <a:p>
-            <a:pPr algn="ctr"/>
-            <a:endParaRPr lang="en-US"/>
-          </a:p>
-        </p:txBody>
-      </p:sp>
-      <p:sp>
-        <p:nvSpPr>
-          <p:cNvPr id="15" name="Rectangle 14">
-            <a:extLst>
-              <a:ext uri="{FF2B5EF4-FFF2-40B4-BE49-F238E27FC236}">
-                <a16:creationId xmlns:a16="http://schemas.microsoft.com/office/drawing/2014/main" id="{63F3825F-3B5C-4754-87AE-9C49CA9B5A5D}"/>
-              </a:ext>
-            </a:extLst>
-          </p:cNvPr>
-          <p:cNvSpPr/>
-          <p:nvPr/>
-        </p:nvSpPr>
-        <p:spPr>
-          <a:xfrm>
-            <a:off x="251669" y="3136851"/>
-            <a:ext cx="457200" cy="457200"/>
-          </a:xfrm>
-          <a:prstGeom prst="rect">
-            <a:avLst/>
-          </a:prstGeom>
-          <a:solidFill>
-            <a:srgbClr val="E7A800"/>
-          </a:solidFill>
-          <a:ln>
-            <a:noFill/>
-          </a:ln>
-        </p:spPr>
-        <p:style>
-          <a:lnRef idx="2">
-            <a:schemeClr val="accent1">
-              <a:shade val="50000"/>
-            </a:schemeClr>
-          </a:lnRef>
-          <a:fillRef idx="1">
-            <a:schemeClr val="accent1"/>
-          </a:fillRef>
-          <a:effectRef idx="0">
-            <a:schemeClr val="accent1"/>
-          </a:effectRef>
-          <a:fontRef idx="minor">
-            <a:schemeClr val="lt1"/>
-          </a:fontRef>
-        </p:style>
-        <p:txBody>
-          <a:bodyPr rtlCol="0" anchor="ctr"/>
-          <a:lstStyle/>
-          <a:p>
-            <a:pPr algn="ctr"/>
-            <a:endParaRPr lang="en-US"/>
-          </a:p>
-        </p:txBody>
-      </p:sp>
-      <p:sp>
-        <p:nvSpPr>
-          <p:cNvPr id="21" name="Rectangle 20">
-            <a:extLst>
-              <a:ext uri="{FF2B5EF4-FFF2-40B4-BE49-F238E27FC236}">
-                <a16:creationId xmlns:a16="http://schemas.microsoft.com/office/drawing/2014/main" id="{4FC4A7A7-9B89-4B5E-A46E-6330BD168957}"/>
-              </a:ext>
-            </a:extLst>
-          </p:cNvPr>
-          <p:cNvSpPr/>
-          <p:nvPr/>
-        </p:nvSpPr>
-        <p:spPr>
-          <a:xfrm>
-            <a:off x="251669" y="1979287"/>
-            <a:ext cx="457200" cy="457200"/>
-          </a:xfrm>
-          <a:prstGeom prst="rect">
-            <a:avLst/>
-          </a:prstGeom>
-          <a:solidFill>
-            <a:srgbClr val="FFD818"/>
-          </a:solidFill>
-          <a:ln>
-            <a:noFill/>
-          </a:ln>
-        </p:spPr>
-        <p:style>
-          <a:lnRef idx="2">
-            <a:schemeClr val="accent1">
-              <a:shade val="50000"/>
-            </a:schemeClr>
-          </a:lnRef>
-          <a:fillRef idx="1">
-            <a:schemeClr val="accent1"/>
-          </a:fillRef>
-          <a:effectRef idx="0">
-            <a:schemeClr val="accent1"/>
-          </a:effectRef>
-          <a:fontRef idx="minor">
-            <a:schemeClr val="lt1"/>
-          </a:fontRef>
-        </p:style>
-        <p:txBody>
-          <a:bodyPr rtlCol="0" anchor="ctr"/>
-          <a:lstStyle/>
-          <a:p>
-            <a:pPr algn="ctr"/>
-            <a:endParaRPr lang="en-US"/>
-          </a:p>
-        </p:txBody>
-      </p:sp>
+        </p:grpSpPr>
+        <p:sp>
+          <p:nvSpPr>
+            <p:cNvPr id="2" name="Rectangle 1">
+              <a:extLst>
+                <a:ext uri="{FF2B5EF4-FFF2-40B4-BE49-F238E27FC236}">
+                  <a16:creationId xmlns:a16="http://schemas.microsoft.com/office/drawing/2014/main" id="{397E2EDA-3338-4704-B0BD-DE5D9286A11C}"/>
+                </a:ext>
+              </a:extLst>
+            </p:cNvPr>
+            <p:cNvSpPr/>
+            <p:nvPr/>
+          </p:nvSpPr>
+          <p:spPr>
+            <a:xfrm>
+              <a:off x="251669" y="821723"/>
+              <a:ext cx="457200" cy="457200"/>
+            </a:xfrm>
+            <a:prstGeom prst="rect">
+              <a:avLst/>
+            </a:prstGeom>
+            <a:solidFill>
+              <a:srgbClr val="9966FF"/>
+            </a:solidFill>
+            <a:ln>
+              <a:noFill/>
+            </a:ln>
+          </p:spPr>
+          <p:style>
+            <a:lnRef idx="2">
+              <a:schemeClr val="accent1">
+                <a:shade val="50000"/>
+              </a:schemeClr>
+            </a:lnRef>
+            <a:fillRef idx="1">
+              <a:schemeClr val="accent1"/>
+            </a:fillRef>
+            <a:effectRef idx="0">
+              <a:schemeClr val="accent1"/>
+            </a:effectRef>
+            <a:fontRef idx="minor">
+              <a:schemeClr val="lt1"/>
+            </a:fontRef>
+          </p:style>
+          <p:txBody>
+            <a:bodyPr rtlCol="0" anchor="ctr"/>
+            <a:lstStyle/>
+            <a:p>
+              <a:pPr algn="ctr"/>
+              <a:endParaRPr lang="en-US"/>
+            </a:p>
+          </p:txBody>
+        </p:sp>
+        <p:sp>
+          <p:nvSpPr>
+            <p:cNvPr id="12" name="Rectangle 11">
+              <a:extLst>
+                <a:ext uri="{FF2B5EF4-FFF2-40B4-BE49-F238E27FC236}">
+                  <a16:creationId xmlns:a16="http://schemas.microsoft.com/office/drawing/2014/main" id="{A1CA9AE8-F975-496C-8A74-CCAD759179B2}"/>
+                </a:ext>
+              </a:extLst>
+            </p:cNvPr>
+            <p:cNvSpPr/>
+            <p:nvPr/>
+          </p:nvSpPr>
+          <p:spPr>
+            <a:xfrm>
+              <a:off x="251669" y="1400505"/>
+              <a:ext cx="457200" cy="457200"/>
+            </a:xfrm>
+            <a:prstGeom prst="rect">
+              <a:avLst/>
+            </a:prstGeom>
+            <a:solidFill>
+              <a:srgbClr val="814EE7"/>
+            </a:solidFill>
+            <a:ln>
+              <a:noFill/>
+            </a:ln>
+          </p:spPr>
+          <p:style>
+            <a:lnRef idx="2">
+              <a:schemeClr val="accent1">
+                <a:shade val="50000"/>
+              </a:schemeClr>
+            </a:lnRef>
+            <a:fillRef idx="1">
+              <a:schemeClr val="accent1"/>
+            </a:fillRef>
+            <a:effectRef idx="0">
+              <a:schemeClr val="accent1"/>
+            </a:effectRef>
+            <a:fontRef idx="minor">
+              <a:schemeClr val="lt1"/>
+            </a:fontRef>
+          </p:style>
+          <p:txBody>
+            <a:bodyPr rtlCol="0" anchor="ctr"/>
+            <a:lstStyle/>
+            <a:p>
+              <a:pPr algn="ctr"/>
+              <a:endParaRPr lang="en-US"/>
+            </a:p>
+          </p:txBody>
+        </p:sp>
+        <p:sp>
+          <p:nvSpPr>
+            <p:cNvPr id="13" name="Rectangle 12">
+              <a:extLst>
+                <a:ext uri="{FF2B5EF4-FFF2-40B4-BE49-F238E27FC236}">
+                  <a16:creationId xmlns:a16="http://schemas.microsoft.com/office/drawing/2014/main" id="{3DE62F1C-1EE7-4E36-97DF-38CF0BE1A23F}"/>
+                </a:ext>
+              </a:extLst>
+            </p:cNvPr>
+            <p:cNvSpPr/>
+            <p:nvPr/>
+          </p:nvSpPr>
+          <p:spPr>
+            <a:xfrm>
+              <a:off x="251669" y="242939"/>
+              <a:ext cx="457200" cy="457200"/>
+            </a:xfrm>
+            <a:prstGeom prst="rect">
+              <a:avLst/>
+            </a:prstGeom>
+            <a:solidFill>
+              <a:srgbClr val="B17EFF"/>
+            </a:solidFill>
+            <a:ln>
+              <a:noFill/>
+            </a:ln>
+          </p:spPr>
+          <p:style>
+            <a:lnRef idx="2">
+              <a:schemeClr val="accent1">
+                <a:shade val="50000"/>
+              </a:schemeClr>
+            </a:lnRef>
+            <a:fillRef idx="1">
+              <a:schemeClr val="accent1"/>
+            </a:fillRef>
+            <a:effectRef idx="0">
+              <a:schemeClr val="accent1"/>
+            </a:effectRef>
+            <a:fontRef idx="minor">
+              <a:schemeClr val="lt1"/>
+            </a:fontRef>
+          </p:style>
+          <p:txBody>
+            <a:bodyPr rtlCol="0" anchor="ctr"/>
+            <a:lstStyle/>
+            <a:p>
+              <a:pPr algn="ctr"/>
+              <a:endParaRPr lang="en-US"/>
+            </a:p>
+          </p:txBody>
+        </p:sp>
+        <p:sp>
+          <p:nvSpPr>
+            <p:cNvPr id="14" name="Rectangle 13">
+              <a:extLst>
+                <a:ext uri="{FF2B5EF4-FFF2-40B4-BE49-F238E27FC236}">
+                  <a16:creationId xmlns:a16="http://schemas.microsoft.com/office/drawing/2014/main" id="{0FBCC31B-6405-4DEA-8029-061E23E5AA34}"/>
+                </a:ext>
+              </a:extLst>
+            </p:cNvPr>
+            <p:cNvSpPr/>
+            <p:nvPr/>
+          </p:nvSpPr>
+          <p:spPr>
+            <a:xfrm>
+              <a:off x="251669" y="2558069"/>
+              <a:ext cx="457200" cy="457200"/>
+            </a:xfrm>
+            <a:prstGeom prst="rect">
+              <a:avLst/>
+            </a:prstGeom>
+            <a:solidFill>
+              <a:srgbClr val="FFC000"/>
+            </a:solidFill>
+            <a:ln>
+              <a:noFill/>
+            </a:ln>
+          </p:spPr>
+          <p:style>
+            <a:lnRef idx="2">
+              <a:schemeClr val="accent1">
+                <a:shade val="50000"/>
+              </a:schemeClr>
+            </a:lnRef>
+            <a:fillRef idx="1">
+              <a:schemeClr val="accent1"/>
+            </a:fillRef>
+            <a:effectRef idx="0">
+              <a:schemeClr val="accent1"/>
+            </a:effectRef>
+            <a:fontRef idx="minor">
+              <a:schemeClr val="lt1"/>
+            </a:fontRef>
+          </p:style>
+          <p:txBody>
+            <a:bodyPr rtlCol="0" anchor="ctr"/>
+            <a:lstStyle/>
+            <a:p>
+              <a:pPr algn="ctr"/>
+              <a:endParaRPr lang="en-US"/>
+            </a:p>
+          </p:txBody>
+        </p:sp>
+        <p:sp>
+          <p:nvSpPr>
+            <p:cNvPr id="15" name="Rectangle 14">
+              <a:extLst>
+                <a:ext uri="{FF2B5EF4-FFF2-40B4-BE49-F238E27FC236}">
+                  <a16:creationId xmlns:a16="http://schemas.microsoft.com/office/drawing/2014/main" id="{63F3825F-3B5C-4754-87AE-9C49CA9B5A5D}"/>
+                </a:ext>
+              </a:extLst>
+            </p:cNvPr>
+            <p:cNvSpPr/>
+            <p:nvPr/>
+          </p:nvSpPr>
+          <p:spPr>
+            <a:xfrm>
+              <a:off x="251669" y="3136851"/>
+              <a:ext cx="457200" cy="457200"/>
+            </a:xfrm>
+            <a:prstGeom prst="rect">
+              <a:avLst/>
+            </a:prstGeom>
+            <a:solidFill>
+              <a:srgbClr val="E7A800"/>
+            </a:solidFill>
+            <a:ln>
+              <a:noFill/>
+            </a:ln>
+          </p:spPr>
+          <p:style>
+            <a:lnRef idx="2">
+              <a:schemeClr val="accent1">
+                <a:shade val="50000"/>
+              </a:schemeClr>
+            </a:lnRef>
+            <a:fillRef idx="1">
+              <a:schemeClr val="accent1"/>
+            </a:fillRef>
+            <a:effectRef idx="0">
+              <a:schemeClr val="accent1"/>
+            </a:effectRef>
+            <a:fontRef idx="minor">
+              <a:schemeClr val="lt1"/>
+            </a:fontRef>
+          </p:style>
+          <p:txBody>
+            <a:bodyPr rtlCol="0" anchor="ctr"/>
+            <a:lstStyle/>
+            <a:p>
+              <a:pPr algn="ctr"/>
+              <a:endParaRPr lang="en-US"/>
+            </a:p>
+          </p:txBody>
+        </p:sp>
+        <p:sp>
+          <p:nvSpPr>
+            <p:cNvPr id="21" name="Rectangle 20">
+              <a:extLst>
+                <a:ext uri="{FF2B5EF4-FFF2-40B4-BE49-F238E27FC236}">
+                  <a16:creationId xmlns:a16="http://schemas.microsoft.com/office/drawing/2014/main" id="{4FC4A7A7-9B89-4B5E-A46E-6330BD168957}"/>
+                </a:ext>
+              </a:extLst>
+            </p:cNvPr>
+            <p:cNvSpPr/>
+            <p:nvPr/>
+          </p:nvSpPr>
+          <p:spPr>
+            <a:xfrm>
+              <a:off x="251669" y="1979287"/>
+              <a:ext cx="457200" cy="457200"/>
+            </a:xfrm>
+            <a:prstGeom prst="rect">
+              <a:avLst/>
+            </a:prstGeom>
+            <a:solidFill>
+              <a:srgbClr val="FFD818"/>
+            </a:solidFill>
+            <a:ln>
+              <a:noFill/>
+            </a:ln>
+          </p:spPr>
+          <p:style>
+            <a:lnRef idx="2">
+              <a:schemeClr val="accent1">
+                <a:shade val="50000"/>
+              </a:schemeClr>
+            </a:lnRef>
+            <a:fillRef idx="1">
+              <a:schemeClr val="accent1"/>
+            </a:fillRef>
+            <a:effectRef idx="0">
+              <a:schemeClr val="accent1"/>
+            </a:effectRef>
+            <a:fontRef idx="minor">
+              <a:schemeClr val="lt1"/>
+            </a:fontRef>
+          </p:style>
+          <p:txBody>
+            <a:bodyPr rtlCol="0" anchor="ctr"/>
+            <a:lstStyle/>
+            <a:p>
+              <a:pPr algn="ctr"/>
+              <a:endParaRPr lang="en-US"/>
+            </a:p>
+          </p:txBody>
+        </p:sp>
+      </p:grpSp>
       <p:grpSp>
         <p:nvGrpSpPr>
           <p:cNvPr id="22" name="Group 21">
@@ -8457,6 +8479,2491 @@
 </p:sld>
 </file>
 
+<file path=ppt/slides/slide2.xml><?xml version="1.0" encoding="utf-8"?>
+<p:sld xmlns:a="http://schemas.openxmlformats.org/drawingml/2006/main" xmlns:r="http://schemas.openxmlformats.org/officeDocument/2006/relationships" xmlns:p="http://schemas.openxmlformats.org/presentationml/2006/main">
+  <p:cSld>
+    <p:spTree>
+      <p:nvGrpSpPr>
+        <p:cNvPr id="1" name=""/>
+        <p:cNvGrpSpPr/>
+        <p:nvPr/>
+      </p:nvGrpSpPr>
+      <p:grpSpPr>
+        <a:xfrm>
+          <a:off x="0" y="0"/>
+          <a:ext cx="0" cy="0"/>
+          <a:chOff x="0" y="0"/>
+          <a:chExt cx="0" cy="0"/>
+        </a:xfrm>
+      </p:grpSpPr>
+      <p:grpSp>
+        <p:nvGrpSpPr>
+          <p:cNvPr id="3" name="Group 2">
+            <a:extLst>
+              <a:ext uri="{FF2B5EF4-FFF2-40B4-BE49-F238E27FC236}">
+                <a16:creationId xmlns:a16="http://schemas.microsoft.com/office/drawing/2014/main" id="{BDDA04E8-538E-4706-BAA9-6C8BC2FEDAEE}"/>
+              </a:ext>
+            </a:extLst>
+          </p:cNvPr>
+          <p:cNvGrpSpPr/>
+          <p:nvPr/>
+        </p:nvGrpSpPr>
+        <p:grpSpPr>
+          <a:xfrm>
+            <a:off x="251669" y="242939"/>
+            <a:ext cx="457200" cy="3351112"/>
+            <a:chOff x="251669" y="242939"/>
+            <a:chExt cx="457200" cy="3351112"/>
+          </a:xfrm>
+        </p:grpSpPr>
+        <p:sp>
+          <p:nvSpPr>
+            <p:cNvPr id="2" name="Rectangle 1">
+              <a:extLst>
+                <a:ext uri="{FF2B5EF4-FFF2-40B4-BE49-F238E27FC236}">
+                  <a16:creationId xmlns:a16="http://schemas.microsoft.com/office/drawing/2014/main" id="{397E2EDA-3338-4704-B0BD-DE5D9286A11C}"/>
+                </a:ext>
+              </a:extLst>
+            </p:cNvPr>
+            <p:cNvSpPr/>
+            <p:nvPr/>
+          </p:nvSpPr>
+          <p:spPr>
+            <a:xfrm>
+              <a:off x="251669" y="821723"/>
+              <a:ext cx="457200" cy="457200"/>
+            </a:xfrm>
+            <a:prstGeom prst="rect">
+              <a:avLst/>
+            </a:prstGeom>
+            <a:solidFill>
+              <a:srgbClr val="9966FF"/>
+            </a:solidFill>
+            <a:ln>
+              <a:noFill/>
+            </a:ln>
+          </p:spPr>
+          <p:style>
+            <a:lnRef idx="2">
+              <a:schemeClr val="accent1">
+                <a:shade val="50000"/>
+              </a:schemeClr>
+            </a:lnRef>
+            <a:fillRef idx="1">
+              <a:schemeClr val="accent1"/>
+            </a:fillRef>
+            <a:effectRef idx="0">
+              <a:schemeClr val="accent1"/>
+            </a:effectRef>
+            <a:fontRef idx="minor">
+              <a:schemeClr val="lt1"/>
+            </a:fontRef>
+          </p:style>
+          <p:txBody>
+            <a:bodyPr rtlCol="0" anchor="ctr"/>
+            <a:lstStyle/>
+            <a:p>
+              <a:pPr algn="ctr"/>
+              <a:endParaRPr lang="en-US"/>
+            </a:p>
+          </p:txBody>
+        </p:sp>
+        <p:sp>
+          <p:nvSpPr>
+            <p:cNvPr id="12" name="Rectangle 11">
+              <a:extLst>
+                <a:ext uri="{FF2B5EF4-FFF2-40B4-BE49-F238E27FC236}">
+                  <a16:creationId xmlns:a16="http://schemas.microsoft.com/office/drawing/2014/main" id="{A1CA9AE8-F975-496C-8A74-CCAD759179B2}"/>
+                </a:ext>
+              </a:extLst>
+            </p:cNvPr>
+            <p:cNvSpPr/>
+            <p:nvPr/>
+          </p:nvSpPr>
+          <p:spPr>
+            <a:xfrm>
+              <a:off x="251669" y="1400505"/>
+              <a:ext cx="457200" cy="457200"/>
+            </a:xfrm>
+            <a:prstGeom prst="rect">
+              <a:avLst/>
+            </a:prstGeom>
+            <a:solidFill>
+              <a:srgbClr val="814EE7"/>
+            </a:solidFill>
+            <a:ln>
+              <a:noFill/>
+            </a:ln>
+          </p:spPr>
+          <p:style>
+            <a:lnRef idx="2">
+              <a:schemeClr val="accent1">
+                <a:shade val="50000"/>
+              </a:schemeClr>
+            </a:lnRef>
+            <a:fillRef idx="1">
+              <a:schemeClr val="accent1"/>
+            </a:fillRef>
+            <a:effectRef idx="0">
+              <a:schemeClr val="accent1"/>
+            </a:effectRef>
+            <a:fontRef idx="minor">
+              <a:schemeClr val="lt1"/>
+            </a:fontRef>
+          </p:style>
+          <p:txBody>
+            <a:bodyPr rtlCol="0" anchor="ctr"/>
+            <a:lstStyle/>
+            <a:p>
+              <a:pPr algn="ctr"/>
+              <a:endParaRPr lang="en-US"/>
+            </a:p>
+          </p:txBody>
+        </p:sp>
+        <p:sp>
+          <p:nvSpPr>
+            <p:cNvPr id="13" name="Rectangle 12">
+              <a:extLst>
+                <a:ext uri="{FF2B5EF4-FFF2-40B4-BE49-F238E27FC236}">
+                  <a16:creationId xmlns:a16="http://schemas.microsoft.com/office/drawing/2014/main" id="{3DE62F1C-1EE7-4E36-97DF-38CF0BE1A23F}"/>
+                </a:ext>
+              </a:extLst>
+            </p:cNvPr>
+            <p:cNvSpPr/>
+            <p:nvPr/>
+          </p:nvSpPr>
+          <p:spPr>
+            <a:xfrm>
+              <a:off x="251669" y="242939"/>
+              <a:ext cx="457200" cy="457200"/>
+            </a:xfrm>
+            <a:prstGeom prst="rect">
+              <a:avLst/>
+            </a:prstGeom>
+            <a:solidFill>
+              <a:srgbClr val="B17EFF"/>
+            </a:solidFill>
+            <a:ln>
+              <a:noFill/>
+            </a:ln>
+          </p:spPr>
+          <p:style>
+            <a:lnRef idx="2">
+              <a:schemeClr val="accent1">
+                <a:shade val="50000"/>
+              </a:schemeClr>
+            </a:lnRef>
+            <a:fillRef idx="1">
+              <a:schemeClr val="accent1"/>
+            </a:fillRef>
+            <a:effectRef idx="0">
+              <a:schemeClr val="accent1"/>
+            </a:effectRef>
+            <a:fontRef idx="minor">
+              <a:schemeClr val="lt1"/>
+            </a:fontRef>
+          </p:style>
+          <p:txBody>
+            <a:bodyPr rtlCol="0" anchor="ctr"/>
+            <a:lstStyle/>
+            <a:p>
+              <a:pPr algn="ctr"/>
+              <a:endParaRPr lang="en-US"/>
+            </a:p>
+          </p:txBody>
+        </p:sp>
+        <p:sp>
+          <p:nvSpPr>
+            <p:cNvPr id="14" name="Rectangle 13">
+              <a:extLst>
+                <a:ext uri="{FF2B5EF4-FFF2-40B4-BE49-F238E27FC236}">
+                  <a16:creationId xmlns:a16="http://schemas.microsoft.com/office/drawing/2014/main" id="{0FBCC31B-6405-4DEA-8029-061E23E5AA34}"/>
+                </a:ext>
+              </a:extLst>
+            </p:cNvPr>
+            <p:cNvSpPr/>
+            <p:nvPr/>
+          </p:nvSpPr>
+          <p:spPr>
+            <a:xfrm>
+              <a:off x="251669" y="2558069"/>
+              <a:ext cx="457200" cy="457200"/>
+            </a:xfrm>
+            <a:prstGeom prst="rect">
+              <a:avLst/>
+            </a:prstGeom>
+            <a:solidFill>
+              <a:srgbClr val="FFC000"/>
+            </a:solidFill>
+            <a:ln>
+              <a:noFill/>
+            </a:ln>
+          </p:spPr>
+          <p:style>
+            <a:lnRef idx="2">
+              <a:schemeClr val="accent1">
+                <a:shade val="50000"/>
+              </a:schemeClr>
+            </a:lnRef>
+            <a:fillRef idx="1">
+              <a:schemeClr val="accent1"/>
+            </a:fillRef>
+            <a:effectRef idx="0">
+              <a:schemeClr val="accent1"/>
+            </a:effectRef>
+            <a:fontRef idx="minor">
+              <a:schemeClr val="lt1"/>
+            </a:fontRef>
+          </p:style>
+          <p:txBody>
+            <a:bodyPr rtlCol="0" anchor="ctr"/>
+            <a:lstStyle/>
+            <a:p>
+              <a:pPr algn="ctr"/>
+              <a:endParaRPr lang="en-US"/>
+            </a:p>
+          </p:txBody>
+        </p:sp>
+        <p:sp>
+          <p:nvSpPr>
+            <p:cNvPr id="15" name="Rectangle 14">
+              <a:extLst>
+                <a:ext uri="{FF2B5EF4-FFF2-40B4-BE49-F238E27FC236}">
+                  <a16:creationId xmlns:a16="http://schemas.microsoft.com/office/drawing/2014/main" id="{63F3825F-3B5C-4754-87AE-9C49CA9B5A5D}"/>
+                </a:ext>
+              </a:extLst>
+            </p:cNvPr>
+            <p:cNvSpPr/>
+            <p:nvPr/>
+          </p:nvSpPr>
+          <p:spPr>
+            <a:xfrm>
+              <a:off x="251669" y="3136851"/>
+              <a:ext cx="457200" cy="457200"/>
+            </a:xfrm>
+            <a:prstGeom prst="rect">
+              <a:avLst/>
+            </a:prstGeom>
+            <a:solidFill>
+              <a:srgbClr val="E7A800"/>
+            </a:solidFill>
+            <a:ln>
+              <a:noFill/>
+            </a:ln>
+          </p:spPr>
+          <p:style>
+            <a:lnRef idx="2">
+              <a:schemeClr val="accent1">
+                <a:shade val="50000"/>
+              </a:schemeClr>
+            </a:lnRef>
+            <a:fillRef idx="1">
+              <a:schemeClr val="accent1"/>
+            </a:fillRef>
+            <a:effectRef idx="0">
+              <a:schemeClr val="accent1"/>
+            </a:effectRef>
+            <a:fontRef idx="minor">
+              <a:schemeClr val="lt1"/>
+            </a:fontRef>
+          </p:style>
+          <p:txBody>
+            <a:bodyPr rtlCol="0" anchor="ctr"/>
+            <a:lstStyle/>
+            <a:p>
+              <a:pPr algn="ctr"/>
+              <a:endParaRPr lang="en-US"/>
+            </a:p>
+          </p:txBody>
+        </p:sp>
+        <p:sp>
+          <p:nvSpPr>
+            <p:cNvPr id="21" name="Rectangle 20">
+              <a:extLst>
+                <a:ext uri="{FF2B5EF4-FFF2-40B4-BE49-F238E27FC236}">
+                  <a16:creationId xmlns:a16="http://schemas.microsoft.com/office/drawing/2014/main" id="{4FC4A7A7-9B89-4B5E-A46E-6330BD168957}"/>
+                </a:ext>
+              </a:extLst>
+            </p:cNvPr>
+            <p:cNvSpPr/>
+            <p:nvPr/>
+          </p:nvSpPr>
+          <p:spPr>
+            <a:xfrm>
+              <a:off x="251669" y="1979287"/>
+              <a:ext cx="457200" cy="457200"/>
+            </a:xfrm>
+            <a:prstGeom prst="rect">
+              <a:avLst/>
+            </a:prstGeom>
+            <a:solidFill>
+              <a:srgbClr val="FFD818"/>
+            </a:solidFill>
+            <a:ln>
+              <a:noFill/>
+            </a:ln>
+          </p:spPr>
+          <p:style>
+            <a:lnRef idx="2">
+              <a:schemeClr val="accent1">
+                <a:shade val="50000"/>
+              </a:schemeClr>
+            </a:lnRef>
+            <a:fillRef idx="1">
+              <a:schemeClr val="accent1"/>
+            </a:fillRef>
+            <a:effectRef idx="0">
+              <a:schemeClr val="accent1"/>
+            </a:effectRef>
+            <a:fontRef idx="minor">
+              <a:schemeClr val="lt1"/>
+            </a:fontRef>
+          </p:style>
+          <p:txBody>
+            <a:bodyPr rtlCol="0" anchor="ctr"/>
+            <a:lstStyle/>
+            <a:p>
+              <a:pPr algn="ctr"/>
+              <a:endParaRPr lang="en-US"/>
+            </a:p>
+          </p:txBody>
+        </p:sp>
+      </p:grpSp>
+      <p:grpSp>
+        <p:nvGrpSpPr>
+          <p:cNvPr id="8" name="Group 7">
+            <a:extLst>
+              <a:ext uri="{FF2B5EF4-FFF2-40B4-BE49-F238E27FC236}">
+                <a16:creationId xmlns:a16="http://schemas.microsoft.com/office/drawing/2014/main" id="{094CBD0A-5C80-4B9B-AFE3-46385616F8F8}"/>
+              </a:ext>
+            </a:extLst>
+          </p:cNvPr>
+          <p:cNvGrpSpPr/>
+          <p:nvPr/>
+        </p:nvGrpSpPr>
+        <p:grpSpPr>
+          <a:xfrm>
+            <a:off x="3352800" y="1278923"/>
+            <a:ext cx="2743200" cy="2743200"/>
+            <a:chOff x="5201760" y="1526937"/>
+            <a:chExt cx="2743200" cy="2743200"/>
+          </a:xfrm>
+        </p:grpSpPr>
+        <p:grpSp>
+          <p:nvGrpSpPr>
+            <p:cNvPr id="6" name="Group 5">
+              <a:extLst>
+                <a:ext uri="{FF2B5EF4-FFF2-40B4-BE49-F238E27FC236}">
+                  <a16:creationId xmlns:a16="http://schemas.microsoft.com/office/drawing/2014/main" id="{F7CB01C3-E286-4F08-9E61-D5710A185A03}"/>
+                </a:ext>
+              </a:extLst>
+            </p:cNvPr>
+            <p:cNvGrpSpPr/>
+            <p:nvPr/>
+          </p:nvGrpSpPr>
+          <p:grpSpPr>
+            <a:xfrm>
+              <a:off x="5201760" y="1526937"/>
+              <a:ext cx="2743200" cy="2743200"/>
+              <a:chOff x="4882197" y="1127372"/>
+              <a:chExt cx="2743200" cy="2743200"/>
+            </a:xfrm>
+          </p:grpSpPr>
+          <p:sp>
+            <p:nvSpPr>
+              <p:cNvPr id="19" name="Rectangle 18">
+                <a:extLst>
+                  <a:ext uri="{FF2B5EF4-FFF2-40B4-BE49-F238E27FC236}">
+                    <a16:creationId xmlns:a16="http://schemas.microsoft.com/office/drawing/2014/main" id="{DE501EA2-0DBD-42CD-BDDD-E6FFA637260E}"/>
+                  </a:ext>
+                </a:extLst>
+              </p:cNvPr>
+              <p:cNvSpPr/>
+              <p:nvPr/>
+            </p:nvSpPr>
+            <p:spPr>
+              <a:xfrm>
+                <a:off x="4882197" y="1127372"/>
+                <a:ext cx="2743200" cy="2743200"/>
+              </a:xfrm>
+              <a:prstGeom prst="rect">
+                <a:avLst/>
+              </a:prstGeom>
+              <a:noFill/>
+              <a:ln>
+                <a:noFill/>
+              </a:ln>
+            </p:spPr>
+            <p:style>
+              <a:lnRef idx="2">
+                <a:schemeClr val="accent1">
+                  <a:shade val="50000"/>
+                </a:schemeClr>
+              </a:lnRef>
+              <a:fillRef idx="1">
+                <a:schemeClr val="accent1"/>
+              </a:fillRef>
+              <a:effectRef idx="0">
+                <a:schemeClr val="accent1"/>
+              </a:effectRef>
+              <a:fontRef idx="minor">
+                <a:schemeClr val="lt1"/>
+              </a:fontRef>
+            </p:style>
+            <p:txBody>
+              <a:bodyPr rtlCol="0" anchor="ctr"/>
+              <a:lstStyle/>
+              <a:p>
+                <a:pPr algn="ctr"/>
+                <a:endParaRPr lang="en-US"/>
+              </a:p>
+            </p:txBody>
+          </p:sp>
+          <p:sp>
+            <p:nvSpPr>
+              <p:cNvPr id="85" name="Freeform: Shape 84">
+                <a:extLst>
+                  <a:ext uri="{FF2B5EF4-FFF2-40B4-BE49-F238E27FC236}">
+                    <a16:creationId xmlns:a16="http://schemas.microsoft.com/office/drawing/2014/main" id="{C1E87CB4-40A2-4217-888C-9CB36750EA19}"/>
+                  </a:ext>
+                </a:extLst>
+              </p:cNvPr>
+              <p:cNvSpPr/>
+              <p:nvPr/>
+            </p:nvSpPr>
+            <p:spPr>
+              <a:xfrm rot="853024">
+                <a:off x="5144715" y="1183069"/>
+                <a:ext cx="1582803" cy="2216048"/>
+              </a:xfrm>
+              <a:custGeom>
+                <a:avLst/>
+                <a:gdLst>
+                  <a:gd name="connsiteX0" fmla="*/ 501071 w 1582803"/>
+                  <a:gd name="connsiteY0" fmla="*/ 2199288 h 2216048"/>
+                  <a:gd name="connsiteX1" fmla="*/ 501416 w 1582803"/>
+                  <a:gd name="connsiteY1" fmla="*/ 2199563 h 2216048"/>
+                  <a:gd name="connsiteX2" fmla="*/ 499805 w 1582803"/>
+                  <a:gd name="connsiteY2" fmla="*/ 2201202 h 2216048"/>
+                  <a:gd name="connsiteX3" fmla="*/ 509436 w 1582803"/>
+                  <a:gd name="connsiteY3" fmla="*/ 2186644 h 2216048"/>
+                  <a:gd name="connsiteX4" fmla="*/ 501071 w 1582803"/>
+                  <a:gd name="connsiteY4" fmla="*/ 2199288 h 2216048"/>
+                  <a:gd name="connsiteX5" fmla="*/ 500790 w 1582803"/>
+                  <a:gd name="connsiteY5" fmla="*/ 2199065 h 2216048"/>
+                  <a:gd name="connsiteX6" fmla="*/ 507729 w 1582803"/>
+                  <a:gd name="connsiteY6" fmla="*/ 2188975 h 2216048"/>
+                  <a:gd name="connsiteX7" fmla="*/ 509436 w 1582803"/>
+                  <a:gd name="connsiteY7" fmla="*/ 2186644 h 2216048"/>
+                  <a:gd name="connsiteX8" fmla="*/ 819110 w 1582803"/>
+                  <a:gd name="connsiteY8" fmla="*/ 160678 h 2216048"/>
+                  <a:gd name="connsiteX9" fmla="*/ 1429197 w 1582803"/>
+                  <a:gd name="connsiteY9" fmla="*/ 149133 h 2216048"/>
+                  <a:gd name="connsiteX10" fmla="*/ 1526472 w 1582803"/>
+                  <a:gd name="connsiteY10" fmla="*/ 179022 h 2216048"/>
+                  <a:gd name="connsiteX11" fmla="*/ 1534350 w 1582803"/>
+                  <a:gd name="connsiteY11" fmla="*/ 160689 h 2216048"/>
+                  <a:gd name="connsiteX12" fmla="*/ 1582803 w 1582803"/>
+                  <a:gd name="connsiteY12" fmla="*/ 0 h 2216048"/>
+                  <a:gd name="connsiteX13" fmla="*/ 1553906 w 1582803"/>
+                  <a:gd name="connsiteY13" fmla="*/ 203321 h 2216048"/>
+                  <a:gd name="connsiteX14" fmla="*/ 1431819 w 1582803"/>
+                  <a:gd name="connsiteY14" fmla="*/ 455379 h 2216048"/>
+                  <a:gd name="connsiteX15" fmla="*/ 1192992 w 1582803"/>
+                  <a:gd name="connsiteY15" fmla="*/ 782244 h 2216048"/>
+                  <a:gd name="connsiteX16" fmla="*/ 942392 w 1582803"/>
+                  <a:gd name="connsiteY16" fmla="*/ 1122144 h 2216048"/>
+                  <a:gd name="connsiteX17" fmla="*/ 787564 w 1582803"/>
+                  <a:gd name="connsiteY17" fmla="*/ 1483010 h 2216048"/>
+                  <a:gd name="connsiteX18" fmla="*/ 714659 w 1582803"/>
+                  <a:gd name="connsiteY18" fmla="*/ 1968863 h 2216048"/>
+                  <a:gd name="connsiteX19" fmla="*/ 704525 w 1582803"/>
+                  <a:gd name="connsiteY19" fmla="*/ 2127224 h 2216048"/>
+                  <a:gd name="connsiteX20" fmla="*/ 609814 w 1582803"/>
+                  <a:gd name="connsiteY20" fmla="*/ 1693889 h 2216048"/>
+                  <a:gd name="connsiteX21" fmla="*/ 570956 w 1582803"/>
+                  <a:gd name="connsiteY21" fmla="*/ 1361993 h 2216048"/>
+                  <a:gd name="connsiteX22" fmla="*/ 648283 w 1582803"/>
+                  <a:gd name="connsiteY22" fmla="*/ 1528349 h 2216048"/>
+                  <a:gd name="connsiteX23" fmla="*/ 644059 w 1582803"/>
+                  <a:gd name="connsiteY23" fmla="*/ 1313318 h 2216048"/>
+                  <a:gd name="connsiteX24" fmla="*/ 722701 w 1582803"/>
+                  <a:gd name="connsiteY24" fmla="*/ 1147650 h 2216048"/>
+                  <a:gd name="connsiteX25" fmla="*/ 770426 w 1582803"/>
+                  <a:gd name="connsiteY25" fmla="*/ 919458 h 2216048"/>
+                  <a:gd name="connsiteX26" fmla="*/ 801597 w 1582803"/>
+                  <a:gd name="connsiteY26" fmla="*/ 1062329 h 2216048"/>
+                  <a:gd name="connsiteX27" fmla="*/ 835154 w 1582803"/>
+                  <a:gd name="connsiteY27" fmla="*/ 837726 h 2216048"/>
+                  <a:gd name="connsiteX28" fmla="*/ 983437 w 1582803"/>
+                  <a:gd name="connsiteY28" fmla="*/ 649389 h 2216048"/>
+                  <a:gd name="connsiteX29" fmla="*/ 1155522 w 1582803"/>
+                  <a:gd name="connsiteY29" fmla="*/ 515329 h 2216048"/>
+                  <a:gd name="connsiteX30" fmla="*/ 1391329 w 1582803"/>
+                  <a:gd name="connsiteY30" fmla="*/ 355074 h 2216048"/>
+                  <a:gd name="connsiteX31" fmla="*/ 1396094 w 1582803"/>
+                  <a:gd name="connsiteY31" fmla="*/ 350843 h 2216048"/>
+                  <a:gd name="connsiteX32" fmla="*/ 1378860 w 1582803"/>
+                  <a:gd name="connsiteY32" fmla="*/ 345548 h 2216048"/>
+                  <a:gd name="connsiteX33" fmla="*/ 306027 w 1582803"/>
+                  <a:gd name="connsiteY33" fmla="*/ 829562 h 2216048"/>
+                  <a:gd name="connsiteX34" fmla="*/ 432427 w 1582803"/>
+                  <a:gd name="connsiteY34" fmla="*/ 2144702 h 2216048"/>
+                  <a:gd name="connsiteX35" fmla="*/ 500790 w 1582803"/>
+                  <a:gd name="connsiteY35" fmla="*/ 2199065 h 2216048"/>
+                  <a:gd name="connsiteX36" fmla="*/ 498194 w 1582803"/>
+                  <a:gd name="connsiteY36" fmla="*/ 2202840 h 2216048"/>
+                  <a:gd name="connsiteX37" fmla="*/ 125476 w 1582803"/>
+                  <a:gd name="connsiteY37" fmla="*/ 737314 h 2216048"/>
+                  <a:gd name="connsiteX38" fmla="*/ 819110 w 1582803"/>
+                  <a:gd name="connsiteY38" fmla="*/ 160678 h 2216048"/>
+                </a:gdLst>
+                <a:ahLst/>
+                <a:cxnLst>
+                  <a:cxn ang="0">
+                    <a:pos x="connsiteX0" y="connsiteY0"/>
+                  </a:cxn>
+                  <a:cxn ang="0">
+                    <a:pos x="connsiteX1" y="connsiteY1"/>
+                  </a:cxn>
+                  <a:cxn ang="0">
+                    <a:pos x="connsiteX2" y="connsiteY2"/>
+                  </a:cxn>
+                  <a:cxn ang="0">
+                    <a:pos x="connsiteX3" y="connsiteY3"/>
+                  </a:cxn>
+                  <a:cxn ang="0">
+                    <a:pos x="connsiteX4" y="connsiteY4"/>
+                  </a:cxn>
+                  <a:cxn ang="0">
+                    <a:pos x="connsiteX5" y="connsiteY5"/>
+                  </a:cxn>
+                  <a:cxn ang="0">
+                    <a:pos x="connsiteX6" y="connsiteY6"/>
+                  </a:cxn>
+                  <a:cxn ang="0">
+                    <a:pos x="connsiteX7" y="connsiteY7"/>
+                  </a:cxn>
+                  <a:cxn ang="0">
+                    <a:pos x="connsiteX8" y="connsiteY8"/>
+                  </a:cxn>
+                  <a:cxn ang="0">
+                    <a:pos x="connsiteX9" y="connsiteY9"/>
+                  </a:cxn>
+                  <a:cxn ang="0">
+                    <a:pos x="connsiteX10" y="connsiteY10"/>
+                  </a:cxn>
+                  <a:cxn ang="0">
+                    <a:pos x="connsiteX11" y="connsiteY11"/>
+                  </a:cxn>
+                  <a:cxn ang="0">
+                    <a:pos x="connsiteX12" y="connsiteY12"/>
+                  </a:cxn>
+                  <a:cxn ang="0">
+                    <a:pos x="connsiteX13" y="connsiteY13"/>
+                  </a:cxn>
+                  <a:cxn ang="0">
+                    <a:pos x="connsiteX14" y="connsiteY14"/>
+                  </a:cxn>
+                  <a:cxn ang="0">
+                    <a:pos x="connsiteX15" y="connsiteY15"/>
+                  </a:cxn>
+                  <a:cxn ang="0">
+                    <a:pos x="connsiteX16" y="connsiteY16"/>
+                  </a:cxn>
+                  <a:cxn ang="0">
+                    <a:pos x="connsiteX17" y="connsiteY17"/>
+                  </a:cxn>
+                  <a:cxn ang="0">
+                    <a:pos x="connsiteX18" y="connsiteY18"/>
+                  </a:cxn>
+                  <a:cxn ang="0">
+                    <a:pos x="connsiteX19" y="connsiteY19"/>
+                  </a:cxn>
+                  <a:cxn ang="0">
+                    <a:pos x="connsiteX20" y="connsiteY20"/>
+                  </a:cxn>
+                  <a:cxn ang="0">
+                    <a:pos x="connsiteX21" y="connsiteY21"/>
+                  </a:cxn>
+                  <a:cxn ang="0">
+                    <a:pos x="connsiteX22" y="connsiteY22"/>
+                  </a:cxn>
+                  <a:cxn ang="0">
+                    <a:pos x="connsiteX23" y="connsiteY23"/>
+                  </a:cxn>
+                  <a:cxn ang="0">
+                    <a:pos x="connsiteX24" y="connsiteY24"/>
+                  </a:cxn>
+                  <a:cxn ang="0">
+                    <a:pos x="connsiteX25" y="connsiteY25"/>
+                  </a:cxn>
+                  <a:cxn ang="0">
+                    <a:pos x="connsiteX26" y="connsiteY26"/>
+                  </a:cxn>
+                  <a:cxn ang="0">
+                    <a:pos x="connsiteX27" y="connsiteY27"/>
+                  </a:cxn>
+                  <a:cxn ang="0">
+                    <a:pos x="connsiteX28" y="connsiteY28"/>
+                  </a:cxn>
+                  <a:cxn ang="0">
+                    <a:pos x="connsiteX29" y="connsiteY29"/>
+                  </a:cxn>
+                  <a:cxn ang="0">
+                    <a:pos x="connsiteX30" y="connsiteY30"/>
+                  </a:cxn>
+                  <a:cxn ang="0">
+                    <a:pos x="connsiteX31" y="connsiteY31"/>
+                  </a:cxn>
+                  <a:cxn ang="0">
+                    <a:pos x="connsiteX32" y="connsiteY32"/>
+                  </a:cxn>
+                  <a:cxn ang="0">
+                    <a:pos x="connsiteX33" y="connsiteY33"/>
+                  </a:cxn>
+                  <a:cxn ang="0">
+                    <a:pos x="connsiteX34" y="connsiteY34"/>
+                  </a:cxn>
+                  <a:cxn ang="0">
+                    <a:pos x="connsiteX35" y="connsiteY35"/>
+                  </a:cxn>
+                  <a:cxn ang="0">
+                    <a:pos x="connsiteX36" y="connsiteY36"/>
+                  </a:cxn>
+                  <a:cxn ang="0">
+                    <a:pos x="connsiteX37" y="connsiteY37"/>
+                  </a:cxn>
+                  <a:cxn ang="0">
+                    <a:pos x="connsiteX38" y="connsiteY38"/>
+                  </a:cxn>
+                </a:cxnLst>
+                <a:rect l="l" t="t" r="r" b="b"/>
+                <a:pathLst>
+                  <a:path w="1582803" h="2216048">
+                    <a:moveTo>
+                      <a:pt x="501071" y="2199288"/>
+                    </a:moveTo>
+                    <a:lnTo>
+                      <a:pt x="501416" y="2199563"/>
+                    </a:lnTo>
+                    <a:cubicBezTo>
+                      <a:pt x="482326" y="2227446"/>
+                      <a:pt x="491065" y="2214324"/>
+                      <a:pt x="499805" y="2201202"/>
+                    </a:cubicBezTo>
+                    <a:close/>
+                    <a:moveTo>
+                      <a:pt x="509436" y="2186644"/>
+                    </a:moveTo>
+                    <a:lnTo>
+                      <a:pt x="501071" y="2199288"/>
+                    </a:lnTo>
+                    <a:lnTo>
+                      <a:pt x="500790" y="2199065"/>
+                    </a:lnTo>
+                    <a:lnTo>
+                      <a:pt x="507729" y="2188975"/>
+                    </a:lnTo>
+                    <a:cubicBezTo>
+                      <a:pt x="509458" y="2186490"/>
+                      <a:pt x="509882" y="2185926"/>
+                      <a:pt x="509436" y="2186644"/>
+                    </a:cubicBezTo>
+                    <a:close/>
+                    <a:moveTo>
+                      <a:pt x="819110" y="160678"/>
+                    </a:moveTo>
+                    <a:cubicBezTo>
+                      <a:pt x="1013333" y="102935"/>
+                      <a:pt x="1223728" y="96302"/>
+                      <a:pt x="1429197" y="149133"/>
+                    </a:cubicBezTo>
+                    <a:lnTo>
+                      <a:pt x="1526472" y="179022"/>
+                    </a:lnTo>
+                    <a:lnTo>
+                      <a:pt x="1534350" y="160689"/>
+                    </a:lnTo>
+                    <a:cubicBezTo>
+                      <a:pt x="1556130" y="100518"/>
+                      <a:pt x="1573878" y="26761"/>
+                      <a:pt x="1582803" y="0"/>
+                    </a:cubicBezTo>
+                    <a:cubicBezTo>
+                      <a:pt x="1582803" y="0"/>
+                      <a:pt x="1579070" y="127424"/>
+                      <a:pt x="1553906" y="203321"/>
+                    </a:cubicBezTo>
+                    <a:cubicBezTo>
+                      <a:pt x="1528742" y="279217"/>
+                      <a:pt x="1491971" y="358892"/>
+                      <a:pt x="1431819" y="455379"/>
+                    </a:cubicBezTo>
+                    <a:cubicBezTo>
+                      <a:pt x="1371666" y="551867"/>
+                      <a:pt x="1274564" y="671117"/>
+                      <a:pt x="1192992" y="782244"/>
+                    </a:cubicBezTo>
+                    <a:cubicBezTo>
+                      <a:pt x="1192992" y="782244"/>
+                      <a:pt x="1009964" y="1005350"/>
+                      <a:pt x="942392" y="1122144"/>
+                    </a:cubicBezTo>
+                    <a:cubicBezTo>
+                      <a:pt x="874821" y="1238938"/>
+                      <a:pt x="825519" y="1341890"/>
+                      <a:pt x="787564" y="1483010"/>
+                    </a:cubicBezTo>
+                    <a:cubicBezTo>
+                      <a:pt x="749609" y="1624130"/>
+                      <a:pt x="732134" y="1796496"/>
+                      <a:pt x="714659" y="1968863"/>
+                    </a:cubicBezTo>
+                    <a:lnTo>
+                      <a:pt x="704525" y="2127224"/>
+                    </a:lnTo>
+                    <a:cubicBezTo>
+                      <a:pt x="704525" y="2127224"/>
+                      <a:pt x="632075" y="1821428"/>
+                      <a:pt x="609814" y="1693889"/>
+                    </a:cubicBezTo>
+                    <a:cubicBezTo>
+                      <a:pt x="587552" y="1566350"/>
+                      <a:pt x="577433" y="1417308"/>
+                      <a:pt x="570956" y="1361993"/>
+                    </a:cubicBezTo>
+                    <a:lnTo>
+                      <a:pt x="648283" y="1528349"/>
+                    </a:lnTo>
+                    <a:cubicBezTo>
+                      <a:pt x="648283" y="1528349"/>
+                      <a:pt x="631657" y="1376768"/>
+                      <a:pt x="644059" y="1313318"/>
+                    </a:cubicBezTo>
+                    <a:cubicBezTo>
+                      <a:pt x="656462" y="1249868"/>
+                      <a:pt x="701641" y="1213294"/>
+                      <a:pt x="722701" y="1147650"/>
+                    </a:cubicBezTo>
+                    <a:cubicBezTo>
+                      <a:pt x="743762" y="1082007"/>
+                      <a:pt x="762471" y="957490"/>
+                      <a:pt x="770426" y="919458"/>
+                    </a:cubicBezTo>
+                    <a:lnTo>
+                      <a:pt x="801597" y="1062329"/>
+                    </a:lnTo>
+                    <a:cubicBezTo>
+                      <a:pt x="801597" y="1062329"/>
+                      <a:pt x="804847" y="906549"/>
+                      <a:pt x="835154" y="837726"/>
+                    </a:cubicBezTo>
+                    <a:cubicBezTo>
+                      <a:pt x="865460" y="768903"/>
+                      <a:pt x="930042" y="703122"/>
+                      <a:pt x="983437" y="649389"/>
+                    </a:cubicBezTo>
+                    <a:cubicBezTo>
+                      <a:pt x="1036831" y="595657"/>
+                      <a:pt x="1087540" y="564382"/>
+                      <a:pt x="1155522" y="515329"/>
+                    </a:cubicBezTo>
+                    <a:cubicBezTo>
+                      <a:pt x="1223504" y="466277"/>
+                      <a:pt x="1332015" y="405281"/>
+                      <a:pt x="1391329" y="355074"/>
+                    </a:cubicBezTo>
+                    <a:lnTo>
+                      <a:pt x="1396094" y="350843"/>
+                    </a:lnTo>
+                    <a:lnTo>
+                      <a:pt x="1378860" y="345548"/>
+                    </a:lnTo>
+                    <a:cubicBezTo>
+                      <a:pt x="956157" y="236860"/>
+                      <a:pt x="508124" y="434006"/>
+                      <a:pt x="306027" y="829562"/>
+                    </a:cubicBezTo>
+                    <a:cubicBezTo>
+                      <a:pt x="103931" y="1225118"/>
+                      <a:pt x="108884" y="1847850"/>
+                      <a:pt x="432427" y="2144702"/>
+                    </a:cubicBezTo>
+                    <a:lnTo>
+                      <a:pt x="500790" y="2199065"/>
+                    </a:lnTo>
+                    <a:lnTo>
+                      <a:pt x="498194" y="2202840"/>
+                    </a:lnTo>
+                    <a:cubicBezTo>
+                      <a:pt x="23105" y="1877560"/>
+                      <a:pt x="-136488" y="1250045"/>
+                      <a:pt x="125476" y="737314"/>
+                    </a:cubicBezTo>
+                    <a:cubicBezTo>
+                      <a:pt x="272831" y="448903"/>
+                      <a:pt x="527777" y="247292"/>
+                      <a:pt x="819110" y="160678"/>
+                    </a:cubicBezTo>
+                    <a:close/>
+                  </a:path>
+                </a:pathLst>
+              </a:custGeom>
+              <a:solidFill>
+                <a:srgbClr val="9966FF"/>
+              </a:solidFill>
+              <a:ln>
+                <a:noFill/>
+              </a:ln>
+            </p:spPr>
+            <p:style>
+              <a:lnRef idx="2">
+                <a:schemeClr val="accent1">
+                  <a:shade val="50000"/>
+                </a:schemeClr>
+              </a:lnRef>
+              <a:fillRef idx="1">
+                <a:schemeClr val="accent1"/>
+              </a:fillRef>
+              <a:effectRef idx="0">
+                <a:schemeClr val="accent1"/>
+              </a:effectRef>
+              <a:fontRef idx="minor">
+                <a:schemeClr val="lt1"/>
+              </a:fontRef>
+            </p:style>
+            <p:txBody>
+              <a:bodyPr wrap="square" rtlCol="0" anchor="ctr">
+                <a:noAutofit/>
+              </a:bodyPr>
+              <a:lstStyle/>
+              <a:p>
+                <a:pPr algn="ctr"/>
+                <a:endParaRPr lang="en-US" dirty="0">
+                  <a:solidFill>
+                    <a:schemeClr val="tx1"/>
+                  </a:solidFill>
+                </a:endParaRPr>
+              </a:p>
+            </p:txBody>
+          </p:sp>
+        </p:grpSp>
+        <p:grpSp>
+          <p:nvGrpSpPr>
+            <p:cNvPr id="7" name="Group 6">
+              <a:extLst>
+                <a:ext uri="{FF2B5EF4-FFF2-40B4-BE49-F238E27FC236}">
+                  <a16:creationId xmlns:a16="http://schemas.microsoft.com/office/drawing/2014/main" id="{1A246BB0-4BB3-43AA-BAF8-F25CC2B4CF7C}"/>
+                </a:ext>
+              </a:extLst>
+            </p:cNvPr>
+            <p:cNvGrpSpPr/>
+            <p:nvPr/>
+          </p:nvGrpSpPr>
+          <p:grpSpPr>
+            <a:xfrm>
+              <a:off x="5201760" y="1526937"/>
+              <a:ext cx="2743200" cy="2743200"/>
+              <a:chOff x="8420164" y="2222451"/>
+              <a:chExt cx="2743200" cy="2743200"/>
+            </a:xfrm>
+          </p:grpSpPr>
+          <p:sp>
+            <p:nvSpPr>
+              <p:cNvPr id="86" name="Rectangle 85">
+                <a:extLst>
+                  <a:ext uri="{FF2B5EF4-FFF2-40B4-BE49-F238E27FC236}">
+                    <a16:creationId xmlns:a16="http://schemas.microsoft.com/office/drawing/2014/main" id="{76E53BA5-DE5B-42B6-A330-1B9240EF03A7}"/>
+                  </a:ext>
+                </a:extLst>
+              </p:cNvPr>
+              <p:cNvSpPr/>
+              <p:nvPr/>
+            </p:nvSpPr>
+            <p:spPr>
+              <a:xfrm>
+                <a:off x="8420164" y="2222451"/>
+                <a:ext cx="2743200" cy="2743200"/>
+              </a:xfrm>
+              <a:prstGeom prst="rect">
+                <a:avLst/>
+              </a:prstGeom>
+              <a:noFill/>
+              <a:ln>
+                <a:noFill/>
+              </a:ln>
+            </p:spPr>
+            <p:style>
+              <a:lnRef idx="2">
+                <a:schemeClr val="accent1">
+                  <a:shade val="50000"/>
+                </a:schemeClr>
+              </a:lnRef>
+              <a:fillRef idx="1">
+                <a:schemeClr val="accent1"/>
+              </a:fillRef>
+              <a:effectRef idx="0">
+                <a:schemeClr val="accent1"/>
+              </a:effectRef>
+              <a:fontRef idx="minor">
+                <a:schemeClr val="lt1"/>
+              </a:fontRef>
+            </p:style>
+            <p:txBody>
+              <a:bodyPr rtlCol="0" anchor="ctr"/>
+              <a:lstStyle/>
+              <a:p>
+                <a:pPr algn="ctr"/>
+                <a:endParaRPr lang="en-US"/>
+              </a:p>
+            </p:txBody>
+          </p:sp>
+          <p:sp>
+            <p:nvSpPr>
+              <p:cNvPr id="89" name="Freeform: Shape 88">
+                <a:extLst>
+                  <a:ext uri="{FF2B5EF4-FFF2-40B4-BE49-F238E27FC236}">
+                    <a16:creationId xmlns:a16="http://schemas.microsoft.com/office/drawing/2014/main" id="{A405A4DF-6254-4581-B8CF-85E02F8962FD}"/>
+                  </a:ext>
+                </a:extLst>
+              </p:cNvPr>
+              <p:cNvSpPr/>
+              <p:nvPr/>
+            </p:nvSpPr>
+            <p:spPr>
+              <a:xfrm rot="11120515">
+                <a:off x="9131800" y="2442194"/>
+                <a:ext cx="1789593" cy="2451267"/>
+              </a:xfrm>
+              <a:custGeom>
+                <a:avLst/>
+                <a:gdLst>
+                  <a:gd name="connsiteX0" fmla="*/ 1531385 w 1789593"/>
+                  <a:gd name="connsiteY0" fmla="*/ 174047 h 2451267"/>
+                  <a:gd name="connsiteX1" fmla="*/ 1531361 w 1789593"/>
+                  <a:gd name="connsiteY1" fmla="*/ 174040 h 2451267"/>
+                  <a:gd name="connsiteX2" fmla="*/ 1534080 w 1789593"/>
+                  <a:gd name="connsiteY2" fmla="*/ 166462 h 2451267"/>
+                  <a:gd name="connsiteX3" fmla="*/ 1535232 w 1789593"/>
+                  <a:gd name="connsiteY3" fmla="*/ 163271 h 2451267"/>
+                  <a:gd name="connsiteX4" fmla="*/ 1524524 w 1789593"/>
+                  <a:gd name="connsiteY4" fmla="*/ 193267 h 2451267"/>
+                  <a:gd name="connsiteX5" fmla="*/ 1529878 w 1789593"/>
+                  <a:gd name="connsiteY5" fmla="*/ 178269 h 2451267"/>
+                  <a:gd name="connsiteX6" fmla="*/ 1531385 w 1789593"/>
+                  <a:gd name="connsiteY6" fmla="*/ 174047 h 2451267"/>
+                  <a:gd name="connsiteX7" fmla="*/ 1531423 w 1789593"/>
+                  <a:gd name="connsiteY7" fmla="*/ 174059 h 2451267"/>
+                  <a:gd name="connsiteX8" fmla="*/ 1524524 w 1789593"/>
+                  <a:gd name="connsiteY8" fmla="*/ 193267 h 2451267"/>
+                  <a:gd name="connsiteX9" fmla="*/ 482416 w 1789593"/>
+                  <a:gd name="connsiteY9" fmla="*/ 2451267 h 2451267"/>
+                  <a:gd name="connsiteX10" fmla="*/ 489235 w 1789593"/>
+                  <a:gd name="connsiteY10" fmla="*/ 2262557 h 2451267"/>
+                  <a:gd name="connsiteX11" fmla="*/ 493039 w 1789593"/>
+                  <a:gd name="connsiteY11" fmla="*/ 2192439 h 2451267"/>
+                  <a:gd name="connsiteX12" fmla="*/ 413198 w 1789593"/>
+                  <a:gd name="connsiteY12" fmla="*/ 2132224 h 2451267"/>
+                  <a:gd name="connsiteX13" fmla="*/ 125366 w 1789593"/>
+                  <a:gd name="connsiteY13" fmla="*/ 731046 h 2451267"/>
+                  <a:gd name="connsiteX14" fmla="*/ 1429180 w 1789593"/>
+                  <a:gd name="connsiteY14" fmla="*/ 142645 h 2451267"/>
+                  <a:gd name="connsiteX15" fmla="*/ 1531361 w 1789593"/>
+                  <a:gd name="connsiteY15" fmla="*/ 174040 h 2451267"/>
+                  <a:gd name="connsiteX16" fmla="*/ 1528333 w 1789593"/>
+                  <a:gd name="connsiteY16" fmla="*/ 182479 h 2451267"/>
+                  <a:gd name="connsiteX17" fmla="*/ 305937 w 1789593"/>
+                  <a:gd name="connsiteY17" fmla="*/ 823255 h 2451267"/>
+                  <a:gd name="connsiteX18" fmla="*/ 478734 w 1789593"/>
+                  <a:gd name="connsiteY18" fmla="*/ 1917956 h 2451267"/>
+                  <a:gd name="connsiteX19" fmla="*/ 522767 w 1789593"/>
+                  <a:gd name="connsiteY19" fmla="*/ 1954448 h 2451267"/>
+                  <a:gd name="connsiteX20" fmla="*/ 542850 w 1789593"/>
+                  <a:gd name="connsiteY20" fmla="*/ 1854794 h 2451267"/>
+                  <a:gd name="connsiteX21" fmla="*/ 593854 w 1789593"/>
+                  <a:gd name="connsiteY21" fmla="*/ 1706906 h 2451267"/>
+                  <a:gd name="connsiteX22" fmla="*/ 738953 w 1789593"/>
+                  <a:gd name="connsiteY22" fmla="*/ 1531872 h 2451267"/>
+                  <a:gd name="connsiteX23" fmla="*/ 615107 w 1789593"/>
+                  <a:gd name="connsiteY23" fmla="*/ 1567916 h 2451267"/>
+                  <a:gd name="connsiteX24" fmla="*/ 720951 w 1789593"/>
+                  <a:gd name="connsiteY24" fmla="*/ 1391660 h 2451267"/>
+                  <a:gd name="connsiteX25" fmla="*/ 882870 w 1789593"/>
+                  <a:gd name="connsiteY25" fmla="*/ 1239517 h 2451267"/>
+                  <a:gd name="connsiteX26" fmla="*/ 1171496 w 1789593"/>
+                  <a:gd name="connsiteY26" fmla="*/ 1134242 h 2451267"/>
+                  <a:gd name="connsiteX27" fmla="*/ 978381 w 1789593"/>
+                  <a:gd name="connsiteY27" fmla="*/ 1162085 h 2451267"/>
+                  <a:gd name="connsiteX28" fmla="*/ 827700 w 1789593"/>
+                  <a:gd name="connsiteY28" fmla="*/ 1225104 h 2451267"/>
+                  <a:gd name="connsiteX29" fmla="*/ 964007 w 1789593"/>
+                  <a:gd name="connsiteY29" fmla="*/ 1060677 h 2451267"/>
+                  <a:gd name="connsiteX30" fmla="*/ 1064092 w 1789593"/>
+                  <a:gd name="connsiteY30" fmla="*/ 875173 h 2451267"/>
+                  <a:gd name="connsiteX31" fmla="*/ 1210098 w 1789593"/>
+                  <a:gd name="connsiteY31" fmla="*/ 709839 h 2451267"/>
+                  <a:gd name="connsiteX32" fmla="*/ 1387616 w 1789593"/>
+                  <a:gd name="connsiteY32" fmla="*/ 619847 h 2451267"/>
+                  <a:gd name="connsiteX33" fmla="*/ 1605158 w 1789593"/>
+                  <a:gd name="connsiteY33" fmla="*/ 486968 h 2451267"/>
+                  <a:gd name="connsiteX34" fmla="*/ 1641595 w 1789593"/>
+                  <a:gd name="connsiteY34" fmla="*/ 248700 h 2451267"/>
+                  <a:gd name="connsiteX35" fmla="*/ 1626766 w 1789593"/>
+                  <a:gd name="connsiteY35" fmla="*/ 142442 h 2451267"/>
+                  <a:gd name="connsiteX36" fmla="*/ 1789593 w 1789593"/>
+                  <a:gd name="connsiteY36" fmla="*/ 0 h 2451267"/>
+                  <a:gd name="connsiteX37" fmla="*/ 1754694 w 1789593"/>
+                  <a:gd name="connsiteY37" fmla="*/ 150052 h 2451267"/>
+                  <a:gd name="connsiteX38" fmla="*/ 1522762 w 1789593"/>
+                  <a:gd name="connsiteY38" fmla="*/ 861643 h 2451267"/>
+                  <a:gd name="connsiteX39" fmla="*/ 1218879 w 1789593"/>
+                  <a:gd name="connsiteY39" fmla="*/ 1379352 h 2451267"/>
+                  <a:gd name="connsiteX40" fmla="*/ 802388 w 1789593"/>
+                  <a:gd name="connsiteY40" fmla="*/ 1843981 h 2451267"/>
+                  <a:gd name="connsiteX41" fmla="*/ 569940 w 1789593"/>
+                  <a:gd name="connsiteY41" fmla="*/ 2183757 h 2451267"/>
+                  <a:gd name="connsiteX42" fmla="*/ 482416 w 1789593"/>
+                  <a:gd name="connsiteY42" fmla="*/ 2451267 h 2451267"/>
+                </a:gdLst>
+                <a:ahLst/>
+                <a:cxnLst>
+                  <a:cxn ang="0">
+                    <a:pos x="connsiteX0" y="connsiteY0"/>
+                  </a:cxn>
+                  <a:cxn ang="0">
+                    <a:pos x="connsiteX1" y="connsiteY1"/>
+                  </a:cxn>
+                  <a:cxn ang="0">
+                    <a:pos x="connsiteX2" y="connsiteY2"/>
+                  </a:cxn>
+                  <a:cxn ang="0">
+                    <a:pos x="connsiteX3" y="connsiteY3"/>
+                  </a:cxn>
+                  <a:cxn ang="0">
+                    <a:pos x="connsiteX4" y="connsiteY4"/>
+                  </a:cxn>
+                  <a:cxn ang="0">
+                    <a:pos x="connsiteX5" y="connsiteY5"/>
+                  </a:cxn>
+                  <a:cxn ang="0">
+                    <a:pos x="connsiteX6" y="connsiteY6"/>
+                  </a:cxn>
+                  <a:cxn ang="0">
+                    <a:pos x="connsiteX7" y="connsiteY7"/>
+                  </a:cxn>
+                  <a:cxn ang="0">
+                    <a:pos x="connsiteX8" y="connsiteY8"/>
+                  </a:cxn>
+                  <a:cxn ang="0">
+                    <a:pos x="connsiteX9" y="connsiteY9"/>
+                  </a:cxn>
+                  <a:cxn ang="0">
+                    <a:pos x="connsiteX10" y="connsiteY10"/>
+                  </a:cxn>
+                  <a:cxn ang="0">
+                    <a:pos x="connsiteX11" y="connsiteY11"/>
+                  </a:cxn>
+                  <a:cxn ang="0">
+                    <a:pos x="connsiteX12" y="connsiteY12"/>
+                  </a:cxn>
+                  <a:cxn ang="0">
+                    <a:pos x="connsiteX13" y="connsiteY13"/>
+                  </a:cxn>
+                  <a:cxn ang="0">
+                    <a:pos x="connsiteX14" y="connsiteY14"/>
+                  </a:cxn>
+                  <a:cxn ang="0">
+                    <a:pos x="connsiteX15" y="connsiteY15"/>
+                  </a:cxn>
+                  <a:cxn ang="0">
+                    <a:pos x="connsiteX16" y="connsiteY16"/>
+                  </a:cxn>
+                  <a:cxn ang="0">
+                    <a:pos x="connsiteX17" y="connsiteY17"/>
+                  </a:cxn>
+                  <a:cxn ang="0">
+                    <a:pos x="connsiteX18" y="connsiteY18"/>
+                  </a:cxn>
+                  <a:cxn ang="0">
+                    <a:pos x="connsiteX19" y="connsiteY19"/>
+                  </a:cxn>
+                  <a:cxn ang="0">
+                    <a:pos x="connsiteX20" y="connsiteY20"/>
+                  </a:cxn>
+                  <a:cxn ang="0">
+                    <a:pos x="connsiteX21" y="connsiteY21"/>
+                  </a:cxn>
+                  <a:cxn ang="0">
+                    <a:pos x="connsiteX22" y="connsiteY22"/>
+                  </a:cxn>
+                  <a:cxn ang="0">
+                    <a:pos x="connsiteX23" y="connsiteY23"/>
+                  </a:cxn>
+                  <a:cxn ang="0">
+                    <a:pos x="connsiteX24" y="connsiteY24"/>
+                  </a:cxn>
+                  <a:cxn ang="0">
+                    <a:pos x="connsiteX25" y="connsiteY25"/>
+                  </a:cxn>
+                  <a:cxn ang="0">
+                    <a:pos x="connsiteX26" y="connsiteY26"/>
+                  </a:cxn>
+                  <a:cxn ang="0">
+                    <a:pos x="connsiteX27" y="connsiteY27"/>
+                  </a:cxn>
+                  <a:cxn ang="0">
+                    <a:pos x="connsiteX28" y="connsiteY28"/>
+                  </a:cxn>
+                  <a:cxn ang="0">
+                    <a:pos x="connsiteX29" y="connsiteY29"/>
+                  </a:cxn>
+                  <a:cxn ang="0">
+                    <a:pos x="connsiteX30" y="connsiteY30"/>
+                  </a:cxn>
+                  <a:cxn ang="0">
+                    <a:pos x="connsiteX31" y="connsiteY31"/>
+                  </a:cxn>
+                  <a:cxn ang="0">
+                    <a:pos x="connsiteX32" y="connsiteY32"/>
+                  </a:cxn>
+                  <a:cxn ang="0">
+                    <a:pos x="connsiteX33" y="connsiteY33"/>
+                  </a:cxn>
+                  <a:cxn ang="0">
+                    <a:pos x="connsiteX34" y="connsiteY34"/>
+                  </a:cxn>
+                  <a:cxn ang="0">
+                    <a:pos x="connsiteX35" y="connsiteY35"/>
+                  </a:cxn>
+                  <a:cxn ang="0">
+                    <a:pos x="connsiteX36" y="connsiteY36"/>
+                  </a:cxn>
+                  <a:cxn ang="0">
+                    <a:pos x="connsiteX37" y="connsiteY37"/>
+                  </a:cxn>
+                  <a:cxn ang="0">
+                    <a:pos x="connsiteX38" y="connsiteY38"/>
+                  </a:cxn>
+                  <a:cxn ang="0">
+                    <a:pos x="connsiteX39" y="connsiteY39"/>
+                  </a:cxn>
+                  <a:cxn ang="0">
+                    <a:pos x="connsiteX40" y="connsiteY40"/>
+                  </a:cxn>
+                  <a:cxn ang="0">
+                    <a:pos x="connsiteX41" y="connsiteY41"/>
+                  </a:cxn>
+                  <a:cxn ang="0">
+                    <a:pos x="connsiteX42" y="connsiteY42"/>
+                  </a:cxn>
+                </a:cxnLst>
+                <a:rect l="l" t="t" r="r" b="b"/>
+                <a:pathLst>
+                  <a:path w="1789593" h="2451267">
+                    <a:moveTo>
+                      <a:pt x="1531385" y="174047"/>
+                    </a:moveTo>
+                    <a:lnTo>
+                      <a:pt x="1531361" y="174040"/>
+                    </a:lnTo>
+                    <a:lnTo>
+                      <a:pt x="1534080" y="166462"/>
+                    </a:lnTo>
+                    <a:cubicBezTo>
+                      <a:pt x="1535145" y="163498"/>
+                      <a:pt x="1535444" y="162672"/>
+                      <a:pt x="1535232" y="163271"/>
+                    </a:cubicBezTo>
+                    <a:close/>
+                    <a:moveTo>
+                      <a:pt x="1524524" y="193267"/>
+                    </a:moveTo>
+                    <a:cubicBezTo>
+                      <a:pt x="1524947" y="192068"/>
+                      <a:pt x="1527413" y="185169"/>
+                      <a:pt x="1529878" y="178269"/>
+                    </a:cubicBezTo>
+                    <a:lnTo>
+                      <a:pt x="1531385" y="174047"/>
+                    </a:lnTo>
+                    <a:lnTo>
+                      <a:pt x="1531423" y="174059"/>
+                    </a:lnTo>
+                    <a:cubicBezTo>
+                      <a:pt x="1525720" y="189963"/>
+                      <a:pt x="1524101" y="194465"/>
+                      <a:pt x="1524524" y="193267"/>
+                    </a:cubicBezTo>
+                    <a:close/>
+                    <a:moveTo>
+                      <a:pt x="482416" y="2451267"/>
+                    </a:moveTo>
+                    <a:cubicBezTo>
+                      <a:pt x="484458" y="2416418"/>
+                      <a:pt x="485941" y="2342885"/>
+                      <a:pt x="489235" y="2262557"/>
+                    </a:cubicBezTo>
+                    <a:lnTo>
+                      <a:pt x="493039" y="2192439"/>
+                    </a:lnTo>
+                    <a:lnTo>
+                      <a:pt x="413198" y="2132224"/>
+                    </a:lnTo>
+                    <a:cubicBezTo>
+                      <a:pt x="4961" y="1793498"/>
+                      <a:pt x="-120162" y="1211859"/>
+                      <a:pt x="125366" y="731046"/>
+                    </a:cubicBezTo>
+                    <a:cubicBezTo>
+                      <a:pt x="370894" y="250232"/>
+                      <a:pt x="915425" y="10552"/>
+                      <a:pt x="1429180" y="142645"/>
+                    </a:cubicBezTo>
+                    <a:lnTo>
+                      <a:pt x="1531361" y="174040"/>
+                    </a:lnTo>
+                    <a:lnTo>
+                      <a:pt x="1528333" y="182479"/>
+                    </a:lnTo>
+                    <a:cubicBezTo>
+                      <a:pt x="1082267" y="22515"/>
+                      <a:pt x="521452" y="401216"/>
+                      <a:pt x="305937" y="823255"/>
+                    </a:cubicBezTo>
+                    <a:cubicBezTo>
+                      <a:pt x="117362" y="1192540"/>
+                      <a:pt x="194483" y="1634099"/>
+                      <a:pt x="478734" y="1917956"/>
+                    </a:cubicBezTo>
+                    <a:lnTo>
+                      <a:pt x="522767" y="1954448"/>
+                    </a:lnTo>
+                    <a:lnTo>
+                      <a:pt x="542850" y="1854794"/>
+                    </a:lnTo>
+                    <a:cubicBezTo>
+                      <a:pt x="557428" y="1799201"/>
+                      <a:pt x="574518" y="1748673"/>
+                      <a:pt x="593854" y="1706906"/>
+                    </a:cubicBezTo>
+                    <a:cubicBezTo>
+                      <a:pt x="632526" y="1623372"/>
+                      <a:pt x="738953" y="1531872"/>
+                      <a:pt x="738953" y="1531872"/>
+                    </a:cubicBezTo>
+                    <a:lnTo>
+                      <a:pt x="615107" y="1567916"/>
+                    </a:lnTo>
+                    <a:cubicBezTo>
+                      <a:pt x="632748" y="1538540"/>
+                      <a:pt x="676323" y="1446393"/>
+                      <a:pt x="720951" y="1391660"/>
+                    </a:cubicBezTo>
+                    <a:cubicBezTo>
+                      <a:pt x="765577" y="1336926"/>
+                      <a:pt x="807779" y="1282420"/>
+                      <a:pt x="882870" y="1239517"/>
+                    </a:cubicBezTo>
+                    <a:cubicBezTo>
+                      <a:pt x="957960" y="1196614"/>
+                      <a:pt x="1171496" y="1134242"/>
+                      <a:pt x="1171496" y="1134242"/>
+                    </a:cubicBezTo>
+                    <a:cubicBezTo>
+                      <a:pt x="1139310" y="1138883"/>
+                      <a:pt x="1035681" y="1146941"/>
+                      <a:pt x="978381" y="1162085"/>
+                    </a:cubicBezTo>
+                    <a:cubicBezTo>
+                      <a:pt x="921082" y="1177229"/>
+                      <a:pt x="827700" y="1225104"/>
+                      <a:pt x="827700" y="1225104"/>
+                    </a:cubicBezTo>
+                    <a:cubicBezTo>
+                      <a:pt x="850417" y="1197699"/>
+                      <a:pt x="924608" y="1118999"/>
+                      <a:pt x="964007" y="1060677"/>
+                    </a:cubicBezTo>
+                    <a:cubicBezTo>
+                      <a:pt x="1003405" y="1002356"/>
+                      <a:pt x="1023076" y="933647"/>
+                      <a:pt x="1064092" y="875173"/>
+                    </a:cubicBezTo>
+                    <a:cubicBezTo>
+                      <a:pt x="1105107" y="816701"/>
+                      <a:pt x="1156177" y="752394"/>
+                      <a:pt x="1210098" y="709839"/>
+                    </a:cubicBezTo>
+                    <a:cubicBezTo>
+                      <a:pt x="1264019" y="667285"/>
+                      <a:pt x="1321772" y="656992"/>
+                      <a:pt x="1387616" y="619847"/>
+                    </a:cubicBezTo>
+                    <a:cubicBezTo>
+                      <a:pt x="1453458" y="582701"/>
+                      <a:pt x="1562829" y="548825"/>
+                      <a:pt x="1605158" y="486968"/>
+                    </a:cubicBezTo>
+                    <a:cubicBezTo>
+                      <a:pt x="1647488" y="425110"/>
+                      <a:pt x="1637993" y="306121"/>
+                      <a:pt x="1641595" y="248700"/>
+                    </a:cubicBezTo>
+                    <a:cubicBezTo>
+                      <a:pt x="1645196" y="191279"/>
+                      <a:pt x="1626766" y="142442"/>
+                      <a:pt x="1626766" y="142442"/>
+                    </a:cubicBezTo>
+                    <a:lnTo>
+                      <a:pt x="1789593" y="0"/>
+                    </a:lnTo>
+                    <a:lnTo>
+                      <a:pt x="1754694" y="150052"/>
+                    </a:lnTo>
+                    <a:cubicBezTo>
+                      <a:pt x="1683380" y="403405"/>
+                      <a:pt x="1612065" y="656759"/>
+                      <a:pt x="1522762" y="861643"/>
+                    </a:cubicBezTo>
+                    <a:cubicBezTo>
+                      <a:pt x="1433460" y="1066526"/>
+                      <a:pt x="1338941" y="1215629"/>
+                      <a:pt x="1218879" y="1379352"/>
+                    </a:cubicBezTo>
+                    <a:cubicBezTo>
+                      <a:pt x="1098817" y="1543075"/>
+                      <a:pt x="910545" y="1709914"/>
+                      <a:pt x="802388" y="1843981"/>
+                    </a:cubicBezTo>
+                    <a:cubicBezTo>
+                      <a:pt x="694232" y="1978049"/>
+                      <a:pt x="623268" y="2082543"/>
+                      <a:pt x="569940" y="2183757"/>
+                    </a:cubicBezTo>
+                    <a:cubicBezTo>
+                      <a:pt x="516612" y="2284972"/>
+                      <a:pt x="482416" y="2451267"/>
+                      <a:pt x="482416" y="2451267"/>
+                    </a:cubicBezTo>
+                    <a:close/>
+                  </a:path>
+                </a:pathLst>
+              </a:custGeom>
+              <a:solidFill>
+                <a:srgbClr val="FFC000"/>
+              </a:solidFill>
+              <a:ln>
+                <a:noFill/>
+              </a:ln>
+            </p:spPr>
+            <p:style>
+              <a:lnRef idx="2">
+                <a:schemeClr val="accent1">
+                  <a:shade val="50000"/>
+                </a:schemeClr>
+              </a:lnRef>
+              <a:fillRef idx="1">
+                <a:schemeClr val="accent1"/>
+              </a:fillRef>
+              <a:effectRef idx="0">
+                <a:schemeClr val="accent1"/>
+              </a:effectRef>
+              <a:fontRef idx="minor">
+                <a:schemeClr val="lt1"/>
+              </a:fontRef>
+            </p:style>
+            <p:txBody>
+              <a:bodyPr wrap="square" rtlCol="0" anchor="ctr">
+                <a:noAutofit/>
+              </a:bodyPr>
+              <a:lstStyle/>
+              <a:p>
+                <a:pPr algn="ctr"/>
+                <a:endParaRPr lang="en-US" dirty="0">
+                  <a:solidFill>
+                    <a:schemeClr val="tx1"/>
+                  </a:solidFill>
+                </a:endParaRPr>
+              </a:p>
+            </p:txBody>
+          </p:sp>
+        </p:grpSp>
+      </p:grpSp>
+      <p:grpSp>
+        <p:nvGrpSpPr>
+          <p:cNvPr id="91" name="Group 90">
+            <a:extLst>
+              <a:ext uri="{FF2B5EF4-FFF2-40B4-BE49-F238E27FC236}">
+                <a16:creationId xmlns:a16="http://schemas.microsoft.com/office/drawing/2014/main" id="{3E796106-DF5A-46CF-9B56-26C7477D4DBE}"/>
+              </a:ext>
+            </a:extLst>
+          </p:cNvPr>
+          <p:cNvGrpSpPr/>
+          <p:nvPr/>
+        </p:nvGrpSpPr>
+        <p:grpSpPr>
+          <a:xfrm>
+            <a:off x="6699114" y="1278923"/>
+            <a:ext cx="2743200" cy="2743200"/>
+            <a:chOff x="5201760" y="1526937"/>
+            <a:chExt cx="2743200" cy="2743200"/>
+          </a:xfrm>
+        </p:grpSpPr>
+        <p:grpSp>
+          <p:nvGrpSpPr>
+            <p:cNvPr id="92" name="Group 91">
+              <a:extLst>
+                <a:ext uri="{FF2B5EF4-FFF2-40B4-BE49-F238E27FC236}">
+                  <a16:creationId xmlns:a16="http://schemas.microsoft.com/office/drawing/2014/main" id="{EFC1BB49-AA2D-4C0A-B91E-B03A77CCEBCA}"/>
+                </a:ext>
+              </a:extLst>
+            </p:cNvPr>
+            <p:cNvGrpSpPr/>
+            <p:nvPr/>
+          </p:nvGrpSpPr>
+          <p:grpSpPr>
+            <a:xfrm>
+              <a:off x="5201760" y="1526937"/>
+              <a:ext cx="2743200" cy="2743200"/>
+              <a:chOff x="4882197" y="1127372"/>
+              <a:chExt cx="2743200" cy="2743200"/>
+            </a:xfrm>
+          </p:grpSpPr>
+          <p:sp>
+            <p:nvSpPr>
+              <p:cNvPr id="96" name="Rectangle 95">
+                <a:extLst>
+                  <a:ext uri="{FF2B5EF4-FFF2-40B4-BE49-F238E27FC236}">
+                    <a16:creationId xmlns:a16="http://schemas.microsoft.com/office/drawing/2014/main" id="{C9454A3D-77A8-4A6D-ACFD-9FBF12B258D8}"/>
+                  </a:ext>
+                </a:extLst>
+              </p:cNvPr>
+              <p:cNvSpPr/>
+              <p:nvPr/>
+            </p:nvSpPr>
+            <p:spPr>
+              <a:xfrm>
+                <a:off x="4882197" y="1127372"/>
+                <a:ext cx="2743200" cy="2743200"/>
+              </a:xfrm>
+              <a:prstGeom prst="rect">
+                <a:avLst/>
+              </a:prstGeom>
+              <a:noFill/>
+              <a:ln>
+                <a:noFill/>
+              </a:ln>
+            </p:spPr>
+            <p:style>
+              <a:lnRef idx="2">
+                <a:schemeClr val="accent1">
+                  <a:shade val="50000"/>
+                </a:schemeClr>
+              </a:lnRef>
+              <a:fillRef idx="1">
+                <a:schemeClr val="accent1"/>
+              </a:fillRef>
+              <a:effectRef idx="0">
+                <a:schemeClr val="accent1"/>
+              </a:effectRef>
+              <a:fontRef idx="minor">
+                <a:schemeClr val="lt1"/>
+              </a:fontRef>
+            </p:style>
+            <p:txBody>
+              <a:bodyPr rtlCol="0" anchor="ctr"/>
+              <a:lstStyle/>
+              <a:p>
+                <a:pPr algn="ctr"/>
+                <a:endParaRPr lang="en-US"/>
+              </a:p>
+            </p:txBody>
+          </p:sp>
+          <p:sp>
+            <p:nvSpPr>
+              <p:cNvPr id="97" name="Freeform: Shape 96">
+                <a:extLst>
+                  <a:ext uri="{FF2B5EF4-FFF2-40B4-BE49-F238E27FC236}">
+                    <a16:creationId xmlns:a16="http://schemas.microsoft.com/office/drawing/2014/main" id="{AED063D5-6844-4551-AA37-3C7D1174CAFB}"/>
+                  </a:ext>
+                </a:extLst>
+              </p:cNvPr>
+              <p:cNvSpPr/>
+              <p:nvPr/>
+            </p:nvSpPr>
+            <p:spPr>
+              <a:xfrm rot="853024">
+                <a:off x="5144715" y="1183069"/>
+                <a:ext cx="1582803" cy="2216048"/>
+              </a:xfrm>
+              <a:custGeom>
+                <a:avLst/>
+                <a:gdLst>
+                  <a:gd name="connsiteX0" fmla="*/ 501071 w 1582803"/>
+                  <a:gd name="connsiteY0" fmla="*/ 2199288 h 2216048"/>
+                  <a:gd name="connsiteX1" fmla="*/ 501416 w 1582803"/>
+                  <a:gd name="connsiteY1" fmla="*/ 2199563 h 2216048"/>
+                  <a:gd name="connsiteX2" fmla="*/ 499805 w 1582803"/>
+                  <a:gd name="connsiteY2" fmla="*/ 2201202 h 2216048"/>
+                  <a:gd name="connsiteX3" fmla="*/ 509436 w 1582803"/>
+                  <a:gd name="connsiteY3" fmla="*/ 2186644 h 2216048"/>
+                  <a:gd name="connsiteX4" fmla="*/ 501071 w 1582803"/>
+                  <a:gd name="connsiteY4" fmla="*/ 2199288 h 2216048"/>
+                  <a:gd name="connsiteX5" fmla="*/ 500790 w 1582803"/>
+                  <a:gd name="connsiteY5" fmla="*/ 2199065 h 2216048"/>
+                  <a:gd name="connsiteX6" fmla="*/ 507729 w 1582803"/>
+                  <a:gd name="connsiteY6" fmla="*/ 2188975 h 2216048"/>
+                  <a:gd name="connsiteX7" fmla="*/ 509436 w 1582803"/>
+                  <a:gd name="connsiteY7" fmla="*/ 2186644 h 2216048"/>
+                  <a:gd name="connsiteX8" fmla="*/ 819110 w 1582803"/>
+                  <a:gd name="connsiteY8" fmla="*/ 160678 h 2216048"/>
+                  <a:gd name="connsiteX9" fmla="*/ 1429197 w 1582803"/>
+                  <a:gd name="connsiteY9" fmla="*/ 149133 h 2216048"/>
+                  <a:gd name="connsiteX10" fmla="*/ 1526472 w 1582803"/>
+                  <a:gd name="connsiteY10" fmla="*/ 179022 h 2216048"/>
+                  <a:gd name="connsiteX11" fmla="*/ 1534350 w 1582803"/>
+                  <a:gd name="connsiteY11" fmla="*/ 160689 h 2216048"/>
+                  <a:gd name="connsiteX12" fmla="*/ 1582803 w 1582803"/>
+                  <a:gd name="connsiteY12" fmla="*/ 0 h 2216048"/>
+                  <a:gd name="connsiteX13" fmla="*/ 1553906 w 1582803"/>
+                  <a:gd name="connsiteY13" fmla="*/ 203321 h 2216048"/>
+                  <a:gd name="connsiteX14" fmla="*/ 1431819 w 1582803"/>
+                  <a:gd name="connsiteY14" fmla="*/ 455379 h 2216048"/>
+                  <a:gd name="connsiteX15" fmla="*/ 1192992 w 1582803"/>
+                  <a:gd name="connsiteY15" fmla="*/ 782244 h 2216048"/>
+                  <a:gd name="connsiteX16" fmla="*/ 942392 w 1582803"/>
+                  <a:gd name="connsiteY16" fmla="*/ 1122144 h 2216048"/>
+                  <a:gd name="connsiteX17" fmla="*/ 787564 w 1582803"/>
+                  <a:gd name="connsiteY17" fmla="*/ 1483010 h 2216048"/>
+                  <a:gd name="connsiteX18" fmla="*/ 714659 w 1582803"/>
+                  <a:gd name="connsiteY18" fmla="*/ 1968863 h 2216048"/>
+                  <a:gd name="connsiteX19" fmla="*/ 704525 w 1582803"/>
+                  <a:gd name="connsiteY19" fmla="*/ 2127224 h 2216048"/>
+                  <a:gd name="connsiteX20" fmla="*/ 609814 w 1582803"/>
+                  <a:gd name="connsiteY20" fmla="*/ 1693889 h 2216048"/>
+                  <a:gd name="connsiteX21" fmla="*/ 570956 w 1582803"/>
+                  <a:gd name="connsiteY21" fmla="*/ 1361993 h 2216048"/>
+                  <a:gd name="connsiteX22" fmla="*/ 648283 w 1582803"/>
+                  <a:gd name="connsiteY22" fmla="*/ 1528349 h 2216048"/>
+                  <a:gd name="connsiteX23" fmla="*/ 644059 w 1582803"/>
+                  <a:gd name="connsiteY23" fmla="*/ 1313318 h 2216048"/>
+                  <a:gd name="connsiteX24" fmla="*/ 722701 w 1582803"/>
+                  <a:gd name="connsiteY24" fmla="*/ 1147650 h 2216048"/>
+                  <a:gd name="connsiteX25" fmla="*/ 770426 w 1582803"/>
+                  <a:gd name="connsiteY25" fmla="*/ 919458 h 2216048"/>
+                  <a:gd name="connsiteX26" fmla="*/ 801597 w 1582803"/>
+                  <a:gd name="connsiteY26" fmla="*/ 1062329 h 2216048"/>
+                  <a:gd name="connsiteX27" fmla="*/ 835154 w 1582803"/>
+                  <a:gd name="connsiteY27" fmla="*/ 837726 h 2216048"/>
+                  <a:gd name="connsiteX28" fmla="*/ 983437 w 1582803"/>
+                  <a:gd name="connsiteY28" fmla="*/ 649389 h 2216048"/>
+                  <a:gd name="connsiteX29" fmla="*/ 1155522 w 1582803"/>
+                  <a:gd name="connsiteY29" fmla="*/ 515329 h 2216048"/>
+                  <a:gd name="connsiteX30" fmla="*/ 1391329 w 1582803"/>
+                  <a:gd name="connsiteY30" fmla="*/ 355074 h 2216048"/>
+                  <a:gd name="connsiteX31" fmla="*/ 1396094 w 1582803"/>
+                  <a:gd name="connsiteY31" fmla="*/ 350843 h 2216048"/>
+                  <a:gd name="connsiteX32" fmla="*/ 1378860 w 1582803"/>
+                  <a:gd name="connsiteY32" fmla="*/ 345548 h 2216048"/>
+                  <a:gd name="connsiteX33" fmla="*/ 306027 w 1582803"/>
+                  <a:gd name="connsiteY33" fmla="*/ 829562 h 2216048"/>
+                  <a:gd name="connsiteX34" fmla="*/ 432427 w 1582803"/>
+                  <a:gd name="connsiteY34" fmla="*/ 2144702 h 2216048"/>
+                  <a:gd name="connsiteX35" fmla="*/ 500790 w 1582803"/>
+                  <a:gd name="connsiteY35" fmla="*/ 2199065 h 2216048"/>
+                  <a:gd name="connsiteX36" fmla="*/ 498194 w 1582803"/>
+                  <a:gd name="connsiteY36" fmla="*/ 2202840 h 2216048"/>
+                  <a:gd name="connsiteX37" fmla="*/ 125476 w 1582803"/>
+                  <a:gd name="connsiteY37" fmla="*/ 737314 h 2216048"/>
+                  <a:gd name="connsiteX38" fmla="*/ 819110 w 1582803"/>
+                  <a:gd name="connsiteY38" fmla="*/ 160678 h 2216048"/>
+                </a:gdLst>
+                <a:ahLst/>
+                <a:cxnLst>
+                  <a:cxn ang="0">
+                    <a:pos x="connsiteX0" y="connsiteY0"/>
+                  </a:cxn>
+                  <a:cxn ang="0">
+                    <a:pos x="connsiteX1" y="connsiteY1"/>
+                  </a:cxn>
+                  <a:cxn ang="0">
+                    <a:pos x="connsiteX2" y="connsiteY2"/>
+                  </a:cxn>
+                  <a:cxn ang="0">
+                    <a:pos x="connsiteX3" y="connsiteY3"/>
+                  </a:cxn>
+                  <a:cxn ang="0">
+                    <a:pos x="connsiteX4" y="connsiteY4"/>
+                  </a:cxn>
+                  <a:cxn ang="0">
+                    <a:pos x="connsiteX5" y="connsiteY5"/>
+                  </a:cxn>
+                  <a:cxn ang="0">
+                    <a:pos x="connsiteX6" y="connsiteY6"/>
+                  </a:cxn>
+                  <a:cxn ang="0">
+                    <a:pos x="connsiteX7" y="connsiteY7"/>
+                  </a:cxn>
+                  <a:cxn ang="0">
+                    <a:pos x="connsiteX8" y="connsiteY8"/>
+                  </a:cxn>
+                  <a:cxn ang="0">
+                    <a:pos x="connsiteX9" y="connsiteY9"/>
+                  </a:cxn>
+                  <a:cxn ang="0">
+                    <a:pos x="connsiteX10" y="connsiteY10"/>
+                  </a:cxn>
+                  <a:cxn ang="0">
+                    <a:pos x="connsiteX11" y="connsiteY11"/>
+                  </a:cxn>
+                  <a:cxn ang="0">
+                    <a:pos x="connsiteX12" y="connsiteY12"/>
+                  </a:cxn>
+                  <a:cxn ang="0">
+                    <a:pos x="connsiteX13" y="connsiteY13"/>
+                  </a:cxn>
+                  <a:cxn ang="0">
+                    <a:pos x="connsiteX14" y="connsiteY14"/>
+                  </a:cxn>
+                  <a:cxn ang="0">
+                    <a:pos x="connsiteX15" y="connsiteY15"/>
+                  </a:cxn>
+                  <a:cxn ang="0">
+                    <a:pos x="connsiteX16" y="connsiteY16"/>
+                  </a:cxn>
+                  <a:cxn ang="0">
+                    <a:pos x="connsiteX17" y="connsiteY17"/>
+                  </a:cxn>
+                  <a:cxn ang="0">
+                    <a:pos x="connsiteX18" y="connsiteY18"/>
+                  </a:cxn>
+                  <a:cxn ang="0">
+                    <a:pos x="connsiteX19" y="connsiteY19"/>
+                  </a:cxn>
+                  <a:cxn ang="0">
+                    <a:pos x="connsiteX20" y="connsiteY20"/>
+                  </a:cxn>
+                  <a:cxn ang="0">
+                    <a:pos x="connsiteX21" y="connsiteY21"/>
+                  </a:cxn>
+                  <a:cxn ang="0">
+                    <a:pos x="connsiteX22" y="connsiteY22"/>
+                  </a:cxn>
+                  <a:cxn ang="0">
+                    <a:pos x="connsiteX23" y="connsiteY23"/>
+                  </a:cxn>
+                  <a:cxn ang="0">
+                    <a:pos x="connsiteX24" y="connsiteY24"/>
+                  </a:cxn>
+                  <a:cxn ang="0">
+                    <a:pos x="connsiteX25" y="connsiteY25"/>
+                  </a:cxn>
+                  <a:cxn ang="0">
+                    <a:pos x="connsiteX26" y="connsiteY26"/>
+                  </a:cxn>
+                  <a:cxn ang="0">
+                    <a:pos x="connsiteX27" y="connsiteY27"/>
+                  </a:cxn>
+                  <a:cxn ang="0">
+                    <a:pos x="connsiteX28" y="connsiteY28"/>
+                  </a:cxn>
+                  <a:cxn ang="0">
+                    <a:pos x="connsiteX29" y="connsiteY29"/>
+                  </a:cxn>
+                  <a:cxn ang="0">
+                    <a:pos x="connsiteX30" y="connsiteY30"/>
+                  </a:cxn>
+                  <a:cxn ang="0">
+                    <a:pos x="connsiteX31" y="connsiteY31"/>
+                  </a:cxn>
+                  <a:cxn ang="0">
+                    <a:pos x="connsiteX32" y="connsiteY32"/>
+                  </a:cxn>
+                  <a:cxn ang="0">
+                    <a:pos x="connsiteX33" y="connsiteY33"/>
+                  </a:cxn>
+                  <a:cxn ang="0">
+                    <a:pos x="connsiteX34" y="connsiteY34"/>
+                  </a:cxn>
+                  <a:cxn ang="0">
+                    <a:pos x="connsiteX35" y="connsiteY35"/>
+                  </a:cxn>
+                  <a:cxn ang="0">
+                    <a:pos x="connsiteX36" y="connsiteY36"/>
+                  </a:cxn>
+                  <a:cxn ang="0">
+                    <a:pos x="connsiteX37" y="connsiteY37"/>
+                  </a:cxn>
+                  <a:cxn ang="0">
+                    <a:pos x="connsiteX38" y="connsiteY38"/>
+                  </a:cxn>
+                </a:cxnLst>
+                <a:rect l="l" t="t" r="r" b="b"/>
+                <a:pathLst>
+                  <a:path w="1582803" h="2216048">
+                    <a:moveTo>
+                      <a:pt x="501071" y="2199288"/>
+                    </a:moveTo>
+                    <a:lnTo>
+                      <a:pt x="501416" y="2199563"/>
+                    </a:lnTo>
+                    <a:cubicBezTo>
+                      <a:pt x="482326" y="2227446"/>
+                      <a:pt x="491065" y="2214324"/>
+                      <a:pt x="499805" y="2201202"/>
+                    </a:cubicBezTo>
+                    <a:close/>
+                    <a:moveTo>
+                      <a:pt x="509436" y="2186644"/>
+                    </a:moveTo>
+                    <a:lnTo>
+                      <a:pt x="501071" y="2199288"/>
+                    </a:lnTo>
+                    <a:lnTo>
+                      <a:pt x="500790" y="2199065"/>
+                    </a:lnTo>
+                    <a:lnTo>
+                      <a:pt x="507729" y="2188975"/>
+                    </a:lnTo>
+                    <a:cubicBezTo>
+                      <a:pt x="509458" y="2186490"/>
+                      <a:pt x="509882" y="2185926"/>
+                      <a:pt x="509436" y="2186644"/>
+                    </a:cubicBezTo>
+                    <a:close/>
+                    <a:moveTo>
+                      <a:pt x="819110" y="160678"/>
+                    </a:moveTo>
+                    <a:cubicBezTo>
+                      <a:pt x="1013333" y="102935"/>
+                      <a:pt x="1223728" y="96302"/>
+                      <a:pt x="1429197" y="149133"/>
+                    </a:cubicBezTo>
+                    <a:lnTo>
+                      <a:pt x="1526472" y="179022"/>
+                    </a:lnTo>
+                    <a:lnTo>
+                      <a:pt x="1534350" y="160689"/>
+                    </a:lnTo>
+                    <a:cubicBezTo>
+                      <a:pt x="1556130" y="100518"/>
+                      <a:pt x="1573878" y="26761"/>
+                      <a:pt x="1582803" y="0"/>
+                    </a:cubicBezTo>
+                    <a:cubicBezTo>
+                      <a:pt x="1582803" y="0"/>
+                      <a:pt x="1579070" y="127424"/>
+                      <a:pt x="1553906" y="203321"/>
+                    </a:cubicBezTo>
+                    <a:cubicBezTo>
+                      <a:pt x="1528742" y="279217"/>
+                      <a:pt x="1491971" y="358892"/>
+                      <a:pt x="1431819" y="455379"/>
+                    </a:cubicBezTo>
+                    <a:cubicBezTo>
+                      <a:pt x="1371666" y="551867"/>
+                      <a:pt x="1274564" y="671117"/>
+                      <a:pt x="1192992" y="782244"/>
+                    </a:cubicBezTo>
+                    <a:cubicBezTo>
+                      <a:pt x="1192992" y="782244"/>
+                      <a:pt x="1009964" y="1005350"/>
+                      <a:pt x="942392" y="1122144"/>
+                    </a:cubicBezTo>
+                    <a:cubicBezTo>
+                      <a:pt x="874821" y="1238938"/>
+                      <a:pt x="825519" y="1341890"/>
+                      <a:pt x="787564" y="1483010"/>
+                    </a:cubicBezTo>
+                    <a:cubicBezTo>
+                      <a:pt x="749609" y="1624130"/>
+                      <a:pt x="732134" y="1796496"/>
+                      <a:pt x="714659" y="1968863"/>
+                    </a:cubicBezTo>
+                    <a:lnTo>
+                      <a:pt x="704525" y="2127224"/>
+                    </a:lnTo>
+                    <a:cubicBezTo>
+                      <a:pt x="704525" y="2127224"/>
+                      <a:pt x="632075" y="1821428"/>
+                      <a:pt x="609814" y="1693889"/>
+                    </a:cubicBezTo>
+                    <a:cubicBezTo>
+                      <a:pt x="587552" y="1566350"/>
+                      <a:pt x="577433" y="1417308"/>
+                      <a:pt x="570956" y="1361993"/>
+                    </a:cubicBezTo>
+                    <a:lnTo>
+                      <a:pt x="648283" y="1528349"/>
+                    </a:lnTo>
+                    <a:cubicBezTo>
+                      <a:pt x="648283" y="1528349"/>
+                      <a:pt x="631657" y="1376768"/>
+                      <a:pt x="644059" y="1313318"/>
+                    </a:cubicBezTo>
+                    <a:cubicBezTo>
+                      <a:pt x="656462" y="1249868"/>
+                      <a:pt x="701641" y="1213294"/>
+                      <a:pt x="722701" y="1147650"/>
+                    </a:cubicBezTo>
+                    <a:cubicBezTo>
+                      <a:pt x="743762" y="1082007"/>
+                      <a:pt x="762471" y="957490"/>
+                      <a:pt x="770426" y="919458"/>
+                    </a:cubicBezTo>
+                    <a:lnTo>
+                      <a:pt x="801597" y="1062329"/>
+                    </a:lnTo>
+                    <a:cubicBezTo>
+                      <a:pt x="801597" y="1062329"/>
+                      <a:pt x="804847" y="906549"/>
+                      <a:pt x="835154" y="837726"/>
+                    </a:cubicBezTo>
+                    <a:cubicBezTo>
+                      <a:pt x="865460" y="768903"/>
+                      <a:pt x="930042" y="703122"/>
+                      <a:pt x="983437" y="649389"/>
+                    </a:cubicBezTo>
+                    <a:cubicBezTo>
+                      <a:pt x="1036831" y="595657"/>
+                      <a:pt x="1087540" y="564382"/>
+                      <a:pt x="1155522" y="515329"/>
+                    </a:cubicBezTo>
+                    <a:cubicBezTo>
+                      <a:pt x="1223504" y="466277"/>
+                      <a:pt x="1332015" y="405281"/>
+                      <a:pt x="1391329" y="355074"/>
+                    </a:cubicBezTo>
+                    <a:lnTo>
+                      <a:pt x="1396094" y="350843"/>
+                    </a:lnTo>
+                    <a:lnTo>
+                      <a:pt x="1378860" y="345548"/>
+                    </a:lnTo>
+                    <a:cubicBezTo>
+                      <a:pt x="956157" y="236860"/>
+                      <a:pt x="508124" y="434006"/>
+                      <a:pt x="306027" y="829562"/>
+                    </a:cubicBezTo>
+                    <a:cubicBezTo>
+                      <a:pt x="103931" y="1225118"/>
+                      <a:pt x="108884" y="1847850"/>
+                      <a:pt x="432427" y="2144702"/>
+                    </a:cubicBezTo>
+                    <a:lnTo>
+                      <a:pt x="500790" y="2199065"/>
+                    </a:lnTo>
+                    <a:lnTo>
+                      <a:pt x="498194" y="2202840"/>
+                    </a:lnTo>
+                    <a:cubicBezTo>
+                      <a:pt x="23105" y="1877560"/>
+                      <a:pt x="-136488" y="1250045"/>
+                      <a:pt x="125476" y="737314"/>
+                    </a:cubicBezTo>
+                    <a:cubicBezTo>
+                      <a:pt x="272831" y="448903"/>
+                      <a:pt x="527777" y="247292"/>
+                      <a:pt x="819110" y="160678"/>
+                    </a:cubicBezTo>
+                    <a:close/>
+                  </a:path>
+                </a:pathLst>
+              </a:custGeom>
+              <a:solidFill>
+                <a:srgbClr val="814EE7"/>
+              </a:solidFill>
+              <a:ln>
+                <a:noFill/>
+              </a:ln>
+            </p:spPr>
+            <p:style>
+              <a:lnRef idx="2">
+                <a:schemeClr val="accent1">
+                  <a:shade val="50000"/>
+                </a:schemeClr>
+              </a:lnRef>
+              <a:fillRef idx="1">
+                <a:schemeClr val="accent1"/>
+              </a:fillRef>
+              <a:effectRef idx="0">
+                <a:schemeClr val="accent1"/>
+              </a:effectRef>
+              <a:fontRef idx="minor">
+                <a:schemeClr val="lt1"/>
+              </a:fontRef>
+            </p:style>
+            <p:txBody>
+              <a:bodyPr wrap="square" rtlCol="0" anchor="ctr">
+                <a:noAutofit/>
+              </a:bodyPr>
+              <a:lstStyle/>
+              <a:p>
+                <a:pPr algn="ctr"/>
+                <a:endParaRPr lang="en-US" dirty="0">
+                  <a:solidFill>
+                    <a:schemeClr val="tx1"/>
+                  </a:solidFill>
+                </a:endParaRPr>
+              </a:p>
+            </p:txBody>
+          </p:sp>
+        </p:grpSp>
+        <p:grpSp>
+          <p:nvGrpSpPr>
+            <p:cNvPr id="93" name="Group 92">
+              <a:extLst>
+                <a:ext uri="{FF2B5EF4-FFF2-40B4-BE49-F238E27FC236}">
+                  <a16:creationId xmlns:a16="http://schemas.microsoft.com/office/drawing/2014/main" id="{5FFAE1E7-9AD5-4E50-9833-E92298AE546D}"/>
+                </a:ext>
+              </a:extLst>
+            </p:cNvPr>
+            <p:cNvGrpSpPr/>
+            <p:nvPr/>
+          </p:nvGrpSpPr>
+          <p:grpSpPr>
+            <a:xfrm>
+              <a:off x="5201760" y="1526937"/>
+              <a:ext cx="2743200" cy="2743200"/>
+              <a:chOff x="8420164" y="2222451"/>
+              <a:chExt cx="2743200" cy="2743200"/>
+            </a:xfrm>
+          </p:grpSpPr>
+          <p:sp>
+            <p:nvSpPr>
+              <p:cNvPr id="94" name="Rectangle 93">
+                <a:extLst>
+                  <a:ext uri="{FF2B5EF4-FFF2-40B4-BE49-F238E27FC236}">
+                    <a16:creationId xmlns:a16="http://schemas.microsoft.com/office/drawing/2014/main" id="{3FC82F6F-19DB-42C6-8705-5E219939AA45}"/>
+                  </a:ext>
+                </a:extLst>
+              </p:cNvPr>
+              <p:cNvSpPr/>
+              <p:nvPr/>
+            </p:nvSpPr>
+            <p:spPr>
+              <a:xfrm>
+                <a:off x="8420164" y="2222451"/>
+                <a:ext cx="2743200" cy="2743200"/>
+              </a:xfrm>
+              <a:prstGeom prst="rect">
+                <a:avLst/>
+              </a:prstGeom>
+              <a:noFill/>
+              <a:ln>
+                <a:noFill/>
+              </a:ln>
+            </p:spPr>
+            <p:style>
+              <a:lnRef idx="2">
+                <a:schemeClr val="accent1">
+                  <a:shade val="50000"/>
+                </a:schemeClr>
+              </a:lnRef>
+              <a:fillRef idx="1">
+                <a:schemeClr val="accent1"/>
+              </a:fillRef>
+              <a:effectRef idx="0">
+                <a:schemeClr val="accent1"/>
+              </a:effectRef>
+              <a:fontRef idx="minor">
+                <a:schemeClr val="lt1"/>
+              </a:fontRef>
+            </p:style>
+            <p:txBody>
+              <a:bodyPr rtlCol="0" anchor="ctr"/>
+              <a:lstStyle/>
+              <a:p>
+                <a:pPr algn="ctr"/>
+                <a:endParaRPr lang="en-US"/>
+              </a:p>
+            </p:txBody>
+          </p:sp>
+          <p:sp>
+            <p:nvSpPr>
+              <p:cNvPr id="95" name="Freeform: Shape 94">
+                <a:extLst>
+                  <a:ext uri="{FF2B5EF4-FFF2-40B4-BE49-F238E27FC236}">
+                    <a16:creationId xmlns:a16="http://schemas.microsoft.com/office/drawing/2014/main" id="{24531691-6C87-45BC-802D-D218C9D31C01}"/>
+                  </a:ext>
+                </a:extLst>
+              </p:cNvPr>
+              <p:cNvSpPr/>
+              <p:nvPr/>
+            </p:nvSpPr>
+            <p:spPr>
+              <a:xfrm rot="11120515">
+                <a:off x="9131800" y="2442194"/>
+                <a:ext cx="1789593" cy="2451267"/>
+              </a:xfrm>
+              <a:custGeom>
+                <a:avLst/>
+                <a:gdLst>
+                  <a:gd name="connsiteX0" fmla="*/ 1531385 w 1789593"/>
+                  <a:gd name="connsiteY0" fmla="*/ 174047 h 2451267"/>
+                  <a:gd name="connsiteX1" fmla="*/ 1531361 w 1789593"/>
+                  <a:gd name="connsiteY1" fmla="*/ 174040 h 2451267"/>
+                  <a:gd name="connsiteX2" fmla="*/ 1534080 w 1789593"/>
+                  <a:gd name="connsiteY2" fmla="*/ 166462 h 2451267"/>
+                  <a:gd name="connsiteX3" fmla="*/ 1535232 w 1789593"/>
+                  <a:gd name="connsiteY3" fmla="*/ 163271 h 2451267"/>
+                  <a:gd name="connsiteX4" fmla="*/ 1524524 w 1789593"/>
+                  <a:gd name="connsiteY4" fmla="*/ 193267 h 2451267"/>
+                  <a:gd name="connsiteX5" fmla="*/ 1529878 w 1789593"/>
+                  <a:gd name="connsiteY5" fmla="*/ 178269 h 2451267"/>
+                  <a:gd name="connsiteX6" fmla="*/ 1531385 w 1789593"/>
+                  <a:gd name="connsiteY6" fmla="*/ 174047 h 2451267"/>
+                  <a:gd name="connsiteX7" fmla="*/ 1531423 w 1789593"/>
+                  <a:gd name="connsiteY7" fmla="*/ 174059 h 2451267"/>
+                  <a:gd name="connsiteX8" fmla="*/ 1524524 w 1789593"/>
+                  <a:gd name="connsiteY8" fmla="*/ 193267 h 2451267"/>
+                  <a:gd name="connsiteX9" fmla="*/ 482416 w 1789593"/>
+                  <a:gd name="connsiteY9" fmla="*/ 2451267 h 2451267"/>
+                  <a:gd name="connsiteX10" fmla="*/ 489235 w 1789593"/>
+                  <a:gd name="connsiteY10" fmla="*/ 2262557 h 2451267"/>
+                  <a:gd name="connsiteX11" fmla="*/ 493039 w 1789593"/>
+                  <a:gd name="connsiteY11" fmla="*/ 2192439 h 2451267"/>
+                  <a:gd name="connsiteX12" fmla="*/ 413198 w 1789593"/>
+                  <a:gd name="connsiteY12" fmla="*/ 2132224 h 2451267"/>
+                  <a:gd name="connsiteX13" fmla="*/ 125366 w 1789593"/>
+                  <a:gd name="connsiteY13" fmla="*/ 731046 h 2451267"/>
+                  <a:gd name="connsiteX14" fmla="*/ 1429180 w 1789593"/>
+                  <a:gd name="connsiteY14" fmla="*/ 142645 h 2451267"/>
+                  <a:gd name="connsiteX15" fmla="*/ 1531361 w 1789593"/>
+                  <a:gd name="connsiteY15" fmla="*/ 174040 h 2451267"/>
+                  <a:gd name="connsiteX16" fmla="*/ 1528333 w 1789593"/>
+                  <a:gd name="connsiteY16" fmla="*/ 182479 h 2451267"/>
+                  <a:gd name="connsiteX17" fmla="*/ 305937 w 1789593"/>
+                  <a:gd name="connsiteY17" fmla="*/ 823255 h 2451267"/>
+                  <a:gd name="connsiteX18" fmla="*/ 478734 w 1789593"/>
+                  <a:gd name="connsiteY18" fmla="*/ 1917956 h 2451267"/>
+                  <a:gd name="connsiteX19" fmla="*/ 522767 w 1789593"/>
+                  <a:gd name="connsiteY19" fmla="*/ 1954448 h 2451267"/>
+                  <a:gd name="connsiteX20" fmla="*/ 542850 w 1789593"/>
+                  <a:gd name="connsiteY20" fmla="*/ 1854794 h 2451267"/>
+                  <a:gd name="connsiteX21" fmla="*/ 593854 w 1789593"/>
+                  <a:gd name="connsiteY21" fmla="*/ 1706906 h 2451267"/>
+                  <a:gd name="connsiteX22" fmla="*/ 738953 w 1789593"/>
+                  <a:gd name="connsiteY22" fmla="*/ 1531872 h 2451267"/>
+                  <a:gd name="connsiteX23" fmla="*/ 615107 w 1789593"/>
+                  <a:gd name="connsiteY23" fmla="*/ 1567916 h 2451267"/>
+                  <a:gd name="connsiteX24" fmla="*/ 720951 w 1789593"/>
+                  <a:gd name="connsiteY24" fmla="*/ 1391660 h 2451267"/>
+                  <a:gd name="connsiteX25" fmla="*/ 882870 w 1789593"/>
+                  <a:gd name="connsiteY25" fmla="*/ 1239517 h 2451267"/>
+                  <a:gd name="connsiteX26" fmla="*/ 1171496 w 1789593"/>
+                  <a:gd name="connsiteY26" fmla="*/ 1134242 h 2451267"/>
+                  <a:gd name="connsiteX27" fmla="*/ 978381 w 1789593"/>
+                  <a:gd name="connsiteY27" fmla="*/ 1162085 h 2451267"/>
+                  <a:gd name="connsiteX28" fmla="*/ 827700 w 1789593"/>
+                  <a:gd name="connsiteY28" fmla="*/ 1225104 h 2451267"/>
+                  <a:gd name="connsiteX29" fmla="*/ 964007 w 1789593"/>
+                  <a:gd name="connsiteY29" fmla="*/ 1060677 h 2451267"/>
+                  <a:gd name="connsiteX30" fmla="*/ 1064092 w 1789593"/>
+                  <a:gd name="connsiteY30" fmla="*/ 875173 h 2451267"/>
+                  <a:gd name="connsiteX31" fmla="*/ 1210098 w 1789593"/>
+                  <a:gd name="connsiteY31" fmla="*/ 709839 h 2451267"/>
+                  <a:gd name="connsiteX32" fmla="*/ 1387616 w 1789593"/>
+                  <a:gd name="connsiteY32" fmla="*/ 619847 h 2451267"/>
+                  <a:gd name="connsiteX33" fmla="*/ 1605158 w 1789593"/>
+                  <a:gd name="connsiteY33" fmla="*/ 486968 h 2451267"/>
+                  <a:gd name="connsiteX34" fmla="*/ 1641595 w 1789593"/>
+                  <a:gd name="connsiteY34" fmla="*/ 248700 h 2451267"/>
+                  <a:gd name="connsiteX35" fmla="*/ 1626766 w 1789593"/>
+                  <a:gd name="connsiteY35" fmla="*/ 142442 h 2451267"/>
+                  <a:gd name="connsiteX36" fmla="*/ 1789593 w 1789593"/>
+                  <a:gd name="connsiteY36" fmla="*/ 0 h 2451267"/>
+                  <a:gd name="connsiteX37" fmla="*/ 1754694 w 1789593"/>
+                  <a:gd name="connsiteY37" fmla="*/ 150052 h 2451267"/>
+                  <a:gd name="connsiteX38" fmla="*/ 1522762 w 1789593"/>
+                  <a:gd name="connsiteY38" fmla="*/ 861643 h 2451267"/>
+                  <a:gd name="connsiteX39" fmla="*/ 1218879 w 1789593"/>
+                  <a:gd name="connsiteY39" fmla="*/ 1379352 h 2451267"/>
+                  <a:gd name="connsiteX40" fmla="*/ 802388 w 1789593"/>
+                  <a:gd name="connsiteY40" fmla="*/ 1843981 h 2451267"/>
+                  <a:gd name="connsiteX41" fmla="*/ 569940 w 1789593"/>
+                  <a:gd name="connsiteY41" fmla="*/ 2183757 h 2451267"/>
+                  <a:gd name="connsiteX42" fmla="*/ 482416 w 1789593"/>
+                  <a:gd name="connsiteY42" fmla="*/ 2451267 h 2451267"/>
+                </a:gdLst>
+                <a:ahLst/>
+                <a:cxnLst>
+                  <a:cxn ang="0">
+                    <a:pos x="connsiteX0" y="connsiteY0"/>
+                  </a:cxn>
+                  <a:cxn ang="0">
+                    <a:pos x="connsiteX1" y="connsiteY1"/>
+                  </a:cxn>
+                  <a:cxn ang="0">
+                    <a:pos x="connsiteX2" y="connsiteY2"/>
+                  </a:cxn>
+                  <a:cxn ang="0">
+                    <a:pos x="connsiteX3" y="connsiteY3"/>
+                  </a:cxn>
+                  <a:cxn ang="0">
+                    <a:pos x="connsiteX4" y="connsiteY4"/>
+                  </a:cxn>
+                  <a:cxn ang="0">
+                    <a:pos x="connsiteX5" y="connsiteY5"/>
+                  </a:cxn>
+                  <a:cxn ang="0">
+                    <a:pos x="connsiteX6" y="connsiteY6"/>
+                  </a:cxn>
+                  <a:cxn ang="0">
+                    <a:pos x="connsiteX7" y="connsiteY7"/>
+                  </a:cxn>
+                  <a:cxn ang="0">
+                    <a:pos x="connsiteX8" y="connsiteY8"/>
+                  </a:cxn>
+                  <a:cxn ang="0">
+                    <a:pos x="connsiteX9" y="connsiteY9"/>
+                  </a:cxn>
+                  <a:cxn ang="0">
+                    <a:pos x="connsiteX10" y="connsiteY10"/>
+                  </a:cxn>
+                  <a:cxn ang="0">
+                    <a:pos x="connsiteX11" y="connsiteY11"/>
+                  </a:cxn>
+                  <a:cxn ang="0">
+                    <a:pos x="connsiteX12" y="connsiteY12"/>
+                  </a:cxn>
+                  <a:cxn ang="0">
+                    <a:pos x="connsiteX13" y="connsiteY13"/>
+                  </a:cxn>
+                  <a:cxn ang="0">
+                    <a:pos x="connsiteX14" y="connsiteY14"/>
+                  </a:cxn>
+                  <a:cxn ang="0">
+                    <a:pos x="connsiteX15" y="connsiteY15"/>
+                  </a:cxn>
+                  <a:cxn ang="0">
+                    <a:pos x="connsiteX16" y="connsiteY16"/>
+                  </a:cxn>
+                  <a:cxn ang="0">
+                    <a:pos x="connsiteX17" y="connsiteY17"/>
+                  </a:cxn>
+                  <a:cxn ang="0">
+                    <a:pos x="connsiteX18" y="connsiteY18"/>
+                  </a:cxn>
+                  <a:cxn ang="0">
+                    <a:pos x="connsiteX19" y="connsiteY19"/>
+                  </a:cxn>
+                  <a:cxn ang="0">
+                    <a:pos x="connsiteX20" y="connsiteY20"/>
+                  </a:cxn>
+                  <a:cxn ang="0">
+                    <a:pos x="connsiteX21" y="connsiteY21"/>
+                  </a:cxn>
+                  <a:cxn ang="0">
+                    <a:pos x="connsiteX22" y="connsiteY22"/>
+                  </a:cxn>
+                  <a:cxn ang="0">
+                    <a:pos x="connsiteX23" y="connsiteY23"/>
+                  </a:cxn>
+                  <a:cxn ang="0">
+                    <a:pos x="connsiteX24" y="connsiteY24"/>
+                  </a:cxn>
+                  <a:cxn ang="0">
+                    <a:pos x="connsiteX25" y="connsiteY25"/>
+                  </a:cxn>
+                  <a:cxn ang="0">
+                    <a:pos x="connsiteX26" y="connsiteY26"/>
+                  </a:cxn>
+                  <a:cxn ang="0">
+                    <a:pos x="connsiteX27" y="connsiteY27"/>
+                  </a:cxn>
+                  <a:cxn ang="0">
+                    <a:pos x="connsiteX28" y="connsiteY28"/>
+                  </a:cxn>
+                  <a:cxn ang="0">
+                    <a:pos x="connsiteX29" y="connsiteY29"/>
+                  </a:cxn>
+                  <a:cxn ang="0">
+                    <a:pos x="connsiteX30" y="connsiteY30"/>
+                  </a:cxn>
+                  <a:cxn ang="0">
+                    <a:pos x="connsiteX31" y="connsiteY31"/>
+                  </a:cxn>
+                  <a:cxn ang="0">
+                    <a:pos x="connsiteX32" y="connsiteY32"/>
+                  </a:cxn>
+                  <a:cxn ang="0">
+                    <a:pos x="connsiteX33" y="connsiteY33"/>
+                  </a:cxn>
+                  <a:cxn ang="0">
+                    <a:pos x="connsiteX34" y="connsiteY34"/>
+                  </a:cxn>
+                  <a:cxn ang="0">
+                    <a:pos x="connsiteX35" y="connsiteY35"/>
+                  </a:cxn>
+                  <a:cxn ang="0">
+                    <a:pos x="connsiteX36" y="connsiteY36"/>
+                  </a:cxn>
+                  <a:cxn ang="0">
+                    <a:pos x="connsiteX37" y="connsiteY37"/>
+                  </a:cxn>
+                  <a:cxn ang="0">
+                    <a:pos x="connsiteX38" y="connsiteY38"/>
+                  </a:cxn>
+                  <a:cxn ang="0">
+                    <a:pos x="connsiteX39" y="connsiteY39"/>
+                  </a:cxn>
+                  <a:cxn ang="0">
+                    <a:pos x="connsiteX40" y="connsiteY40"/>
+                  </a:cxn>
+                  <a:cxn ang="0">
+                    <a:pos x="connsiteX41" y="connsiteY41"/>
+                  </a:cxn>
+                  <a:cxn ang="0">
+                    <a:pos x="connsiteX42" y="connsiteY42"/>
+                  </a:cxn>
+                </a:cxnLst>
+                <a:rect l="l" t="t" r="r" b="b"/>
+                <a:pathLst>
+                  <a:path w="1789593" h="2451267">
+                    <a:moveTo>
+                      <a:pt x="1531385" y="174047"/>
+                    </a:moveTo>
+                    <a:lnTo>
+                      <a:pt x="1531361" y="174040"/>
+                    </a:lnTo>
+                    <a:lnTo>
+                      <a:pt x="1534080" y="166462"/>
+                    </a:lnTo>
+                    <a:cubicBezTo>
+                      <a:pt x="1535145" y="163498"/>
+                      <a:pt x="1535444" y="162672"/>
+                      <a:pt x="1535232" y="163271"/>
+                    </a:cubicBezTo>
+                    <a:close/>
+                    <a:moveTo>
+                      <a:pt x="1524524" y="193267"/>
+                    </a:moveTo>
+                    <a:cubicBezTo>
+                      <a:pt x="1524947" y="192068"/>
+                      <a:pt x="1527413" y="185169"/>
+                      <a:pt x="1529878" y="178269"/>
+                    </a:cubicBezTo>
+                    <a:lnTo>
+                      <a:pt x="1531385" y="174047"/>
+                    </a:lnTo>
+                    <a:lnTo>
+                      <a:pt x="1531423" y="174059"/>
+                    </a:lnTo>
+                    <a:cubicBezTo>
+                      <a:pt x="1525720" y="189963"/>
+                      <a:pt x="1524101" y="194465"/>
+                      <a:pt x="1524524" y="193267"/>
+                    </a:cubicBezTo>
+                    <a:close/>
+                    <a:moveTo>
+                      <a:pt x="482416" y="2451267"/>
+                    </a:moveTo>
+                    <a:cubicBezTo>
+                      <a:pt x="484458" y="2416418"/>
+                      <a:pt x="485941" y="2342885"/>
+                      <a:pt x="489235" y="2262557"/>
+                    </a:cubicBezTo>
+                    <a:lnTo>
+                      <a:pt x="493039" y="2192439"/>
+                    </a:lnTo>
+                    <a:lnTo>
+                      <a:pt x="413198" y="2132224"/>
+                    </a:lnTo>
+                    <a:cubicBezTo>
+                      <a:pt x="4961" y="1793498"/>
+                      <a:pt x="-120162" y="1211859"/>
+                      <a:pt x="125366" y="731046"/>
+                    </a:cubicBezTo>
+                    <a:cubicBezTo>
+                      <a:pt x="370894" y="250232"/>
+                      <a:pt x="915425" y="10552"/>
+                      <a:pt x="1429180" y="142645"/>
+                    </a:cubicBezTo>
+                    <a:lnTo>
+                      <a:pt x="1531361" y="174040"/>
+                    </a:lnTo>
+                    <a:lnTo>
+                      <a:pt x="1528333" y="182479"/>
+                    </a:lnTo>
+                    <a:cubicBezTo>
+                      <a:pt x="1082267" y="22515"/>
+                      <a:pt x="521452" y="401216"/>
+                      <a:pt x="305937" y="823255"/>
+                    </a:cubicBezTo>
+                    <a:cubicBezTo>
+                      <a:pt x="117362" y="1192540"/>
+                      <a:pt x="194483" y="1634099"/>
+                      <a:pt x="478734" y="1917956"/>
+                    </a:cubicBezTo>
+                    <a:lnTo>
+                      <a:pt x="522767" y="1954448"/>
+                    </a:lnTo>
+                    <a:lnTo>
+                      <a:pt x="542850" y="1854794"/>
+                    </a:lnTo>
+                    <a:cubicBezTo>
+                      <a:pt x="557428" y="1799201"/>
+                      <a:pt x="574518" y="1748673"/>
+                      <a:pt x="593854" y="1706906"/>
+                    </a:cubicBezTo>
+                    <a:cubicBezTo>
+                      <a:pt x="632526" y="1623372"/>
+                      <a:pt x="738953" y="1531872"/>
+                      <a:pt x="738953" y="1531872"/>
+                    </a:cubicBezTo>
+                    <a:lnTo>
+                      <a:pt x="615107" y="1567916"/>
+                    </a:lnTo>
+                    <a:cubicBezTo>
+                      <a:pt x="632748" y="1538540"/>
+                      <a:pt x="676323" y="1446393"/>
+                      <a:pt x="720951" y="1391660"/>
+                    </a:cubicBezTo>
+                    <a:cubicBezTo>
+                      <a:pt x="765577" y="1336926"/>
+                      <a:pt x="807779" y="1282420"/>
+                      <a:pt x="882870" y="1239517"/>
+                    </a:cubicBezTo>
+                    <a:cubicBezTo>
+                      <a:pt x="957960" y="1196614"/>
+                      <a:pt x="1171496" y="1134242"/>
+                      <a:pt x="1171496" y="1134242"/>
+                    </a:cubicBezTo>
+                    <a:cubicBezTo>
+                      <a:pt x="1139310" y="1138883"/>
+                      <a:pt x="1035681" y="1146941"/>
+                      <a:pt x="978381" y="1162085"/>
+                    </a:cubicBezTo>
+                    <a:cubicBezTo>
+                      <a:pt x="921082" y="1177229"/>
+                      <a:pt x="827700" y="1225104"/>
+                      <a:pt x="827700" y="1225104"/>
+                    </a:cubicBezTo>
+                    <a:cubicBezTo>
+                      <a:pt x="850417" y="1197699"/>
+                      <a:pt x="924608" y="1118999"/>
+                      <a:pt x="964007" y="1060677"/>
+                    </a:cubicBezTo>
+                    <a:cubicBezTo>
+                      <a:pt x="1003405" y="1002356"/>
+                      <a:pt x="1023076" y="933647"/>
+                      <a:pt x="1064092" y="875173"/>
+                    </a:cubicBezTo>
+                    <a:cubicBezTo>
+                      <a:pt x="1105107" y="816701"/>
+                      <a:pt x="1156177" y="752394"/>
+                      <a:pt x="1210098" y="709839"/>
+                    </a:cubicBezTo>
+                    <a:cubicBezTo>
+                      <a:pt x="1264019" y="667285"/>
+                      <a:pt x="1321772" y="656992"/>
+                      <a:pt x="1387616" y="619847"/>
+                    </a:cubicBezTo>
+                    <a:cubicBezTo>
+                      <a:pt x="1453458" y="582701"/>
+                      <a:pt x="1562829" y="548825"/>
+                      <a:pt x="1605158" y="486968"/>
+                    </a:cubicBezTo>
+                    <a:cubicBezTo>
+                      <a:pt x="1647488" y="425110"/>
+                      <a:pt x="1637993" y="306121"/>
+                      <a:pt x="1641595" y="248700"/>
+                    </a:cubicBezTo>
+                    <a:cubicBezTo>
+                      <a:pt x="1645196" y="191279"/>
+                      <a:pt x="1626766" y="142442"/>
+                      <a:pt x="1626766" y="142442"/>
+                    </a:cubicBezTo>
+                    <a:lnTo>
+                      <a:pt x="1789593" y="0"/>
+                    </a:lnTo>
+                    <a:lnTo>
+                      <a:pt x="1754694" y="150052"/>
+                    </a:lnTo>
+                    <a:cubicBezTo>
+                      <a:pt x="1683380" y="403405"/>
+                      <a:pt x="1612065" y="656759"/>
+                      <a:pt x="1522762" y="861643"/>
+                    </a:cubicBezTo>
+                    <a:cubicBezTo>
+                      <a:pt x="1433460" y="1066526"/>
+                      <a:pt x="1338941" y="1215629"/>
+                      <a:pt x="1218879" y="1379352"/>
+                    </a:cubicBezTo>
+                    <a:cubicBezTo>
+                      <a:pt x="1098817" y="1543075"/>
+                      <a:pt x="910545" y="1709914"/>
+                      <a:pt x="802388" y="1843981"/>
+                    </a:cubicBezTo>
+                    <a:cubicBezTo>
+                      <a:pt x="694232" y="1978049"/>
+                      <a:pt x="623268" y="2082543"/>
+                      <a:pt x="569940" y="2183757"/>
+                    </a:cubicBezTo>
+                    <a:cubicBezTo>
+                      <a:pt x="516612" y="2284972"/>
+                      <a:pt x="482416" y="2451267"/>
+                      <a:pt x="482416" y="2451267"/>
+                    </a:cubicBezTo>
+                    <a:close/>
+                  </a:path>
+                </a:pathLst>
+              </a:custGeom>
+              <a:solidFill>
+                <a:srgbClr val="E7A800"/>
+              </a:solidFill>
+              <a:ln>
+                <a:noFill/>
+              </a:ln>
+            </p:spPr>
+            <p:style>
+              <a:lnRef idx="2">
+                <a:schemeClr val="accent1">
+                  <a:shade val="50000"/>
+                </a:schemeClr>
+              </a:lnRef>
+              <a:fillRef idx="1">
+                <a:schemeClr val="accent1"/>
+              </a:fillRef>
+              <a:effectRef idx="0">
+                <a:schemeClr val="accent1"/>
+              </a:effectRef>
+              <a:fontRef idx="minor">
+                <a:schemeClr val="lt1"/>
+              </a:fontRef>
+            </p:style>
+            <p:txBody>
+              <a:bodyPr wrap="square" rtlCol="0" anchor="ctr">
+                <a:noAutofit/>
+              </a:bodyPr>
+              <a:lstStyle/>
+              <a:p>
+                <a:pPr algn="ctr"/>
+                <a:endParaRPr lang="en-US" dirty="0">
+                  <a:solidFill>
+                    <a:schemeClr val="tx1"/>
+                  </a:solidFill>
+                </a:endParaRPr>
+              </a:p>
+            </p:txBody>
+          </p:sp>
+        </p:grpSp>
+      </p:grpSp>
+    </p:spTree>
+    <p:extLst>
+      <p:ext uri="{BB962C8B-B14F-4D97-AF65-F5344CB8AC3E}">
+        <p14:creationId xmlns:p14="http://schemas.microsoft.com/office/powerpoint/2010/main" val="3719591864"/>
+      </p:ext>
+    </p:extLst>
+  </p:cSld>
+  <p:clrMapOvr>
+    <a:masterClrMapping/>
+  </p:clrMapOvr>
+</p:sld>
+</file>
+
 <file path=ppt/theme/theme1.xml><?xml version="1.0" encoding="utf-8"?>
 <a:theme xmlns:a="http://schemas.openxmlformats.org/drawingml/2006/main" name="Office Theme">
   <a:themeElements>

</xml_diff>

<commit_message>
frontend: Updated ImgIcon to use next/image
</commit_message>
<xml_diff>
--- a/design/pendemic.pptx
+++ b/design/pendemic.pptx
@@ -260,7 +260,7 @@
           <a:p>
             <a:fld id="{D72D9797-B2A1-4EF7-ADAF-E9AEDD5553EE}" type="datetimeFigureOut">
               <a:rPr lang="en-US" smtClean="0"/>
-              <a:t>29-May-21</a:t>
+              <a:t>05-Jun-21</a:t>
             </a:fld>
             <a:endParaRPr lang="en-US"/>
           </a:p>
@@ -458,7 +458,7 @@
           <a:p>
             <a:fld id="{D72D9797-B2A1-4EF7-ADAF-E9AEDD5553EE}" type="datetimeFigureOut">
               <a:rPr lang="en-US" smtClean="0"/>
-              <a:t>29-May-21</a:t>
+              <a:t>05-Jun-21</a:t>
             </a:fld>
             <a:endParaRPr lang="en-US"/>
           </a:p>
@@ -666,7 +666,7 @@
           <a:p>
             <a:fld id="{D72D9797-B2A1-4EF7-ADAF-E9AEDD5553EE}" type="datetimeFigureOut">
               <a:rPr lang="en-US" smtClean="0"/>
-              <a:t>29-May-21</a:t>
+              <a:t>05-Jun-21</a:t>
             </a:fld>
             <a:endParaRPr lang="en-US"/>
           </a:p>
@@ -864,7 +864,7 @@
           <a:p>
             <a:fld id="{D72D9797-B2A1-4EF7-ADAF-E9AEDD5553EE}" type="datetimeFigureOut">
               <a:rPr lang="en-US" smtClean="0"/>
-              <a:t>29-May-21</a:t>
+              <a:t>05-Jun-21</a:t>
             </a:fld>
             <a:endParaRPr lang="en-US"/>
           </a:p>
@@ -1139,7 +1139,7 @@
           <a:p>
             <a:fld id="{D72D9797-B2A1-4EF7-ADAF-E9AEDD5553EE}" type="datetimeFigureOut">
               <a:rPr lang="en-US" smtClean="0"/>
-              <a:t>29-May-21</a:t>
+              <a:t>05-Jun-21</a:t>
             </a:fld>
             <a:endParaRPr lang="en-US"/>
           </a:p>
@@ -1404,7 +1404,7 @@
           <a:p>
             <a:fld id="{D72D9797-B2A1-4EF7-ADAF-E9AEDD5553EE}" type="datetimeFigureOut">
               <a:rPr lang="en-US" smtClean="0"/>
-              <a:t>29-May-21</a:t>
+              <a:t>05-Jun-21</a:t>
             </a:fld>
             <a:endParaRPr lang="en-US"/>
           </a:p>
@@ -1816,7 +1816,7 @@
           <a:p>
             <a:fld id="{D72D9797-B2A1-4EF7-ADAF-E9AEDD5553EE}" type="datetimeFigureOut">
               <a:rPr lang="en-US" smtClean="0"/>
-              <a:t>29-May-21</a:t>
+              <a:t>05-Jun-21</a:t>
             </a:fld>
             <a:endParaRPr lang="en-US"/>
           </a:p>
@@ -1957,7 +1957,7 @@
           <a:p>
             <a:fld id="{D72D9797-B2A1-4EF7-ADAF-E9AEDD5553EE}" type="datetimeFigureOut">
               <a:rPr lang="en-US" smtClean="0"/>
-              <a:t>29-May-21</a:t>
+              <a:t>05-Jun-21</a:t>
             </a:fld>
             <a:endParaRPr lang="en-US"/>
           </a:p>
@@ -2070,7 +2070,7 @@
           <a:p>
             <a:fld id="{D72D9797-B2A1-4EF7-ADAF-E9AEDD5553EE}" type="datetimeFigureOut">
               <a:rPr lang="en-US" smtClean="0"/>
-              <a:t>29-May-21</a:t>
+              <a:t>05-Jun-21</a:t>
             </a:fld>
             <a:endParaRPr lang="en-US"/>
           </a:p>
@@ -2381,7 +2381,7 @@
           <a:p>
             <a:fld id="{D72D9797-B2A1-4EF7-ADAF-E9AEDD5553EE}" type="datetimeFigureOut">
               <a:rPr lang="en-US" smtClean="0"/>
-              <a:t>29-May-21</a:t>
+              <a:t>05-Jun-21</a:t>
             </a:fld>
             <a:endParaRPr lang="en-US"/>
           </a:p>
@@ -2669,7 +2669,7 @@
           <a:p>
             <a:fld id="{D72D9797-B2A1-4EF7-ADAF-E9AEDD5553EE}" type="datetimeFigureOut">
               <a:rPr lang="en-US" smtClean="0"/>
-              <a:t>29-May-21</a:t>
+              <a:t>05-Jun-21</a:t>
             </a:fld>
             <a:endParaRPr lang="en-US"/>
           </a:p>
@@ -2910,7 +2910,7 @@
           <a:p>
             <a:fld id="{D72D9797-B2A1-4EF7-ADAF-E9AEDD5553EE}" type="datetimeFigureOut">
               <a:rPr lang="en-US" smtClean="0"/>
-              <a:t>29-May-21</a:t>
+              <a:t>05-Jun-21</a:t>
             </a:fld>
             <a:endParaRPr lang="en-US"/>
           </a:p>
@@ -8843,7 +8843,7 @@
         </p:nvGrpSpPr>
         <p:grpSpPr>
           <a:xfrm>
-            <a:off x="3352800" y="1278923"/>
+            <a:off x="3352800" y="87686"/>
             <a:ext cx="2743200" cy="2743200"/>
             <a:chOff x="5201760" y="1526937"/>
             <a:chExt cx="2743200" cy="2743200"/>
@@ -9904,7 +9904,7 @@
         </p:nvGrpSpPr>
         <p:grpSpPr>
           <a:xfrm>
-            <a:off x="6699114" y="1278923"/>
+            <a:off x="6699114" y="87686"/>
             <a:ext cx="2743200" cy="2743200"/>
             <a:chOff x="5201760" y="1526937"/>
             <a:chExt cx="2743200" cy="2743200"/>
@@ -10950,6 +10950,3362 @@
             </p:txBody>
           </p:sp>
         </p:grpSp>
+      </p:grpSp>
+      <p:grpSp>
+        <p:nvGrpSpPr>
+          <p:cNvPr id="24" name="Group 23">
+            <a:extLst>
+              <a:ext uri="{FF2B5EF4-FFF2-40B4-BE49-F238E27FC236}">
+                <a16:creationId xmlns:a16="http://schemas.microsoft.com/office/drawing/2014/main" id="{60BB7A37-4C40-490B-BFBA-41A3FBD29E2A}"/>
+              </a:ext>
+            </a:extLst>
+          </p:cNvPr>
+          <p:cNvGrpSpPr/>
+          <p:nvPr/>
+        </p:nvGrpSpPr>
+        <p:grpSpPr>
+          <a:xfrm>
+            <a:off x="3352800" y="3225168"/>
+            <a:ext cx="2743200" cy="2743200"/>
+            <a:chOff x="4882197" y="1127372"/>
+            <a:chExt cx="2743200" cy="2743200"/>
+          </a:xfrm>
+        </p:grpSpPr>
+        <p:sp>
+          <p:nvSpPr>
+            <p:cNvPr id="28" name="Rectangle 27">
+              <a:extLst>
+                <a:ext uri="{FF2B5EF4-FFF2-40B4-BE49-F238E27FC236}">
+                  <a16:creationId xmlns:a16="http://schemas.microsoft.com/office/drawing/2014/main" id="{9634BEAE-D61A-489C-8A60-0A0E78A63FF1}"/>
+                </a:ext>
+              </a:extLst>
+            </p:cNvPr>
+            <p:cNvSpPr/>
+            <p:nvPr/>
+          </p:nvSpPr>
+          <p:spPr>
+            <a:xfrm>
+              <a:off x="4882197" y="1127372"/>
+              <a:ext cx="2743200" cy="2743200"/>
+            </a:xfrm>
+            <a:prstGeom prst="rect">
+              <a:avLst/>
+            </a:prstGeom>
+            <a:noFill/>
+            <a:ln>
+              <a:noFill/>
+            </a:ln>
+          </p:spPr>
+          <p:style>
+            <a:lnRef idx="2">
+              <a:schemeClr val="accent1">
+                <a:shade val="50000"/>
+              </a:schemeClr>
+            </a:lnRef>
+            <a:fillRef idx="1">
+              <a:schemeClr val="accent1"/>
+            </a:fillRef>
+            <a:effectRef idx="0">
+              <a:schemeClr val="accent1"/>
+            </a:effectRef>
+            <a:fontRef idx="minor">
+              <a:schemeClr val="lt1"/>
+            </a:fontRef>
+          </p:style>
+          <p:txBody>
+            <a:bodyPr rtlCol="0" anchor="ctr"/>
+            <a:lstStyle/>
+            <a:p>
+              <a:pPr algn="ctr"/>
+              <a:endParaRPr lang="en-US"/>
+            </a:p>
+          </p:txBody>
+        </p:sp>
+        <p:sp>
+          <p:nvSpPr>
+            <p:cNvPr id="29" name="Freeform: Shape 28">
+              <a:extLst>
+                <a:ext uri="{FF2B5EF4-FFF2-40B4-BE49-F238E27FC236}">
+                  <a16:creationId xmlns:a16="http://schemas.microsoft.com/office/drawing/2014/main" id="{DF8F2799-8293-4C2F-B431-B393FB5CCD66}"/>
+                </a:ext>
+              </a:extLst>
+            </p:cNvPr>
+            <p:cNvSpPr/>
+            <p:nvPr/>
+          </p:nvSpPr>
+          <p:spPr>
+            <a:xfrm rot="853024">
+              <a:off x="5144715" y="1183069"/>
+              <a:ext cx="1582803" cy="2216048"/>
+            </a:xfrm>
+            <a:custGeom>
+              <a:avLst/>
+              <a:gdLst>
+                <a:gd name="connsiteX0" fmla="*/ 501071 w 1582803"/>
+                <a:gd name="connsiteY0" fmla="*/ 2199288 h 2216048"/>
+                <a:gd name="connsiteX1" fmla="*/ 501416 w 1582803"/>
+                <a:gd name="connsiteY1" fmla="*/ 2199563 h 2216048"/>
+                <a:gd name="connsiteX2" fmla="*/ 499805 w 1582803"/>
+                <a:gd name="connsiteY2" fmla="*/ 2201202 h 2216048"/>
+                <a:gd name="connsiteX3" fmla="*/ 509436 w 1582803"/>
+                <a:gd name="connsiteY3" fmla="*/ 2186644 h 2216048"/>
+                <a:gd name="connsiteX4" fmla="*/ 501071 w 1582803"/>
+                <a:gd name="connsiteY4" fmla="*/ 2199288 h 2216048"/>
+                <a:gd name="connsiteX5" fmla="*/ 500790 w 1582803"/>
+                <a:gd name="connsiteY5" fmla="*/ 2199065 h 2216048"/>
+                <a:gd name="connsiteX6" fmla="*/ 507729 w 1582803"/>
+                <a:gd name="connsiteY6" fmla="*/ 2188975 h 2216048"/>
+                <a:gd name="connsiteX7" fmla="*/ 509436 w 1582803"/>
+                <a:gd name="connsiteY7" fmla="*/ 2186644 h 2216048"/>
+                <a:gd name="connsiteX8" fmla="*/ 819110 w 1582803"/>
+                <a:gd name="connsiteY8" fmla="*/ 160678 h 2216048"/>
+                <a:gd name="connsiteX9" fmla="*/ 1429197 w 1582803"/>
+                <a:gd name="connsiteY9" fmla="*/ 149133 h 2216048"/>
+                <a:gd name="connsiteX10" fmla="*/ 1526472 w 1582803"/>
+                <a:gd name="connsiteY10" fmla="*/ 179022 h 2216048"/>
+                <a:gd name="connsiteX11" fmla="*/ 1534350 w 1582803"/>
+                <a:gd name="connsiteY11" fmla="*/ 160689 h 2216048"/>
+                <a:gd name="connsiteX12" fmla="*/ 1582803 w 1582803"/>
+                <a:gd name="connsiteY12" fmla="*/ 0 h 2216048"/>
+                <a:gd name="connsiteX13" fmla="*/ 1553906 w 1582803"/>
+                <a:gd name="connsiteY13" fmla="*/ 203321 h 2216048"/>
+                <a:gd name="connsiteX14" fmla="*/ 1431819 w 1582803"/>
+                <a:gd name="connsiteY14" fmla="*/ 455379 h 2216048"/>
+                <a:gd name="connsiteX15" fmla="*/ 1192992 w 1582803"/>
+                <a:gd name="connsiteY15" fmla="*/ 782244 h 2216048"/>
+                <a:gd name="connsiteX16" fmla="*/ 942392 w 1582803"/>
+                <a:gd name="connsiteY16" fmla="*/ 1122144 h 2216048"/>
+                <a:gd name="connsiteX17" fmla="*/ 787564 w 1582803"/>
+                <a:gd name="connsiteY17" fmla="*/ 1483010 h 2216048"/>
+                <a:gd name="connsiteX18" fmla="*/ 714659 w 1582803"/>
+                <a:gd name="connsiteY18" fmla="*/ 1968863 h 2216048"/>
+                <a:gd name="connsiteX19" fmla="*/ 704525 w 1582803"/>
+                <a:gd name="connsiteY19" fmla="*/ 2127224 h 2216048"/>
+                <a:gd name="connsiteX20" fmla="*/ 609814 w 1582803"/>
+                <a:gd name="connsiteY20" fmla="*/ 1693889 h 2216048"/>
+                <a:gd name="connsiteX21" fmla="*/ 570956 w 1582803"/>
+                <a:gd name="connsiteY21" fmla="*/ 1361993 h 2216048"/>
+                <a:gd name="connsiteX22" fmla="*/ 648283 w 1582803"/>
+                <a:gd name="connsiteY22" fmla="*/ 1528349 h 2216048"/>
+                <a:gd name="connsiteX23" fmla="*/ 644059 w 1582803"/>
+                <a:gd name="connsiteY23" fmla="*/ 1313318 h 2216048"/>
+                <a:gd name="connsiteX24" fmla="*/ 722701 w 1582803"/>
+                <a:gd name="connsiteY24" fmla="*/ 1147650 h 2216048"/>
+                <a:gd name="connsiteX25" fmla="*/ 770426 w 1582803"/>
+                <a:gd name="connsiteY25" fmla="*/ 919458 h 2216048"/>
+                <a:gd name="connsiteX26" fmla="*/ 801597 w 1582803"/>
+                <a:gd name="connsiteY26" fmla="*/ 1062329 h 2216048"/>
+                <a:gd name="connsiteX27" fmla="*/ 835154 w 1582803"/>
+                <a:gd name="connsiteY27" fmla="*/ 837726 h 2216048"/>
+                <a:gd name="connsiteX28" fmla="*/ 983437 w 1582803"/>
+                <a:gd name="connsiteY28" fmla="*/ 649389 h 2216048"/>
+                <a:gd name="connsiteX29" fmla="*/ 1155522 w 1582803"/>
+                <a:gd name="connsiteY29" fmla="*/ 515329 h 2216048"/>
+                <a:gd name="connsiteX30" fmla="*/ 1391329 w 1582803"/>
+                <a:gd name="connsiteY30" fmla="*/ 355074 h 2216048"/>
+                <a:gd name="connsiteX31" fmla="*/ 1396094 w 1582803"/>
+                <a:gd name="connsiteY31" fmla="*/ 350843 h 2216048"/>
+                <a:gd name="connsiteX32" fmla="*/ 1378860 w 1582803"/>
+                <a:gd name="connsiteY32" fmla="*/ 345548 h 2216048"/>
+                <a:gd name="connsiteX33" fmla="*/ 306027 w 1582803"/>
+                <a:gd name="connsiteY33" fmla="*/ 829562 h 2216048"/>
+                <a:gd name="connsiteX34" fmla="*/ 432427 w 1582803"/>
+                <a:gd name="connsiteY34" fmla="*/ 2144702 h 2216048"/>
+                <a:gd name="connsiteX35" fmla="*/ 500790 w 1582803"/>
+                <a:gd name="connsiteY35" fmla="*/ 2199065 h 2216048"/>
+                <a:gd name="connsiteX36" fmla="*/ 498194 w 1582803"/>
+                <a:gd name="connsiteY36" fmla="*/ 2202840 h 2216048"/>
+                <a:gd name="connsiteX37" fmla="*/ 125476 w 1582803"/>
+                <a:gd name="connsiteY37" fmla="*/ 737314 h 2216048"/>
+                <a:gd name="connsiteX38" fmla="*/ 819110 w 1582803"/>
+                <a:gd name="connsiteY38" fmla="*/ 160678 h 2216048"/>
+                <a:gd name="connsiteX0" fmla="*/ 501071 w 1582803"/>
+                <a:gd name="connsiteY0" fmla="*/ 2199288 h 2216048"/>
+                <a:gd name="connsiteX1" fmla="*/ 501416 w 1582803"/>
+                <a:gd name="connsiteY1" fmla="*/ 2199563 h 2216048"/>
+                <a:gd name="connsiteX2" fmla="*/ 499805 w 1582803"/>
+                <a:gd name="connsiteY2" fmla="*/ 2201202 h 2216048"/>
+                <a:gd name="connsiteX3" fmla="*/ 501071 w 1582803"/>
+                <a:gd name="connsiteY3" fmla="*/ 2199288 h 2216048"/>
+                <a:gd name="connsiteX4" fmla="*/ 509436 w 1582803"/>
+                <a:gd name="connsiteY4" fmla="*/ 2186644 h 2216048"/>
+                <a:gd name="connsiteX5" fmla="*/ 501071 w 1582803"/>
+                <a:gd name="connsiteY5" fmla="*/ 2199288 h 2216048"/>
+                <a:gd name="connsiteX6" fmla="*/ 500790 w 1582803"/>
+                <a:gd name="connsiteY6" fmla="*/ 2199065 h 2216048"/>
+                <a:gd name="connsiteX7" fmla="*/ 507729 w 1582803"/>
+                <a:gd name="connsiteY7" fmla="*/ 2188975 h 2216048"/>
+                <a:gd name="connsiteX8" fmla="*/ 509436 w 1582803"/>
+                <a:gd name="connsiteY8" fmla="*/ 2186644 h 2216048"/>
+                <a:gd name="connsiteX9" fmla="*/ 819110 w 1582803"/>
+                <a:gd name="connsiteY9" fmla="*/ 160678 h 2216048"/>
+                <a:gd name="connsiteX10" fmla="*/ 1429197 w 1582803"/>
+                <a:gd name="connsiteY10" fmla="*/ 149133 h 2216048"/>
+                <a:gd name="connsiteX11" fmla="*/ 1526472 w 1582803"/>
+                <a:gd name="connsiteY11" fmla="*/ 179022 h 2216048"/>
+                <a:gd name="connsiteX12" fmla="*/ 1534350 w 1582803"/>
+                <a:gd name="connsiteY12" fmla="*/ 160689 h 2216048"/>
+                <a:gd name="connsiteX13" fmla="*/ 1582803 w 1582803"/>
+                <a:gd name="connsiteY13" fmla="*/ 0 h 2216048"/>
+                <a:gd name="connsiteX14" fmla="*/ 1553906 w 1582803"/>
+                <a:gd name="connsiteY14" fmla="*/ 203321 h 2216048"/>
+                <a:gd name="connsiteX15" fmla="*/ 1431819 w 1582803"/>
+                <a:gd name="connsiteY15" fmla="*/ 455379 h 2216048"/>
+                <a:gd name="connsiteX16" fmla="*/ 1192992 w 1582803"/>
+                <a:gd name="connsiteY16" fmla="*/ 782244 h 2216048"/>
+                <a:gd name="connsiteX17" fmla="*/ 942392 w 1582803"/>
+                <a:gd name="connsiteY17" fmla="*/ 1122144 h 2216048"/>
+                <a:gd name="connsiteX18" fmla="*/ 787564 w 1582803"/>
+                <a:gd name="connsiteY18" fmla="*/ 1483010 h 2216048"/>
+                <a:gd name="connsiteX19" fmla="*/ 714659 w 1582803"/>
+                <a:gd name="connsiteY19" fmla="*/ 1968863 h 2216048"/>
+                <a:gd name="connsiteX20" fmla="*/ 704525 w 1582803"/>
+                <a:gd name="connsiteY20" fmla="*/ 2127224 h 2216048"/>
+                <a:gd name="connsiteX21" fmla="*/ 609814 w 1582803"/>
+                <a:gd name="connsiteY21" fmla="*/ 1693889 h 2216048"/>
+                <a:gd name="connsiteX22" fmla="*/ 570956 w 1582803"/>
+                <a:gd name="connsiteY22" fmla="*/ 1361993 h 2216048"/>
+                <a:gd name="connsiteX23" fmla="*/ 648283 w 1582803"/>
+                <a:gd name="connsiteY23" fmla="*/ 1528349 h 2216048"/>
+                <a:gd name="connsiteX24" fmla="*/ 644059 w 1582803"/>
+                <a:gd name="connsiteY24" fmla="*/ 1313318 h 2216048"/>
+                <a:gd name="connsiteX25" fmla="*/ 722701 w 1582803"/>
+                <a:gd name="connsiteY25" fmla="*/ 1147650 h 2216048"/>
+                <a:gd name="connsiteX26" fmla="*/ 770426 w 1582803"/>
+                <a:gd name="connsiteY26" fmla="*/ 919458 h 2216048"/>
+                <a:gd name="connsiteX27" fmla="*/ 801597 w 1582803"/>
+                <a:gd name="connsiteY27" fmla="*/ 1062329 h 2216048"/>
+                <a:gd name="connsiteX28" fmla="*/ 835154 w 1582803"/>
+                <a:gd name="connsiteY28" fmla="*/ 837726 h 2216048"/>
+                <a:gd name="connsiteX29" fmla="*/ 983437 w 1582803"/>
+                <a:gd name="connsiteY29" fmla="*/ 649389 h 2216048"/>
+                <a:gd name="connsiteX30" fmla="*/ 1155522 w 1582803"/>
+                <a:gd name="connsiteY30" fmla="*/ 515329 h 2216048"/>
+                <a:gd name="connsiteX31" fmla="*/ 1391329 w 1582803"/>
+                <a:gd name="connsiteY31" fmla="*/ 355074 h 2216048"/>
+                <a:gd name="connsiteX32" fmla="*/ 1396094 w 1582803"/>
+                <a:gd name="connsiteY32" fmla="*/ 350843 h 2216048"/>
+                <a:gd name="connsiteX33" fmla="*/ 306027 w 1582803"/>
+                <a:gd name="connsiteY33" fmla="*/ 829562 h 2216048"/>
+                <a:gd name="connsiteX34" fmla="*/ 432427 w 1582803"/>
+                <a:gd name="connsiteY34" fmla="*/ 2144702 h 2216048"/>
+                <a:gd name="connsiteX35" fmla="*/ 500790 w 1582803"/>
+                <a:gd name="connsiteY35" fmla="*/ 2199065 h 2216048"/>
+                <a:gd name="connsiteX36" fmla="*/ 498194 w 1582803"/>
+                <a:gd name="connsiteY36" fmla="*/ 2202840 h 2216048"/>
+                <a:gd name="connsiteX37" fmla="*/ 125476 w 1582803"/>
+                <a:gd name="connsiteY37" fmla="*/ 737314 h 2216048"/>
+                <a:gd name="connsiteX38" fmla="*/ 819110 w 1582803"/>
+                <a:gd name="connsiteY38" fmla="*/ 160678 h 2216048"/>
+                <a:gd name="connsiteX0" fmla="*/ 501071 w 1582803"/>
+                <a:gd name="connsiteY0" fmla="*/ 2199288 h 2216048"/>
+                <a:gd name="connsiteX1" fmla="*/ 501416 w 1582803"/>
+                <a:gd name="connsiteY1" fmla="*/ 2199563 h 2216048"/>
+                <a:gd name="connsiteX2" fmla="*/ 499805 w 1582803"/>
+                <a:gd name="connsiteY2" fmla="*/ 2201202 h 2216048"/>
+                <a:gd name="connsiteX3" fmla="*/ 501071 w 1582803"/>
+                <a:gd name="connsiteY3" fmla="*/ 2199288 h 2216048"/>
+                <a:gd name="connsiteX4" fmla="*/ 509436 w 1582803"/>
+                <a:gd name="connsiteY4" fmla="*/ 2186644 h 2216048"/>
+                <a:gd name="connsiteX5" fmla="*/ 501071 w 1582803"/>
+                <a:gd name="connsiteY5" fmla="*/ 2199288 h 2216048"/>
+                <a:gd name="connsiteX6" fmla="*/ 500790 w 1582803"/>
+                <a:gd name="connsiteY6" fmla="*/ 2199065 h 2216048"/>
+                <a:gd name="connsiteX7" fmla="*/ 507729 w 1582803"/>
+                <a:gd name="connsiteY7" fmla="*/ 2188975 h 2216048"/>
+                <a:gd name="connsiteX8" fmla="*/ 509436 w 1582803"/>
+                <a:gd name="connsiteY8" fmla="*/ 2186644 h 2216048"/>
+                <a:gd name="connsiteX9" fmla="*/ 819110 w 1582803"/>
+                <a:gd name="connsiteY9" fmla="*/ 160678 h 2216048"/>
+                <a:gd name="connsiteX10" fmla="*/ 1429197 w 1582803"/>
+                <a:gd name="connsiteY10" fmla="*/ 149133 h 2216048"/>
+                <a:gd name="connsiteX11" fmla="*/ 1526472 w 1582803"/>
+                <a:gd name="connsiteY11" fmla="*/ 179022 h 2216048"/>
+                <a:gd name="connsiteX12" fmla="*/ 1534350 w 1582803"/>
+                <a:gd name="connsiteY12" fmla="*/ 160689 h 2216048"/>
+                <a:gd name="connsiteX13" fmla="*/ 1582803 w 1582803"/>
+                <a:gd name="connsiteY13" fmla="*/ 0 h 2216048"/>
+                <a:gd name="connsiteX14" fmla="*/ 1553906 w 1582803"/>
+                <a:gd name="connsiteY14" fmla="*/ 203321 h 2216048"/>
+                <a:gd name="connsiteX15" fmla="*/ 1431819 w 1582803"/>
+                <a:gd name="connsiteY15" fmla="*/ 455379 h 2216048"/>
+                <a:gd name="connsiteX16" fmla="*/ 1192992 w 1582803"/>
+                <a:gd name="connsiteY16" fmla="*/ 782244 h 2216048"/>
+                <a:gd name="connsiteX17" fmla="*/ 942392 w 1582803"/>
+                <a:gd name="connsiteY17" fmla="*/ 1122144 h 2216048"/>
+                <a:gd name="connsiteX18" fmla="*/ 787564 w 1582803"/>
+                <a:gd name="connsiteY18" fmla="*/ 1483010 h 2216048"/>
+                <a:gd name="connsiteX19" fmla="*/ 714659 w 1582803"/>
+                <a:gd name="connsiteY19" fmla="*/ 1968863 h 2216048"/>
+                <a:gd name="connsiteX20" fmla="*/ 704525 w 1582803"/>
+                <a:gd name="connsiteY20" fmla="*/ 2127224 h 2216048"/>
+                <a:gd name="connsiteX21" fmla="*/ 609814 w 1582803"/>
+                <a:gd name="connsiteY21" fmla="*/ 1693889 h 2216048"/>
+                <a:gd name="connsiteX22" fmla="*/ 570956 w 1582803"/>
+                <a:gd name="connsiteY22" fmla="*/ 1361993 h 2216048"/>
+                <a:gd name="connsiteX23" fmla="*/ 648283 w 1582803"/>
+                <a:gd name="connsiteY23" fmla="*/ 1528349 h 2216048"/>
+                <a:gd name="connsiteX24" fmla="*/ 644059 w 1582803"/>
+                <a:gd name="connsiteY24" fmla="*/ 1313318 h 2216048"/>
+                <a:gd name="connsiteX25" fmla="*/ 722701 w 1582803"/>
+                <a:gd name="connsiteY25" fmla="*/ 1147650 h 2216048"/>
+                <a:gd name="connsiteX26" fmla="*/ 770426 w 1582803"/>
+                <a:gd name="connsiteY26" fmla="*/ 919458 h 2216048"/>
+                <a:gd name="connsiteX27" fmla="*/ 801597 w 1582803"/>
+                <a:gd name="connsiteY27" fmla="*/ 1062329 h 2216048"/>
+                <a:gd name="connsiteX28" fmla="*/ 835154 w 1582803"/>
+                <a:gd name="connsiteY28" fmla="*/ 837726 h 2216048"/>
+                <a:gd name="connsiteX29" fmla="*/ 983437 w 1582803"/>
+                <a:gd name="connsiteY29" fmla="*/ 649389 h 2216048"/>
+                <a:gd name="connsiteX30" fmla="*/ 1155522 w 1582803"/>
+                <a:gd name="connsiteY30" fmla="*/ 515329 h 2216048"/>
+                <a:gd name="connsiteX31" fmla="*/ 1391329 w 1582803"/>
+                <a:gd name="connsiteY31" fmla="*/ 355074 h 2216048"/>
+                <a:gd name="connsiteX32" fmla="*/ 306027 w 1582803"/>
+                <a:gd name="connsiteY32" fmla="*/ 829562 h 2216048"/>
+                <a:gd name="connsiteX33" fmla="*/ 432427 w 1582803"/>
+                <a:gd name="connsiteY33" fmla="*/ 2144702 h 2216048"/>
+                <a:gd name="connsiteX34" fmla="*/ 500790 w 1582803"/>
+                <a:gd name="connsiteY34" fmla="*/ 2199065 h 2216048"/>
+                <a:gd name="connsiteX35" fmla="*/ 498194 w 1582803"/>
+                <a:gd name="connsiteY35" fmla="*/ 2202840 h 2216048"/>
+                <a:gd name="connsiteX36" fmla="*/ 125476 w 1582803"/>
+                <a:gd name="connsiteY36" fmla="*/ 737314 h 2216048"/>
+                <a:gd name="connsiteX37" fmla="*/ 819110 w 1582803"/>
+                <a:gd name="connsiteY37" fmla="*/ 160678 h 2216048"/>
+                <a:gd name="connsiteX0" fmla="*/ 501071 w 1582803"/>
+                <a:gd name="connsiteY0" fmla="*/ 2199288 h 2216048"/>
+                <a:gd name="connsiteX1" fmla="*/ 501416 w 1582803"/>
+                <a:gd name="connsiteY1" fmla="*/ 2199563 h 2216048"/>
+                <a:gd name="connsiteX2" fmla="*/ 499805 w 1582803"/>
+                <a:gd name="connsiteY2" fmla="*/ 2201202 h 2216048"/>
+                <a:gd name="connsiteX3" fmla="*/ 501071 w 1582803"/>
+                <a:gd name="connsiteY3" fmla="*/ 2199288 h 2216048"/>
+                <a:gd name="connsiteX4" fmla="*/ 509436 w 1582803"/>
+                <a:gd name="connsiteY4" fmla="*/ 2186644 h 2216048"/>
+                <a:gd name="connsiteX5" fmla="*/ 501071 w 1582803"/>
+                <a:gd name="connsiteY5" fmla="*/ 2199288 h 2216048"/>
+                <a:gd name="connsiteX6" fmla="*/ 500790 w 1582803"/>
+                <a:gd name="connsiteY6" fmla="*/ 2199065 h 2216048"/>
+                <a:gd name="connsiteX7" fmla="*/ 507729 w 1582803"/>
+                <a:gd name="connsiteY7" fmla="*/ 2188975 h 2216048"/>
+                <a:gd name="connsiteX8" fmla="*/ 509436 w 1582803"/>
+                <a:gd name="connsiteY8" fmla="*/ 2186644 h 2216048"/>
+                <a:gd name="connsiteX9" fmla="*/ 819110 w 1582803"/>
+                <a:gd name="connsiteY9" fmla="*/ 160678 h 2216048"/>
+                <a:gd name="connsiteX10" fmla="*/ 1429197 w 1582803"/>
+                <a:gd name="connsiteY10" fmla="*/ 149133 h 2216048"/>
+                <a:gd name="connsiteX11" fmla="*/ 1526472 w 1582803"/>
+                <a:gd name="connsiteY11" fmla="*/ 179022 h 2216048"/>
+                <a:gd name="connsiteX12" fmla="*/ 1534350 w 1582803"/>
+                <a:gd name="connsiteY12" fmla="*/ 160689 h 2216048"/>
+                <a:gd name="connsiteX13" fmla="*/ 1582803 w 1582803"/>
+                <a:gd name="connsiteY13" fmla="*/ 0 h 2216048"/>
+                <a:gd name="connsiteX14" fmla="*/ 1553906 w 1582803"/>
+                <a:gd name="connsiteY14" fmla="*/ 203321 h 2216048"/>
+                <a:gd name="connsiteX15" fmla="*/ 1431819 w 1582803"/>
+                <a:gd name="connsiteY15" fmla="*/ 455379 h 2216048"/>
+                <a:gd name="connsiteX16" fmla="*/ 1192992 w 1582803"/>
+                <a:gd name="connsiteY16" fmla="*/ 782244 h 2216048"/>
+                <a:gd name="connsiteX17" fmla="*/ 942392 w 1582803"/>
+                <a:gd name="connsiteY17" fmla="*/ 1122144 h 2216048"/>
+                <a:gd name="connsiteX18" fmla="*/ 787564 w 1582803"/>
+                <a:gd name="connsiteY18" fmla="*/ 1483010 h 2216048"/>
+                <a:gd name="connsiteX19" fmla="*/ 714659 w 1582803"/>
+                <a:gd name="connsiteY19" fmla="*/ 1968863 h 2216048"/>
+                <a:gd name="connsiteX20" fmla="*/ 704525 w 1582803"/>
+                <a:gd name="connsiteY20" fmla="*/ 2127224 h 2216048"/>
+                <a:gd name="connsiteX21" fmla="*/ 609814 w 1582803"/>
+                <a:gd name="connsiteY21" fmla="*/ 1693889 h 2216048"/>
+                <a:gd name="connsiteX22" fmla="*/ 570956 w 1582803"/>
+                <a:gd name="connsiteY22" fmla="*/ 1361993 h 2216048"/>
+                <a:gd name="connsiteX23" fmla="*/ 648283 w 1582803"/>
+                <a:gd name="connsiteY23" fmla="*/ 1528349 h 2216048"/>
+                <a:gd name="connsiteX24" fmla="*/ 644059 w 1582803"/>
+                <a:gd name="connsiteY24" fmla="*/ 1313318 h 2216048"/>
+                <a:gd name="connsiteX25" fmla="*/ 722701 w 1582803"/>
+                <a:gd name="connsiteY25" fmla="*/ 1147650 h 2216048"/>
+                <a:gd name="connsiteX26" fmla="*/ 770426 w 1582803"/>
+                <a:gd name="connsiteY26" fmla="*/ 919458 h 2216048"/>
+                <a:gd name="connsiteX27" fmla="*/ 801597 w 1582803"/>
+                <a:gd name="connsiteY27" fmla="*/ 1062329 h 2216048"/>
+                <a:gd name="connsiteX28" fmla="*/ 835154 w 1582803"/>
+                <a:gd name="connsiteY28" fmla="*/ 837726 h 2216048"/>
+                <a:gd name="connsiteX29" fmla="*/ 983437 w 1582803"/>
+                <a:gd name="connsiteY29" fmla="*/ 649389 h 2216048"/>
+                <a:gd name="connsiteX30" fmla="*/ 1155522 w 1582803"/>
+                <a:gd name="connsiteY30" fmla="*/ 515329 h 2216048"/>
+                <a:gd name="connsiteX31" fmla="*/ 306027 w 1582803"/>
+                <a:gd name="connsiteY31" fmla="*/ 829562 h 2216048"/>
+                <a:gd name="connsiteX32" fmla="*/ 432427 w 1582803"/>
+                <a:gd name="connsiteY32" fmla="*/ 2144702 h 2216048"/>
+                <a:gd name="connsiteX33" fmla="*/ 500790 w 1582803"/>
+                <a:gd name="connsiteY33" fmla="*/ 2199065 h 2216048"/>
+                <a:gd name="connsiteX34" fmla="*/ 498194 w 1582803"/>
+                <a:gd name="connsiteY34" fmla="*/ 2202840 h 2216048"/>
+                <a:gd name="connsiteX35" fmla="*/ 125476 w 1582803"/>
+                <a:gd name="connsiteY35" fmla="*/ 737314 h 2216048"/>
+                <a:gd name="connsiteX36" fmla="*/ 819110 w 1582803"/>
+                <a:gd name="connsiteY36" fmla="*/ 160678 h 2216048"/>
+                <a:gd name="connsiteX0" fmla="*/ 501071 w 1582803"/>
+                <a:gd name="connsiteY0" fmla="*/ 2199288 h 2216048"/>
+                <a:gd name="connsiteX1" fmla="*/ 501416 w 1582803"/>
+                <a:gd name="connsiteY1" fmla="*/ 2199563 h 2216048"/>
+                <a:gd name="connsiteX2" fmla="*/ 499805 w 1582803"/>
+                <a:gd name="connsiteY2" fmla="*/ 2201202 h 2216048"/>
+                <a:gd name="connsiteX3" fmla="*/ 501071 w 1582803"/>
+                <a:gd name="connsiteY3" fmla="*/ 2199288 h 2216048"/>
+                <a:gd name="connsiteX4" fmla="*/ 509436 w 1582803"/>
+                <a:gd name="connsiteY4" fmla="*/ 2186644 h 2216048"/>
+                <a:gd name="connsiteX5" fmla="*/ 501071 w 1582803"/>
+                <a:gd name="connsiteY5" fmla="*/ 2199288 h 2216048"/>
+                <a:gd name="connsiteX6" fmla="*/ 500790 w 1582803"/>
+                <a:gd name="connsiteY6" fmla="*/ 2199065 h 2216048"/>
+                <a:gd name="connsiteX7" fmla="*/ 507729 w 1582803"/>
+                <a:gd name="connsiteY7" fmla="*/ 2188975 h 2216048"/>
+                <a:gd name="connsiteX8" fmla="*/ 509436 w 1582803"/>
+                <a:gd name="connsiteY8" fmla="*/ 2186644 h 2216048"/>
+                <a:gd name="connsiteX9" fmla="*/ 819110 w 1582803"/>
+                <a:gd name="connsiteY9" fmla="*/ 160678 h 2216048"/>
+                <a:gd name="connsiteX10" fmla="*/ 1429197 w 1582803"/>
+                <a:gd name="connsiteY10" fmla="*/ 149133 h 2216048"/>
+                <a:gd name="connsiteX11" fmla="*/ 1526472 w 1582803"/>
+                <a:gd name="connsiteY11" fmla="*/ 179022 h 2216048"/>
+                <a:gd name="connsiteX12" fmla="*/ 1534350 w 1582803"/>
+                <a:gd name="connsiteY12" fmla="*/ 160689 h 2216048"/>
+                <a:gd name="connsiteX13" fmla="*/ 1582803 w 1582803"/>
+                <a:gd name="connsiteY13" fmla="*/ 0 h 2216048"/>
+                <a:gd name="connsiteX14" fmla="*/ 1553906 w 1582803"/>
+                <a:gd name="connsiteY14" fmla="*/ 203321 h 2216048"/>
+                <a:gd name="connsiteX15" fmla="*/ 1431819 w 1582803"/>
+                <a:gd name="connsiteY15" fmla="*/ 455379 h 2216048"/>
+                <a:gd name="connsiteX16" fmla="*/ 1192992 w 1582803"/>
+                <a:gd name="connsiteY16" fmla="*/ 782244 h 2216048"/>
+                <a:gd name="connsiteX17" fmla="*/ 942392 w 1582803"/>
+                <a:gd name="connsiteY17" fmla="*/ 1122144 h 2216048"/>
+                <a:gd name="connsiteX18" fmla="*/ 787564 w 1582803"/>
+                <a:gd name="connsiteY18" fmla="*/ 1483010 h 2216048"/>
+                <a:gd name="connsiteX19" fmla="*/ 714659 w 1582803"/>
+                <a:gd name="connsiteY19" fmla="*/ 1968863 h 2216048"/>
+                <a:gd name="connsiteX20" fmla="*/ 704525 w 1582803"/>
+                <a:gd name="connsiteY20" fmla="*/ 2127224 h 2216048"/>
+                <a:gd name="connsiteX21" fmla="*/ 609814 w 1582803"/>
+                <a:gd name="connsiteY21" fmla="*/ 1693889 h 2216048"/>
+                <a:gd name="connsiteX22" fmla="*/ 570956 w 1582803"/>
+                <a:gd name="connsiteY22" fmla="*/ 1361993 h 2216048"/>
+                <a:gd name="connsiteX23" fmla="*/ 648283 w 1582803"/>
+                <a:gd name="connsiteY23" fmla="*/ 1528349 h 2216048"/>
+                <a:gd name="connsiteX24" fmla="*/ 644059 w 1582803"/>
+                <a:gd name="connsiteY24" fmla="*/ 1313318 h 2216048"/>
+                <a:gd name="connsiteX25" fmla="*/ 722701 w 1582803"/>
+                <a:gd name="connsiteY25" fmla="*/ 1147650 h 2216048"/>
+                <a:gd name="connsiteX26" fmla="*/ 770426 w 1582803"/>
+                <a:gd name="connsiteY26" fmla="*/ 919458 h 2216048"/>
+                <a:gd name="connsiteX27" fmla="*/ 801597 w 1582803"/>
+                <a:gd name="connsiteY27" fmla="*/ 1062329 h 2216048"/>
+                <a:gd name="connsiteX28" fmla="*/ 835154 w 1582803"/>
+                <a:gd name="connsiteY28" fmla="*/ 837726 h 2216048"/>
+                <a:gd name="connsiteX29" fmla="*/ 983437 w 1582803"/>
+                <a:gd name="connsiteY29" fmla="*/ 649389 h 2216048"/>
+                <a:gd name="connsiteX30" fmla="*/ 306027 w 1582803"/>
+                <a:gd name="connsiteY30" fmla="*/ 829562 h 2216048"/>
+                <a:gd name="connsiteX31" fmla="*/ 432427 w 1582803"/>
+                <a:gd name="connsiteY31" fmla="*/ 2144702 h 2216048"/>
+                <a:gd name="connsiteX32" fmla="*/ 500790 w 1582803"/>
+                <a:gd name="connsiteY32" fmla="*/ 2199065 h 2216048"/>
+                <a:gd name="connsiteX33" fmla="*/ 498194 w 1582803"/>
+                <a:gd name="connsiteY33" fmla="*/ 2202840 h 2216048"/>
+                <a:gd name="connsiteX34" fmla="*/ 125476 w 1582803"/>
+                <a:gd name="connsiteY34" fmla="*/ 737314 h 2216048"/>
+                <a:gd name="connsiteX35" fmla="*/ 819110 w 1582803"/>
+                <a:gd name="connsiteY35" fmla="*/ 160678 h 2216048"/>
+                <a:gd name="connsiteX0" fmla="*/ 501071 w 1582803"/>
+                <a:gd name="connsiteY0" fmla="*/ 2199288 h 2216048"/>
+                <a:gd name="connsiteX1" fmla="*/ 501416 w 1582803"/>
+                <a:gd name="connsiteY1" fmla="*/ 2199563 h 2216048"/>
+                <a:gd name="connsiteX2" fmla="*/ 499805 w 1582803"/>
+                <a:gd name="connsiteY2" fmla="*/ 2201202 h 2216048"/>
+                <a:gd name="connsiteX3" fmla="*/ 501071 w 1582803"/>
+                <a:gd name="connsiteY3" fmla="*/ 2199288 h 2216048"/>
+                <a:gd name="connsiteX4" fmla="*/ 509436 w 1582803"/>
+                <a:gd name="connsiteY4" fmla="*/ 2186644 h 2216048"/>
+                <a:gd name="connsiteX5" fmla="*/ 501071 w 1582803"/>
+                <a:gd name="connsiteY5" fmla="*/ 2199288 h 2216048"/>
+                <a:gd name="connsiteX6" fmla="*/ 500790 w 1582803"/>
+                <a:gd name="connsiteY6" fmla="*/ 2199065 h 2216048"/>
+                <a:gd name="connsiteX7" fmla="*/ 507729 w 1582803"/>
+                <a:gd name="connsiteY7" fmla="*/ 2188975 h 2216048"/>
+                <a:gd name="connsiteX8" fmla="*/ 509436 w 1582803"/>
+                <a:gd name="connsiteY8" fmla="*/ 2186644 h 2216048"/>
+                <a:gd name="connsiteX9" fmla="*/ 819110 w 1582803"/>
+                <a:gd name="connsiteY9" fmla="*/ 160678 h 2216048"/>
+                <a:gd name="connsiteX10" fmla="*/ 1429197 w 1582803"/>
+                <a:gd name="connsiteY10" fmla="*/ 149133 h 2216048"/>
+                <a:gd name="connsiteX11" fmla="*/ 1526472 w 1582803"/>
+                <a:gd name="connsiteY11" fmla="*/ 179022 h 2216048"/>
+                <a:gd name="connsiteX12" fmla="*/ 1534350 w 1582803"/>
+                <a:gd name="connsiteY12" fmla="*/ 160689 h 2216048"/>
+                <a:gd name="connsiteX13" fmla="*/ 1582803 w 1582803"/>
+                <a:gd name="connsiteY13" fmla="*/ 0 h 2216048"/>
+                <a:gd name="connsiteX14" fmla="*/ 1553906 w 1582803"/>
+                <a:gd name="connsiteY14" fmla="*/ 203321 h 2216048"/>
+                <a:gd name="connsiteX15" fmla="*/ 1431819 w 1582803"/>
+                <a:gd name="connsiteY15" fmla="*/ 455379 h 2216048"/>
+                <a:gd name="connsiteX16" fmla="*/ 1192992 w 1582803"/>
+                <a:gd name="connsiteY16" fmla="*/ 782244 h 2216048"/>
+                <a:gd name="connsiteX17" fmla="*/ 942392 w 1582803"/>
+                <a:gd name="connsiteY17" fmla="*/ 1122144 h 2216048"/>
+                <a:gd name="connsiteX18" fmla="*/ 787564 w 1582803"/>
+                <a:gd name="connsiteY18" fmla="*/ 1483010 h 2216048"/>
+                <a:gd name="connsiteX19" fmla="*/ 714659 w 1582803"/>
+                <a:gd name="connsiteY19" fmla="*/ 1968863 h 2216048"/>
+                <a:gd name="connsiteX20" fmla="*/ 704525 w 1582803"/>
+                <a:gd name="connsiteY20" fmla="*/ 2127224 h 2216048"/>
+                <a:gd name="connsiteX21" fmla="*/ 609814 w 1582803"/>
+                <a:gd name="connsiteY21" fmla="*/ 1693889 h 2216048"/>
+                <a:gd name="connsiteX22" fmla="*/ 570956 w 1582803"/>
+                <a:gd name="connsiteY22" fmla="*/ 1361993 h 2216048"/>
+                <a:gd name="connsiteX23" fmla="*/ 648283 w 1582803"/>
+                <a:gd name="connsiteY23" fmla="*/ 1528349 h 2216048"/>
+                <a:gd name="connsiteX24" fmla="*/ 644059 w 1582803"/>
+                <a:gd name="connsiteY24" fmla="*/ 1313318 h 2216048"/>
+                <a:gd name="connsiteX25" fmla="*/ 722701 w 1582803"/>
+                <a:gd name="connsiteY25" fmla="*/ 1147650 h 2216048"/>
+                <a:gd name="connsiteX26" fmla="*/ 770426 w 1582803"/>
+                <a:gd name="connsiteY26" fmla="*/ 919458 h 2216048"/>
+                <a:gd name="connsiteX27" fmla="*/ 801597 w 1582803"/>
+                <a:gd name="connsiteY27" fmla="*/ 1062329 h 2216048"/>
+                <a:gd name="connsiteX28" fmla="*/ 835154 w 1582803"/>
+                <a:gd name="connsiteY28" fmla="*/ 837726 h 2216048"/>
+                <a:gd name="connsiteX29" fmla="*/ 306027 w 1582803"/>
+                <a:gd name="connsiteY29" fmla="*/ 829562 h 2216048"/>
+                <a:gd name="connsiteX30" fmla="*/ 432427 w 1582803"/>
+                <a:gd name="connsiteY30" fmla="*/ 2144702 h 2216048"/>
+                <a:gd name="connsiteX31" fmla="*/ 500790 w 1582803"/>
+                <a:gd name="connsiteY31" fmla="*/ 2199065 h 2216048"/>
+                <a:gd name="connsiteX32" fmla="*/ 498194 w 1582803"/>
+                <a:gd name="connsiteY32" fmla="*/ 2202840 h 2216048"/>
+                <a:gd name="connsiteX33" fmla="*/ 125476 w 1582803"/>
+                <a:gd name="connsiteY33" fmla="*/ 737314 h 2216048"/>
+                <a:gd name="connsiteX34" fmla="*/ 819110 w 1582803"/>
+                <a:gd name="connsiteY34" fmla="*/ 160678 h 2216048"/>
+                <a:gd name="connsiteX0" fmla="*/ 501071 w 1582803"/>
+                <a:gd name="connsiteY0" fmla="*/ 2199288 h 2216048"/>
+                <a:gd name="connsiteX1" fmla="*/ 501416 w 1582803"/>
+                <a:gd name="connsiteY1" fmla="*/ 2199563 h 2216048"/>
+                <a:gd name="connsiteX2" fmla="*/ 499805 w 1582803"/>
+                <a:gd name="connsiteY2" fmla="*/ 2201202 h 2216048"/>
+                <a:gd name="connsiteX3" fmla="*/ 501071 w 1582803"/>
+                <a:gd name="connsiteY3" fmla="*/ 2199288 h 2216048"/>
+                <a:gd name="connsiteX4" fmla="*/ 509436 w 1582803"/>
+                <a:gd name="connsiteY4" fmla="*/ 2186644 h 2216048"/>
+                <a:gd name="connsiteX5" fmla="*/ 501071 w 1582803"/>
+                <a:gd name="connsiteY5" fmla="*/ 2199288 h 2216048"/>
+                <a:gd name="connsiteX6" fmla="*/ 500790 w 1582803"/>
+                <a:gd name="connsiteY6" fmla="*/ 2199065 h 2216048"/>
+                <a:gd name="connsiteX7" fmla="*/ 507729 w 1582803"/>
+                <a:gd name="connsiteY7" fmla="*/ 2188975 h 2216048"/>
+                <a:gd name="connsiteX8" fmla="*/ 509436 w 1582803"/>
+                <a:gd name="connsiteY8" fmla="*/ 2186644 h 2216048"/>
+                <a:gd name="connsiteX9" fmla="*/ 819110 w 1582803"/>
+                <a:gd name="connsiteY9" fmla="*/ 160678 h 2216048"/>
+                <a:gd name="connsiteX10" fmla="*/ 1429197 w 1582803"/>
+                <a:gd name="connsiteY10" fmla="*/ 149133 h 2216048"/>
+                <a:gd name="connsiteX11" fmla="*/ 1526472 w 1582803"/>
+                <a:gd name="connsiteY11" fmla="*/ 179022 h 2216048"/>
+                <a:gd name="connsiteX12" fmla="*/ 1534350 w 1582803"/>
+                <a:gd name="connsiteY12" fmla="*/ 160689 h 2216048"/>
+                <a:gd name="connsiteX13" fmla="*/ 1582803 w 1582803"/>
+                <a:gd name="connsiteY13" fmla="*/ 0 h 2216048"/>
+                <a:gd name="connsiteX14" fmla="*/ 1553906 w 1582803"/>
+                <a:gd name="connsiteY14" fmla="*/ 203321 h 2216048"/>
+                <a:gd name="connsiteX15" fmla="*/ 1431819 w 1582803"/>
+                <a:gd name="connsiteY15" fmla="*/ 455379 h 2216048"/>
+                <a:gd name="connsiteX16" fmla="*/ 1192992 w 1582803"/>
+                <a:gd name="connsiteY16" fmla="*/ 782244 h 2216048"/>
+                <a:gd name="connsiteX17" fmla="*/ 942392 w 1582803"/>
+                <a:gd name="connsiteY17" fmla="*/ 1122144 h 2216048"/>
+                <a:gd name="connsiteX18" fmla="*/ 787564 w 1582803"/>
+                <a:gd name="connsiteY18" fmla="*/ 1483010 h 2216048"/>
+                <a:gd name="connsiteX19" fmla="*/ 714659 w 1582803"/>
+                <a:gd name="connsiteY19" fmla="*/ 1968863 h 2216048"/>
+                <a:gd name="connsiteX20" fmla="*/ 704525 w 1582803"/>
+                <a:gd name="connsiteY20" fmla="*/ 2127224 h 2216048"/>
+                <a:gd name="connsiteX21" fmla="*/ 609814 w 1582803"/>
+                <a:gd name="connsiteY21" fmla="*/ 1693889 h 2216048"/>
+                <a:gd name="connsiteX22" fmla="*/ 570956 w 1582803"/>
+                <a:gd name="connsiteY22" fmla="*/ 1361993 h 2216048"/>
+                <a:gd name="connsiteX23" fmla="*/ 648283 w 1582803"/>
+                <a:gd name="connsiteY23" fmla="*/ 1528349 h 2216048"/>
+                <a:gd name="connsiteX24" fmla="*/ 644059 w 1582803"/>
+                <a:gd name="connsiteY24" fmla="*/ 1313318 h 2216048"/>
+                <a:gd name="connsiteX25" fmla="*/ 722701 w 1582803"/>
+                <a:gd name="connsiteY25" fmla="*/ 1147650 h 2216048"/>
+                <a:gd name="connsiteX26" fmla="*/ 770426 w 1582803"/>
+                <a:gd name="connsiteY26" fmla="*/ 919458 h 2216048"/>
+                <a:gd name="connsiteX27" fmla="*/ 801597 w 1582803"/>
+                <a:gd name="connsiteY27" fmla="*/ 1062329 h 2216048"/>
+                <a:gd name="connsiteX28" fmla="*/ 306027 w 1582803"/>
+                <a:gd name="connsiteY28" fmla="*/ 829562 h 2216048"/>
+                <a:gd name="connsiteX29" fmla="*/ 432427 w 1582803"/>
+                <a:gd name="connsiteY29" fmla="*/ 2144702 h 2216048"/>
+                <a:gd name="connsiteX30" fmla="*/ 500790 w 1582803"/>
+                <a:gd name="connsiteY30" fmla="*/ 2199065 h 2216048"/>
+                <a:gd name="connsiteX31" fmla="*/ 498194 w 1582803"/>
+                <a:gd name="connsiteY31" fmla="*/ 2202840 h 2216048"/>
+                <a:gd name="connsiteX32" fmla="*/ 125476 w 1582803"/>
+                <a:gd name="connsiteY32" fmla="*/ 737314 h 2216048"/>
+                <a:gd name="connsiteX33" fmla="*/ 819110 w 1582803"/>
+                <a:gd name="connsiteY33" fmla="*/ 160678 h 2216048"/>
+                <a:gd name="connsiteX0" fmla="*/ 501071 w 1582803"/>
+                <a:gd name="connsiteY0" fmla="*/ 2199288 h 2216048"/>
+                <a:gd name="connsiteX1" fmla="*/ 501416 w 1582803"/>
+                <a:gd name="connsiteY1" fmla="*/ 2199563 h 2216048"/>
+                <a:gd name="connsiteX2" fmla="*/ 499805 w 1582803"/>
+                <a:gd name="connsiteY2" fmla="*/ 2201202 h 2216048"/>
+                <a:gd name="connsiteX3" fmla="*/ 501071 w 1582803"/>
+                <a:gd name="connsiteY3" fmla="*/ 2199288 h 2216048"/>
+                <a:gd name="connsiteX4" fmla="*/ 509436 w 1582803"/>
+                <a:gd name="connsiteY4" fmla="*/ 2186644 h 2216048"/>
+                <a:gd name="connsiteX5" fmla="*/ 501071 w 1582803"/>
+                <a:gd name="connsiteY5" fmla="*/ 2199288 h 2216048"/>
+                <a:gd name="connsiteX6" fmla="*/ 500790 w 1582803"/>
+                <a:gd name="connsiteY6" fmla="*/ 2199065 h 2216048"/>
+                <a:gd name="connsiteX7" fmla="*/ 507729 w 1582803"/>
+                <a:gd name="connsiteY7" fmla="*/ 2188975 h 2216048"/>
+                <a:gd name="connsiteX8" fmla="*/ 509436 w 1582803"/>
+                <a:gd name="connsiteY8" fmla="*/ 2186644 h 2216048"/>
+                <a:gd name="connsiteX9" fmla="*/ 819110 w 1582803"/>
+                <a:gd name="connsiteY9" fmla="*/ 160678 h 2216048"/>
+                <a:gd name="connsiteX10" fmla="*/ 1429197 w 1582803"/>
+                <a:gd name="connsiteY10" fmla="*/ 149133 h 2216048"/>
+                <a:gd name="connsiteX11" fmla="*/ 1526472 w 1582803"/>
+                <a:gd name="connsiteY11" fmla="*/ 179022 h 2216048"/>
+                <a:gd name="connsiteX12" fmla="*/ 1534350 w 1582803"/>
+                <a:gd name="connsiteY12" fmla="*/ 160689 h 2216048"/>
+                <a:gd name="connsiteX13" fmla="*/ 1582803 w 1582803"/>
+                <a:gd name="connsiteY13" fmla="*/ 0 h 2216048"/>
+                <a:gd name="connsiteX14" fmla="*/ 1553906 w 1582803"/>
+                <a:gd name="connsiteY14" fmla="*/ 203321 h 2216048"/>
+                <a:gd name="connsiteX15" fmla="*/ 1431819 w 1582803"/>
+                <a:gd name="connsiteY15" fmla="*/ 455379 h 2216048"/>
+                <a:gd name="connsiteX16" fmla="*/ 1192992 w 1582803"/>
+                <a:gd name="connsiteY16" fmla="*/ 782244 h 2216048"/>
+                <a:gd name="connsiteX17" fmla="*/ 942392 w 1582803"/>
+                <a:gd name="connsiteY17" fmla="*/ 1122144 h 2216048"/>
+                <a:gd name="connsiteX18" fmla="*/ 787564 w 1582803"/>
+                <a:gd name="connsiteY18" fmla="*/ 1483010 h 2216048"/>
+                <a:gd name="connsiteX19" fmla="*/ 714659 w 1582803"/>
+                <a:gd name="connsiteY19" fmla="*/ 1968863 h 2216048"/>
+                <a:gd name="connsiteX20" fmla="*/ 704525 w 1582803"/>
+                <a:gd name="connsiteY20" fmla="*/ 2127224 h 2216048"/>
+                <a:gd name="connsiteX21" fmla="*/ 609814 w 1582803"/>
+                <a:gd name="connsiteY21" fmla="*/ 1693889 h 2216048"/>
+                <a:gd name="connsiteX22" fmla="*/ 570956 w 1582803"/>
+                <a:gd name="connsiteY22" fmla="*/ 1361993 h 2216048"/>
+                <a:gd name="connsiteX23" fmla="*/ 648283 w 1582803"/>
+                <a:gd name="connsiteY23" fmla="*/ 1528349 h 2216048"/>
+                <a:gd name="connsiteX24" fmla="*/ 644059 w 1582803"/>
+                <a:gd name="connsiteY24" fmla="*/ 1313318 h 2216048"/>
+                <a:gd name="connsiteX25" fmla="*/ 722701 w 1582803"/>
+                <a:gd name="connsiteY25" fmla="*/ 1147650 h 2216048"/>
+                <a:gd name="connsiteX26" fmla="*/ 801597 w 1582803"/>
+                <a:gd name="connsiteY26" fmla="*/ 1062329 h 2216048"/>
+                <a:gd name="connsiteX27" fmla="*/ 306027 w 1582803"/>
+                <a:gd name="connsiteY27" fmla="*/ 829562 h 2216048"/>
+                <a:gd name="connsiteX28" fmla="*/ 432427 w 1582803"/>
+                <a:gd name="connsiteY28" fmla="*/ 2144702 h 2216048"/>
+                <a:gd name="connsiteX29" fmla="*/ 500790 w 1582803"/>
+                <a:gd name="connsiteY29" fmla="*/ 2199065 h 2216048"/>
+                <a:gd name="connsiteX30" fmla="*/ 498194 w 1582803"/>
+                <a:gd name="connsiteY30" fmla="*/ 2202840 h 2216048"/>
+                <a:gd name="connsiteX31" fmla="*/ 125476 w 1582803"/>
+                <a:gd name="connsiteY31" fmla="*/ 737314 h 2216048"/>
+                <a:gd name="connsiteX32" fmla="*/ 819110 w 1582803"/>
+                <a:gd name="connsiteY32" fmla="*/ 160678 h 2216048"/>
+                <a:gd name="connsiteX0" fmla="*/ 501071 w 1582803"/>
+                <a:gd name="connsiteY0" fmla="*/ 2199288 h 2216048"/>
+                <a:gd name="connsiteX1" fmla="*/ 501416 w 1582803"/>
+                <a:gd name="connsiteY1" fmla="*/ 2199563 h 2216048"/>
+                <a:gd name="connsiteX2" fmla="*/ 499805 w 1582803"/>
+                <a:gd name="connsiteY2" fmla="*/ 2201202 h 2216048"/>
+                <a:gd name="connsiteX3" fmla="*/ 501071 w 1582803"/>
+                <a:gd name="connsiteY3" fmla="*/ 2199288 h 2216048"/>
+                <a:gd name="connsiteX4" fmla="*/ 509436 w 1582803"/>
+                <a:gd name="connsiteY4" fmla="*/ 2186644 h 2216048"/>
+                <a:gd name="connsiteX5" fmla="*/ 501071 w 1582803"/>
+                <a:gd name="connsiteY5" fmla="*/ 2199288 h 2216048"/>
+                <a:gd name="connsiteX6" fmla="*/ 500790 w 1582803"/>
+                <a:gd name="connsiteY6" fmla="*/ 2199065 h 2216048"/>
+                <a:gd name="connsiteX7" fmla="*/ 507729 w 1582803"/>
+                <a:gd name="connsiteY7" fmla="*/ 2188975 h 2216048"/>
+                <a:gd name="connsiteX8" fmla="*/ 509436 w 1582803"/>
+                <a:gd name="connsiteY8" fmla="*/ 2186644 h 2216048"/>
+                <a:gd name="connsiteX9" fmla="*/ 819110 w 1582803"/>
+                <a:gd name="connsiteY9" fmla="*/ 160678 h 2216048"/>
+                <a:gd name="connsiteX10" fmla="*/ 1429197 w 1582803"/>
+                <a:gd name="connsiteY10" fmla="*/ 149133 h 2216048"/>
+                <a:gd name="connsiteX11" fmla="*/ 1526472 w 1582803"/>
+                <a:gd name="connsiteY11" fmla="*/ 179022 h 2216048"/>
+                <a:gd name="connsiteX12" fmla="*/ 1534350 w 1582803"/>
+                <a:gd name="connsiteY12" fmla="*/ 160689 h 2216048"/>
+                <a:gd name="connsiteX13" fmla="*/ 1582803 w 1582803"/>
+                <a:gd name="connsiteY13" fmla="*/ 0 h 2216048"/>
+                <a:gd name="connsiteX14" fmla="*/ 1553906 w 1582803"/>
+                <a:gd name="connsiteY14" fmla="*/ 203321 h 2216048"/>
+                <a:gd name="connsiteX15" fmla="*/ 1431819 w 1582803"/>
+                <a:gd name="connsiteY15" fmla="*/ 455379 h 2216048"/>
+                <a:gd name="connsiteX16" fmla="*/ 1192992 w 1582803"/>
+                <a:gd name="connsiteY16" fmla="*/ 782244 h 2216048"/>
+                <a:gd name="connsiteX17" fmla="*/ 942392 w 1582803"/>
+                <a:gd name="connsiteY17" fmla="*/ 1122144 h 2216048"/>
+                <a:gd name="connsiteX18" fmla="*/ 787564 w 1582803"/>
+                <a:gd name="connsiteY18" fmla="*/ 1483010 h 2216048"/>
+                <a:gd name="connsiteX19" fmla="*/ 714659 w 1582803"/>
+                <a:gd name="connsiteY19" fmla="*/ 1968863 h 2216048"/>
+                <a:gd name="connsiteX20" fmla="*/ 704525 w 1582803"/>
+                <a:gd name="connsiteY20" fmla="*/ 2127224 h 2216048"/>
+                <a:gd name="connsiteX21" fmla="*/ 609814 w 1582803"/>
+                <a:gd name="connsiteY21" fmla="*/ 1693889 h 2216048"/>
+                <a:gd name="connsiteX22" fmla="*/ 570956 w 1582803"/>
+                <a:gd name="connsiteY22" fmla="*/ 1361993 h 2216048"/>
+                <a:gd name="connsiteX23" fmla="*/ 648283 w 1582803"/>
+                <a:gd name="connsiteY23" fmla="*/ 1528349 h 2216048"/>
+                <a:gd name="connsiteX24" fmla="*/ 644059 w 1582803"/>
+                <a:gd name="connsiteY24" fmla="*/ 1313318 h 2216048"/>
+                <a:gd name="connsiteX25" fmla="*/ 722701 w 1582803"/>
+                <a:gd name="connsiteY25" fmla="*/ 1147650 h 2216048"/>
+                <a:gd name="connsiteX26" fmla="*/ 306027 w 1582803"/>
+                <a:gd name="connsiteY26" fmla="*/ 829562 h 2216048"/>
+                <a:gd name="connsiteX27" fmla="*/ 432427 w 1582803"/>
+                <a:gd name="connsiteY27" fmla="*/ 2144702 h 2216048"/>
+                <a:gd name="connsiteX28" fmla="*/ 500790 w 1582803"/>
+                <a:gd name="connsiteY28" fmla="*/ 2199065 h 2216048"/>
+                <a:gd name="connsiteX29" fmla="*/ 498194 w 1582803"/>
+                <a:gd name="connsiteY29" fmla="*/ 2202840 h 2216048"/>
+                <a:gd name="connsiteX30" fmla="*/ 125476 w 1582803"/>
+                <a:gd name="connsiteY30" fmla="*/ 737314 h 2216048"/>
+                <a:gd name="connsiteX31" fmla="*/ 819110 w 1582803"/>
+                <a:gd name="connsiteY31" fmla="*/ 160678 h 2216048"/>
+                <a:gd name="connsiteX0" fmla="*/ 501071 w 1582803"/>
+                <a:gd name="connsiteY0" fmla="*/ 2199288 h 2216048"/>
+                <a:gd name="connsiteX1" fmla="*/ 501416 w 1582803"/>
+                <a:gd name="connsiteY1" fmla="*/ 2199563 h 2216048"/>
+                <a:gd name="connsiteX2" fmla="*/ 499805 w 1582803"/>
+                <a:gd name="connsiteY2" fmla="*/ 2201202 h 2216048"/>
+                <a:gd name="connsiteX3" fmla="*/ 501071 w 1582803"/>
+                <a:gd name="connsiteY3" fmla="*/ 2199288 h 2216048"/>
+                <a:gd name="connsiteX4" fmla="*/ 509436 w 1582803"/>
+                <a:gd name="connsiteY4" fmla="*/ 2186644 h 2216048"/>
+                <a:gd name="connsiteX5" fmla="*/ 501071 w 1582803"/>
+                <a:gd name="connsiteY5" fmla="*/ 2199288 h 2216048"/>
+                <a:gd name="connsiteX6" fmla="*/ 500790 w 1582803"/>
+                <a:gd name="connsiteY6" fmla="*/ 2199065 h 2216048"/>
+                <a:gd name="connsiteX7" fmla="*/ 507729 w 1582803"/>
+                <a:gd name="connsiteY7" fmla="*/ 2188975 h 2216048"/>
+                <a:gd name="connsiteX8" fmla="*/ 509436 w 1582803"/>
+                <a:gd name="connsiteY8" fmla="*/ 2186644 h 2216048"/>
+                <a:gd name="connsiteX9" fmla="*/ 819110 w 1582803"/>
+                <a:gd name="connsiteY9" fmla="*/ 160678 h 2216048"/>
+                <a:gd name="connsiteX10" fmla="*/ 1429197 w 1582803"/>
+                <a:gd name="connsiteY10" fmla="*/ 149133 h 2216048"/>
+                <a:gd name="connsiteX11" fmla="*/ 1526472 w 1582803"/>
+                <a:gd name="connsiteY11" fmla="*/ 179022 h 2216048"/>
+                <a:gd name="connsiteX12" fmla="*/ 1534350 w 1582803"/>
+                <a:gd name="connsiteY12" fmla="*/ 160689 h 2216048"/>
+                <a:gd name="connsiteX13" fmla="*/ 1582803 w 1582803"/>
+                <a:gd name="connsiteY13" fmla="*/ 0 h 2216048"/>
+                <a:gd name="connsiteX14" fmla="*/ 1553906 w 1582803"/>
+                <a:gd name="connsiteY14" fmla="*/ 203321 h 2216048"/>
+                <a:gd name="connsiteX15" fmla="*/ 1431819 w 1582803"/>
+                <a:gd name="connsiteY15" fmla="*/ 455379 h 2216048"/>
+                <a:gd name="connsiteX16" fmla="*/ 1192992 w 1582803"/>
+                <a:gd name="connsiteY16" fmla="*/ 782244 h 2216048"/>
+                <a:gd name="connsiteX17" fmla="*/ 942392 w 1582803"/>
+                <a:gd name="connsiteY17" fmla="*/ 1122144 h 2216048"/>
+                <a:gd name="connsiteX18" fmla="*/ 787564 w 1582803"/>
+                <a:gd name="connsiteY18" fmla="*/ 1483010 h 2216048"/>
+                <a:gd name="connsiteX19" fmla="*/ 714659 w 1582803"/>
+                <a:gd name="connsiteY19" fmla="*/ 1968863 h 2216048"/>
+                <a:gd name="connsiteX20" fmla="*/ 704525 w 1582803"/>
+                <a:gd name="connsiteY20" fmla="*/ 2127224 h 2216048"/>
+                <a:gd name="connsiteX21" fmla="*/ 609814 w 1582803"/>
+                <a:gd name="connsiteY21" fmla="*/ 1693889 h 2216048"/>
+                <a:gd name="connsiteX22" fmla="*/ 570956 w 1582803"/>
+                <a:gd name="connsiteY22" fmla="*/ 1361993 h 2216048"/>
+                <a:gd name="connsiteX23" fmla="*/ 648283 w 1582803"/>
+                <a:gd name="connsiteY23" fmla="*/ 1528349 h 2216048"/>
+                <a:gd name="connsiteX24" fmla="*/ 644059 w 1582803"/>
+                <a:gd name="connsiteY24" fmla="*/ 1313318 h 2216048"/>
+                <a:gd name="connsiteX25" fmla="*/ 306027 w 1582803"/>
+                <a:gd name="connsiteY25" fmla="*/ 829562 h 2216048"/>
+                <a:gd name="connsiteX26" fmla="*/ 432427 w 1582803"/>
+                <a:gd name="connsiteY26" fmla="*/ 2144702 h 2216048"/>
+                <a:gd name="connsiteX27" fmla="*/ 500790 w 1582803"/>
+                <a:gd name="connsiteY27" fmla="*/ 2199065 h 2216048"/>
+                <a:gd name="connsiteX28" fmla="*/ 498194 w 1582803"/>
+                <a:gd name="connsiteY28" fmla="*/ 2202840 h 2216048"/>
+                <a:gd name="connsiteX29" fmla="*/ 125476 w 1582803"/>
+                <a:gd name="connsiteY29" fmla="*/ 737314 h 2216048"/>
+                <a:gd name="connsiteX30" fmla="*/ 819110 w 1582803"/>
+                <a:gd name="connsiteY30" fmla="*/ 160678 h 2216048"/>
+                <a:gd name="connsiteX0" fmla="*/ 501071 w 1582803"/>
+                <a:gd name="connsiteY0" fmla="*/ 2199288 h 2216048"/>
+                <a:gd name="connsiteX1" fmla="*/ 501416 w 1582803"/>
+                <a:gd name="connsiteY1" fmla="*/ 2199563 h 2216048"/>
+                <a:gd name="connsiteX2" fmla="*/ 499805 w 1582803"/>
+                <a:gd name="connsiteY2" fmla="*/ 2201202 h 2216048"/>
+                <a:gd name="connsiteX3" fmla="*/ 501071 w 1582803"/>
+                <a:gd name="connsiteY3" fmla="*/ 2199288 h 2216048"/>
+                <a:gd name="connsiteX4" fmla="*/ 509436 w 1582803"/>
+                <a:gd name="connsiteY4" fmla="*/ 2186644 h 2216048"/>
+                <a:gd name="connsiteX5" fmla="*/ 501071 w 1582803"/>
+                <a:gd name="connsiteY5" fmla="*/ 2199288 h 2216048"/>
+                <a:gd name="connsiteX6" fmla="*/ 500790 w 1582803"/>
+                <a:gd name="connsiteY6" fmla="*/ 2199065 h 2216048"/>
+                <a:gd name="connsiteX7" fmla="*/ 507729 w 1582803"/>
+                <a:gd name="connsiteY7" fmla="*/ 2188975 h 2216048"/>
+                <a:gd name="connsiteX8" fmla="*/ 509436 w 1582803"/>
+                <a:gd name="connsiteY8" fmla="*/ 2186644 h 2216048"/>
+                <a:gd name="connsiteX9" fmla="*/ 819110 w 1582803"/>
+                <a:gd name="connsiteY9" fmla="*/ 160678 h 2216048"/>
+                <a:gd name="connsiteX10" fmla="*/ 1429197 w 1582803"/>
+                <a:gd name="connsiteY10" fmla="*/ 149133 h 2216048"/>
+                <a:gd name="connsiteX11" fmla="*/ 1526472 w 1582803"/>
+                <a:gd name="connsiteY11" fmla="*/ 179022 h 2216048"/>
+                <a:gd name="connsiteX12" fmla="*/ 1534350 w 1582803"/>
+                <a:gd name="connsiteY12" fmla="*/ 160689 h 2216048"/>
+                <a:gd name="connsiteX13" fmla="*/ 1582803 w 1582803"/>
+                <a:gd name="connsiteY13" fmla="*/ 0 h 2216048"/>
+                <a:gd name="connsiteX14" fmla="*/ 1553906 w 1582803"/>
+                <a:gd name="connsiteY14" fmla="*/ 203321 h 2216048"/>
+                <a:gd name="connsiteX15" fmla="*/ 1431819 w 1582803"/>
+                <a:gd name="connsiteY15" fmla="*/ 455379 h 2216048"/>
+                <a:gd name="connsiteX16" fmla="*/ 1192992 w 1582803"/>
+                <a:gd name="connsiteY16" fmla="*/ 782244 h 2216048"/>
+                <a:gd name="connsiteX17" fmla="*/ 942392 w 1582803"/>
+                <a:gd name="connsiteY17" fmla="*/ 1122144 h 2216048"/>
+                <a:gd name="connsiteX18" fmla="*/ 787564 w 1582803"/>
+                <a:gd name="connsiteY18" fmla="*/ 1483010 h 2216048"/>
+                <a:gd name="connsiteX19" fmla="*/ 714659 w 1582803"/>
+                <a:gd name="connsiteY19" fmla="*/ 1968863 h 2216048"/>
+                <a:gd name="connsiteX20" fmla="*/ 704525 w 1582803"/>
+                <a:gd name="connsiteY20" fmla="*/ 2127224 h 2216048"/>
+                <a:gd name="connsiteX21" fmla="*/ 609814 w 1582803"/>
+                <a:gd name="connsiteY21" fmla="*/ 1693889 h 2216048"/>
+                <a:gd name="connsiteX22" fmla="*/ 570956 w 1582803"/>
+                <a:gd name="connsiteY22" fmla="*/ 1361993 h 2216048"/>
+                <a:gd name="connsiteX23" fmla="*/ 648283 w 1582803"/>
+                <a:gd name="connsiteY23" fmla="*/ 1528349 h 2216048"/>
+                <a:gd name="connsiteX24" fmla="*/ 306027 w 1582803"/>
+                <a:gd name="connsiteY24" fmla="*/ 829562 h 2216048"/>
+                <a:gd name="connsiteX25" fmla="*/ 432427 w 1582803"/>
+                <a:gd name="connsiteY25" fmla="*/ 2144702 h 2216048"/>
+                <a:gd name="connsiteX26" fmla="*/ 500790 w 1582803"/>
+                <a:gd name="connsiteY26" fmla="*/ 2199065 h 2216048"/>
+                <a:gd name="connsiteX27" fmla="*/ 498194 w 1582803"/>
+                <a:gd name="connsiteY27" fmla="*/ 2202840 h 2216048"/>
+                <a:gd name="connsiteX28" fmla="*/ 125476 w 1582803"/>
+                <a:gd name="connsiteY28" fmla="*/ 737314 h 2216048"/>
+                <a:gd name="connsiteX29" fmla="*/ 819110 w 1582803"/>
+                <a:gd name="connsiteY29" fmla="*/ 160678 h 2216048"/>
+                <a:gd name="connsiteX0" fmla="*/ 501071 w 1582803"/>
+                <a:gd name="connsiteY0" fmla="*/ 2199288 h 2216048"/>
+                <a:gd name="connsiteX1" fmla="*/ 501416 w 1582803"/>
+                <a:gd name="connsiteY1" fmla="*/ 2199563 h 2216048"/>
+                <a:gd name="connsiteX2" fmla="*/ 499805 w 1582803"/>
+                <a:gd name="connsiteY2" fmla="*/ 2201202 h 2216048"/>
+                <a:gd name="connsiteX3" fmla="*/ 501071 w 1582803"/>
+                <a:gd name="connsiteY3" fmla="*/ 2199288 h 2216048"/>
+                <a:gd name="connsiteX4" fmla="*/ 509436 w 1582803"/>
+                <a:gd name="connsiteY4" fmla="*/ 2186644 h 2216048"/>
+                <a:gd name="connsiteX5" fmla="*/ 501071 w 1582803"/>
+                <a:gd name="connsiteY5" fmla="*/ 2199288 h 2216048"/>
+                <a:gd name="connsiteX6" fmla="*/ 500790 w 1582803"/>
+                <a:gd name="connsiteY6" fmla="*/ 2199065 h 2216048"/>
+                <a:gd name="connsiteX7" fmla="*/ 507729 w 1582803"/>
+                <a:gd name="connsiteY7" fmla="*/ 2188975 h 2216048"/>
+                <a:gd name="connsiteX8" fmla="*/ 509436 w 1582803"/>
+                <a:gd name="connsiteY8" fmla="*/ 2186644 h 2216048"/>
+                <a:gd name="connsiteX9" fmla="*/ 819110 w 1582803"/>
+                <a:gd name="connsiteY9" fmla="*/ 160678 h 2216048"/>
+                <a:gd name="connsiteX10" fmla="*/ 1429197 w 1582803"/>
+                <a:gd name="connsiteY10" fmla="*/ 149133 h 2216048"/>
+                <a:gd name="connsiteX11" fmla="*/ 1526472 w 1582803"/>
+                <a:gd name="connsiteY11" fmla="*/ 179022 h 2216048"/>
+                <a:gd name="connsiteX12" fmla="*/ 1534350 w 1582803"/>
+                <a:gd name="connsiteY12" fmla="*/ 160689 h 2216048"/>
+                <a:gd name="connsiteX13" fmla="*/ 1582803 w 1582803"/>
+                <a:gd name="connsiteY13" fmla="*/ 0 h 2216048"/>
+                <a:gd name="connsiteX14" fmla="*/ 1553906 w 1582803"/>
+                <a:gd name="connsiteY14" fmla="*/ 203321 h 2216048"/>
+                <a:gd name="connsiteX15" fmla="*/ 1431819 w 1582803"/>
+                <a:gd name="connsiteY15" fmla="*/ 455379 h 2216048"/>
+                <a:gd name="connsiteX16" fmla="*/ 1192992 w 1582803"/>
+                <a:gd name="connsiteY16" fmla="*/ 782244 h 2216048"/>
+                <a:gd name="connsiteX17" fmla="*/ 942392 w 1582803"/>
+                <a:gd name="connsiteY17" fmla="*/ 1122144 h 2216048"/>
+                <a:gd name="connsiteX18" fmla="*/ 787564 w 1582803"/>
+                <a:gd name="connsiteY18" fmla="*/ 1483010 h 2216048"/>
+                <a:gd name="connsiteX19" fmla="*/ 714659 w 1582803"/>
+                <a:gd name="connsiteY19" fmla="*/ 1968863 h 2216048"/>
+                <a:gd name="connsiteX20" fmla="*/ 704525 w 1582803"/>
+                <a:gd name="connsiteY20" fmla="*/ 2127224 h 2216048"/>
+                <a:gd name="connsiteX21" fmla="*/ 609814 w 1582803"/>
+                <a:gd name="connsiteY21" fmla="*/ 1693889 h 2216048"/>
+                <a:gd name="connsiteX22" fmla="*/ 648283 w 1582803"/>
+                <a:gd name="connsiteY22" fmla="*/ 1528349 h 2216048"/>
+                <a:gd name="connsiteX23" fmla="*/ 306027 w 1582803"/>
+                <a:gd name="connsiteY23" fmla="*/ 829562 h 2216048"/>
+                <a:gd name="connsiteX24" fmla="*/ 432427 w 1582803"/>
+                <a:gd name="connsiteY24" fmla="*/ 2144702 h 2216048"/>
+                <a:gd name="connsiteX25" fmla="*/ 500790 w 1582803"/>
+                <a:gd name="connsiteY25" fmla="*/ 2199065 h 2216048"/>
+                <a:gd name="connsiteX26" fmla="*/ 498194 w 1582803"/>
+                <a:gd name="connsiteY26" fmla="*/ 2202840 h 2216048"/>
+                <a:gd name="connsiteX27" fmla="*/ 125476 w 1582803"/>
+                <a:gd name="connsiteY27" fmla="*/ 737314 h 2216048"/>
+                <a:gd name="connsiteX28" fmla="*/ 819110 w 1582803"/>
+                <a:gd name="connsiteY28" fmla="*/ 160678 h 2216048"/>
+                <a:gd name="connsiteX0" fmla="*/ 501071 w 1582803"/>
+                <a:gd name="connsiteY0" fmla="*/ 2199288 h 2216048"/>
+                <a:gd name="connsiteX1" fmla="*/ 501416 w 1582803"/>
+                <a:gd name="connsiteY1" fmla="*/ 2199563 h 2216048"/>
+                <a:gd name="connsiteX2" fmla="*/ 499805 w 1582803"/>
+                <a:gd name="connsiteY2" fmla="*/ 2201202 h 2216048"/>
+                <a:gd name="connsiteX3" fmla="*/ 501071 w 1582803"/>
+                <a:gd name="connsiteY3" fmla="*/ 2199288 h 2216048"/>
+                <a:gd name="connsiteX4" fmla="*/ 509436 w 1582803"/>
+                <a:gd name="connsiteY4" fmla="*/ 2186644 h 2216048"/>
+                <a:gd name="connsiteX5" fmla="*/ 501071 w 1582803"/>
+                <a:gd name="connsiteY5" fmla="*/ 2199288 h 2216048"/>
+                <a:gd name="connsiteX6" fmla="*/ 500790 w 1582803"/>
+                <a:gd name="connsiteY6" fmla="*/ 2199065 h 2216048"/>
+                <a:gd name="connsiteX7" fmla="*/ 507729 w 1582803"/>
+                <a:gd name="connsiteY7" fmla="*/ 2188975 h 2216048"/>
+                <a:gd name="connsiteX8" fmla="*/ 509436 w 1582803"/>
+                <a:gd name="connsiteY8" fmla="*/ 2186644 h 2216048"/>
+                <a:gd name="connsiteX9" fmla="*/ 819110 w 1582803"/>
+                <a:gd name="connsiteY9" fmla="*/ 160678 h 2216048"/>
+                <a:gd name="connsiteX10" fmla="*/ 1429197 w 1582803"/>
+                <a:gd name="connsiteY10" fmla="*/ 149133 h 2216048"/>
+                <a:gd name="connsiteX11" fmla="*/ 1526472 w 1582803"/>
+                <a:gd name="connsiteY11" fmla="*/ 179022 h 2216048"/>
+                <a:gd name="connsiteX12" fmla="*/ 1534350 w 1582803"/>
+                <a:gd name="connsiteY12" fmla="*/ 160689 h 2216048"/>
+                <a:gd name="connsiteX13" fmla="*/ 1582803 w 1582803"/>
+                <a:gd name="connsiteY13" fmla="*/ 0 h 2216048"/>
+                <a:gd name="connsiteX14" fmla="*/ 1553906 w 1582803"/>
+                <a:gd name="connsiteY14" fmla="*/ 203321 h 2216048"/>
+                <a:gd name="connsiteX15" fmla="*/ 1431819 w 1582803"/>
+                <a:gd name="connsiteY15" fmla="*/ 455379 h 2216048"/>
+                <a:gd name="connsiteX16" fmla="*/ 1192992 w 1582803"/>
+                <a:gd name="connsiteY16" fmla="*/ 782244 h 2216048"/>
+                <a:gd name="connsiteX17" fmla="*/ 942392 w 1582803"/>
+                <a:gd name="connsiteY17" fmla="*/ 1122144 h 2216048"/>
+                <a:gd name="connsiteX18" fmla="*/ 787564 w 1582803"/>
+                <a:gd name="connsiteY18" fmla="*/ 1483010 h 2216048"/>
+                <a:gd name="connsiteX19" fmla="*/ 714659 w 1582803"/>
+                <a:gd name="connsiteY19" fmla="*/ 1968863 h 2216048"/>
+                <a:gd name="connsiteX20" fmla="*/ 704525 w 1582803"/>
+                <a:gd name="connsiteY20" fmla="*/ 2127224 h 2216048"/>
+                <a:gd name="connsiteX21" fmla="*/ 609814 w 1582803"/>
+                <a:gd name="connsiteY21" fmla="*/ 1693889 h 2216048"/>
+                <a:gd name="connsiteX22" fmla="*/ 306027 w 1582803"/>
+                <a:gd name="connsiteY22" fmla="*/ 829562 h 2216048"/>
+                <a:gd name="connsiteX23" fmla="*/ 432427 w 1582803"/>
+                <a:gd name="connsiteY23" fmla="*/ 2144702 h 2216048"/>
+                <a:gd name="connsiteX24" fmla="*/ 500790 w 1582803"/>
+                <a:gd name="connsiteY24" fmla="*/ 2199065 h 2216048"/>
+                <a:gd name="connsiteX25" fmla="*/ 498194 w 1582803"/>
+                <a:gd name="connsiteY25" fmla="*/ 2202840 h 2216048"/>
+                <a:gd name="connsiteX26" fmla="*/ 125476 w 1582803"/>
+                <a:gd name="connsiteY26" fmla="*/ 737314 h 2216048"/>
+                <a:gd name="connsiteX27" fmla="*/ 819110 w 1582803"/>
+                <a:gd name="connsiteY27" fmla="*/ 160678 h 2216048"/>
+                <a:gd name="connsiteX0" fmla="*/ 501071 w 1582803"/>
+                <a:gd name="connsiteY0" fmla="*/ 2199288 h 2216048"/>
+                <a:gd name="connsiteX1" fmla="*/ 501416 w 1582803"/>
+                <a:gd name="connsiteY1" fmla="*/ 2199563 h 2216048"/>
+                <a:gd name="connsiteX2" fmla="*/ 499805 w 1582803"/>
+                <a:gd name="connsiteY2" fmla="*/ 2201202 h 2216048"/>
+                <a:gd name="connsiteX3" fmla="*/ 501071 w 1582803"/>
+                <a:gd name="connsiteY3" fmla="*/ 2199288 h 2216048"/>
+                <a:gd name="connsiteX4" fmla="*/ 509436 w 1582803"/>
+                <a:gd name="connsiteY4" fmla="*/ 2186644 h 2216048"/>
+                <a:gd name="connsiteX5" fmla="*/ 501071 w 1582803"/>
+                <a:gd name="connsiteY5" fmla="*/ 2199288 h 2216048"/>
+                <a:gd name="connsiteX6" fmla="*/ 500790 w 1582803"/>
+                <a:gd name="connsiteY6" fmla="*/ 2199065 h 2216048"/>
+                <a:gd name="connsiteX7" fmla="*/ 507729 w 1582803"/>
+                <a:gd name="connsiteY7" fmla="*/ 2188975 h 2216048"/>
+                <a:gd name="connsiteX8" fmla="*/ 509436 w 1582803"/>
+                <a:gd name="connsiteY8" fmla="*/ 2186644 h 2216048"/>
+                <a:gd name="connsiteX9" fmla="*/ 819110 w 1582803"/>
+                <a:gd name="connsiteY9" fmla="*/ 160678 h 2216048"/>
+                <a:gd name="connsiteX10" fmla="*/ 1429197 w 1582803"/>
+                <a:gd name="connsiteY10" fmla="*/ 149133 h 2216048"/>
+                <a:gd name="connsiteX11" fmla="*/ 1526472 w 1582803"/>
+                <a:gd name="connsiteY11" fmla="*/ 179022 h 2216048"/>
+                <a:gd name="connsiteX12" fmla="*/ 1534350 w 1582803"/>
+                <a:gd name="connsiteY12" fmla="*/ 160689 h 2216048"/>
+                <a:gd name="connsiteX13" fmla="*/ 1582803 w 1582803"/>
+                <a:gd name="connsiteY13" fmla="*/ 0 h 2216048"/>
+                <a:gd name="connsiteX14" fmla="*/ 1553906 w 1582803"/>
+                <a:gd name="connsiteY14" fmla="*/ 203321 h 2216048"/>
+                <a:gd name="connsiteX15" fmla="*/ 1431819 w 1582803"/>
+                <a:gd name="connsiteY15" fmla="*/ 455379 h 2216048"/>
+                <a:gd name="connsiteX16" fmla="*/ 1192992 w 1582803"/>
+                <a:gd name="connsiteY16" fmla="*/ 782244 h 2216048"/>
+                <a:gd name="connsiteX17" fmla="*/ 942392 w 1582803"/>
+                <a:gd name="connsiteY17" fmla="*/ 1122144 h 2216048"/>
+                <a:gd name="connsiteX18" fmla="*/ 787564 w 1582803"/>
+                <a:gd name="connsiteY18" fmla="*/ 1483010 h 2216048"/>
+                <a:gd name="connsiteX19" fmla="*/ 714659 w 1582803"/>
+                <a:gd name="connsiteY19" fmla="*/ 1968863 h 2216048"/>
+                <a:gd name="connsiteX20" fmla="*/ 704525 w 1582803"/>
+                <a:gd name="connsiteY20" fmla="*/ 2127224 h 2216048"/>
+                <a:gd name="connsiteX21" fmla="*/ 609814 w 1582803"/>
+                <a:gd name="connsiteY21" fmla="*/ 1693889 h 2216048"/>
+                <a:gd name="connsiteX22" fmla="*/ 432427 w 1582803"/>
+                <a:gd name="connsiteY22" fmla="*/ 2144702 h 2216048"/>
+                <a:gd name="connsiteX23" fmla="*/ 500790 w 1582803"/>
+                <a:gd name="connsiteY23" fmla="*/ 2199065 h 2216048"/>
+                <a:gd name="connsiteX24" fmla="*/ 498194 w 1582803"/>
+                <a:gd name="connsiteY24" fmla="*/ 2202840 h 2216048"/>
+                <a:gd name="connsiteX25" fmla="*/ 125476 w 1582803"/>
+                <a:gd name="connsiteY25" fmla="*/ 737314 h 2216048"/>
+                <a:gd name="connsiteX26" fmla="*/ 819110 w 1582803"/>
+                <a:gd name="connsiteY26" fmla="*/ 160678 h 2216048"/>
+                <a:gd name="connsiteX0" fmla="*/ 501071 w 1582803"/>
+                <a:gd name="connsiteY0" fmla="*/ 2199288 h 2216048"/>
+                <a:gd name="connsiteX1" fmla="*/ 501416 w 1582803"/>
+                <a:gd name="connsiteY1" fmla="*/ 2199563 h 2216048"/>
+                <a:gd name="connsiteX2" fmla="*/ 499805 w 1582803"/>
+                <a:gd name="connsiteY2" fmla="*/ 2201202 h 2216048"/>
+                <a:gd name="connsiteX3" fmla="*/ 501071 w 1582803"/>
+                <a:gd name="connsiteY3" fmla="*/ 2199288 h 2216048"/>
+                <a:gd name="connsiteX4" fmla="*/ 509436 w 1582803"/>
+                <a:gd name="connsiteY4" fmla="*/ 2186644 h 2216048"/>
+                <a:gd name="connsiteX5" fmla="*/ 501071 w 1582803"/>
+                <a:gd name="connsiteY5" fmla="*/ 2199288 h 2216048"/>
+                <a:gd name="connsiteX6" fmla="*/ 500790 w 1582803"/>
+                <a:gd name="connsiteY6" fmla="*/ 2199065 h 2216048"/>
+                <a:gd name="connsiteX7" fmla="*/ 507729 w 1582803"/>
+                <a:gd name="connsiteY7" fmla="*/ 2188975 h 2216048"/>
+                <a:gd name="connsiteX8" fmla="*/ 509436 w 1582803"/>
+                <a:gd name="connsiteY8" fmla="*/ 2186644 h 2216048"/>
+                <a:gd name="connsiteX9" fmla="*/ 819110 w 1582803"/>
+                <a:gd name="connsiteY9" fmla="*/ 160678 h 2216048"/>
+                <a:gd name="connsiteX10" fmla="*/ 1429197 w 1582803"/>
+                <a:gd name="connsiteY10" fmla="*/ 149133 h 2216048"/>
+                <a:gd name="connsiteX11" fmla="*/ 1526472 w 1582803"/>
+                <a:gd name="connsiteY11" fmla="*/ 179022 h 2216048"/>
+                <a:gd name="connsiteX12" fmla="*/ 1534350 w 1582803"/>
+                <a:gd name="connsiteY12" fmla="*/ 160689 h 2216048"/>
+                <a:gd name="connsiteX13" fmla="*/ 1582803 w 1582803"/>
+                <a:gd name="connsiteY13" fmla="*/ 0 h 2216048"/>
+                <a:gd name="connsiteX14" fmla="*/ 1553906 w 1582803"/>
+                <a:gd name="connsiteY14" fmla="*/ 203321 h 2216048"/>
+                <a:gd name="connsiteX15" fmla="*/ 1431819 w 1582803"/>
+                <a:gd name="connsiteY15" fmla="*/ 455379 h 2216048"/>
+                <a:gd name="connsiteX16" fmla="*/ 1192992 w 1582803"/>
+                <a:gd name="connsiteY16" fmla="*/ 782244 h 2216048"/>
+                <a:gd name="connsiteX17" fmla="*/ 942392 w 1582803"/>
+                <a:gd name="connsiteY17" fmla="*/ 1122144 h 2216048"/>
+                <a:gd name="connsiteX18" fmla="*/ 787564 w 1582803"/>
+                <a:gd name="connsiteY18" fmla="*/ 1483010 h 2216048"/>
+                <a:gd name="connsiteX19" fmla="*/ 714659 w 1582803"/>
+                <a:gd name="connsiteY19" fmla="*/ 1968863 h 2216048"/>
+                <a:gd name="connsiteX20" fmla="*/ 704525 w 1582803"/>
+                <a:gd name="connsiteY20" fmla="*/ 2127224 h 2216048"/>
+                <a:gd name="connsiteX21" fmla="*/ 432427 w 1582803"/>
+                <a:gd name="connsiteY21" fmla="*/ 2144702 h 2216048"/>
+                <a:gd name="connsiteX22" fmla="*/ 500790 w 1582803"/>
+                <a:gd name="connsiteY22" fmla="*/ 2199065 h 2216048"/>
+                <a:gd name="connsiteX23" fmla="*/ 498194 w 1582803"/>
+                <a:gd name="connsiteY23" fmla="*/ 2202840 h 2216048"/>
+                <a:gd name="connsiteX24" fmla="*/ 125476 w 1582803"/>
+                <a:gd name="connsiteY24" fmla="*/ 737314 h 2216048"/>
+                <a:gd name="connsiteX25" fmla="*/ 819110 w 1582803"/>
+                <a:gd name="connsiteY25" fmla="*/ 160678 h 2216048"/>
+                <a:gd name="connsiteX0" fmla="*/ 501071 w 1582803"/>
+                <a:gd name="connsiteY0" fmla="*/ 2199288 h 2216048"/>
+                <a:gd name="connsiteX1" fmla="*/ 501416 w 1582803"/>
+                <a:gd name="connsiteY1" fmla="*/ 2199563 h 2216048"/>
+                <a:gd name="connsiteX2" fmla="*/ 499805 w 1582803"/>
+                <a:gd name="connsiteY2" fmla="*/ 2201202 h 2216048"/>
+                <a:gd name="connsiteX3" fmla="*/ 501071 w 1582803"/>
+                <a:gd name="connsiteY3" fmla="*/ 2199288 h 2216048"/>
+                <a:gd name="connsiteX4" fmla="*/ 509436 w 1582803"/>
+                <a:gd name="connsiteY4" fmla="*/ 2186644 h 2216048"/>
+                <a:gd name="connsiteX5" fmla="*/ 501071 w 1582803"/>
+                <a:gd name="connsiteY5" fmla="*/ 2199288 h 2216048"/>
+                <a:gd name="connsiteX6" fmla="*/ 500790 w 1582803"/>
+                <a:gd name="connsiteY6" fmla="*/ 2199065 h 2216048"/>
+                <a:gd name="connsiteX7" fmla="*/ 507729 w 1582803"/>
+                <a:gd name="connsiteY7" fmla="*/ 2188975 h 2216048"/>
+                <a:gd name="connsiteX8" fmla="*/ 509436 w 1582803"/>
+                <a:gd name="connsiteY8" fmla="*/ 2186644 h 2216048"/>
+                <a:gd name="connsiteX9" fmla="*/ 819110 w 1582803"/>
+                <a:gd name="connsiteY9" fmla="*/ 160678 h 2216048"/>
+                <a:gd name="connsiteX10" fmla="*/ 1429197 w 1582803"/>
+                <a:gd name="connsiteY10" fmla="*/ 149133 h 2216048"/>
+                <a:gd name="connsiteX11" fmla="*/ 1526472 w 1582803"/>
+                <a:gd name="connsiteY11" fmla="*/ 179022 h 2216048"/>
+                <a:gd name="connsiteX12" fmla="*/ 1534350 w 1582803"/>
+                <a:gd name="connsiteY12" fmla="*/ 160689 h 2216048"/>
+                <a:gd name="connsiteX13" fmla="*/ 1582803 w 1582803"/>
+                <a:gd name="connsiteY13" fmla="*/ 0 h 2216048"/>
+                <a:gd name="connsiteX14" fmla="*/ 1553906 w 1582803"/>
+                <a:gd name="connsiteY14" fmla="*/ 203321 h 2216048"/>
+                <a:gd name="connsiteX15" fmla="*/ 1431819 w 1582803"/>
+                <a:gd name="connsiteY15" fmla="*/ 455379 h 2216048"/>
+                <a:gd name="connsiteX16" fmla="*/ 1192992 w 1582803"/>
+                <a:gd name="connsiteY16" fmla="*/ 782244 h 2216048"/>
+                <a:gd name="connsiteX17" fmla="*/ 942392 w 1582803"/>
+                <a:gd name="connsiteY17" fmla="*/ 1122144 h 2216048"/>
+                <a:gd name="connsiteX18" fmla="*/ 787564 w 1582803"/>
+                <a:gd name="connsiteY18" fmla="*/ 1483010 h 2216048"/>
+                <a:gd name="connsiteX19" fmla="*/ 714659 w 1582803"/>
+                <a:gd name="connsiteY19" fmla="*/ 1968863 h 2216048"/>
+                <a:gd name="connsiteX20" fmla="*/ 704525 w 1582803"/>
+                <a:gd name="connsiteY20" fmla="*/ 2127224 h 2216048"/>
+                <a:gd name="connsiteX21" fmla="*/ 500790 w 1582803"/>
+                <a:gd name="connsiteY21" fmla="*/ 2199065 h 2216048"/>
+                <a:gd name="connsiteX22" fmla="*/ 498194 w 1582803"/>
+                <a:gd name="connsiteY22" fmla="*/ 2202840 h 2216048"/>
+                <a:gd name="connsiteX23" fmla="*/ 125476 w 1582803"/>
+                <a:gd name="connsiteY23" fmla="*/ 737314 h 2216048"/>
+                <a:gd name="connsiteX24" fmla="*/ 819110 w 1582803"/>
+                <a:gd name="connsiteY24" fmla="*/ 160678 h 2216048"/>
+                <a:gd name="connsiteX0" fmla="*/ 501071 w 1582803"/>
+                <a:gd name="connsiteY0" fmla="*/ 2199288 h 2216048"/>
+                <a:gd name="connsiteX1" fmla="*/ 501416 w 1582803"/>
+                <a:gd name="connsiteY1" fmla="*/ 2199563 h 2216048"/>
+                <a:gd name="connsiteX2" fmla="*/ 499805 w 1582803"/>
+                <a:gd name="connsiteY2" fmla="*/ 2201202 h 2216048"/>
+                <a:gd name="connsiteX3" fmla="*/ 501071 w 1582803"/>
+                <a:gd name="connsiteY3" fmla="*/ 2199288 h 2216048"/>
+                <a:gd name="connsiteX4" fmla="*/ 507729 w 1582803"/>
+                <a:gd name="connsiteY4" fmla="*/ 2188975 h 2216048"/>
+                <a:gd name="connsiteX5" fmla="*/ 501071 w 1582803"/>
+                <a:gd name="connsiteY5" fmla="*/ 2199288 h 2216048"/>
+                <a:gd name="connsiteX6" fmla="*/ 500790 w 1582803"/>
+                <a:gd name="connsiteY6" fmla="*/ 2199065 h 2216048"/>
+                <a:gd name="connsiteX7" fmla="*/ 507729 w 1582803"/>
+                <a:gd name="connsiteY7" fmla="*/ 2188975 h 2216048"/>
+                <a:gd name="connsiteX8" fmla="*/ 819110 w 1582803"/>
+                <a:gd name="connsiteY8" fmla="*/ 160678 h 2216048"/>
+                <a:gd name="connsiteX9" fmla="*/ 1429197 w 1582803"/>
+                <a:gd name="connsiteY9" fmla="*/ 149133 h 2216048"/>
+                <a:gd name="connsiteX10" fmla="*/ 1526472 w 1582803"/>
+                <a:gd name="connsiteY10" fmla="*/ 179022 h 2216048"/>
+                <a:gd name="connsiteX11" fmla="*/ 1534350 w 1582803"/>
+                <a:gd name="connsiteY11" fmla="*/ 160689 h 2216048"/>
+                <a:gd name="connsiteX12" fmla="*/ 1582803 w 1582803"/>
+                <a:gd name="connsiteY12" fmla="*/ 0 h 2216048"/>
+                <a:gd name="connsiteX13" fmla="*/ 1553906 w 1582803"/>
+                <a:gd name="connsiteY13" fmla="*/ 203321 h 2216048"/>
+                <a:gd name="connsiteX14" fmla="*/ 1431819 w 1582803"/>
+                <a:gd name="connsiteY14" fmla="*/ 455379 h 2216048"/>
+                <a:gd name="connsiteX15" fmla="*/ 1192992 w 1582803"/>
+                <a:gd name="connsiteY15" fmla="*/ 782244 h 2216048"/>
+                <a:gd name="connsiteX16" fmla="*/ 942392 w 1582803"/>
+                <a:gd name="connsiteY16" fmla="*/ 1122144 h 2216048"/>
+                <a:gd name="connsiteX17" fmla="*/ 787564 w 1582803"/>
+                <a:gd name="connsiteY17" fmla="*/ 1483010 h 2216048"/>
+                <a:gd name="connsiteX18" fmla="*/ 714659 w 1582803"/>
+                <a:gd name="connsiteY18" fmla="*/ 1968863 h 2216048"/>
+                <a:gd name="connsiteX19" fmla="*/ 704525 w 1582803"/>
+                <a:gd name="connsiteY19" fmla="*/ 2127224 h 2216048"/>
+                <a:gd name="connsiteX20" fmla="*/ 500790 w 1582803"/>
+                <a:gd name="connsiteY20" fmla="*/ 2199065 h 2216048"/>
+                <a:gd name="connsiteX21" fmla="*/ 498194 w 1582803"/>
+                <a:gd name="connsiteY21" fmla="*/ 2202840 h 2216048"/>
+                <a:gd name="connsiteX22" fmla="*/ 125476 w 1582803"/>
+                <a:gd name="connsiteY22" fmla="*/ 737314 h 2216048"/>
+                <a:gd name="connsiteX23" fmla="*/ 819110 w 1582803"/>
+                <a:gd name="connsiteY23" fmla="*/ 160678 h 2216048"/>
+                <a:gd name="connsiteX0" fmla="*/ 501071 w 1582803"/>
+                <a:gd name="connsiteY0" fmla="*/ 2199288 h 2216048"/>
+                <a:gd name="connsiteX1" fmla="*/ 501416 w 1582803"/>
+                <a:gd name="connsiteY1" fmla="*/ 2199563 h 2216048"/>
+                <a:gd name="connsiteX2" fmla="*/ 499805 w 1582803"/>
+                <a:gd name="connsiteY2" fmla="*/ 2201202 h 2216048"/>
+                <a:gd name="connsiteX3" fmla="*/ 501071 w 1582803"/>
+                <a:gd name="connsiteY3" fmla="*/ 2199288 h 2216048"/>
+                <a:gd name="connsiteX4" fmla="*/ 500790 w 1582803"/>
+                <a:gd name="connsiteY4" fmla="*/ 2199065 h 2216048"/>
+                <a:gd name="connsiteX5" fmla="*/ 501071 w 1582803"/>
+                <a:gd name="connsiteY5" fmla="*/ 2199288 h 2216048"/>
+                <a:gd name="connsiteX6" fmla="*/ 500790 w 1582803"/>
+                <a:gd name="connsiteY6" fmla="*/ 2199065 h 2216048"/>
+                <a:gd name="connsiteX7" fmla="*/ 819110 w 1582803"/>
+                <a:gd name="connsiteY7" fmla="*/ 160678 h 2216048"/>
+                <a:gd name="connsiteX8" fmla="*/ 1429197 w 1582803"/>
+                <a:gd name="connsiteY8" fmla="*/ 149133 h 2216048"/>
+                <a:gd name="connsiteX9" fmla="*/ 1526472 w 1582803"/>
+                <a:gd name="connsiteY9" fmla="*/ 179022 h 2216048"/>
+                <a:gd name="connsiteX10" fmla="*/ 1534350 w 1582803"/>
+                <a:gd name="connsiteY10" fmla="*/ 160689 h 2216048"/>
+                <a:gd name="connsiteX11" fmla="*/ 1582803 w 1582803"/>
+                <a:gd name="connsiteY11" fmla="*/ 0 h 2216048"/>
+                <a:gd name="connsiteX12" fmla="*/ 1553906 w 1582803"/>
+                <a:gd name="connsiteY12" fmla="*/ 203321 h 2216048"/>
+                <a:gd name="connsiteX13" fmla="*/ 1431819 w 1582803"/>
+                <a:gd name="connsiteY13" fmla="*/ 455379 h 2216048"/>
+                <a:gd name="connsiteX14" fmla="*/ 1192992 w 1582803"/>
+                <a:gd name="connsiteY14" fmla="*/ 782244 h 2216048"/>
+                <a:gd name="connsiteX15" fmla="*/ 942392 w 1582803"/>
+                <a:gd name="connsiteY15" fmla="*/ 1122144 h 2216048"/>
+                <a:gd name="connsiteX16" fmla="*/ 787564 w 1582803"/>
+                <a:gd name="connsiteY16" fmla="*/ 1483010 h 2216048"/>
+                <a:gd name="connsiteX17" fmla="*/ 714659 w 1582803"/>
+                <a:gd name="connsiteY17" fmla="*/ 1968863 h 2216048"/>
+                <a:gd name="connsiteX18" fmla="*/ 704525 w 1582803"/>
+                <a:gd name="connsiteY18" fmla="*/ 2127224 h 2216048"/>
+                <a:gd name="connsiteX19" fmla="*/ 500790 w 1582803"/>
+                <a:gd name="connsiteY19" fmla="*/ 2199065 h 2216048"/>
+                <a:gd name="connsiteX20" fmla="*/ 498194 w 1582803"/>
+                <a:gd name="connsiteY20" fmla="*/ 2202840 h 2216048"/>
+                <a:gd name="connsiteX21" fmla="*/ 125476 w 1582803"/>
+                <a:gd name="connsiteY21" fmla="*/ 737314 h 2216048"/>
+                <a:gd name="connsiteX22" fmla="*/ 819110 w 1582803"/>
+                <a:gd name="connsiteY22" fmla="*/ 160678 h 2216048"/>
+              </a:gdLst>
+              <a:ahLst/>
+              <a:cxnLst>
+                <a:cxn ang="0">
+                  <a:pos x="connsiteX0" y="connsiteY0"/>
+                </a:cxn>
+                <a:cxn ang="0">
+                  <a:pos x="connsiteX1" y="connsiteY1"/>
+                </a:cxn>
+                <a:cxn ang="0">
+                  <a:pos x="connsiteX2" y="connsiteY2"/>
+                </a:cxn>
+                <a:cxn ang="0">
+                  <a:pos x="connsiteX3" y="connsiteY3"/>
+                </a:cxn>
+                <a:cxn ang="0">
+                  <a:pos x="connsiteX4" y="connsiteY4"/>
+                </a:cxn>
+                <a:cxn ang="0">
+                  <a:pos x="connsiteX5" y="connsiteY5"/>
+                </a:cxn>
+                <a:cxn ang="0">
+                  <a:pos x="connsiteX6" y="connsiteY6"/>
+                </a:cxn>
+                <a:cxn ang="0">
+                  <a:pos x="connsiteX7" y="connsiteY7"/>
+                </a:cxn>
+                <a:cxn ang="0">
+                  <a:pos x="connsiteX8" y="connsiteY8"/>
+                </a:cxn>
+                <a:cxn ang="0">
+                  <a:pos x="connsiteX9" y="connsiteY9"/>
+                </a:cxn>
+                <a:cxn ang="0">
+                  <a:pos x="connsiteX10" y="connsiteY10"/>
+                </a:cxn>
+                <a:cxn ang="0">
+                  <a:pos x="connsiteX11" y="connsiteY11"/>
+                </a:cxn>
+                <a:cxn ang="0">
+                  <a:pos x="connsiteX12" y="connsiteY12"/>
+                </a:cxn>
+                <a:cxn ang="0">
+                  <a:pos x="connsiteX13" y="connsiteY13"/>
+                </a:cxn>
+                <a:cxn ang="0">
+                  <a:pos x="connsiteX14" y="connsiteY14"/>
+                </a:cxn>
+                <a:cxn ang="0">
+                  <a:pos x="connsiteX15" y="connsiteY15"/>
+                </a:cxn>
+                <a:cxn ang="0">
+                  <a:pos x="connsiteX16" y="connsiteY16"/>
+                </a:cxn>
+                <a:cxn ang="0">
+                  <a:pos x="connsiteX17" y="connsiteY17"/>
+                </a:cxn>
+                <a:cxn ang="0">
+                  <a:pos x="connsiteX18" y="connsiteY18"/>
+                </a:cxn>
+                <a:cxn ang="0">
+                  <a:pos x="connsiteX19" y="connsiteY19"/>
+                </a:cxn>
+                <a:cxn ang="0">
+                  <a:pos x="connsiteX20" y="connsiteY20"/>
+                </a:cxn>
+                <a:cxn ang="0">
+                  <a:pos x="connsiteX21" y="connsiteY21"/>
+                </a:cxn>
+                <a:cxn ang="0">
+                  <a:pos x="connsiteX22" y="connsiteY22"/>
+                </a:cxn>
+              </a:cxnLst>
+              <a:rect l="l" t="t" r="r" b="b"/>
+              <a:pathLst>
+                <a:path w="1582803" h="2216048">
+                  <a:moveTo>
+                    <a:pt x="501071" y="2199288"/>
+                  </a:moveTo>
+                  <a:lnTo>
+                    <a:pt x="501416" y="2199563"/>
+                  </a:lnTo>
+                  <a:cubicBezTo>
+                    <a:pt x="482326" y="2227446"/>
+                    <a:pt x="491065" y="2214324"/>
+                    <a:pt x="499805" y="2201202"/>
+                  </a:cubicBezTo>
+                  <a:lnTo>
+                    <a:pt x="501071" y="2199288"/>
+                  </a:lnTo>
+                  <a:close/>
+                  <a:moveTo>
+                    <a:pt x="500790" y="2199065"/>
+                  </a:moveTo>
+                  <a:lnTo>
+                    <a:pt x="501071" y="2199288"/>
+                  </a:lnTo>
+                  <a:lnTo>
+                    <a:pt x="500790" y="2199065"/>
+                  </a:lnTo>
+                  <a:close/>
+                  <a:moveTo>
+                    <a:pt x="819110" y="160678"/>
+                  </a:moveTo>
+                  <a:cubicBezTo>
+                    <a:pt x="1013333" y="102935"/>
+                    <a:pt x="1223728" y="96302"/>
+                    <a:pt x="1429197" y="149133"/>
+                  </a:cubicBezTo>
+                  <a:lnTo>
+                    <a:pt x="1526472" y="179022"/>
+                  </a:lnTo>
+                  <a:lnTo>
+                    <a:pt x="1534350" y="160689"/>
+                  </a:lnTo>
+                  <a:cubicBezTo>
+                    <a:pt x="1556130" y="100518"/>
+                    <a:pt x="1573878" y="26761"/>
+                    <a:pt x="1582803" y="0"/>
+                  </a:cubicBezTo>
+                  <a:cubicBezTo>
+                    <a:pt x="1582803" y="0"/>
+                    <a:pt x="1579070" y="127424"/>
+                    <a:pt x="1553906" y="203321"/>
+                  </a:cubicBezTo>
+                  <a:cubicBezTo>
+                    <a:pt x="1528742" y="279217"/>
+                    <a:pt x="1491971" y="358892"/>
+                    <a:pt x="1431819" y="455379"/>
+                  </a:cubicBezTo>
+                  <a:cubicBezTo>
+                    <a:pt x="1371666" y="551867"/>
+                    <a:pt x="1274564" y="671117"/>
+                    <a:pt x="1192992" y="782244"/>
+                  </a:cubicBezTo>
+                  <a:cubicBezTo>
+                    <a:pt x="1192992" y="782244"/>
+                    <a:pt x="1009964" y="1005350"/>
+                    <a:pt x="942392" y="1122144"/>
+                  </a:cubicBezTo>
+                  <a:cubicBezTo>
+                    <a:pt x="874821" y="1238938"/>
+                    <a:pt x="825519" y="1341890"/>
+                    <a:pt x="787564" y="1483010"/>
+                  </a:cubicBezTo>
+                  <a:cubicBezTo>
+                    <a:pt x="749609" y="1624130"/>
+                    <a:pt x="732134" y="1796496"/>
+                    <a:pt x="714659" y="1968863"/>
+                  </a:cubicBezTo>
+                  <a:lnTo>
+                    <a:pt x="704525" y="2127224"/>
+                  </a:lnTo>
+                  <a:cubicBezTo>
+                    <a:pt x="668880" y="2165591"/>
+                    <a:pt x="535179" y="2186462"/>
+                    <a:pt x="500790" y="2199065"/>
+                  </a:cubicBezTo>
+                  <a:lnTo>
+                    <a:pt x="498194" y="2202840"/>
+                  </a:lnTo>
+                  <a:cubicBezTo>
+                    <a:pt x="23105" y="1877560"/>
+                    <a:pt x="-136488" y="1250045"/>
+                    <a:pt x="125476" y="737314"/>
+                  </a:cubicBezTo>
+                  <a:cubicBezTo>
+                    <a:pt x="272831" y="448903"/>
+                    <a:pt x="527777" y="247292"/>
+                    <a:pt x="819110" y="160678"/>
+                  </a:cubicBezTo>
+                  <a:close/>
+                </a:path>
+              </a:pathLst>
+            </a:custGeom>
+            <a:solidFill>
+              <a:srgbClr val="9966FF"/>
+            </a:solidFill>
+            <a:ln>
+              <a:noFill/>
+            </a:ln>
+          </p:spPr>
+          <p:style>
+            <a:lnRef idx="2">
+              <a:schemeClr val="accent1">
+                <a:shade val="50000"/>
+              </a:schemeClr>
+            </a:lnRef>
+            <a:fillRef idx="1">
+              <a:schemeClr val="accent1"/>
+            </a:fillRef>
+            <a:effectRef idx="0">
+              <a:schemeClr val="accent1"/>
+            </a:effectRef>
+            <a:fontRef idx="minor">
+              <a:schemeClr val="lt1"/>
+            </a:fontRef>
+          </p:style>
+          <p:txBody>
+            <a:bodyPr wrap="square" rtlCol="0" anchor="ctr">
+              <a:noAutofit/>
+            </a:bodyPr>
+            <a:lstStyle/>
+            <a:p>
+              <a:pPr algn="ctr"/>
+              <a:endParaRPr lang="en-US" dirty="0">
+                <a:solidFill>
+                  <a:schemeClr val="tx1"/>
+                </a:solidFill>
+              </a:endParaRPr>
+            </a:p>
+          </p:txBody>
+        </p:sp>
+      </p:grpSp>
+      <p:grpSp>
+        <p:nvGrpSpPr>
+          <p:cNvPr id="25" name="Group 24">
+            <a:extLst>
+              <a:ext uri="{FF2B5EF4-FFF2-40B4-BE49-F238E27FC236}">
+                <a16:creationId xmlns:a16="http://schemas.microsoft.com/office/drawing/2014/main" id="{3AAFCAF3-570B-4297-B58D-0C5292D035EB}"/>
+              </a:ext>
+            </a:extLst>
+          </p:cNvPr>
+          <p:cNvGrpSpPr/>
+          <p:nvPr/>
+        </p:nvGrpSpPr>
+        <p:grpSpPr>
+          <a:xfrm>
+            <a:off x="3352800" y="3225168"/>
+            <a:ext cx="2743200" cy="2743200"/>
+            <a:chOff x="8420164" y="2222451"/>
+            <a:chExt cx="2743200" cy="2743200"/>
+          </a:xfrm>
+        </p:grpSpPr>
+        <p:sp>
+          <p:nvSpPr>
+            <p:cNvPr id="26" name="Rectangle 25">
+              <a:extLst>
+                <a:ext uri="{FF2B5EF4-FFF2-40B4-BE49-F238E27FC236}">
+                  <a16:creationId xmlns:a16="http://schemas.microsoft.com/office/drawing/2014/main" id="{3869FBBB-A410-4CA7-93CA-241996ED209E}"/>
+                </a:ext>
+              </a:extLst>
+            </p:cNvPr>
+            <p:cNvSpPr/>
+            <p:nvPr/>
+          </p:nvSpPr>
+          <p:spPr>
+            <a:xfrm>
+              <a:off x="8420164" y="2222451"/>
+              <a:ext cx="2743200" cy="2743200"/>
+            </a:xfrm>
+            <a:prstGeom prst="rect">
+              <a:avLst/>
+            </a:prstGeom>
+            <a:noFill/>
+            <a:ln>
+              <a:noFill/>
+            </a:ln>
+          </p:spPr>
+          <p:style>
+            <a:lnRef idx="2">
+              <a:schemeClr val="accent1">
+                <a:shade val="50000"/>
+              </a:schemeClr>
+            </a:lnRef>
+            <a:fillRef idx="1">
+              <a:schemeClr val="accent1"/>
+            </a:fillRef>
+            <a:effectRef idx="0">
+              <a:schemeClr val="accent1"/>
+            </a:effectRef>
+            <a:fontRef idx="minor">
+              <a:schemeClr val="lt1"/>
+            </a:fontRef>
+          </p:style>
+          <p:txBody>
+            <a:bodyPr rtlCol="0" anchor="ctr"/>
+            <a:lstStyle/>
+            <a:p>
+              <a:pPr algn="ctr"/>
+              <a:endParaRPr lang="en-US"/>
+            </a:p>
+          </p:txBody>
+        </p:sp>
+        <p:sp>
+          <p:nvSpPr>
+            <p:cNvPr id="27" name="Freeform: Shape 26">
+              <a:extLst>
+                <a:ext uri="{FF2B5EF4-FFF2-40B4-BE49-F238E27FC236}">
+                  <a16:creationId xmlns:a16="http://schemas.microsoft.com/office/drawing/2014/main" id="{5A83C109-99B7-4FAD-A20E-B8012B8FE3E6}"/>
+                </a:ext>
+              </a:extLst>
+            </p:cNvPr>
+            <p:cNvSpPr/>
+            <p:nvPr/>
+          </p:nvSpPr>
+          <p:spPr>
+            <a:xfrm rot="11120515">
+              <a:off x="9131800" y="2442194"/>
+              <a:ext cx="1789593" cy="2451267"/>
+            </a:xfrm>
+            <a:custGeom>
+              <a:avLst/>
+              <a:gdLst>
+                <a:gd name="connsiteX0" fmla="*/ 1531385 w 1789593"/>
+                <a:gd name="connsiteY0" fmla="*/ 174047 h 2451267"/>
+                <a:gd name="connsiteX1" fmla="*/ 1531361 w 1789593"/>
+                <a:gd name="connsiteY1" fmla="*/ 174040 h 2451267"/>
+                <a:gd name="connsiteX2" fmla="*/ 1534080 w 1789593"/>
+                <a:gd name="connsiteY2" fmla="*/ 166462 h 2451267"/>
+                <a:gd name="connsiteX3" fmla="*/ 1535232 w 1789593"/>
+                <a:gd name="connsiteY3" fmla="*/ 163271 h 2451267"/>
+                <a:gd name="connsiteX4" fmla="*/ 1524524 w 1789593"/>
+                <a:gd name="connsiteY4" fmla="*/ 193267 h 2451267"/>
+                <a:gd name="connsiteX5" fmla="*/ 1529878 w 1789593"/>
+                <a:gd name="connsiteY5" fmla="*/ 178269 h 2451267"/>
+                <a:gd name="connsiteX6" fmla="*/ 1531385 w 1789593"/>
+                <a:gd name="connsiteY6" fmla="*/ 174047 h 2451267"/>
+                <a:gd name="connsiteX7" fmla="*/ 1531423 w 1789593"/>
+                <a:gd name="connsiteY7" fmla="*/ 174059 h 2451267"/>
+                <a:gd name="connsiteX8" fmla="*/ 1524524 w 1789593"/>
+                <a:gd name="connsiteY8" fmla="*/ 193267 h 2451267"/>
+                <a:gd name="connsiteX9" fmla="*/ 482416 w 1789593"/>
+                <a:gd name="connsiteY9" fmla="*/ 2451267 h 2451267"/>
+                <a:gd name="connsiteX10" fmla="*/ 489235 w 1789593"/>
+                <a:gd name="connsiteY10" fmla="*/ 2262557 h 2451267"/>
+                <a:gd name="connsiteX11" fmla="*/ 493039 w 1789593"/>
+                <a:gd name="connsiteY11" fmla="*/ 2192439 h 2451267"/>
+                <a:gd name="connsiteX12" fmla="*/ 413198 w 1789593"/>
+                <a:gd name="connsiteY12" fmla="*/ 2132224 h 2451267"/>
+                <a:gd name="connsiteX13" fmla="*/ 125366 w 1789593"/>
+                <a:gd name="connsiteY13" fmla="*/ 731046 h 2451267"/>
+                <a:gd name="connsiteX14" fmla="*/ 1429180 w 1789593"/>
+                <a:gd name="connsiteY14" fmla="*/ 142645 h 2451267"/>
+                <a:gd name="connsiteX15" fmla="*/ 1531361 w 1789593"/>
+                <a:gd name="connsiteY15" fmla="*/ 174040 h 2451267"/>
+                <a:gd name="connsiteX16" fmla="*/ 1528333 w 1789593"/>
+                <a:gd name="connsiteY16" fmla="*/ 182479 h 2451267"/>
+                <a:gd name="connsiteX17" fmla="*/ 305937 w 1789593"/>
+                <a:gd name="connsiteY17" fmla="*/ 823255 h 2451267"/>
+                <a:gd name="connsiteX18" fmla="*/ 478734 w 1789593"/>
+                <a:gd name="connsiteY18" fmla="*/ 1917956 h 2451267"/>
+                <a:gd name="connsiteX19" fmla="*/ 522767 w 1789593"/>
+                <a:gd name="connsiteY19" fmla="*/ 1954448 h 2451267"/>
+                <a:gd name="connsiteX20" fmla="*/ 542850 w 1789593"/>
+                <a:gd name="connsiteY20" fmla="*/ 1854794 h 2451267"/>
+                <a:gd name="connsiteX21" fmla="*/ 593854 w 1789593"/>
+                <a:gd name="connsiteY21" fmla="*/ 1706906 h 2451267"/>
+                <a:gd name="connsiteX22" fmla="*/ 738953 w 1789593"/>
+                <a:gd name="connsiteY22" fmla="*/ 1531872 h 2451267"/>
+                <a:gd name="connsiteX23" fmla="*/ 615107 w 1789593"/>
+                <a:gd name="connsiteY23" fmla="*/ 1567916 h 2451267"/>
+                <a:gd name="connsiteX24" fmla="*/ 720951 w 1789593"/>
+                <a:gd name="connsiteY24" fmla="*/ 1391660 h 2451267"/>
+                <a:gd name="connsiteX25" fmla="*/ 882870 w 1789593"/>
+                <a:gd name="connsiteY25" fmla="*/ 1239517 h 2451267"/>
+                <a:gd name="connsiteX26" fmla="*/ 1171496 w 1789593"/>
+                <a:gd name="connsiteY26" fmla="*/ 1134242 h 2451267"/>
+                <a:gd name="connsiteX27" fmla="*/ 978381 w 1789593"/>
+                <a:gd name="connsiteY27" fmla="*/ 1162085 h 2451267"/>
+                <a:gd name="connsiteX28" fmla="*/ 827700 w 1789593"/>
+                <a:gd name="connsiteY28" fmla="*/ 1225104 h 2451267"/>
+                <a:gd name="connsiteX29" fmla="*/ 964007 w 1789593"/>
+                <a:gd name="connsiteY29" fmla="*/ 1060677 h 2451267"/>
+                <a:gd name="connsiteX30" fmla="*/ 1064092 w 1789593"/>
+                <a:gd name="connsiteY30" fmla="*/ 875173 h 2451267"/>
+                <a:gd name="connsiteX31" fmla="*/ 1210098 w 1789593"/>
+                <a:gd name="connsiteY31" fmla="*/ 709839 h 2451267"/>
+                <a:gd name="connsiteX32" fmla="*/ 1387616 w 1789593"/>
+                <a:gd name="connsiteY32" fmla="*/ 619847 h 2451267"/>
+                <a:gd name="connsiteX33" fmla="*/ 1605158 w 1789593"/>
+                <a:gd name="connsiteY33" fmla="*/ 486968 h 2451267"/>
+                <a:gd name="connsiteX34" fmla="*/ 1641595 w 1789593"/>
+                <a:gd name="connsiteY34" fmla="*/ 248700 h 2451267"/>
+                <a:gd name="connsiteX35" fmla="*/ 1626766 w 1789593"/>
+                <a:gd name="connsiteY35" fmla="*/ 142442 h 2451267"/>
+                <a:gd name="connsiteX36" fmla="*/ 1789593 w 1789593"/>
+                <a:gd name="connsiteY36" fmla="*/ 0 h 2451267"/>
+                <a:gd name="connsiteX37" fmla="*/ 1754694 w 1789593"/>
+                <a:gd name="connsiteY37" fmla="*/ 150052 h 2451267"/>
+                <a:gd name="connsiteX38" fmla="*/ 1522762 w 1789593"/>
+                <a:gd name="connsiteY38" fmla="*/ 861643 h 2451267"/>
+                <a:gd name="connsiteX39" fmla="*/ 1218879 w 1789593"/>
+                <a:gd name="connsiteY39" fmla="*/ 1379352 h 2451267"/>
+                <a:gd name="connsiteX40" fmla="*/ 802388 w 1789593"/>
+                <a:gd name="connsiteY40" fmla="*/ 1843981 h 2451267"/>
+                <a:gd name="connsiteX41" fmla="*/ 569940 w 1789593"/>
+                <a:gd name="connsiteY41" fmla="*/ 2183757 h 2451267"/>
+                <a:gd name="connsiteX42" fmla="*/ 482416 w 1789593"/>
+                <a:gd name="connsiteY42" fmla="*/ 2451267 h 2451267"/>
+                <a:gd name="connsiteX0" fmla="*/ 1531385 w 1789593"/>
+                <a:gd name="connsiteY0" fmla="*/ 174047 h 2451267"/>
+                <a:gd name="connsiteX1" fmla="*/ 1531361 w 1789593"/>
+                <a:gd name="connsiteY1" fmla="*/ 174040 h 2451267"/>
+                <a:gd name="connsiteX2" fmla="*/ 1534080 w 1789593"/>
+                <a:gd name="connsiteY2" fmla="*/ 166462 h 2451267"/>
+                <a:gd name="connsiteX3" fmla="*/ 1535232 w 1789593"/>
+                <a:gd name="connsiteY3" fmla="*/ 163271 h 2451267"/>
+                <a:gd name="connsiteX4" fmla="*/ 1531385 w 1789593"/>
+                <a:gd name="connsiteY4" fmla="*/ 174047 h 2451267"/>
+                <a:gd name="connsiteX5" fmla="*/ 1524524 w 1789593"/>
+                <a:gd name="connsiteY5" fmla="*/ 193267 h 2451267"/>
+                <a:gd name="connsiteX6" fmla="*/ 1529878 w 1789593"/>
+                <a:gd name="connsiteY6" fmla="*/ 178269 h 2451267"/>
+                <a:gd name="connsiteX7" fmla="*/ 1531385 w 1789593"/>
+                <a:gd name="connsiteY7" fmla="*/ 174047 h 2451267"/>
+                <a:gd name="connsiteX8" fmla="*/ 1531423 w 1789593"/>
+                <a:gd name="connsiteY8" fmla="*/ 174059 h 2451267"/>
+                <a:gd name="connsiteX9" fmla="*/ 1524524 w 1789593"/>
+                <a:gd name="connsiteY9" fmla="*/ 193267 h 2451267"/>
+                <a:gd name="connsiteX10" fmla="*/ 482416 w 1789593"/>
+                <a:gd name="connsiteY10" fmla="*/ 2451267 h 2451267"/>
+                <a:gd name="connsiteX11" fmla="*/ 489235 w 1789593"/>
+                <a:gd name="connsiteY11" fmla="*/ 2262557 h 2451267"/>
+                <a:gd name="connsiteX12" fmla="*/ 493039 w 1789593"/>
+                <a:gd name="connsiteY12" fmla="*/ 2192439 h 2451267"/>
+                <a:gd name="connsiteX13" fmla="*/ 413198 w 1789593"/>
+                <a:gd name="connsiteY13" fmla="*/ 2132224 h 2451267"/>
+                <a:gd name="connsiteX14" fmla="*/ 125366 w 1789593"/>
+                <a:gd name="connsiteY14" fmla="*/ 731046 h 2451267"/>
+                <a:gd name="connsiteX15" fmla="*/ 1429180 w 1789593"/>
+                <a:gd name="connsiteY15" fmla="*/ 142645 h 2451267"/>
+                <a:gd name="connsiteX16" fmla="*/ 1531361 w 1789593"/>
+                <a:gd name="connsiteY16" fmla="*/ 174040 h 2451267"/>
+                <a:gd name="connsiteX17" fmla="*/ 1528333 w 1789593"/>
+                <a:gd name="connsiteY17" fmla="*/ 182479 h 2451267"/>
+                <a:gd name="connsiteX18" fmla="*/ 305937 w 1789593"/>
+                <a:gd name="connsiteY18" fmla="*/ 823255 h 2451267"/>
+                <a:gd name="connsiteX19" fmla="*/ 478734 w 1789593"/>
+                <a:gd name="connsiteY19" fmla="*/ 1917956 h 2451267"/>
+                <a:gd name="connsiteX20" fmla="*/ 522767 w 1789593"/>
+                <a:gd name="connsiteY20" fmla="*/ 1954448 h 2451267"/>
+                <a:gd name="connsiteX21" fmla="*/ 542850 w 1789593"/>
+                <a:gd name="connsiteY21" fmla="*/ 1854794 h 2451267"/>
+                <a:gd name="connsiteX22" fmla="*/ 593854 w 1789593"/>
+                <a:gd name="connsiteY22" fmla="*/ 1706906 h 2451267"/>
+                <a:gd name="connsiteX23" fmla="*/ 738953 w 1789593"/>
+                <a:gd name="connsiteY23" fmla="*/ 1531872 h 2451267"/>
+                <a:gd name="connsiteX24" fmla="*/ 615107 w 1789593"/>
+                <a:gd name="connsiteY24" fmla="*/ 1567916 h 2451267"/>
+                <a:gd name="connsiteX25" fmla="*/ 720951 w 1789593"/>
+                <a:gd name="connsiteY25" fmla="*/ 1391660 h 2451267"/>
+                <a:gd name="connsiteX26" fmla="*/ 882870 w 1789593"/>
+                <a:gd name="connsiteY26" fmla="*/ 1239517 h 2451267"/>
+                <a:gd name="connsiteX27" fmla="*/ 1171496 w 1789593"/>
+                <a:gd name="connsiteY27" fmla="*/ 1134242 h 2451267"/>
+                <a:gd name="connsiteX28" fmla="*/ 978381 w 1789593"/>
+                <a:gd name="connsiteY28" fmla="*/ 1162085 h 2451267"/>
+                <a:gd name="connsiteX29" fmla="*/ 827700 w 1789593"/>
+                <a:gd name="connsiteY29" fmla="*/ 1225104 h 2451267"/>
+                <a:gd name="connsiteX30" fmla="*/ 964007 w 1789593"/>
+                <a:gd name="connsiteY30" fmla="*/ 1060677 h 2451267"/>
+                <a:gd name="connsiteX31" fmla="*/ 1064092 w 1789593"/>
+                <a:gd name="connsiteY31" fmla="*/ 875173 h 2451267"/>
+                <a:gd name="connsiteX32" fmla="*/ 1210098 w 1789593"/>
+                <a:gd name="connsiteY32" fmla="*/ 709839 h 2451267"/>
+                <a:gd name="connsiteX33" fmla="*/ 1387616 w 1789593"/>
+                <a:gd name="connsiteY33" fmla="*/ 619847 h 2451267"/>
+                <a:gd name="connsiteX34" fmla="*/ 1605158 w 1789593"/>
+                <a:gd name="connsiteY34" fmla="*/ 486968 h 2451267"/>
+                <a:gd name="connsiteX35" fmla="*/ 1641595 w 1789593"/>
+                <a:gd name="connsiteY35" fmla="*/ 248700 h 2451267"/>
+                <a:gd name="connsiteX36" fmla="*/ 1789593 w 1789593"/>
+                <a:gd name="connsiteY36" fmla="*/ 0 h 2451267"/>
+                <a:gd name="connsiteX37" fmla="*/ 1754694 w 1789593"/>
+                <a:gd name="connsiteY37" fmla="*/ 150052 h 2451267"/>
+                <a:gd name="connsiteX38" fmla="*/ 1522762 w 1789593"/>
+                <a:gd name="connsiteY38" fmla="*/ 861643 h 2451267"/>
+                <a:gd name="connsiteX39" fmla="*/ 1218879 w 1789593"/>
+                <a:gd name="connsiteY39" fmla="*/ 1379352 h 2451267"/>
+                <a:gd name="connsiteX40" fmla="*/ 802388 w 1789593"/>
+                <a:gd name="connsiteY40" fmla="*/ 1843981 h 2451267"/>
+                <a:gd name="connsiteX41" fmla="*/ 569940 w 1789593"/>
+                <a:gd name="connsiteY41" fmla="*/ 2183757 h 2451267"/>
+                <a:gd name="connsiteX42" fmla="*/ 482416 w 1789593"/>
+                <a:gd name="connsiteY42" fmla="*/ 2451267 h 2451267"/>
+                <a:gd name="connsiteX0" fmla="*/ 1531385 w 1789593"/>
+                <a:gd name="connsiteY0" fmla="*/ 174047 h 2451267"/>
+                <a:gd name="connsiteX1" fmla="*/ 1531361 w 1789593"/>
+                <a:gd name="connsiteY1" fmla="*/ 174040 h 2451267"/>
+                <a:gd name="connsiteX2" fmla="*/ 1534080 w 1789593"/>
+                <a:gd name="connsiteY2" fmla="*/ 166462 h 2451267"/>
+                <a:gd name="connsiteX3" fmla="*/ 1535232 w 1789593"/>
+                <a:gd name="connsiteY3" fmla="*/ 163271 h 2451267"/>
+                <a:gd name="connsiteX4" fmla="*/ 1531385 w 1789593"/>
+                <a:gd name="connsiteY4" fmla="*/ 174047 h 2451267"/>
+                <a:gd name="connsiteX5" fmla="*/ 1524524 w 1789593"/>
+                <a:gd name="connsiteY5" fmla="*/ 193267 h 2451267"/>
+                <a:gd name="connsiteX6" fmla="*/ 1529878 w 1789593"/>
+                <a:gd name="connsiteY6" fmla="*/ 178269 h 2451267"/>
+                <a:gd name="connsiteX7" fmla="*/ 1531385 w 1789593"/>
+                <a:gd name="connsiteY7" fmla="*/ 174047 h 2451267"/>
+                <a:gd name="connsiteX8" fmla="*/ 1531423 w 1789593"/>
+                <a:gd name="connsiteY8" fmla="*/ 174059 h 2451267"/>
+                <a:gd name="connsiteX9" fmla="*/ 1524524 w 1789593"/>
+                <a:gd name="connsiteY9" fmla="*/ 193267 h 2451267"/>
+                <a:gd name="connsiteX10" fmla="*/ 482416 w 1789593"/>
+                <a:gd name="connsiteY10" fmla="*/ 2451267 h 2451267"/>
+                <a:gd name="connsiteX11" fmla="*/ 489235 w 1789593"/>
+                <a:gd name="connsiteY11" fmla="*/ 2262557 h 2451267"/>
+                <a:gd name="connsiteX12" fmla="*/ 493039 w 1789593"/>
+                <a:gd name="connsiteY12" fmla="*/ 2192439 h 2451267"/>
+                <a:gd name="connsiteX13" fmla="*/ 413198 w 1789593"/>
+                <a:gd name="connsiteY13" fmla="*/ 2132224 h 2451267"/>
+                <a:gd name="connsiteX14" fmla="*/ 125366 w 1789593"/>
+                <a:gd name="connsiteY14" fmla="*/ 731046 h 2451267"/>
+                <a:gd name="connsiteX15" fmla="*/ 1429180 w 1789593"/>
+                <a:gd name="connsiteY15" fmla="*/ 142645 h 2451267"/>
+                <a:gd name="connsiteX16" fmla="*/ 1531361 w 1789593"/>
+                <a:gd name="connsiteY16" fmla="*/ 174040 h 2451267"/>
+                <a:gd name="connsiteX17" fmla="*/ 1528333 w 1789593"/>
+                <a:gd name="connsiteY17" fmla="*/ 182479 h 2451267"/>
+                <a:gd name="connsiteX18" fmla="*/ 305937 w 1789593"/>
+                <a:gd name="connsiteY18" fmla="*/ 823255 h 2451267"/>
+                <a:gd name="connsiteX19" fmla="*/ 478734 w 1789593"/>
+                <a:gd name="connsiteY19" fmla="*/ 1917956 h 2451267"/>
+                <a:gd name="connsiteX20" fmla="*/ 522767 w 1789593"/>
+                <a:gd name="connsiteY20" fmla="*/ 1954448 h 2451267"/>
+                <a:gd name="connsiteX21" fmla="*/ 542850 w 1789593"/>
+                <a:gd name="connsiteY21" fmla="*/ 1854794 h 2451267"/>
+                <a:gd name="connsiteX22" fmla="*/ 593854 w 1789593"/>
+                <a:gd name="connsiteY22" fmla="*/ 1706906 h 2451267"/>
+                <a:gd name="connsiteX23" fmla="*/ 738953 w 1789593"/>
+                <a:gd name="connsiteY23" fmla="*/ 1531872 h 2451267"/>
+                <a:gd name="connsiteX24" fmla="*/ 615107 w 1789593"/>
+                <a:gd name="connsiteY24" fmla="*/ 1567916 h 2451267"/>
+                <a:gd name="connsiteX25" fmla="*/ 720951 w 1789593"/>
+                <a:gd name="connsiteY25" fmla="*/ 1391660 h 2451267"/>
+                <a:gd name="connsiteX26" fmla="*/ 882870 w 1789593"/>
+                <a:gd name="connsiteY26" fmla="*/ 1239517 h 2451267"/>
+                <a:gd name="connsiteX27" fmla="*/ 1171496 w 1789593"/>
+                <a:gd name="connsiteY27" fmla="*/ 1134242 h 2451267"/>
+                <a:gd name="connsiteX28" fmla="*/ 978381 w 1789593"/>
+                <a:gd name="connsiteY28" fmla="*/ 1162085 h 2451267"/>
+                <a:gd name="connsiteX29" fmla="*/ 827700 w 1789593"/>
+                <a:gd name="connsiteY29" fmla="*/ 1225104 h 2451267"/>
+                <a:gd name="connsiteX30" fmla="*/ 964007 w 1789593"/>
+                <a:gd name="connsiteY30" fmla="*/ 1060677 h 2451267"/>
+                <a:gd name="connsiteX31" fmla="*/ 1064092 w 1789593"/>
+                <a:gd name="connsiteY31" fmla="*/ 875173 h 2451267"/>
+                <a:gd name="connsiteX32" fmla="*/ 1210098 w 1789593"/>
+                <a:gd name="connsiteY32" fmla="*/ 709839 h 2451267"/>
+                <a:gd name="connsiteX33" fmla="*/ 1387616 w 1789593"/>
+                <a:gd name="connsiteY33" fmla="*/ 619847 h 2451267"/>
+                <a:gd name="connsiteX34" fmla="*/ 1605158 w 1789593"/>
+                <a:gd name="connsiteY34" fmla="*/ 486968 h 2451267"/>
+                <a:gd name="connsiteX35" fmla="*/ 1789593 w 1789593"/>
+                <a:gd name="connsiteY35" fmla="*/ 0 h 2451267"/>
+                <a:gd name="connsiteX36" fmla="*/ 1754694 w 1789593"/>
+                <a:gd name="connsiteY36" fmla="*/ 150052 h 2451267"/>
+                <a:gd name="connsiteX37" fmla="*/ 1522762 w 1789593"/>
+                <a:gd name="connsiteY37" fmla="*/ 861643 h 2451267"/>
+                <a:gd name="connsiteX38" fmla="*/ 1218879 w 1789593"/>
+                <a:gd name="connsiteY38" fmla="*/ 1379352 h 2451267"/>
+                <a:gd name="connsiteX39" fmla="*/ 802388 w 1789593"/>
+                <a:gd name="connsiteY39" fmla="*/ 1843981 h 2451267"/>
+                <a:gd name="connsiteX40" fmla="*/ 569940 w 1789593"/>
+                <a:gd name="connsiteY40" fmla="*/ 2183757 h 2451267"/>
+                <a:gd name="connsiteX41" fmla="*/ 482416 w 1789593"/>
+                <a:gd name="connsiteY41" fmla="*/ 2451267 h 2451267"/>
+                <a:gd name="connsiteX0" fmla="*/ 1531385 w 1789593"/>
+                <a:gd name="connsiteY0" fmla="*/ 174047 h 2451267"/>
+                <a:gd name="connsiteX1" fmla="*/ 1531361 w 1789593"/>
+                <a:gd name="connsiteY1" fmla="*/ 174040 h 2451267"/>
+                <a:gd name="connsiteX2" fmla="*/ 1534080 w 1789593"/>
+                <a:gd name="connsiteY2" fmla="*/ 166462 h 2451267"/>
+                <a:gd name="connsiteX3" fmla="*/ 1535232 w 1789593"/>
+                <a:gd name="connsiteY3" fmla="*/ 163271 h 2451267"/>
+                <a:gd name="connsiteX4" fmla="*/ 1531385 w 1789593"/>
+                <a:gd name="connsiteY4" fmla="*/ 174047 h 2451267"/>
+                <a:gd name="connsiteX5" fmla="*/ 1524524 w 1789593"/>
+                <a:gd name="connsiteY5" fmla="*/ 193267 h 2451267"/>
+                <a:gd name="connsiteX6" fmla="*/ 1529878 w 1789593"/>
+                <a:gd name="connsiteY6" fmla="*/ 178269 h 2451267"/>
+                <a:gd name="connsiteX7" fmla="*/ 1531385 w 1789593"/>
+                <a:gd name="connsiteY7" fmla="*/ 174047 h 2451267"/>
+                <a:gd name="connsiteX8" fmla="*/ 1531423 w 1789593"/>
+                <a:gd name="connsiteY8" fmla="*/ 174059 h 2451267"/>
+                <a:gd name="connsiteX9" fmla="*/ 1524524 w 1789593"/>
+                <a:gd name="connsiteY9" fmla="*/ 193267 h 2451267"/>
+                <a:gd name="connsiteX10" fmla="*/ 482416 w 1789593"/>
+                <a:gd name="connsiteY10" fmla="*/ 2451267 h 2451267"/>
+                <a:gd name="connsiteX11" fmla="*/ 489235 w 1789593"/>
+                <a:gd name="connsiteY11" fmla="*/ 2262557 h 2451267"/>
+                <a:gd name="connsiteX12" fmla="*/ 493039 w 1789593"/>
+                <a:gd name="connsiteY12" fmla="*/ 2192439 h 2451267"/>
+                <a:gd name="connsiteX13" fmla="*/ 413198 w 1789593"/>
+                <a:gd name="connsiteY13" fmla="*/ 2132224 h 2451267"/>
+                <a:gd name="connsiteX14" fmla="*/ 125366 w 1789593"/>
+                <a:gd name="connsiteY14" fmla="*/ 731046 h 2451267"/>
+                <a:gd name="connsiteX15" fmla="*/ 1429180 w 1789593"/>
+                <a:gd name="connsiteY15" fmla="*/ 142645 h 2451267"/>
+                <a:gd name="connsiteX16" fmla="*/ 1531361 w 1789593"/>
+                <a:gd name="connsiteY16" fmla="*/ 174040 h 2451267"/>
+                <a:gd name="connsiteX17" fmla="*/ 1528333 w 1789593"/>
+                <a:gd name="connsiteY17" fmla="*/ 182479 h 2451267"/>
+                <a:gd name="connsiteX18" fmla="*/ 305937 w 1789593"/>
+                <a:gd name="connsiteY18" fmla="*/ 823255 h 2451267"/>
+                <a:gd name="connsiteX19" fmla="*/ 478734 w 1789593"/>
+                <a:gd name="connsiteY19" fmla="*/ 1917956 h 2451267"/>
+                <a:gd name="connsiteX20" fmla="*/ 522767 w 1789593"/>
+                <a:gd name="connsiteY20" fmla="*/ 1954448 h 2451267"/>
+                <a:gd name="connsiteX21" fmla="*/ 542850 w 1789593"/>
+                <a:gd name="connsiteY21" fmla="*/ 1854794 h 2451267"/>
+                <a:gd name="connsiteX22" fmla="*/ 593854 w 1789593"/>
+                <a:gd name="connsiteY22" fmla="*/ 1706906 h 2451267"/>
+                <a:gd name="connsiteX23" fmla="*/ 738953 w 1789593"/>
+                <a:gd name="connsiteY23" fmla="*/ 1531872 h 2451267"/>
+                <a:gd name="connsiteX24" fmla="*/ 615107 w 1789593"/>
+                <a:gd name="connsiteY24" fmla="*/ 1567916 h 2451267"/>
+                <a:gd name="connsiteX25" fmla="*/ 720951 w 1789593"/>
+                <a:gd name="connsiteY25" fmla="*/ 1391660 h 2451267"/>
+                <a:gd name="connsiteX26" fmla="*/ 882870 w 1789593"/>
+                <a:gd name="connsiteY26" fmla="*/ 1239517 h 2451267"/>
+                <a:gd name="connsiteX27" fmla="*/ 1171496 w 1789593"/>
+                <a:gd name="connsiteY27" fmla="*/ 1134242 h 2451267"/>
+                <a:gd name="connsiteX28" fmla="*/ 978381 w 1789593"/>
+                <a:gd name="connsiteY28" fmla="*/ 1162085 h 2451267"/>
+                <a:gd name="connsiteX29" fmla="*/ 827700 w 1789593"/>
+                <a:gd name="connsiteY29" fmla="*/ 1225104 h 2451267"/>
+                <a:gd name="connsiteX30" fmla="*/ 964007 w 1789593"/>
+                <a:gd name="connsiteY30" fmla="*/ 1060677 h 2451267"/>
+                <a:gd name="connsiteX31" fmla="*/ 1064092 w 1789593"/>
+                <a:gd name="connsiteY31" fmla="*/ 875173 h 2451267"/>
+                <a:gd name="connsiteX32" fmla="*/ 1210098 w 1789593"/>
+                <a:gd name="connsiteY32" fmla="*/ 709839 h 2451267"/>
+                <a:gd name="connsiteX33" fmla="*/ 1387616 w 1789593"/>
+                <a:gd name="connsiteY33" fmla="*/ 619847 h 2451267"/>
+                <a:gd name="connsiteX34" fmla="*/ 1789593 w 1789593"/>
+                <a:gd name="connsiteY34" fmla="*/ 0 h 2451267"/>
+                <a:gd name="connsiteX35" fmla="*/ 1754694 w 1789593"/>
+                <a:gd name="connsiteY35" fmla="*/ 150052 h 2451267"/>
+                <a:gd name="connsiteX36" fmla="*/ 1522762 w 1789593"/>
+                <a:gd name="connsiteY36" fmla="*/ 861643 h 2451267"/>
+                <a:gd name="connsiteX37" fmla="*/ 1218879 w 1789593"/>
+                <a:gd name="connsiteY37" fmla="*/ 1379352 h 2451267"/>
+                <a:gd name="connsiteX38" fmla="*/ 802388 w 1789593"/>
+                <a:gd name="connsiteY38" fmla="*/ 1843981 h 2451267"/>
+                <a:gd name="connsiteX39" fmla="*/ 569940 w 1789593"/>
+                <a:gd name="connsiteY39" fmla="*/ 2183757 h 2451267"/>
+                <a:gd name="connsiteX40" fmla="*/ 482416 w 1789593"/>
+                <a:gd name="connsiteY40" fmla="*/ 2451267 h 2451267"/>
+                <a:gd name="connsiteX0" fmla="*/ 1531385 w 1789593"/>
+                <a:gd name="connsiteY0" fmla="*/ 174047 h 2451267"/>
+                <a:gd name="connsiteX1" fmla="*/ 1531361 w 1789593"/>
+                <a:gd name="connsiteY1" fmla="*/ 174040 h 2451267"/>
+                <a:gd name="connsiteX2" fmla="*/ 1534080 w 1789593"/>
+                <a:gd name="connsiteY2" fmla="*/ 166462 h 2451267"/>
+                <a:gd name="connsiteX3" fmla="*/ 1535232 w 1789593"/>
+                <a:gd name="connsiteY3" fmla="*/ 163271 h 2451267"/>
+                <a:gd name="connsiteX4" fmla="*/ 1531385 w 1789593"/>
+                <a:gd name="connsiteY4" fmla="*/ 174047 h 2451267"/>
+                <a:gd name="connsiteX5" fmla="*/ 1524524 w 1789593"/>
+                <a:gd name="connsiteY5" fmla="*/ 193267 h 2451267"/>
+                <a:gd name="connsiteX6" fmla="*/ 1529878 w 1789593"/>
+                <a:gd name="connsiteY6" fmla="*/ 178269 h 2451267"/>
+                <a:gd name="connsiteX7" fmla="*/ 1531385 w 1789593"/>
+                <a:gd name="connsiteY7" fmla="*/ 174047 h 2451267"/>
+                <a:gd name="connsiteX8" fmla="*/ 1531423 w 1789593"/>
+                <a:gd name="connsiteY8" fmla="*/ 174059 h 2451267"/>
+                <a:gd name="connsiteX9" fmla="*/ 1524524 w 1789593"/>
+                <a:gd name="connsiteY9" fmla="*/ 193267 h 2451267"/>
+                <a:gd name="connsiteX10" fmla="*/ 482416 w 1789593"/>
+                <a:gd name="connsiteY10" fmla="*/ 2451267 h 2451267"/>
+                <a:gd name="connsiteX11" fmla="*/ 489235 w 1789593"/>
+                <a:gd name="connsiteY11" fmla="*/ 2262557 h 2451267"/>
+                <a:gd name="connsiteX12" fmla="*/ 493039 w 1789593"/>
+                <a:gd name="connsiteY12" fmla="*/ 2192439 h 2451267"/>
+                <a:gd name="connsiteX13" fmla="*/ 413198 w 1789593"/>
+                <a:gd name="connsiteY13" fmla="*/ 2132224 h 2451267"/>
+                <a:gd name="connsiteX14" fmla="*/ 125366 w 1789593"/>
+                <a:gd name="connsiteY14" fmla="*/ 731046 h 2451267"/>
+                <a:gd name="connsiteX15" fmla="*/ 1429180 w 1789593"/>
+                <a:gd name="connsiteY15" fmla="*/ 142645 h 2451267"/>
+                <a:gd name="connsiteX16" fmla="*/ 1531361 w 1789593"/>
+                <a:gd name="connsiteY16" fmla="*/ 174040 h 2451267"/>
+                <a:gd name="connsiteX17" fmla="*/ 1528333 w 1789593"/>
+                <a:gd name="connsiteY17" fmla="*/ 182479 h 2451267"/>
+                <a:gd name="connsiteX18" fmla="*/ 305937 w 1789593"/>
+                <a:gd name="connsiteY18" fmla="*/ 823255 h 2451267"/>
+                <a:gd name="connsiteX19" fmla="*/ 478734 w 1789593"/>
+                <a:gd name="connsiteY19" fmla="*/ 1917956 h 2451267"/>
+                <a:gd name="connsiteX20" fmla="*/ 522767 w 1789593"/>
+                <a:gd name="connsiteY20" fmla="*/ 1954448 h 2451267"/>
+                <a:gd name="connsiteX21" fmla="*/ 542850 w 1789593"/>
+                <a:gd name="connsiteY21" fmla="*/ 1854794 h 2451267"/>
+                <a:gd name="connsiteX22" fmla="*/ 593854 w 1789593"/>
+                <a:gd name="connsiteY22" fmla="*/ 1706906 h 2451267"/>
+                <a:gd name="connsiteX23" fmla="*/ 738953 w 1789593"/>
+                <a:gd name="connsiteY23" fmla="*/ 1531872 h 2451267"/>
+                <a:gd name="connsiteX24" fmla="*/ 615107 w 1789593"/>
+                <a:gd name="connsiteY24" fmla="*/ 1567916 h 2451267"/>
+                <a:gd name="connsiteX25" fmla="*/ 720951 w 1789593"/>
+                <a:gd name="connsiteY25" fmla="*/ 1391660 h 2451267"/>
+                <a:gd name="connsiteX26" fmla="*/ 882870 w 1789593"/>
+                <a:gd name="connsiteY26" fmla="*/ 1239517 h 2451267"/>
+                <a:gd name="connsiteX27" fmla="*/ 1171496 w 1789593"/>
+                <a:gd name="connsiteY27" fmla="*/ 1134242 h 2451267"/>
+                <a:gd name="connsiteX28" fmla="*/ 978381 w 1789593"/>
+                <a:gd name="connsiteY28" fmla="*/ 1162085 h 2451267"/>
+                <a:gd name="connsiteX29" fmla="*/ 827700 w 1789593"/>
+                <a:gd name="connsiteY29" fmla="*/ 1225104 h 2451267"/>
+                <a:gd name="connsiteX30" fmla="*/ 964007 w 1789593"/>
+                <a:gd name="connsiteY30" fmla="*/ 1060677 h 2451267"/>
+                <a:gd name="connsiteX31" fmla="*/ 1064092 w 1789593"/>
+                <a:gd name="connsiteY31" fmla="*/ 875173 h 2451267"/>
+                <a:gd name="connsiteX32" fmla="*/ 1210098 w 1789593"/>
+                <a:gd name="connsiteY32" fmla="*/ 709839 h 2451267"/>
+                <a:gd name="connsiteX33" fmla="*/ 1789593 w 1789593"/>
+                <a:gd name="connsiteY33" fmla="*/ 0 h 2451267"/>
+                <a:gd name="connsiteX34" fmla="*/ 1754694 w 1789593"/>
+                <a:gd name="connsiteY34" fmla="*/ 150052 h 2451267"/>
+                <a:gd name="connsiteX35" fmla="*/ 1522762 w 1789593"/>
+                <a:gd name="connsiteY35" fmla="*/ 861643 h 2451267"/>
+                <a:gd name="connsiteX36" fmla="*/ 1218879 w 1789593"/>
+                <a:gd name="connsiteY36" fmla="*/ 1379352 h 2451267"/>
+                <a:gd name="connsiteX37" fmla="*/ 802388 w 1789593"/>
+                <a:gd name="connsiteY37" fmla="*/ 1843981 h 2451267"/>
+                <a:gd name="connsiteX38" fmla="*/ 569940 w 1789593"/>
+                <a:gd name="connsiteY38" fmla="*/ 2183757 h 2451267"/>
+                <a:gd name="connsiteX39" fmla="*/ 482416 w 1789593"/>
+                <a:gd name="connsiteY39" fmla="*/ 2451267 h 2451267"/>
+                <a:gd name="connsiteX0" fmla="*/ 1531385 w 1789593"/>
+                <a:gd name="connsiteY0" fmla="*/ 174047 h 2451267"/>
+                <a:gd name="connsiteX1" fmla="*/ 1531361 w 1789593"/>
+                <a:gd name="connsiteY1" fmla="*/ 174040 h 2451267"/>
+                <a:gd name="connsiteX2" fmla="*/ 1534080 w 1789593"/>
+                <a:gd name="connsiteY2" fmla="*/ 166462 h 2451267"/>
+                <a:gd name="connsiteX3" fmla="*/ 1535232 w 1789593"/>
+                <a:gd name="connsiteY3" fmla="*/ 163271 h 2451267"/>
+                <a:gd name="connsiteX4" fmla="*/ 1531385 w 1789593"/>
+                <a:gd name="connsiteY4" fmla="*/ 174047 h 2451267"/>
+                <a:gd name="connsiteX5" fmla="*/ 1524524 w 1789593"/>
+                <a:gd name="connsiteY5" fmla="*/ 193267 h 2451267"/>
+                <a:gd name="connsiteX6" fmla="*/ 1529878 w 1789593"/>
+                <a:gd name="connsiteY6" fmla="*/ 178269 h 2451267"/>
+                <a:gd name="connsiteX7" fmla="*/ 1531385 w 1789593"/>
+                <a:gd name="connsiteY7" fmla="*/ 174047 h 2451267"/>
+                <a:gd name="connsiteX8" fmla="*/ 1531423 w 1789593"/>
+                <a:gd name="connsiteY8" fmla="*/ 174059 h 2451267"/>
+                <a:gd name="connsiteX9" fmla="*/ 1524524 w 1789593"/>
+                <a:gd name="connsiteY9" fmla="*/ 193267 h 2451267"/>
+                <a:gd name="connsiteX10" fmla="*/ 482416 w 1789593"/>
+                <a:gd name="connsiteY10" fmla="*/ 2451267 h 2451267"/>
+                <a:gd name="connsiteX11" fmla="*/ 489235 w 1789593"/>
+                <a:gd name="connsiteY11" fmla="*/ 2262557 h 2451267"/>
+                <a:gd name="connsiteX12" fmla="*/ 493039 w 1789593"/>
+                <a:gd name="connsiteY12" fmla="*/ 2192439 h 2451267"/>
+                <a:gd name="connsiteX13" fmla="*/ 413198 w 1789593"/>
+                <a:gd name="connsiteY13" fmla="*/ 2132224 h 2451267"/>
+                <a:gd name="connsiteX14" fmla="*/ 125366 w 1789593"/>
+                <a:gd name="connsiteY14" fmla="*/ 731046 h 2451267"/>
+                <a:gd name="connsiteX15" fmla="*/ 1429180 w 1789593"/>
+                <a:gd name="connsiteY15" fmla="*/ 142645 h 2451267"/>
+                <a:gd name="connsiteX16" fmla="*/ 1531361 w 1789593"/>
+                <a:gd name="connsiteY16" fmla="*/ 174040 h 2451267"/>
+                <a:gd name="connsiteX17" fmla="*/ 1528333 w 1789593"/>
+                <a:gd name="connsiteY17" fmla="*/ 182479 h 2451267"/>
+                <a:gd name="connsiteX18" fmla="*/ 305937 w 1789593"/>
+                <a:gd name="connsiteY18" fmla="*/ 823255 h 2451267"/>
+                <a:gd name="connsiteX19" fmla="*/ 478734 w 1789593"/>
+                <a:gd name="connsiteY19" fmla="*/ 1917956 h 2451267"/>
+                <a:gd name="connsiteX20" fmla="*/ 522767 w 1789593"/>
+                <a:gd name="connsiteY20" fmla="*/ 1954448 h 2451267"/>
+                <a:gd name="connsiteX21" fmla="*/ 542850 w 1789593"/>
+                <a:gd name="connsiteY21" fmla="*/ 1854794 h 2451267"/>
+                <a:gd name="connsiteX22" fmla="*/ 593854 w 1789593"/>
+                <a:gd name="connsiteY22" fmla="*/ 1706906 h 2451267"/>
+                <a:gd name="connsiteX23" fmla="*/ 738953 w 1789593"/>
+                <a:gd name="connsiteY23" fmla="*/ 1531872 h 2451267"/>
+                <a:gd name="connsiteX24" fmla="*/ 615107 w 1789593"/>
+                <a:gd name="connsiteY24" fmla="*/ 1567916 h 2451267"/>
+                <a:gd name="connsiteX25" fmla="*/ 720951 w 1789593"/>
+                <a:gd name="connsiteY25" fmla="*/ 1391660 h 2451267"/>
+                <a:gd name="connsiteX26" fmla="*/ 882870 w 1789593"/>
+                <a:gd name="connsiteY26" fmla="*/ 1239517 h 2451267"/>
+                <a:gd name="connsiteX27" fmla="*/ 1171496 w 1789593"/>
+                <a:gd name="connsiteY27" fmla="*/ 1134242 h 2451267"/>
+                <a:gd name="connsiteX28" fmla="*/ 978381 w 1789593"/>
+                <a:gd name="connsiteY28" fmla="*/ 1162085 h 2451267"/>
+                <a:gd name="connsiteX29" fmla="*/ 827700 w 1789593"/>
+                <a:gd name="connsiteY29" fmla="*/ 1225104 h 2451267"/>
+                <a:gd name="connsiteX30" fmla="*/ 964007 w 1789593"/>
+                <a:gd name="connsiteY30" fmla="*/ 1060677 h 2451267"/>
+                <a:gd name="connsiteX31" fmla="*/ 1064092 w 1789593"/>
+                <a:gd name="connsiteY31" fmla="*/ 875173 h 2451267"/>
+                <a:gd name="connsiteX32" fmla="*/ 1789593 w 1789593"/>
+                <a:gd name="connsiteY32" fmla="*/ 0 h 2451267"/>
+                <a:gd name="connsiteX33" fmla="*/ 1754694 w 1789593"/>
+                <a:gd name="connsiteY33" fmla="*/ 150052 h 2451267"/>
+                <a:gd name="connsiteX34" fmla="*/ 1522762 w 1789593"/>
+                <a:gd name="connsiteY34" fmla="*/ 861643 h 2451267"/>
+                <a:gd name="connsiteX35" fmla="*/ 1218879 w 1789593"/>
+                <a:gd name="connsiteY35" fmla="*/ 1379352 h 2451267"/>
+                <a:gd name="connsiteX36" fmla="*/ 802388 w 1789593"/>
+                <a:gd name="connsiteY36" fmla="*/ 1843981 h 2451267"/>
+                <a:gd name="connsiteX37" fmla="*/ 569940 w 1789593"/>
+                <a:gd name="connsiteY37" fmla="*/ 2183757 h 2451267"/>
+                <a:gd name="connsiteX38" fmla="*/ 482416 w 1789593"/>
+                <a:gd name="connsiteY38" fmla="*/ 2451267 h 2451267"/>
+                <a:gd name="connsiteX0" fmla="*/ 1531385 w 1789593"/>
+                <a:gd name="connsiteY0" fmla="*/ 174047 h 2451267"/>
+                <a:gd name="connsiteX1" fmla="*/ 1531361 w 1789593"/>
+                <a:gd name="connsiteY1" fmla="*/ 174040 h 2451267"/>
+                <a:gd name="connsiteX2" fmla="*/ 1534080 w 1789593"/>
+                <a:gd name="connsiteY2" fmla="*/ 166462 h 2451267"/>
+                <a:gd name="connsiteX3" fmla="*/ 1535232 w 1789593"/>
+                <a:gd name="connsiteY3" fmla="*/ 163271 h 2451267"/>
+                <a:gd name="connsiteX4" fmla="*/ 1531385 w 1789593"/>
+                <a:gd name="connsiteY4" fmla="*/ 174047 h 2451267"/>
+                <a:gd name="connsiteX5" fmla="*/ 1524524 w 1789593"/>
+                <a:gd name="connsiteY5" fmla="*/ 193267 h 2451267"/>
+                <a:gd name="connsiteX6" fmla="*/ 1529878 w 1789593"/>
+                <a:gd name="connsiteY6" fmla="*/ 178269 h 2451267"/>
+                <a:gd name="connsiteX7" fmla="*/ 1531385 w 1789593"/>
+                <a:gd name="connsiteY7" fmla="*/ 174047 h 2451267"/>
+                <a:gd name="connsiteX8" fmla="*/ 1531423 w 1789593"/>
+                <a:gd name="connsiteY8" fmla="*/ 174059 h 2451267"/>
+                <a:gd name="connsiteX9" fmla="*/ 1524524 w 1789593"/>
+                <a:gd name="connsiteY9" fmla="*/ 193267 h 2451267"/>
+                <a:gd name="connsiteX10" fmla="*/ 482416 w 1789593"/>
+                <a:gd name="connsiteY10" fmla="*/ 2451267 h 2451267"/>
+                <a:gd name="connsiteX11" fmla="*/ 489235 w 1789593"/>
+                <a:gd name="connsiteY11" fmla="*/ 2262557 h 2451267"/>
+                <a:gd name="connsiteX12" fmla="*/ 493039 w 1789593"/>
+                <a:gd name="connsiteY12" fmla="*/ 2192439 h 2451267"/>
+                <a:gd name="connsiteX13" fmla="*/ 413198 w 1789593"/>
+                <a:gd name="connsiteY13" fmla="*/ 2132224 h 2451267"/>
+                <a:gd name="connsiteX14" fmla="*/ 125366 w 1789593"/>
+                <a:gd name="connsiteY14" fmla="*/ 731046 h 2451267"/>
+                <a:gd name="connsiteX15" fmla="*/ 1429180 w 1789593"/>
+                <a:gd name="connsiteY15" fmla="*/ 142645 h 2451267"/>
+                <a:gd name="connsiteX16" fmla="*/ 1531361 w 1789593"/>
+                <a:gd name="connsiteY16" fmla="*/ 174040 h 2451267"/>
+                <a:gd name="connsiteX17" fmla="*/ 1528333 w 1789593"/>
+                <a:gd name="connsiteY17" fmla="*/ 182479 h 2451267"/>
+                <a:gd name="connsiteX18" fmla="*/ 305937 w 1789593"/>
+                <a:gd name="connsiteY18" fmla="*/ 823255 h 2451267"/>
+                <a:gd name="connsiteX19" fmla="*/ 478734 w 1789593"/>
+                <a:gd name="connsiteY19" fmla="*/ 1917956 h 2451267"/>
+                <a:gd name="connsiteX20" fmla="*/ 522767 w 1789593"/>
+                <a:gd name="connsiteY20" fmla="*/ 1954448 h 2451267"/>
+                <a:gd name="connsiteX21" fmla="*/ 542850 w 1789593"/>
+                <a:gd name="connsiteY21" fmla="*/ 1854794 h 2451267"/>
+                <a:gd name="connsiteX22" fmla="*/ 593854 w 1789593"/>
+                <a:gd name="connsiteY22" fmla="*/ 1706906 h 2451267"/>
+                <a:gd name="connsiteX23" fmla="*/ 738953 w 1789593"/>
+                <a:gd name="connsiteY23" fmla="*/ 1531872 h 2451267"/>
+                <a:gd name="connsiteX24" fmla="*/ 615107 w 1789593"/>
+                <a:gd name="connsiteY24" fmla="*/ 1567916 h 2451267"/>
+                <a:gd name="connsiteX25" fmla="*/ 720951 w 1789593"/>
+                <a:gd name="connsiteY25" fmla="*/ 1391660 h 2451267"/>
+                <a:gd name="connsiteX26" fmla="*/ 882870 w 1789593"/>
+                <a:gd name="connsiteY26" fmla="*/ 1239517 h 2451267"/>
+                <a:gd name="connsiteX27" fmla="*/ 1171496 w 1789593"/>
+                <a:gd name="connsiteY27" fmla="*/ 1134242 h 2451267"/>
+                <a:gd name="connsiteX28" fmla="*/ 978381 w 1789593"/>
+                <a:gd name="connsiteY28" fmla="*/ 1162085 h 2451267"/>
+                <a:gd name="connsiteX29" fmla="*/ 827700 w 1789593"/>
+                <a:gd name="connsiteY29" fmla="*/ 1225104 h 2451267"/>
+                <a:gd name="connsiteX30" fmla="*/ 964007 w 1789593"/>
+                <a:gd name="connsiteY30" fmla="*/ 1060677 h 2451267"/>
+                <a:gd name="connsiteX31" fmla="*/ 1789593 w 1789593"/>
+                <a:gd name="connsiteY31" fmla="*/ 0 h 2451267"/>
+                <a:gd name="connsiteX32" fmla="*/ 1754694 w 1789593"/>
+                <a:gd name="connsiteY32" fmla="*/ 150052 h 2451267"/>
+                <a:gd name="connsiteX33" fmla="*/ 1522762 w 1789593"/>
+                <a:gd name="connsiteY33" fmla="*/ 861643 h 2451267"/>
+                <a:gd name="connsiteX34" fmla="*/ 1218879 w 1789593"/>
+                <a:gd name="connsiteY34" fmla="*/ 1379352 h 2451267"/>
+                <a:gd name="connsiteX35" fmla="*/ 802388 w 1789593"/>
+                <a:gd name="connsiteY35" fmla="*/ 1843981 h 2451267"/>
+                <a:gd name="connsiteX36" fmla="*/ 569940 w 1789593"/>
+                <a:gd name="connsiteY36" fmla="*/ 2183757 h 2451267"/>
+                <a:gd name="connsiteX37" fmla="*/ 482416 w 1789593"/>
+                <a:gd name="connsiteY37" fmla="*/ 2451267 h 2451267"/>
+                <a:gd name="connsiteX0" fmla="*/ 1531385 w 1789593"/>
+                <a:gd name="connsiteY0" fmla="*/ 174047 h 2451267"/>
+                <a:gd name="connsiteX1" fmla="*/ 1531361 w 1789593"/>
+                <a:gd name="connsiteY1" fmla="*/ 174040 h 2451267"/>
+                <a:gd name="connsiteX2" fmla="*/ 1534080 w 1789593"/>
+                <a:gd name="connsiteY2" fmla="*/ 166462 h 2451267"/>
+                <a:gd name="connsiteX3" fmla="*/ 1535232 w 1789593"/>
+                <a:gd name="connsiteY3" fmla="*/ 163271 h 2451267"/>
+                <a:gd name="connsiteX4" fmla="*/ 1531385 w 1789593"/>
+                <a:gd name="connsiteY4" fmla="*/ 174047 h 2451267"/>
+                <a:gd name="connsiteX5" fmla="*/ 1524524 w 1789593"/>
+                <a:gd name="connsiteY5" fmla="*/ 193267 h 2451267"/>
+                <a:gd name="connsiteX6" fmla="*/ 1529878 w 1789593"/>
+                <a:gd name="connsiteY6" fmla="*/ 178269 h 2451267"/>
+                <a:gd name="connsiteX7" fmla="*/ 1531385 w 1789593"/>
+                <a:gd name="connsiteY7" fmla="*/ 174047 h 2451267"/>
+                <a:gd name="connsiteX8" fmla="*/ 1531423 w 1789593"/>
+                <a:gd name="connsiteY8" fmla="*/ 174059 h 2451267"/>
+                <a:gd name="connsiteX9" fmla="*/ 1524524 w 1789593"/>
+                <a:gd name="connsiteY9" fmla="*/ 193267 h 2451267"/>
+                <a:gd name="connsiteX10" fmla="*/ 482416 w 1789593"/>
+                <a:gd name="connsiteY10" fmla="*/ 2451267 h 2451267"/>
+                <a:gd name="connsiteX11" fmla="*/ 489235 w 1789593"/>
+                <a:gd name="connsiteY11" fmla="*/ 2262557 h 2451267"/>
+                <a:gd name="connsiteX12" fmla="*/ 493039 w 1789593"/>
+                <a:gd name="connsiteY12" fmla="*/ 2192439 h 2451267"/>
+                <a:gd name="connsiteX13" fmla="*/ 413198 w 1789593"/>
+                <a:gd name="connsiteY13" fmla="*/ 2132224 h 2451267"/>
+                <a:gd name="connsiteX14" fmla="*/ 125366 w 1789593"/>
+                <a:gd name="connsiteY14" fmla="*/ 731046 h 2451267"/>
+                <a:gd name="connsiteX15" fmla="*/ 1429180 w 1789593"/>
+                <a:gd name="connsiteY15" fmla="*/ 142645 h 2451267"/>
+                <a:gd name="connsiteX16" fmla="*/ 1531361 w 1789593"/>
+                <a:gd name="connsiteY16" fmla="*/ 174040 h 2451267"/>
+                <a:gd name="connsiteX17" fmla="*/ 1528333 w 1789593"/>
+                <a:gd name="connsiteY17" fmla="*/ 182479 h 2451267"/>
+                <a:gd name="connsiteX18" fmla="*/ 305937 w 1789593"/>
+                <a:gd name="connsiteY18" fmla="*/ 823255 h 2451267"/>
+                <a:gd name="connsiteX19" fmla="*/ 478734 w 1789593"/>
+                <a:gd name="connsiteY19" fmla="*/ 1917956 h 2451267"/>
+                <a:gd name="connsiteX20" fmla="*/ 522767 w 1789593"/>
+                <a:gd name="connsiteY20" fmla="*/ 1954448 h 2451267"/>
+                <a:gd name="connsiteX21" fmla="*/ 542850 w 1789593"/>
+                <a:gd name="connsiteY21" fmla="*/ 1854794 h 2451267"/>
+                <a:gd name="connsiteX22" fmla="*/ 593854 w 1789593"/>
+                <a:gd name="connsiteY22" fmla="*/ 1706906 h 2451267"/>
+                <a:gd name="connsiteX23" fmla="*/ 738953 w 1789593"/>
+                <a:gd name="connsiteY23" fmla="*/ 1531872 h 2451267"/>
+                <a:gd name="connsiteX24" fmla="*/ 615107 w 1789593"/>
+                <a:gd name="connsiteY24" fmla="*/ 1567916 h 2451267"/>
+                <a:gd name="connsiteX25" fmla="*/ 720951 w 1789593"/>
+                <a:gd name="connsiteY25" fmla="*/ 1391660 h 2451267"/>
+                <a:gd name="connsiteX26" fmla="*/ 882870 w 1789593"/>
+                <a:gd name="connsiteY26" fmla="*/ 1239517 h 2451267"/>
+                <a:gd name="connsiteX27" fmla="*/ 1171496 w 1789593"/>
+                <a:gd name="connsiteY27" fmla="*/ 1134242 h 2451267"/>
+                <a:gd name="connsiteX28" fmla="*/ 978381 w 1789593"/>
+                <a:gd name="connsiteY28" fmla="*/ 1162085 h 2451267"/>
+                <a:gd name="connsiteX29" fmla="*/ 827700 w 1789593"/>
+                <a:gd name="connsiteY29" fmla="*/ 1225104 h 2451267"/>
+                <a:gd name="connsiteX30" fmla="*/ 1789593 w 1789593"/>
+                <a:gd name="connsiteY30" fmla="*/ 0 h 2451267"/>
+                <a:gd name="connsiteX31" fmla="*/ 1754694 w 1789593"/>
+                <a:gd name="connsiteY31" fmla="*/ 150052 h 2451267"/>
+                <a:gd name="connsiteX32" fmla="*/ 1522762 w 1789593"/>
+                <a:gd name="connsiteY32" fmla="*/ 861643 h 2451267"/>
+                <a:gd name="connsiteX33" fmla="*/ 1218879 w 1789593"/>
+                <a:gd name="connsiteY33" fmla="*/ 1379352 h 2451267"/>
+                <a:gd name="connsiteX34" fmla="*/ 802388 w 1789593"/>
+                <a:gd name="connsiteY34" fmla="*/ 1843981 h 2451267"/>
+                <a:gd name="connsiteX35" fmla="*/ 569940 w 1789593"/>
+                <a:gd name="connsiteY35" fmla="*/ 2183757 h 2451267"/>
+                <a:gd name="connsiteX36" fmla="*/ 482416 w 1789593"/>
+                <a:gd name="connsiteY36" fmla="*/ 2451267 h 2451267"/>
+                <a:gd name="connsiteX0" fmla="*/ 1531385 w 1789593"/>
+                <a:gd name="connsiteY0" fmla="*/ 174047 h 2451267"/>
+                <a:gd name="connsiteX1" fmla="*/ 1531361 w 1789593"/>
+                <a:gd name="connsiteY1" fmla="*/ 174040 h 2451267"/>
+                <a:gd name="connsiteX2" fmla="*/ 1534080 w 1789593"/>
+                <a:gd name="connsiteY2" fmla="*/ 166462 h 2451267"/>
+                <a:gd name="connsiteX3" fmla="*/ 1535232 w 1789593"/>
+                <a:gd name="connsiteY3" fmla="*/ 163271 h 2451267"/>
+                <a:gd name="connsiteX4" fmla="*/ 1531385 w 1789593"/>
+                <a:gd name="connsiteY4" fmla="*/ 174047 h 2451267"/>
+                <a:gd name="connsiteX5" fmla="*/ 1524524 w 1789593"/>
+                <a:gd name="connsiteY5" fmla="*/ 193267 h 2451267"/>
+                <a:gd name="connsiteX6" fmla="*/ 1529878 w 1789593"/>
+                <a:gd name="connsiteY6" fmla="*/ 178269 h 2451267"/>
+                <a:gd name="connsiteX7" fmla="*/ 1531385 w 1789593"/>
+                <a:gd name="connsiteY7" fmla="*/ 174047 h 2451267"/>
+                <a:gd name="connsiteX8" fmla="*/ 1531423 w 1789593"/>
+                <a:gd name="connsiteY8" fmla="*/ 174059 h 2451267"/>
+                <a:gd name="connsiteX9" fmla="*/ 1524524 w 1789593"/>
+                <a:gd name="connsiteY9" fmla="*/ 193267 h 2451267"/>
+                <a:gd name="connsiteX10" fmla="*/ 482416 w 1789593"/>
+                <a:gd name="connsiteY10" fmla="*/ 2451267 h 2451267"/>
+                <a:gd name="connsiteX11" fmla="*/ 489235 w 1789593"/>
+                <a:gd name="connsiteY11" fmla="*/ 2262557 h 2451267"/>
+                <a:gd name="connsiteX12" fmla="*/ 493039 w 1789593"/>
+                <a:gd name="connsiteY12" fmla="*/ 2192439 h 2451267"/>
+                <a:gd name="connsiteX13" fmla="*/ 413198 w 1789593"/>
+                <a:gd name="connsiteY13" fmla="*/ 2132224 h 2451267"/>
+                <a:gd name="connsiteX14" fmla="*/ 125366 w 1789593"/>
+                <a:gd name="connsiteY14" fmla="*/ 731046 h 2451267"/>
+                <a:gd name="connsiteX15" fmla="*/ 1429180 w 1789593"/>
+                <a:gd name="connsiteY15" fmla="*/ 142645 h 2451267"/>
+                <a:gd name="connsiteX16" fmla="*/ 1531361 w 1789593"/>
+                <a:gd name="connsiteY16" fmla="*/ 174040 h 2451267"/>
+                <a:gd name="connsiteX17" fmla="*/ 1528333 w 1789593"/>
+                <a:gd name="connsiteY17" fmla="*/ 182479 h 2451267"/>
+                <a:gd name="connsiteX18" fmla="*/ 305937 w 1789593"/>
+                <a:gd name="connsiteY18" fmla="*/ 823255 h 2451267"/>
+                <a:gd name="connsiteX19" fmla="*/ 478734 w 1789593"/>
+                <a:gd name="connsiteY19" fmla="*/ 1917956 h 2451267"/>
+                <a:gd name="connsiteX20" fmla="*/ 522767 w 1789593"/>
+                <a:gd name="connsiteY20" fmla="*/ 1954448 h 2451267"/>
+                <a:gd name="connsiteX21" fmla="*/ 542850 w 1789593"/>
+                <a:gd name="connsiteY21" fmla="*/ 1854794 h 2451267"/>
+                <a:gd name="connsiteX22" fmla="*/ 593854 w 1789593"/>
+                <a:gd name="connsiteY22" fmla="*/ 1706906 h 2451267"/>
+                <a:gd name="connsiteX23" fmla="*/ 738953 w 1789593"/>
+                <a:gd name="connsiteY23" fmla="*/ 1531872 h 2451267"/>
+                <a:gd name="connsiteX24" fmla="*/ 615107 w 1789593"/>
+                <a:gd name="connsiteY24" fmla="*/ 1567916 h 2451267"/>
+                <a:gd name="connsiteX25" fmla="*/ 720951 w 1789593"/>
+                <a:gd name="connsiteY25" fmla="*/ 1391660 h 2451267"/>
+                <a:gd name="connsiteX26" fmla="*/ 882870 w 1789593"/>
+                <a:gd name="connsiteY26" fmla="*/ 1239517 h 2451267"/>
+                <a:gd name="connsiteX27" fmla="*/ 1171496 w 1789593"/>
+                <a:gd name="connsiteY27" fmla="*/ 1134242 h 2451267"/>
+                <a:gd name="connsiteX28" fmla="*/ 978381 w 1789593"/>
+                <a:gd name="connsiteY28" fmla="*/ 1162085 h 2451267"/>
+                <a:gd name="connsiteX29" fmla="*/ 1789593 w 1789593"/>
+                <a:gd name="connsiteY29" fmla="*/ 0 h 2451267"/>
+                <a:gd name="connsiteX30" fmla="*/ 1754694 w 1789593"/>
+                <a:gd name="connsiteY30" fmla="*/ 150052 h 2451267"/>
+                <a:gd name="connsiteX31" fmla="*/ 1522762 w 1789593"/>
+                <a:gd name="connsiteY31" fmla="*/ 861643 h 2451267"/>
+                <a:gd name="connsiteX32" fmla="*/ 1218879 w 1789593"/>
+                <a:gd name="connsiteY32" fmla="*/ 1379352 h 2451267"/>
+                <a:gd name="connsiteX33" fmla="*/ 802388 w 1789593"/>
+                <a:gd name="connsiteY33" fmla="*/ 1843981 h 2451267"/>
+                <a:gd name="connsiteX34" fmla="*/ 569940 w 1789593"/>
+                <a:gd name="connsiteY34" fmla="*/ 2183757 h 2451267"/>
+                <a:gd name="connsiteX35" fmla="*/ 482416 w 1789593"/>
+                <a:gd name="connsiteY35" fmla="*/ 2451267 h 2451267"/>
+                <a:gd name="connsiteX0" fmla="*/ 1531385 w 1789593"/>
+                <a:gd name="connsiteY0" fmla="*/ 174047 h 2451267"/>
+                <a:gd name="connsiteX1" fmla="*/ 1531361 w 1789593"/>
+                <a:gd name="connsiteY1" fmla="*/ 174040 h 2451267"/>
+                <a:gd name="connsiteX2" fmla="*/ 1534080 w 1789593"/>
+                <a:gd name="connsiteY2" fmla="*/ 166462 h 2451267"/>
+                <a:gd name="connsiteX3" fmla="*/ 1535232 w 1789593"/>
+                <a:gd name="connsiteY3" fmla="*/ 163271 h 2451267"/>
+                <a:gd name="connsiteX4" fmla="*/ 1531385 w 1789593"/>
+                <a:gd name="connsiteY4" fmla="*/ 174047 h 2451267"/>
+                <a:gd name="connsiteX5" fmla="*/ 1524524 w 1789593"/>
+                <a:gd name="connsiteY5" fmla="*/ 193267 h 2451267"/>
+                <a:gd name="connsiteX6" fmla="*/ 1529878 w 1789593"/>
+                <a:gd name="connsiteY6" fmla="*/ 178269 h 2451267"/>
+                <a:gd name="connsiteX7" fmla="*/ 1531385 w 1789593"/>
+                <a:gd name="connsiteY7" fmla="*/ 174047 h 2451267"/>
+                <a:gd name="connsiteX8" fmla="*/ 1531423 w 1789593"/>
+                <a:gd name="connsiteY8" fmla="*/ 174059 h 2451267"/>
+                <a:gd name="connsiteX9" fmla="*/ 1524524 w 1789593"/>
+                <a:gd name="connsiteY9" fmla="*/ 193267 h 2451267"/>
+                <a:gd name="connsiteX10" fmla="*/ 482416 w 1789593"/>
+                <a:gd name="connsiteY10" fmla="*/ 2451267 h 2451267"/>
+                <a:gd name="connsiteX11" fmla="*/ 489235 w 1789593"/>
+                <a:gd name="connsiteY11" fmla="*/ 2262557 h 2451267"/>
+                <a:gd name="connsiteX12" fmla="*/ 493039 w 1789593"/>
+                <a:gd name="connsiteY12" fmla="*/ 2192439 h 2451267"/>
+                <a:gd name="connsiteX13" fmla="*/ 413198 w 1789593"/>
+                <a:gd name="connsiteY13" fmla="*/ 2132224 h 2451267"/>
+                <a:gd name="connsiteX14" fmla="*/ 125366 w 1789593"/>
+                <a:gd name="connsiteY14" fmla="*/ 731046 h 2451267"/>
+                <a:gd name="connsiteX15" fmla="*/ 1429180 w 1789593"/>
+                <a:gd name="connsiteY15" fmla="*/ 142645 h 2451267"/>
+                <a:gd name="connsiteX16" fmla="*/ 1531361 w 1789593"/>
+                <a:gd name="connsiteY16" fmla="*/ 174040 h 2451267"/>
+                <a:gd name="connsiteX17" fmla="*/ 1528333 w 1789593"/>
+                <a:gd name="connsiteY17" fmla="*/ 182479 h 2451267"/>
+                <a:gd name="connsiteX18" fmla="*/ 305937 w 1789593"/>
+                <a:gd name="connsiteY18" fmla="*/ 823255 h 2451267"/>
+                <a:gd name="connsiteX19" fmla="*/ 478734 w 1789593"/>
+                <a:gd name="connsiteY19" fmla="*/ 1917956 h 2451267"/>
+                <a:gd name="connsiteX20" fmla="*/ 522767 w 1789593"/>
+                <a:gd name="connsiteY20" fmla="*/ 1954448 h 2451267"/>
+                <a:gd name="connsiteX21" fmla="*/ 542850 w 1789593"/>
+                <a:gd name="connsiteY21" fmla="*/ 1854794 h 2451267"/>
+                <a:gd name="connsiteX22" fmla="*/ 593854 w 1789593"/>
+                <a:gd name="connsiteY22" fmla="*/ 1706906 h 2451267"/>
+                <a:gd name="connsiteX23" fmla="*/ 738953 w 1789593"/>
+                <a:gd name="connsiteY23" fmla="*/ 1531872 h 2451267"/>
+                <a:gd name="connsiteX24" fmla="*/ 615107 w 1789593"/>
+                <a:gd name="connsiteY24" fmla="*/ 1567916 h 2451267"/>
+                <a:gd name="connsiteX25" fmla="*/ 720951 w 1789593"/>
+                <a:gd name="connsiteY25" fmla="*/ 1391660 h 2451267"/>
+                <a:gd name="connsiteX26" fmla="*/ 882870 w 1789593"/>
+                <a:gd name="connsiteY26" fmla="*/ 1239517 h 2451267"/>
+                <a:gd name="connsiteX27" fmla="*/ 1171496 w 1789593"/>
+                <a:gd name="connsiteY27" fmla="*/ 1134242 h 2451267"/>
+                <a:gd name="connsiteX28" fmla="*/ 1789593 w 1789593"/>
+                <a:gd name="connsiteY28" fmla="*/ 0 h 2451267"/>
+                <a:gd name="connsiteX29" fmla="*/ 1754694 w 1789593"/>
+                <a:gd name="connsiteY29" fmla="*/ 150052 h 2451267"/>
+                <a:gd name="connsiteX30" fmla="*/ 1522762 w 1789593"/>
+                <a:gd name="connsiteY30" fmla="*/ 861643 h 2451267"/>
+                <a:gd name="connsiteX31" fmla="*/ 1218879 w 1789593"/>
+                <a:gd name="connsiteY31" fmla="*/ 1379352 h 2451267"/>
+                <a:gd name="connsiteX32" fmla="*/ 802388 w 1789593"/>
+                <a:gd name="connsiteY32" fmla="*/ 1843981 h 2451267"/>
+                <a:gd name="connsiteX33" fmla="*/ 569940 w 1789593"/>
+                <a:gd name="connsiteY33" fmla="*/ 2183757 h 2451267"/>
+                <a:gd name="connsiteX34" fmla="*/ 482416 w 1789593"/>
+                <a:gd name="connsiteY34" fmla="*/ 2451267 h 2451267"/>
+                <a:gd name="connsiteX0" fmla="*/ 1531385 w 1789593"/>
+                <a:gd name="connsiteY0" fmla="*/ 174047 h 2451267"/>
+                <a:gd name="connsiteX1" fmla="*/ 1531361 w 1789593"/>
+                <a:gd name="connsiteY1" fmla="*/ 174040 h 2451267"/>
+                <a:gd name="connsiteX2" fmla="*/ 1534080 w 1789593"/>
+                <a:gd name="connsiteY2" fmla="*/ 166462 h 2451267"/>
+                <a:gd name="connsiteX3" fmla="*/ 1535232 w 1789593"/>
+                <a:gd name="connsiteY3" fmla="*/ 163271 h 2451267"/>
+                <a:gd name="connsiteX4" fmla="*/ 1531385 w 1789593"/>
+                <a:gd name="connsiteY4" fmla="*/ 174047 h 2451267"/>
+                <a:gd name="connsiteX5" fmla="*/ 1524524 w 1789593"/>
+                <a:gd name="connsiteY5" fmla="*/ 193267 h 2451267"/>
+                <a:gd name="connsiteX6" fmla="*/ 1529878 w 1789593"/>
+                <a:gd name="connsiteY6" fmla="*/ 178269 h 2451267"/>
+                <a:gd name="connsiteX7" fmla="*/ 1531385 w 1789593"/>
+                <a:gd name="connsiteY7" fmla="*/ 174047 h 2451267"/>
+                <a:gd name="connsiteX8" fmla="*/ 1531423 w 1789593"/>
+                <a:gd name="connsiteY8" fmla="*/ 174059 h 2451267"/>
+                <a:gd name="connsiteX9" fmla="*/ 1524524 w 1789593"/>
+                <a:gd name="connsiteY9" fmla="*/ 193267 h 2451267"/>
+                <a:gd name="connsiteX10" fmla="*/ 482416 w 1789593"/>
+                <a:gd name="connsiteY10" fmla="*/ 2451267 h 2451267"/>
+                <a:gd name="connsiteX11" fmla="*/ 489235 w 1789593"/>
+                <a:gd name="connsiteY11" fmla="*/ 2262557 h 2451267"/>
+                <a:gd name="connsiteX12" fmla="*/ 493039 w 1789593"/>
+                <a:gd name="connsiteY12" fmla="*/ 2192439 h 2451267"/>
+                <a:gd name="connsiteX13" fmla="*/ 413198 w 1789593"/>
+                <a:gd name="connsiteY13" fmla="*/ 2132224 h 2451267"/>
+                <a:gd name="connsiteX14" fmla="*/ 125366 w 1789593"/>
+                <a:gd name="connsiteY14" fmla="*/ 731046 h 2451267"/>
+                <a:gd name="connsiteX15" fmla="*/ 1429180 w 1789593"/>
+                <a:gd name="connsiteY15" fmla="*/ 142645 h 2451267"/>
+                <a:gd name="connsiteX16" fmla="*/ 1531361 w 1789593"/>
+                <a:gd name="connsiteY16" fmla="*/ 174040 h 2451267"/>
+                <a:gd name="connsiteX17" fmla="*/ 1528333 w 1789593"/>
+                <a:gd name="connsiteY17" fmla="*/ 182479 h 2451267"/>
+                <a:gd name="connsiteX18" fmla="*/ 305937 w 1789593"/>
+                <a:gd name="connsiteY18" fmla="*/ 823255 h 2451267"/>
+                <a:gd name="connsiteX19" fmla="*/ 478734 w 1789593"/>
+                <a:gd name="connsiteY19" fmla="*/ 1917956 h 2451267"/>
+                <a:gd name="connsiteX20" fmla="*/ 522767 w 1789593"/>
+                <a:gd name="connsiteY20" fmla="*/ 1954448 h 2451267"/>
+                <a:gd name="connsiteX21" fmla="*/ 542850 w 1789593"/>
+                <a:gd name="connsiteY21" fmla="*/ 1854794 h 2451267"/>
+                <a:gd name="connsiteX22" fmla="*/ 593854 w 1789593"/>
+                <a:gd name="connsiteY22" fmla="*/ 1706906 h 2451267"/>
+                <a:gd name="connsiteX23" fmla="*/ 738953 w 1789593"/>
+                <a:gd name="connsiteY23" fmla="*/ 1531872 h 2451267"/>
+                <a:gd name="connsiteX24" fmla="*/ 615107 w 1789593"/>
+                <a:gd name="connsiteY24" fmla="*/ 1567916 h 2451267"/>
+                <a:gd name="connsiteX25" fmla="*/ 720951 w 1789593"/>
+                <a:gd name="connsiteY25" fmla="*/ 1391660 h 2451267"/>
+                <a:gd name="connsiteX26" fmla="*/ 882870 w 1789593"/>
+                <a:gd name="connsiteY26" fmla="*/ 1239517 h 2451267"/>
+                <a:gd name="connsiteX27" fmla="*/ 1789593 w 1789593"/>
+                <a:gd name="connsiteY27" fmla="*/ 0 h 2451267"/>
+                <a:gd name="connsiteX28" fmla="*/ 1754694 w 1789593"/>
+                <a:gd name="connsiteY28" fmla="*/ 150052 h 2451267"/>
+                <a:gd name="connsiteX29" fmla="*/ 1522762 w 1789593"/>
+                <a:gd name="connsiteY29" fmla="*/ 861643 h 2451267"/>
+                <a:gd name="connsiteX30" fmla="*/ 1218879 w 1789593"/>
+                <a:gd name="connsiteY30" fmla="*/ 1379352 h 2451267"/>
+                <a:gd name="connsiteX31" fmla="*/ 802388 w 1789593"/>
+                <a:gd name="connsiteY31" fmla="*/ 1843981 h 2451267"/>
+                <a:gd name="connsiteX32" fmla="*/ 569940 w 1789593"/>
+                <a:gd name="connsiteY32" fmla="*/ 2183757 h 2451267"/>
+                <a:gd name="connsiteX33" fmla="*/ 482416 w 1789593"/>
+                <a:gd name="connsiteY33" fmla="*/ 2451267 h 2451267"/>
+                <a:gd name="connsiteX0" fmla="*/ 1531385 w 1789593"/>
+                <a:gd name="connsiteY0" fmla="*/ 174047 h 2451267"/>
+                <a:gd name="connsiteX1" fmla="*/ 1531361 w 1789593"/>
+                <a:gd name="connsiteY1" fmla="*/ 174040 h 2451267"/>
+                <a:gd name="connsiteX2" fmla="*/ 1534080 w 1789593"/>
+                <a:gd name="connsiteY2" fmla="*/ 166462 h 2451267"/>
+                <a:gd name="connsiteX3" fmla="*/ 1535232 w 1789593"/>
+                <a:gd name="connsiteY3" fmla="*/ 163271 h 2451267"/>
+                <a:gd name="connsiteX4" fmla="*/ 1531385 w 1789593"/>
+                <a:gd name="connsiteY4" fmla="*/ 174047 h 2451267"/>
+                <a:gd name="connsiteX5" fmla="*/ 1524524 w 1789593"/>
+                <a:gd name="connsiteY5" fmla="*/ 193267 h 2451267"/>
+                <a:gd name="connsiteX6" fmla="*/ 1529878 w 1789593"/>
+                <a:gd name="connsiteY6" fmla="*/ 178269 h 2451267"/>
+                <a:gd name="connsiteX7" fmla="*/ 1531385 w 1789593"/>
+                <a:gd name="connsiteY7" fmla="*/ 174047 h 2451267"/>
+                <a:gd name="connsiteX8" fmla="*/ 1531423 w 1789593"/>
+                <a:gd name="connsiteY8" fmla="*/ 174059 h 2451267"/>
+                <a:gd name="connsiteX9" fmla="*/ 1524524 w 1789593"/>
+                <a:gd name="connsiteY9" fmla="*/ 193267 h 2451267"/>
+                <a:gd name="connsiteX10" fmla="*/ 482416 w 1789593"/>
+                <a:gd name="connsiteY10" fmla="*/ 2451267 h 2451267"/>
+                <a:gd name="connsiteX11" fmla="*/ 489235 w 1789593"/>
+                <a:gd name="connsiteY11" fmla="*/ 2262557 h 2451267"/>
+                <a:gd name="connsiteX12" fmla="*/ 493039 w 1789593"/>
+                <a:gd name="connsiteY12" fmla="*/ 2192439 h 2451267"/>
+                <a:gd name="connsiteX13" fmla="*/ 413198 w 1789593"/>
+                <a:gd name="connsiteY13" fmla="*/ 2132224 h 2451267"/>
+                <a:gd name="connsiteX14" fmla="*/ 125366 w 1789593"/>
+                <a:gd name="connsiteY14" fmla="*/ 731046 h 2451267"/>
+                <a:gd name="connsiteX15" fmla="*/ 1429180 w 1789593"/>
+                <a:gd name="connsiteY15" fmla="*/ 142645 h 2451267"/>
+                <a:gd name="connsiteX16" fmla="*/ 1531361 w 1789593"/>
+                <a:gd name="connsiteY16" fmla="*/ 174040 h 2451267"/>
+                <a:gd name="connsiteX17" fmla="*/ 1528333 w 1789593"/>
+                <a:gd name="connsiteY17" fmla="*/ 182479 h 2451267"/>
+                <a:gd name="connsiteX18" fmla="*/ 305937 w 1789593"/>
+                <a:gd name="connsiteY18" fmla="*/ 823255 h 2451267"/>
+                <a:gd name="connsiteX19" fmla="*/ 478734 w 1789593"/>
+                <a:gd name="connsiteY19" fmla="*/ 1917956 h 2451267"/>
+                <a:gd name="connsiteX20" fmla="*/ 522767 w 1789593"/>
+                <a:gd name="connsiteY20" fmla="*/ 1954448 h 2451267"/>
+                <a:gd name="connsiteX21" fmla="*/ 542850 w 1789593"/>
+                <a:gd name="connsiteY21" fmla="*/ 1854794 h 2451267"/>
+                <a:gd name="connsiteX22" fmla="*/ 593854 w 1789593"/>
+                <a:gd name="connsiteY22" fmla="*/ 1706906 h 2451267"/>
+                <a:gd name="connsiteX23" fmla="*/ 738953 w 1789593"/>
+                <a:gd name="connsiteY23" fmla="*/ 1531872 h 2451267"/>
+                <a:gd name="connsiteX24" fmla="*/ 615107 w 1789593"/>
+                <a:gd name="connsiteY24" fmla="*/ 1567916 h 2451267"/>
+                <a:gd name="connsiteX25" fmla="*/ 720951 w 1789593"/>
+                <a:gd name="connsiteY25" fmla="*/ 1391660 h 2451267"/>
+                <a:gd name="connsiteX26" fmla="*/ 1789593 w 1789593"/>
+                <a:gd name="connsiteY26" fmla="*/ 0 h 2451267"/>
+                <a:gd name="connsiteX27" fmla="*/ 1754694 w 1789593"/>
+                <a:gd name="connsiteY27" fmla="*/ 150052 h 2451267"/>
+                <a:gd name="connsiteX28" fmla="*/ 1522762 w 1789593"/>
+                <a:gd name="connsiteY28" fmla="*/ 861643 h 2451267"/>
+                <a:gd name="connsiteX29" fmla="*/ 1218879 w 1789593"/>
+                <a:gd name="connsiteY29" fmla="*/ 1379352 h 2451267"/>
+                <a:gd name="connsiteX30" fmla="*/ 802388 w 1789593"/>
+                <a:gd name="connsiteY30" fmla="*/ 1843981 h 2451267"/>
+                <a:gd name="connsiteX31" fmla="*/ 569940 w 1789593"/>
+                <a:gd name="connsiteY31" fmla="*/ 2183757 h 2451267"/>
+                <a:gd name="connsiteX32" fmla="*/ 482416 w 1789593"/>
+                <a:gd name="connsiteY32" fmla="*/ 2451267 h 2451267"/>
+                <a:gd name="connsiteX0" fmla="*/ 1531385 w 1789593"/>
+                <a:gd name="connsiteY0" fmla="*/ 174047 h 2451267"/>
+                <a:gd name="connsiteX1" fmla="*/ 1531361 w 1789593"/>
+                <a:gd name="connsiteY1" fmla="*/ 174040 h 2451267"/>
+                <a:gd name="connsiteX2" fmla="*/ 1534080 w 1789593"/>
+                <a:gd name="connsiteY2" fmla="*/ 166462 h 2451267"/>
+                <a:gd name="connsiteX3" fmla="*/ 1535232 w 1789593"/>
+                <a:gd name="connsiteY3" fmla="*/ 163271 h 2451267"/>
+                <a:gd name="connsiteX4" fmla="*/ 1531385 w 1789593"/>
+                <a:gd name="connsiteY4" fmla="*/ 174047 h 2451267"/>
+                <a:gd name="connsiteX5" fmla="*/ 1524524 w 1789593"/>
+                <a:gd name="connsiteY5" fmla="*/ 193267 h 2451267"/>
+                <a:gd name="connsiteX6" fmla="*/ 1529878 w 1789593"/>
+                <a:gd name="connsiteY6" fmla="*/ 178269 h 2451267"/>
+                <a:gd name="connsiteX7" fmla="*/ 1531385 w 1789593"/>
+                <a:gd name="connsiteY7" fmla="*/ 174047 h 2451267"/>
+                <a:gd name="connsiteX8" fmla="*/ 1531423 w 1789593"/>
+                <a:gd name="connsiteY8" fmla="*/ 174059 h 2451267"/>
+                <a:gd name="connsiteX9" fmla="*/ 1524524 w 1789593"/>
+                <a:gd name="connsiteY9" fmla="*/ 193267 h 2451267"/>
+                <a:gd name="connsiteX10" fmla="*/ 482416 w 1789593"/>
+                <a:gd name="connsiteY10" fmla="*/ 2451267 h 2451267"/>
+                <a:gd name="connsiteX11" fmla="*/ 489235 w 1789593"/>
+                <a:gd name="connsiteY11" fmla="*/ 2262557 h 2451267"/>
+                <a:gd name="connsiteX12" fmla="*/ 493039 w 1789593"/>
+                <a:gd name="connsiteY12" fmla="*/ 2192439 h 2451267"/>
+                <a:gd name="connsiteX13" fmla="*/ 413198 w 1789593"/>
+                <a:gd name="connsiteY13" fmla="*/ 2132224 h 2451267"/>
+                <a:gd name="connsiteX14" fmla="*/ 125366 w 1789593"/>
+                <a:gd name="connsiteY14" fmla="*/ 731046 h 2451267"/>
+                <a:gd name="connsiteX15" fmla="*/ 1429180 w 1789593"/>
+                <a:gd name="connsiteY15" fmla="*/ 142645 h 2451267"/>
+                <a:gd name="connsiteX16" fmla="*/ 1531361 w 1789593"/>
+                <a:gd name="connsiteY16" fmla="*/ 174040 h 2451267"/>
+                <a:gd name="connsiteX17" fmla="*/ 1528333 w 1789593"/>
+                <a:gd name="connsiteY17" fmla="*/ 182479 h 2451267"/>
+                <a:gd name="connsiteX18" fmla="*/ 305937 w 1789593"/>
+                <a:gd name="connsiteY18" fmla="*/ 823255 h 2451267"/>
+                <a:gd name="connsiteX19" fmla="*/ 478734 w 1789593"/>
+                <a:gd name="connsiteY19" fmla="*/ 1917956 h 2451267"/>
+                <a:gd name="connsiteX20" fmla="*/ 522767 w 1789593"/>
+                <a:gd name="connsiteY20" fmla="*/ 1954448 h 2451267"/>
+                <a:gd name="connsiteX21" fmla="*/ 542850 w 1789593"/>
+                <a:gd name="connsiteY21" fmla="*/ 1854794 h 2451267"/>
+                <a:gd name="connsiteX22" fmla="*/ 593854 w 1789593"/>
+                <a:gd name="connsiteY22" fmla="*/ 1706906 h 2451267"/>
+                <a:gd name="connsiteX23" fmla="*/ 738953 w 1789593"/>
+                <a:gd name="connsiteY23" fmla="*/ 1531872 h 2451267"/>
+                <a:gd name="connsiteX24" fmla="*/ 615107 w 1789593"/>
+                <a:gd name="connsiteY24" fmla="*/ 1567916 h 2451267"/>
+                <a:gd name="connsiteX25" fmla="*/ 1789593 w 1789593"/>
+                <a:gd name="connsiteY25" fmla="*/ 0 h 2451267"/>
+                <a:gd name="connsiteX26" fmla="*/ 1754694 w 1789593"/>
+                <a:gd name="connsiteY26" fmla="*/ 150052 h 2451267"/>
+                <a:gd name="connsiteX27" fmla="*/ 1522762 w 1789593"/>
+                <a:gd name="connsiteY27" fmla="*/ 861643 h 2451267"/>
+                <a:gd name="connsiteX28" fmla="*/ 1218879 w 1789593"/>
+                <a:gd name="connsiteY28" fmla="*/ 1379352 h 2451267"/>
+                <a:gd name="connsiteX29" fmla="*/ 802388 w 1789593"/>
+                <a:gd name="connsiteY29" fmla="*/ 1843981 h 2451267"/>
+                <a:gd name="connsiteX30" fmla="*/ 569940 w 1789593"/>
+                <a:gd name="connsiteY30" fmla="*/ 2183757 h 2451267"/>
+                <a:gd name="connsiteX31" fmla="*/ 482416 w 1789593"/>
+                <a:gd name="connsiteY31" fmla="*/ 2451267 h 2451267"/>
+                <a:gd name="connsiteX0" fmla="*/ 1531385 w 1789593"/>
+                <a:gd name="connsiteY0" fmla="*/ 174047 h 2451267"/>
+                <a:gd name="connsiteX1" fmla="*/ 1531361 w 1789593"/>
+                <a:gd name="connsiteY1" fmla="*/ 174040 h 2451267"/>
+                <a:gd name="connsiteX2" fmla="*/ 1534080 w 1789593"/>
+                <a:gd name="connsiteY2" fmla="*/ 166462 h 2451267"/>
+                <a:gd name="connsiteX3" fmla="*/ 1535232 w 1789593"/>
+                <a:gd name="connsiteY3" fmla="*/ 163271 h 2451267"/>
+                <a:gd name="connsiteX4" fmla="*/ 1531385 w 1789593"/>
+                <a:gd name="connsiteY4" fmla="*/ 174047 h 2451267"/>
+                <a:gd name="connsiteX5" fmla="*/ 1524524 w 1789593"/>
+                <a:gd name="connsiteY5" fmla="*/ 193267 h 2451267"/>
+                <a:gd name="connsiteX6" fmla="*/ 1529878 w 1789593"/>
+                <a:gd name="connsiteY6" fmla="*/ 178269 h 2451267"/>
+                <a:gd name="connsiteX7" fmla="*/ 1531385 w 1789593"/>
+                <a:gd name="connsiteY7" fmla="*/ 174047 h 2451267"/>
+                <a:gd name="connsiteX8" fmla="*/ 1531423 w 1789593"/>
+                <a:gd name="connsiteY8" fmla="*/ 174059 h 2451267"/>
+                <a:gd name="connsiteX9" fmla="*/ 1524524 w 1789593"/>
+                <a:gd name="connsiteY9" fmla="*/ 193267 h 2451267"/>
+                <a:gd name="connsiteX10" fmla="*/ 482416 w 1789593"/>
+                <a:gd name="connsiteY10" fmla="*/ 2451267 h 2451267"/>
+                <a:gd name="connsiteX11" fmla="*/ 489235 w 1789593"/>
+                <a:gd name="connsiteY11" fmla="*/ 2262557 h 2451267"/>
+                <a:gd name="connsiteX12" fmla="*/ 493039 w 1789593"/>
+                <a:gd name="connsiteY12" fmla="*/ 2192439 h 2451267"/>
+                <a:gd name="connsiteX13" fmla="*/ 413198 w 1789593"/>
+                <a:gd name="connsiteY13" fmla="*/ 2132224 h 2451267"/>
+                <a:gd name="connsiteX14" fmla="*/ 125366 w 1789593"/>
+                <a:gd name="connsiteY14" fmla="*/ 731046 h 2451267"/>
+                <a:gd name="connsiteX15" fmla="*/ 1429180 w 1789593"/>
+                <a:gd name="connsiteY15" fmla="*/ 142645 h 2451267"/>
+                <a:gd name="connsiteX16" fmla="*/ 1531361 w 1789593"/>
+                <a:gd name="connsiteY16" fmla="*/ 174040 h 2451267"/>
+                <a:gd name="connsiteX17" fmla="*/ 1528333 w 1789593"/>
+                <a:gd name="connsiteY17" fmla="*/ 182479 h 2451267"/>
+                <a:gd name="connsiteX18" fmla="*/ 305937 w 1789593"/>
+                <a:gd name="connsiteY18" fmla="*/ 823255 h 2451267"/>
+                <a:gd name="connsiteX19" fmla="*/ 478734 w 1789593"/>
+                <a:gd name="connsiteY19" fmla="*/ 1917956 h 2451267"/>
+                <a:gd name="connsiteX20" fmla="*/ 522767 w 1789593"/>
+                <a:gd name="connsiteY20" fmla="*/ 1954448 h 2451267"/>
+                <a:gd name="connsiteX21" fmla="*/ 542850 w 1789593"/>
+                <a:gd name="connsiteY21" fmla="*/ 1854794 h 2451267"/>
+                <a:gd name="connsiteX22" fmla="*/ 593854 w 1789593"/>
+                <a:gd name="connsiteY22" fmla="*/ 1706906 h 2451267"/>
+                <a:gd name="connsiteX23" fmla="*/ 738953 w 1789593"/>
+                <a:gd name="connsiteY23" fmla="*/ 1531872 h 2451267"/>
+                <a:gd name="connsiteX24" fmla="*/ 1789593 w 1789593"/>
+                <a:gd name="connsiteY24" fmla="*/ 0 h 2451267"/>
+                <a:gd name="connsiteX25" fmla="*/ 1754694 w 1789593"/>
+                <a:gd name="connsiteY25" fmla="*/ 150052 h 2451267"/>
+                <a:gd name="connsiteX26" fmla="*/ 1522762 w 1789593"/>
+                <a:gd name="connsiteY26" fmla="*/ 861643 h 2451267"/>
+                <a:gd name="connsiteX27" fmla="*/ 1218879 w 1789593"/>
+                <a:gd name="connsiteY27" fmla="*/ 1379352 h 2451267"/>
+                <a:gd name="connsiteX28" fmla="*/ 802388 w 1789593"/>
+                <a:gd name="connsiteY28" fmla="*/ 1843981 h 2451267"/>
+                <a:gd name="connsiteX29" fmla="*/ 569940 w 1789593"/>
+                <a:gd name="connsiteY29" fmla="*/ 2183757 h 2451267"/>
+                <a:gd name="connsiteX30" fmla="*/ 482416 w 1789593"/>
+                <a:gd name="connsiteY30" fmla="*/ 2451267 h 2451267"/>
+                <a:gd name="connsiteX0" fmla="*/ 1531385 w 1789593"/>
+                <a:gd name="connsiteY0" fmla="*/ 174047 h 2451267"/>
+                <a:gd name="connsiteX1" fmla="*/ 1531361 w 1789593"/>
+                <a:gd name="connsiteY1" fmla="*/ 174040 h 2451267"/>
+                <a:gd name="connsiteX2" fmla="*/ 1534080 w 1789593"/>
+                <a:gd name="connsiteY2" fmla="*/ 166462 h 2451267"/>
+                <a:gd name="connsiteX3" fmla="*/ 1535232 w 1789593"/>
+                <a:gd name="connsiteY3" fmla="*/ 163271 h 2451267"/>
+                <a:gd name="connsiteX4" fmla="*/ 1531385 w 1789593"/>
+                <a:gd name="connsiteY4" fmla="*/ 174047 h 2451267"/>
+                <a:gd name="connsiteX5" fmla="*/ 1524524 w 1789593"/>
+                <a:gd name="connsiteY5" fmla="*/ 193267 h 2451267"/>
+                <a:gd name="connsiteX6" fmla="*/ 1529878 w 1789593"/>
+                <a:gd name="connsiteY6" fmla="*/ 178269 h 2451267"/>
+                <a:gd name="connsiteX7" fmla="*/ 1531385 w 1789593"/>
+                <a:gd name="connsiteY7" fmla="*/ 174047 h 2451267"/>
+                <a:gd name="connsiteX8" fmla="*/ 1531423 w 1789593"/>
+                <a:gd name="connsiteY8" fmla="*/ 174059 h 2451267"/>
+                <a:gd name="connsiteX9" fmla="*/ 1524524 w 1789593"/>
+                <a:gd name="connsiteY9" fmla="*/ 193267 h 2451267"/>
+                <a:gd name="connsiteX10" fmla="*/ 482416 w 1789593"/>
+                <a:gd name="connsiteY10" fmla="*/ 2451267 h 2451267"/>
+                <a:gd name="connsiteX11" fmla="*/ 489235 w 1789593"/>
+                <a:gd name="connsiteY11" fmla="*/ 2262557 h 2451267"/>
+                <a:gd name="connsiteX12" fmla="*/ 493039 w 1789593"/>
+                <a:gd name="connsiteY12" fmla="*/ 2192439 h 2451267"/>
+                <a:gd name="connsiteX13" fmla="*/ 413198 w 1789593"/>
+                <a:gd name="connsiteY13" fmla="*/ 2132224 h 2451267"/>
+                <a:gd name="connsiteX14" fmla="*/ 125366 w 1789593"/>
+                <a:gd name="connsiteY14" fmla="*/ 731046 h 2451267"/>
+                <a:gd name="connsiteX15" fmla="*/ 1429180 w 1789593"/>
+                <a:gd name="connsiteY15" fmla="*/ 142645 h 2451267"/>
+                <a:gd name="connsiteX16" fmla="*/ 1531361 w 1789593"/>
+                <a:gd name="connsiteY16" fmla="*/ 174040 h 2451267"/>
+                <a:gd name="connsiteX17" fmla="*/ 1528333 w 1789593"/>
+                <a:gd name="connsiteY17" fmla="*/ 182479 h 2451267"/>
+                <a:gd name="connsiteX18" fmla="*/ 305937 w 1789593"/>
+                <a:gd name="connsiteY18" fmla="*/ 823255 h 2451267"/>
+                <a:gd name="connsiteX19" fmla="*/ 478734 w 1789593"/>
+                <a:gd name="connsiteY19" fmla="*/ 1917956 h 2451267"/>
+                <a:gd name="connsiteX20" fmla="*/ 522767 w 1789593"/>
+                <a:gd name="connsiteY20" fmla="*/ 1954448 h 2451267"/>
+                <a:gd name="connsiteX21" fmla="*/ 542850 w 1789593"/>
+                <a:gd name="connsiteY21" fmla="*/ 1854794 h 2451267"/>
+                <a:gd name="connsiteX22" fmla="*/ 593854 w 1789593"/>
+                <a:gd name="connsiteY22" fmla="*/ 1706906 h 2451267"/>
+                <a:gd name="connsiteX23" fmla="*/ 1789593 w 1789593"/>
+                <a:gd name="connsiteY23" fmla="*/ 0 h 2451267"/>
+                <a:gd name="connsiteX24" fmla="*/ 1754694 w 1789593"/>
+                <a:gd name="connsiteY24" fmla="*/ 150052 h 2451267"/>
+                <a:gd name="connsiteX25" fmla="*/ 1522762 w 1789593"/>
+                <a:gd name="connsiteY25" fmla="*/ 861643 h 2451267"/>
+                <a:gd name="connsiteX26" fmla="*/ 1218879 w 1789593"/>
+                <a:gd name="connsiteY26" fmla="*/ 1379352 h 2451267"/>
+                <a:gd name="connsiteX27" fmla="*/ 802388 w 1789593"/>
+                <a:gd name="connsiteY27" fmla="*/ 1843981 h 2451267"/>
+                <a:gd name="connsiteX28" fmla="*/ 569940 w 1789593"/>
+                <a:gd name="connsiteY28" fmla="*/ 2183757 h 2451267"/>
+                <a:gd name="connsiteX29" fmla="*/ 482416 w 1789593"/>
+                <a:gd name="connsiteY29" fmla="*/ 2451267 h 2451267"/>
+                <a:gd name="connsiteX0" fmla="*/ 1531385 w 1789593"/>
+                <a:gd name="connsiteY0" fmla="*/ 174047 h 2451267"/>
+                <a:gd name="connsiteX1" fmla="*/ 1531361 w 1789593"/>
+                <a:gd name="connsiteY1" fmla="*/ 174040 h 2451267"/>
+                <a:gd name="connsiteX2" fmla="*/ 1534080 w 1789593"/>
+                <a:gd name="connsiteY2" fmla="*/ 166462 h 2451267"/>
+                <a:gd name="connsiteX3" fmla="*/ 1535232 w 1789593"/>
+                <a:gd name="connsiteY3" fmla="*/ 163271 h 2451267"/>
+                <a:gd name="connsiteX4" fmla="*/ 1531385 w 1789593"/>
+                <a:gd name="connsiteY4" fmla="*/ 174047 h 2451267"/>
+                <a:gd name="connsiteX5" fmla="*/ 1524524 w 1789593"/>
+                <a:gd name="connsiteY5" fmla="*/ 193267 h 2451267"/>
+                <a:gd name="connsiteX6" fmla="*/ 1529878 w 1789593"/>
+                <a:gd name="connsiteY6" fmla="*/ 178269 h 2451267"/>
+                <a:gd name="connsiteX7" fmla="*/ 1531385 w 1789593"/>
+                <a:gd name="connsiteY7" fmla="*/ 174047 h 2451267"/>
+                <a:gd name="connsiteX8" fmla="*/ 1531423 w 1789593"/>
+                <a:gd name="connsiteY8" fmla="*/ 174059 h 2451267"/>
+                <a:gd name="connsiteX9" fmla="*/ 1524524 w 1789593"/>
+                <a:gd name="connsiteY9" fmla="*/ 193267 h 2451267"/>
+                <a:gd name="connsiteX10" fmla="*/ 482416 w 1789593"/>
+                <a:gd name="connsiteY10" fmla="*/ 2451267 h 2451267"/>
+                <a:gd name="connsiteX11" fmla="*/ 489235 w 1789593"/>
+                <a:gd name="connsiteY11" fmla="*/ 2262557 h 2451267"/>
+                <a:gd name="connsiteX12" fmla="*/ 493039 w 1789593"/>
+                <a:gd name="connsiteY12" fmla="*/ 2192439 h 2451267"/>
+                <a:gd name="connsiteX13" fmla="*/ 413198 w 1789593"/>
+                <a:gd name="connsiteY13" fmla="*/ 2132224 h 2451267"/>
+                <a:gd name="connsiteX14" fmla="*/ 125366 w 1789593"/>
+                <a:gd name="connsiteY14" fmla="*/ 731046 h 2451267"/>
+                <a:gd name="connsiteX15" fmla="*/ 1429180 w 1789593"/>
+                <a:gd name="connsiteY15" fmla="*/ 142645 h 2451267"/>
+                <a:gd name="connsiteX16" fmla="*/ 1531361 w 1789593"/>
+                <a:gd name="connsiteY16" fmla="*/ 174040 h 2451267"/>
+                <a:gd name="connsiteX17" fmla="*/ 1528333 w 1789593"/>
+                <a:gd name="connsiteY17" fmla="*/ 182479 h 2451267"/>
+                <a:gd name="connsiteX18" fmla="*/ 305937 w 1789593"/>
+                <a:gd name="connsiteY18" fmla="*/ 823255 h 2451267"/>
+                <a:gd name="connsiteX19" fmla="*/ 478734 w 1789593"/>
+                <a:gd name="connsiteY19" fmla="*/ 1917956 h 2451267"/>
+                <a:gd name="connsiteX20" fmla="*/ 522767 w 1789593"/>
+                <a:gd name="connsiteY20" fmla="*/ 1954448 h 2451267"/>
+                <a:gd name="connsiteX21" fmla="*/ 542850 w 1789593"/>
+                <a:gd name="connsiteY21" fmla="*/ 1854794 h 2451267"/>
+                <a:gd name="connsiteX22" fmla="*/ 1789593 w 1789593"/>
+                <a:gd name="connsiteY22" fmla="*/ 0 h 2451267"/>
+                <a:gd name="connsiteX23" fmla="*/ 1754694 w 1789593"/>
+                <a:gd name="connsiteY23" fmla="*/ 150052 h 2451267"/>
+                <a:gd name="connsiteX24" fmla="*/ 1522762 w 1789593"/>
+                <a:gd name="connsiteY24" fmla="*/ 861643 h 2451267"/>
+                <a:gd name="connsiteX25" fmla="*/ 1218879 w 1789593"/>
+                <a:gd name="connsiteY25" fmla="*/ 1379352 h 2451267"/>
+                <a:gd name="connsiteX26" fmla="*/ 802388 w 1789593"/>
+                <a:gd name="connsiteY26" fmla="*/ 1843981 h 2451267"/>
+                <a:gd name="connsiteX27" fmla="*/ 569940 w 1789593"/>
+                <a:gd name="connsiteY27" fmla="*/ 2183757 h 2451267"/>
+                <a:gd name="connsiteX28" fmla="*/ 482416 w 1789593"/>
+                <a:gd name="connsiteY28" fmla="*/ 2451267 h 2451267"/>
+                <a:gd name="connsiteX0" fmla="*/ 1531385 w 1789593"/>
+                <a:gd name="connsiteY0" fmla="*/ 174047 h 2451267"/>
+                <a:gd name="connsiteX1" fmla="*/ 1531361 w 1789593"/>
+                <a:gd name="connsiteY1" fmla="*/ 174040 h 2451267"/>
+                <a:gd name="connsiteX2" fmla="*/ 1534080 w 1789593"/>
+                <a:gd name="connsiteY2" fmla="*/ 166462 h 2451267"/>
+                <a:gd name="connsiteX3" fmla="*/ 1535232 w 1789593"/>
+                <a:gd name="connsiteY3" fmla="*/ 163271 h 2451267"/>
+                <a:gd name="connsiteX4" fmla="*/ 1531385 w 1789593"/>
+                <a:gd name="connsiteY4" fmla="*/ 174047 h 2451267"/>
+                <a:gd name="connsiteX5" fmla="*/ 1524524 w 1789593"/>
+                <a:gd name="connsiteY5" fmla="*/ 193267 h 2451267"/>
+                <a:gd name="connsiteX6" fmla="*/ 1529878 w 1789593"/>
+                <a:gd name="connsiteY6" fmla="*/ 178269 h 2451267"/>
+                <a:gd name="connsiteX7" fmla="*/ 1531385 w 1789593"/>
+                <a:gd name="connsiteY7" fmla="*/ 174047 h 2451267"/>
+                <a:gd name="connsiteX8" fmla="*/ 1531423 w 1789593"/>
+                <a:gd name="connsiteY8" fmla="*/ 174059 h 2451267"/>
+                <a:gd name="connsiteX9" fmla="*/ 1524524 w 1789593"/>
+                <a:gd name="connsiteY9" fmla="*/ 193267 h 2451267"/>
+                <a:gd name="connsiteX10" fmla="*/ 482416 w 1789593"/>
+                <a:gd name="connsiteY10" fmla="*/ 2451267 h 2451267"/>
+                <a:gd name="connsiteX11" fmla="*/ 489235 w 1789593"/>
+                <a:gd name="connsiteY11" fmla="*/ 2262557 h 2451267"/>
+                <a:gd name="connsiteX12" fmla="*/ 493039 w 1789593"/>
+                <a:gd name="connsiteY12" fmla="*/ 2192439 h 2451267"/>
+                <a:gd name="connsiteX13" fmla="*/ 413198 w 1789593"/>
+                <a:gd name="connsiteY13" fmla="*/ 2132224 h 2451267"/>
+                <a:gd name="connsiteX14" fmla="*/ 125366 w 1789593"/>
+                <a:gd name="connsiteY14" fmla="*/ 731046 h 2451267"/>
+                <a:gd name="connsiteX15" fmla="*/ 1429180 w 1789593"/>
+                <a:gd name="connsiteY15" fmla="*/ 142645 h 2451267"/>
+                <a:gd name="connsiteX16" fmla="*/ 1531361 w 1789593"/>
+                <a:gd name="connsiteY16" fmla="*/ 174040 h 2451267"/>
+                <a:gd name="connsiteX17" fmla="*/ 1528333 w 1789593"/>
+                <a:gd name="connsiteY17" fmla="*/ 182479 h 2451267"/>
+                <a:gd name="connsiteX18" fmla="*/ 305937 w 1789593"/>
+                <a:gd name="connsiteY18" fmla="*/ 823255 h 2451267"/>
+                <a:gd name="connsiteX19" fmla="*/ 478734 w 1789593"/>
+                <a:gd name="connsiteY19" fmla="*/ 1917956 h 2451267"/>
+                <a:gd name="connsiteX20" fmla="*/ 522767 w 1789593"/>
+                <a:gd name="connsiteY20" fmla="*/ 1954448 h 2451267"/>
+                <a:gd name="connsiteX21" fmla="*/ 1789593 w 1789593"/>
+                <a:gd name="connsiteY21" fmla="*/ 0 h 2451267"/>
+                <a:gd name="connsiteX22" fmla="*/ 1754694 w 1789593"/>
+                <a:gd name="connsiteY22" fmla="*/ 150052 h 2451267"/>
+                <a:gd name="connsiteX23" fmla="*/ 1522762 w 1789593"/>
+                <a:gd name="connsiteY23" fmla="*/ 861643 h 2451267"/>
+                <a:gd name="connsiteX24" fmla="*/ 1218879 w 1789593"/>
+                <a:gd name="connsiteY24" fmla="*/ 1379352 h 2451267"/>
+                <a:gd name="connsiteX25" fmla="*/ 802388 w 1789593"/>
+                <a:gd name="connsiteY25" fmla="*/ 1843981 h 2451267"/>
+                <a:gd name="connsiteX26" fmla="*/ 569940 w 1789593"/>
+                <a:gd name="connsiteY26" fmla="*/ 2183757 h 2451267"/>
+                <a:gd name="connsiteX27" fmla="*/ 482416 w 1789593"/>
+                <a:gd name="connsiteY27" fmla="*/ 2451267 h 2451267"/>
+                <a:gd name="connsiteX0" fmla="*/ 1531385 w 1789593"/>
+                <a:gd name="connsiteY0" fmla="*/ 174047 h 2451267"/>
+                <a:gd name="connsiteX1" fmla="*/ 1531361 w 1789593"/>
+                <a:gd name="connsiteY1" fmla="*/ 174040 h 2451267"/>
+                <a:gd name="connsiteX2" fmla="*/ 1534080 w 1789593"/>
+                <a:gd name="connsiteY2" fmla="*/ 166462 h 2451267"/>
+                <a:gd name="connsiteX3" fmla="*/ 1535232 w 1789593"/>
+                <a:gd name="connsiteY3" fmla="*/ 163271 h 2451267"/>
+                <a:gd name="connsiteX4" fmla="*/ 1531385 w 1789593"/>
+                <a:gd name="connsiteY4" fmla="*/ 174047 h 2451267"/>
+                <a:gd name="connsiteX5" fmla="*/ 1524524 w 1789593"/>
+                <a:gd name="connsiteY5" fmla="*/ 193267 h 2451267"/>
+                <a:gd name="connsiteX6" fmla="*/ 1529878 w 1789593"/>
+                <a:gd name="connsiteY6" fmla="*/ 178269 h 2451267"/>
+                <a:gd name="connsiteX7" fmla="*/ 1531385 w 1789593"/>
+                <a:gd name="connsiteY7" fmla="*/ 174047 h 2451267"/>
+                <a:gd name="connsiteX8" fmla="*/ 1531423 w 1789593"/>
+                <a:gd name="connsiteY8" fmla="*/ 174059 h 2451267"/>
+                <a:gd name="connsiteX9" fmla="*/ 1524524 w 1789593"/>
+                <a:gd name="connsiteY9" fmla="*/ 193267 h 2451267"/>
+                <a:gd name="connsiteX10" fmla="*/ 482416 w 1789593"/>
+                <a:gd name="connsiteY10" fmla="*/ 2451267 h 2451267"/>
+                <a:gd name="connsiteX11" fmla="*/ 489235 w 1789593"/>
+                <a:gd name="connsiteY11" fmla="*/ 2262557 h 2451267"/>
+                <a:gd name="connsiteX12" fmla="*/ 493039 w 1789593"/>
+                <a:gd name="connsiteY12" fmla="*/ 2192439 h 2451267"/>
+                <a:gd name="connsiteX13" fmla="*/ 413198 w 1789593"/>
+                <a:gd name="connsiteY13" fmla="*/ 2132224 h 2451267"/>
+                <a:gd name="connsiteX14" fmla="*/ 125366 w 1789593"/>
+                <a:gd name="connsiteY14" fmla="*/ 731046 h 2451267"/>
+                <a:gd name="connsiteX15" fmla="*/ 1429180 w 1789593"/>
+                <a:gd name="connsiteY15" fmla="*/ 142645 h 2451267"/>
+                <a:gd name="connsiteX16" fmla="*/ 1531361 w 1789593"/>
+                <a:gd name="connsiteY16" fmla="*/ 174040 h 2451267"/>
+                <a:gd name="connsiteX17" fmla="*/ 1528333 w 1789593"/>
+                <a:gd name="connsiteY17" fmla="*/ 182479 h 2451267"/>
+                <a:gd name="connsiteX18" fmla="*/ 305937 w 1789593"/>
+                <a:gd name="connsiteY18" fmla="*/ 823255 h 2451267"/>
+                <a:gd name="connsiteX19" fmla="*/ 478734 w 1789593"/>
+                <a:gd name="connsiteY19" fmla="*/ 1917956 h 2451267"/>
+                <a:gd name="connsiteX20" fmla="*/ 1789593 w 1789593"/>
+                <a:gd name="connsiteY20" fmla="*/ 0 h 2451267"/>
+                <a:gd name="connsiteX21" fmla="*/ 1754694 w 1789593"/>
+                <a:gd name="connsiteY21" fmla="*/ 150052 h 2451267"/>
+                <a:gd name="connsiteX22" fmla="*/ 1522762 w 1789593"/>
+                <a:gd name="connsiteY22" fmla="*/ 861643 h 2451267"/>
+                <a:gd name="connsiteX23" fmla="*/ 1218879 w 1789593"/>
+                <a:gd name="connsiteY23" fmla="*/ 1379352 h 2451267"/>
+                <a:gd name="connsiteX24" fmla="*/ 802388 w 1789593"/>
+                <a:gd name="connsiteY24" fmla="*/ 1843981 h 2451267"/>
+                <a:gd name="connsiteX25" fmla="*/ 569940 w 1789593"/>
+                <a:gd name="connsiteY25" fmla="*/ 2183757 h 2451267"/>
+                <a:gd name="connsiteX26" fmla="*/ 482416 w 1789593"/>
+                <a:gd name="connsiteY26" fmla="*/ 2451267 h 2451267"/>
+                <a:gd name="connsiteX0" fmla="*/ 1531385 w 1789593"/>
+                <a:gd name="connsiteY0" fmla="*/ 174047 h 2451267"/>
+                <a:gd name="connsiteX1" fmla="*/ 1531361 w 1789593"/>
+                <a:gd name="connsiteY1" fmla="*/ 174040 h 2451267"/>
+                <a:gd name="connsiteX2" fmla="*/ 1534080 w 1789593"/>
+                <a:gd name="connsiteY2" fmla="*/ 166462 h 2451267"/>
+                <a:gd name="connsiteX3" fmla="*/ 1535232 w 1789593"/>
+                <a:gd name="connsiteY3" fmla="*/ 163271 h 2451267"/>
+                <a:gd name="connsiteX4" fmla="*/ 1531385 w 1789593"/>
+                <a:gd name="connsiteY4" fmla="*/ 174047 h 2451267"/>
+                <a:gd name="connsiteX5" fmla="*/ 1524524 w 1789593"/>
+                <a:gd name="connsiteY5" fmla="*/ 193267 h 2451267"/>
+                <a:gd name="connsiteX6" fmla="*/ 1529878 w 1789593"/>
+                <a:gd name="connsiteY6" fmla="*/ 178269 h 2451267"/>
+                <a:gd name="connsiteX7" fmla="*/ 1531385 w 1789593"/>
+                <a:gd name="connsiteY7" fmla="*/ 174047 h 2451267"/>
+                <a:gd name="connsiteX8" fmla="*/ 1531423 w 1789593"/>
+                <a:gd name="connsiteY8" fmla="*/ 174059 h 2451267"/>
+                <a:gd name="connsiteX9" fmla="*/ 1524524 w 1789593"/>
+                <a:gd name="connsiteY9" fmla="*/ 193267 h 2451267"/>
+                <a:gd name="connsiteX10" fmla="*/ 482416 w 1789593"/>
+                <a:gd name="connsiteY10" fmla="*/ 2451267 h 2451267"/>
+                <a:gd name="connsiteX11" fmla="*/ 489235 w 1789593"/>
+                <a:gd name="connsiteY11" fmla="*/ 2262557 h 2451267"/>
+                <a:gd name="connsiteX12" fmla="*/ 493039 w 1789593"/>
+                <a:gd name="connsiteY12" fmla="*/ 2192439 h 2451267"/>
+                <a:gd name="connsiteX13" fmla="*/ 413198 w 1789593"/>
+                <a:gd name="connsiteY13" fmla="*/ 2132224 h 2451267"/>
+                <a:gd name="connsiteX14" fmla="*/ 125366 w 1789593"/>
+                <a:gd name="connsiteY14" fmla="*/ 731046 h 2451267"/>
+                <a:gd name="connsiteX15" fmla="*/ 1429180 w 1789593"/>
+                <a:gd name="connsiteY15" fmla="*/ 142645 h 2451267"/>
+                <a:gd name="connsiteX16" fmla="*/ 1531361 w 1789593"/>
+                <a:gd name="connsiteY16" fmla="*/ 174040 h 2451267"/>
+                <a:gd name="connsiteX17" fmla="*/ 1528333 w 1789593"/>
+                <a:gd name="connsiteY17" fmla="*/ 182479 h 2451267"/>
+                <a:gd name="connsiteX18" fmla="*/ 305937 w 1789593"/>
+                <a:gd name="connsiteY18" fmla="*/ 823255 h 2451267"/>
+                <a:gd name="connsiteX19" fmla="*/ 1789593 w 1789593"/>
+                <a:gd name="connsiteY19" fmla="*/ 0 h 2451267"/>
+                <a:gd name="connsiteX20" fmla="*/ 1754694 w 1789593"/>
+                <a:gd name="connsiteY20" fmla="*/ 150052 h 2451267"/>
+                <a:gd name="connsiteX21" fmla="*/ 1522762 w 1789593"/>
+                <a:gd name="connsiteY21" fmla="*/ 861643 h 2451267"/>
+                <a:gd name="connsiteX22" fmla="*/ 1218879 w 1789593"/>
+                <a:gd name="connsiteY22" fmla="*/ 1379352 h 2451267"/>
+                <a:gd name="connsiteX23" fmla="*/ 802388 w 1789593"/>
+                <a:gd name="connsiteY23" fmla="*/ 1843981 h 2451267"/>
+                <a:gd name="connsiteX24" fmla="*/ 569940 w 1789593"/>
+                <a:gd name="connsiteY24" fmla="*/ 2183757 h 2451267"/>
+                <a:gd name="connsiteX25" fmla="*/ 482416 w 1789593"/>
+                <a:gd name="connsiteY25" fmla="*/ 2451267 h 2451267"/>
+                <a:gd name="connsiteX0" fmla="*/ 1531385 w 1789593"/>
+                <a:gd name="connsiteY0" fmla="*/ 174047 h 2451267"/>
+                <a:gd name="connsiteX1" fmla="*/ 1531361 w 1789593"/>
+                <a:gd name="connsiteY1" fmla="*/ 174040 h 2451267"/>
+                <a:gd name="connsiteX2" fmla="*/ 1534080 w 1789593"/>
+                <a:gd name="connsiteY2" fmla="*/ 166462 h 2451267"/>
+                <a:gd name="connsiteX3" fmla="*/ 1535232 w 1789593"/>
+                <a:gd name="connsiteY3" fmla="*/ 163271 h 2451267"/>
+                <a:gd name="connsiteX4" fmla="*/ 1531385 w 1789593"/>
+                <a:gd name="connsiteY4" fmla="*/ 174047 h 2451267"/>
+                <a:gd name="connsiteX5" fmla="*/ 1524524 w 1789593"/>
+                <a:gd name="connsiteY5" fmla="*/ 193267 h 2451267"/>
+                <a:gd name="connsiteX6" fmla="*/ 1529878 w 1789593"/>
+                <a:gd name="connsiteY6" fmla="*/ 178269 h 2451267"/>
+                <a:gd name="connsiteX7" fmla="*/ 1531385 w 1789593"/>
+                <a:gd name="connsiteY7" fmla="*/ 174047 h 2451267"/>
+                <a:gd name="connsiteX8" fmla="*/ 1531423 w 1789593"/>
+                <a:gd name="connsiteY8" fmla="*/ 174059 h 2451267"/>
+                <a:gd name="connsiteX9" fmla="*/ 1524524 w 1789593"/>
+                <a:gd name="connsiteY9" fmla="*/ 193267 h 2451267"/>
+                <a:gd name="connsiteX10" fmla="*/ 482416 w 1789593"/>
+                <a:gd name="connsiteY10" fmla="*/ 2451267 h 2451267"/>
+                <a:gd name="connsiteX11" fmla="*/ 489235 w 1789593"/>
+                <a:gd name="connsiteY11" fmla="*/ 2262557 h 2451267"/>
+                <a:gd name="connsiteX12" fmla="*/ 493039 w 1789593"/>
+                <a:gd name="connsiteY12" fmla="*/ 2192439 h 2451267"/>
+                <a:gd name="connsiteX13" fmla="*/ 413198 w 1789593"/>
+                <a:gd name="connsiteY13" fmla="*/ 2132224 h 2451267"/>
+                <a:gd name="connsiteX14" fmla="*/ 125366 w 1789593"/>
+                <a:gd name="connsiteY14" fmla="*/ 731046 h 2451267"/>
+                <a:gd name="connsiteX15" fmla="*/ 1429180 w 1789593"/>
+                <a:gd name="connsiteY15" fmla="*/ 142645 h 2451267"/>
+                <a:gd name="connsiteX16" fmla="*/ 1531361 w 1789593"/>
+                <a:gd name="connsiteY16" fmla="*/ 174040 h 2451267"/>
+                <a:gd name="connsiteX17" fmla="*/ 1528333 w 1789593"/>
+                <a:gd name="connsiteY17" fmla="*/ 182479 h 2451267"/>
+                <a:gd name="connsiteX18" fmla="*/ 1789593 w 1789593"/>
+                <a:gd name="connsiteY18" fmla="*/ 0 h 2451267"/>
+                <a:gd name="connsiteX19" fmla="*/ 1754694 w 1789593"/>
+                <a:gd name="connsiteY19" fmla="*/ 150052 h 2451267"/>
+                <a:gd name="connsiteX20" fmla="*/ 1522762 w 1789593"/>
+                <a:gd name="connsiteY20" fmla="*/ 861643 h 2451267"/>
+                <a:gd name="connsiteX21" fmla="*/ 1218879 w 1789593"/>
+                <a:gd name="connsiteY21" fmla="*/ 1379352 h 2451267"/>
+                <a:gd name="connsiteX22" fmla="*/ 802388 w 1789593"/>
+                <a:gd name="connsiteY22" fmla="*/ 1843981 h 2451267"/>
+                <a:gd name="connsiteX23" fmla="*/ 569940 w 1789593"/>
+                <a:gd name="connsiteY23" fmla="*/ 2183757 h 2451267"/>
+                <a:gd name="connsiteX24" fmla="*/ 482416 w 1789593"/>
+                <a:gd name="connsiteY24" fmla="*/ 2451267 h 2451267"/>
+                <a:gd name="connsiteX0" fmla="*/ 1531385 w 1789593"/>
+                <a:gd name="connsiteY0" fmla="*/ 174047 h 2451267"/>
+                <a:gd name="connsiteX1" fmla="*/ 1531361 w 1789593"/>
+                <a:gd name="connsiteY1" fmla="*/ 174040 h 2451267"/>
+                <a:gd name="connsiteX2" fmla="*/ 1534080 w 1789593"/>
+                <a:gd name="connsiteY2" fmla="*/ 166462 h 2451267"/>
+                <a:gd name="connsiteX3" fmla="*/ 1535232 w 1789593"/>
+                <a:gd name="connsiteY3" fmla="*/ 163271 h 2451267"/>
+                <a:gd name="connsiteX4" fmla="*/ 1531385 w 1789593"/>
+                <a:gd name="connsiteY4" fmla="*/ 174047 h 2451267"/>
+                <a:gd name="connsiteX5" fmla="*/ 1524524 w 1789593"/>
+                <a:gd name="connsiteY5" fmla="*/ 193267 h 2451267"/>
+                <a:gd name="connsiteX6" fmla="*/ 1529878 w 1789593"/>
+                <a:gd name="connsiteY6" fmla="*/ 178269 h 2451267"/>
+                <a:gd name="connsiteX7" fmla="*/ 1531385 w 1789593"/>
+                <a:gd name="connsiteY7" fmla="*/ 174047 h 2451267"/>
+                <a:gd name="connsiteX8" fmla="*/ 1531423 w 1789593"/>
+                <a:gd name="connsiteY8" fmla="*/ 174059 h 2451267"/>
+                <a:gd name="connsiteX9" fmla="*/ 1524524 w 1789593"/>
+                <a:gd name="connsiteY9" fmla="*/ 193267 h 2451267"/>
+                <a:gd name="connsiteX10" fmla="*/ 482416 w 1789593"/>
+                <a:gd name="connsiteY10" fmla="*/ 2451267 h 2451267"/>
+                <a:gd name="connsiteX11" fmla="*/ 489235 w 1789593"/>
+                <a:gd name="connsiteY11" fmla="*/ 2262557 h 2451267"/>
+                <a:gd name="connsiteX12" fmla="*/ 493039 w 1789593"/>
+                <a:gd name="connsiteY12" fmla="*/ 2192439 h 2451267"/>
+                <a:gd name="connsiteX13" fmla="*/ 413198 w 1789593"/>
+                <a:gd name="connsiteY13" fmla="*/ 2132224 h 2451267"/>
+                <a:gd name="connsiteX14" fmla="*/ 125366 w 1789593"/>
+                <a:gd name="connsiteY14" fmla="*/ 731046 h 2451267"/>
+                <a:gd name="connsiteX15" fmla="*/ 1429180 w 1789593"/>
+                <a:gd name="connsiteY15" fmla="*/ 142645 h 2451267"/>
+                <a:gd name="connsiteX16" fmla="*/ 1531361 w 1789593"/>
+                <a:gd name="connsiteY16" fmla="*/ 174040 h 2451267"/>
+                <a:gd name="connsiteX17" fmla="*/ 1789593 w 1789593"/>
+                <a:gd name="connsiteY17" fmla="*/ 0 h 2451267"/>
+                <a:gd name="connsiteX18" fmla="*/ 1754694 w 1789593"/>
+                <a:gd name="connsiteY18" fmla="*/ 150052 h 2451267"/>
+                <a:gd name="connsiteX19" fmla="*/ 1522762 w 1789593"/>
+                <a:gd name="connsiteY19" fmla="*/ 861643 h 2451267"/>
+                <a:gd name="connsiteX20" fmla="*/ 1218879 w 1789593"/>
+                <a:gd name="connsiteY20" fmla="*/ 1379352 h 2451267"/>
+                <a:gd name="connsiteX21" fmla="*/ 802388 w 1789593"/>
+                <a:gd name="connsiteY21" fmla="*/ 1843981 h 2451267"/>
+                <a:gd name="connsiteX22" fmla="*/ 569940 w 1789593"/>
+                <a:gd name="connsiteY22" fmla="*/ 2183757 h 2451267"/>
+                <a:gd name="connsiteX23" fmla="*/ 482416 w 1789593"/>
+                <a:gd name="connsiteY23" fmla="*/ 2451267 h 2451267"/>
+                <a:gd name="connsiteX0" fmla="*/ 1531385 w 1789593"/>
+                <a:gd name="connsiteY0" fmla="*/ 174047 h 2451267"/>
+                <a:gd name="connsiteX1" fmla="*/ 1531361 w 1789593"/>
+                <a:gd name="connsiteY1" fmla="*/ 174040 h 2451267"/>
+                <a:gd name="connsiteX2" fmla="*/ 1534080 w 1789593"/>
+                <a:gd name="connsiteY2" fmla="*/ 166462 h 2451267"/>
+                <a:gd name="connsiteX3" fmla="*/ 1535232 w 1789593"/>
+                <a:gd name="connsiteY3" fmla="*/ 163271 h 2451267"/>
+                <a:gd name="connsiteX4" fmla="*/ 1531385 w 1789593"/>
+                <a:gd name="connsiteY4" fmla="*/ 174047 h 2451267"/>
+                <a:gd name="connsiteX5" fmla="*/ 1531423 w 1789593"/>
+                <a:gd name="connsiteY5" fmla="*/ 174059 h 2451267"/>
+                <a:gd name="connsiteX6" fmla="*/ 1529878 w 1789593"/>
+                <a:gd name="connsiteY6" fmla="*/ 178269 h 2451267"/>
+                <a:gd name="connsiteX7" fmla="*/ 1531385 w 1789593"/>
+                <a:gd name="connsiteY7" fmla="*/ 174047 h 2451267"/>
+                <a:gd name="connsiteX8" fmla="*/ 1531423 w 1789593"/>
+                <a:gd name="connsiteY8" fmla="*/ 174059 h 2451267"/>
+                <a:gd name="connsiteX9" fmla="*/ 482416 w 1789593"/>
+                <a:gd name="connsiteY9" fmla="*/ 2451267 h 2451267"/>
+                <a:gd name="connsiteX10" fmla="*/ 489235 w 1789593"/>
+                <a:gd name="connsiteY10" fmla="*/ 2262557 h 2451267"/>
+                <a:gd name="connsiteX11" fmla="*/ 493039 w 1789593"/>
+                <a:gd name="connsiteY11" fmla="*/ 2192439 h 2451267"/>
+                <a:gd name="connsiteX12" fmla="*/ 413198 w 1789593"/>
+                <a:gd name="connsiteY12" fmla="*/ 2132224 h 2451267"/>
+                <a:gd name="connsiteX13" fmla="*/ 125366 w 1789593"/>
+                <a:gd name="connsiteY13" fmla="*/ 731046 h 2451267"/>
+                <a:gd name="connsiteX14" fmla="*/ 1429180 w 1789593"/>
+                <a:gd name="connsiteY14" fmla="*/ 142645 h 2451267"/>
+                <a:gd name="connsiteX15" fmla="*/ 1531361 w 1789593"/>
+                <a:gd name="connsiteY15" fmla="*/ 174040 h 2451267"/>
+                <a:gd name="connsiteX16" fmla="*/ 1789593 w 1789593"/>
+                <a:gd name="connsiteY16" fmla="*/ 0 h 2451267"/>
+                <a:gd name="connsiteX17" fmla="*/ 1754694 w 1789593"/>
+                <a:gd name="connsiteY17" fmla="*/ 150052 h 2451267"/>
+                <a:gd name="connsiteX18" fmla="*/ 1522762 w 1789593"/>
+                <a:gd name="connsiteY18" fmla="*/ 861643 h 2451267"/>
+                <a:gd name="connsiteX19" fmla="*/ 1218879 w 1789593"/>
+                <a:gd name="connsiteY19" fmla="*/ 1379352 h 2451267"/>
+                <a:gd name="connsiteX20" fmla="*/ 802388 w 1789593"/>
+                <a:gd name="connsiteY20" fmla="*/ 1843981 h 2451267"/>
+                <a:gd name="connsiteX21" fmla="*/ 569940 w 1789593"/>
+                <a:gd name="connsiteY21" fmla="*/ 2183757 h 2451267"/>
+                <a:gd name="connsiteX22" fmla="*/ 482416 w 1789593"/>
+                <a:gd name="connsiteY22" fmla="*/ 2451267 h 2451267"/>
+                <a:gd name="connsiteX0" fmla="*/ 1531385 w 1789593"/>
+                <a:gd name="connsiteY0" fmla="*/ 174047 h 2451267"/>
+                <a:gd name="connsiteX1" fmla="*/ 1531361 w 1789593"/>
+                <a:gd name="connsiteY1" fmla="*/ 174040 h 2451267"/>
+                <a:gd name="connsiteX2" fmla="*/ 1534080 w 1789593"/>
+                <a:gd name="connsiteY2" fmla="*/ 166462 h 2451267"/>
+                <a:gd name="connsiteX3" fmla="*/ 1535232 w 1789593"/>
+                <a:gd name="connsiteY3" fmla="*/ 163271 h 2451267"/>
+                <a:gd name="connsiteX4" fmla="*/ 1531385 w 1789593"/>
+                <a:gd name="connsiteY4" fmla="*/ 174047 h 2451267"/>
+                <a:gd name="connsiteX5" fmla="*/ 1531423 w 1789593"/>
+                <a:gd name="connsiteY5" fmla="*/ 174059 h 2451267"/>
+                <a:gd name="connsiteX6" fmla="*/ 1529878 w 1789593"/>
+                <a:gd name="connsiteY6" fmla="*/ 178269 h 2451267"/>
+                <a:gd name="connsiteX7" fmla="*/ 1531385 w 1789593"/>
+                <a:gd name="connsiteY7" fmla="*/ 174047 h 2451267"/>
+                <a:gd name="connsiteX8" fmla="*/ 1531423 w 1789593"/>
+                <a:gd name="connsiteY8" fmla="*/ 174059 h 2451267"/>
+                <a:gd name="connsiteX9" fmla="*/ 482416 w 1789593"/>
+                <a:gd name="connsiteY9" fmla="*/ 2451267 h 2451267"/>
+                <a:gd name="connsiteX10" fmla="*/ 489235 w 1789593"/>
+                <a:gd name="connsiteY10" fmla="*/ 2262557 h 2451267"/>
+                <a:gd name="connsiteX11" fmla="*/ 493039 w 1789593"/>
+                <a:gd name="connsiteY11" fmla="*/ 2192439 h 2451267"/>
+                <a:gd name="connsiteX12" fmla="*/ 413198 w 1789593"/>
+                <a:gd name="connsiteY12" fmla="*/ 2132224 h 2451267"/>
+                <a:gd name="connsiteX13" fmla="*/ 125366 w 1789593"/>
+                <a:gd name="connsiteY13" fmla="*/ 731046 h 2451267"/>
+                <a:gd name="connsiteX14" fmla="*/ 1429180 w 1789593"/>
+                <a:gd name="connsiteY14" fmla="*/ 142645 h 2451267"/>
+                <a:gd name="connsiteX15" fmla="*/ 1789593 w 1789593"/>
+                <a:gd name="connsiteY15" fmla="*/ 0 h 2451267"/>
+                <a:gd name="connsiteX16" fmla="*/ 1754694 w 1789593"/>
+                <a:gd name="connsiteY16" fmla="*/ 150052 h 2451267"/>
+                <a:gd name="connsiteX17" fmla="*/ 1522762 w 1789593"/>
+                <a:gd name="connsiteY17" fmla="*/ 861643 h 2451267"/>
+                <a:gd name="connsiteX18" fmla="*/ 1218879 w 1789593"/>
+                <a:gd name="connsiteY18" fmla="*/ 1379352 h 2451267"/>
+                <a:gd name="connsiteX19" fmla="*/ 802388 w 1789593"/>
+                <a:gd name="connsiteY19" fmla="*/ 1843981 h 2451267"/>
+                <a:gd name="connsiteX20" fmla="*/ 569940 w 1789593"/>
+                <a:gd name="connsiteY20" fmla="*/ 2183757 h 2451267"/>
+                <a:gd name="connsiteX21" fmla="*/ 482416 w 1789593"/>
+                <a:gd name="connsiteY21" fmla="*/ 2451267 h 2451267"/>
+                <a:gd name="connsiteX0" fmla="*/ 1531385 w 1789593"/>
+                <a:gd name="connsiteY0" fmla="*/ 174047 h 2451267"/>
+                <a:gd name="connsiteX1" fmla="*/ 1531361 w 1789593"/>
+                <a:gd name="connsiteY1" fmla="*/ 174040 h 2451267"/>
+                <a:gd name="connsiteX2" fmla="*/ 1534080 w 1789593"/>
+                <a:gd name="connsiteY2" fmla="*/ 166462 h 2451267"/>
+                <a:gd name="connsiteX3" fmla="*/ 1535232 w 1789593"/>
+                <a:gd name="connsiteY3" fmla="*/ 163271 h 2451267"/>
+                <a:gd name="connsiteX4" fmla="*/ 1531385 w 1789593"/>
+                <a:gd name="connsiteY4" fmla="*/ 174047 h 2451267"/>
+                <a:gd name="connsiteX5" fmla="*/ 1531385 w 1789593"/>
+                <a:gd name="connsiteY5" fmla="*/ 174047 h 2451267"/>
+                <a:gd name="connsiteX6" fmla="*/ 1529878 w 1789593"/>
+                <a:gd name="connsiteY6" fmla="*/ 178269 h 2451267"/>
+                <a:gd name="connsiteX7" fmla="*/ 1531385 w 1789593"/>
+                <a:gd name="connsiteY7" fmla="*/ 174047 h 2451267"/>
+                <a:gd name="connsiteX8" fmla="*/ 482416 w 1789593"/>
+                <a:gd name="connsiteY8" fmla="*/ 2451267 h 2451267"/>
+                <a:gd name="connsiteX9" fmla="*/ 489235 w 1789593"/>
+                <a:gd name="connsiteY9" fmla="*/ 2262557 h 2451267"/>
+                <a:gd name="connsiteX10" fmla="*/ 493039 w 1789593"/>
+                <a:gd name="connsiteY10" fmla="*/ 2192439 h 2451267"/>
+                <a:gd name="connsiteX11" fmla="*/ 413198 w 1789593"/>
+                <a:gd name="connsiteY11" fmla="*/ 2132224 h 2451267"/>
+                <a:gd name="connsiteX12" fmla="*/ 125366 w 1789593"/>
+                <a:gd name="connsiteY12" fmla="*/ 731046 h 2451267"/>
+                <a:gd name="connsiteX13" fmla="*/ 1429180 w 1789593"/>
+                <a:gd name="connsiteY13" fmla="*/ 142645 h 2451267"/>
+                <a:gd name="connsiteX14" fmla="*/ 1789593 w 1789593"/>
+                <a:gd name="connsiteY14" fmla="*/ 0 h 2451267"/>
+                <a:gd name="connsiteX15" fmla="*/ 1754694 w 1789593"/>
+                <a:gd name="connsiteY15" fmla="*/ 150052 h 2451267"/>
+                <a:gd name="connsiteX16" fmla="*/ 1522762 w 1789593"/>
+                <a:gd name="connsiteY16" fmla="*/ 861643 h 2451267"/>
+                <a:gd name="connsiteX17" fmla="*/ 1218879 w 1789593"/>
+                <a:gd name="connsiteY17" fmla="*/ 1379352 h 2451267"/>
+                <a:gd name="connsiteX18" fmla="*/ 802388 w 1789593"/>
+                <a:gd name="connsiteY18" fmla="*/ 1843981 h 2451267"/>
+                <a:gd name="connsiteX19" fmla="*/ 569940 w 1789593"/>
+                <a:gd name="connsiteY19" fmla="*/ 2183757 h 2451267"/>
+                <a:gd name="connsiteX20" fmla="*/ 482416 w 1789593"/>
+                <a:gd name="connsiteY20" fmla="*/ 2451267 h 2451267"/>
+                <a:gd name="connsiteX0" fmla="*/ 1531385 w 1789593"/>
+                <a:gd name="connsiteY0" fmla="*/ 174047 h 2451267"/>
+                <a:gd name="connsiteX1" fmla="*/ 1531361 w 1789593"/>
+                <a:gd name="connsiteY1" fmla="*/ 174040 h 2451267"/>
+                <a:gd name="connsiteX2" fmla="*/ 1534080 w 1789593"/>
+                <a:gd name="connsiteY2" fmla="*/ 166462 h 2451267"/>
+                <a:gd name="connsiteX3" fmla="*/ 1535232 w 1789593"/>
+                <a:gd name="connsiteY3" fmla="*/ 163271 h 2451267"/>
+                <a:gd name="connsiteX4" fmla="*/ 1531385 w 1789593"/>
+                <a:gd name="connsiteY4" fmla="*/ 174047 h 2451267"/>
+                <a:gd name="connsiteX5" fmla="*/ 482416 w 1789593"/>
+                <a:gd name="connsiteY5" fmla="*/ 2451267 h 2451267"/>
+                <a:gd name="connsiteX6" fmla="*/ 489235 w 1789593"/>
+                <a:gd name="connsiteY6" fmla="*/ 2262557 h 2451267"/>
+                <a:gd name="connsiteX7" fmla="*/ 493039 w 1789593"/>
+                <a:gd name="connsiteY7" fmla="*/ 2192439 h 2451267"/>
+                <a:gd name="connsiteX8" fmla="*/ 413198 w 1789593"/>
+                <a:gd name="connsiteY8" fmla="*/ 2132224 h 2451267"/>
+                <a:gd name="connsiteX9" fmla="*/ 125366 w 1789593"/>
+                <a:gd name="connsiteY9" fmla="*/ 731046 h 2451267"/>
+                <a:gd name="connsiteX10" fmla="*/ 1429180 w 1789593"/>
+                <a:gd name="connsiteY10" fmla="*/ 142645 h 2451267"/>
+                <a:gd name="connsiteX11" fmla="*/ 1789593 w 1789593"/>
+                <a:gd name="connsiteY11" fmla="*/ 0 h 2451267"/>
+                <a:gd name="connsiteX12" fmla="*/ 1754694 w 1789593"/>
+                <a:gd name="connsiteY12" fmla="*/ 150052 h 2451267"/>
+                <a:gd name="connsiteX13" fmla="*/ 1522762 w 1789593"/>
+                <a:gd name="connsiteY13" fmla="*/ 861643 h 2451267"/>
+                <a:gd name="connsiteX14" fmla="*/ 1218879 w 1789593"/>
+                <a:gd name="connsiteY14" fmla="*/ 1379352 h 2451267"/>
+                <a:gd name="connsiteX15" fmla="*/ 802388 w 1789593"/>
+                <a:gd name="connsiteY15" fmla="*/ 1843981 h 2451267"/>
+                <a:gd name="connsiteX16" fmla="*/ 569940 w 1789593"/>
+                <a:gd name="connsiteY16" fmla="*/ 2183757 h 2451267"/>
+                <a:gd name="connsiteX17" fmla="*/ 482416 w 1789593"/>
+                <a:gd name="connsiteY17" fmla="*/ 2451267 h 2451267"/>
+                <a:gd name="connsiteX0" fmla="*/ 1535232 w 1789593"/>
+                <a:gd name="connsiteY0" fmla="*/ 163271 h 2451267"/>
+                <a:gd name="connsiteX1" fmla="*/ 1531361 w 1789593"/>
+                <a:gd name="connsiteY1" fmla="*/ 174040 h 2451267"/>
+                <a:gd name="connsiteX2" fmla="*/ 1534080 w 1789593"/>
+                <a:gd name="connsiteY2" fmla="*/ 166462 h 2451267"/>
+                <a:gd name="connsiteX3" fmla="*/ 1535232 w 1789593"/>
+                <a:gd name="connsiteY3" fmla="*/ 163271 h 2451267"/>
+                <a:gd name="connsiteX4" fmla="*/ 482416 w 1789593"/>
+                <a:gd name="connsiteY4" fmla="*/ 2451267 h 2451267"/>
+                <a:gd name="connsiteX5" fmla="*/ 489235 w 1789593"/>
+                <a:gd name="connsiteY5" fmla="*/ 2262557 h 2451267"/>
+                <a:gd name="connsiteX6" fmla="*/ 493039 w 1789593"/>
+                <a:gd name="connsiteY6" fmla="*/ 2192439 h 2451267"/>
+                <a:gd name="connsiteX7" fmla="*/ 413198 w 1789593"/>
+                <a:gd name="connsiteY7" fmla="*/ 2132224 h 2451267"/>
+                <a:gd name="connsiteX8" fmla="*/ 125366 w 1789593"/>
+                <a:gd name="connsiteY8" fmla="*/ 731046 h 2451267"/>
+                <a:gd name="connsiteX9" fmla="*/ 1429180 w 1789593"/>
+                <a:gd name="connsiteY9" fmla="*/ 142645 h 2451267"/>
+                <a:gd name="connsiteX10" fmla="*/ 1789593 w 1789593"/>
+                <a:gd name="connsiteY10" fmla="*/ 0 h 2451267"/>
+                <a:gd name="connsiteX11" fmla="*/ 1754694 w 1789593"/>
+                <a:gd name="connsiteY11" fmla="*/ 150052 h 2451267"/>
+                <a:gd name="connsiteX12" fmla="*/ 1522762 w 1789593"/>
+                <a:gd name="connsiteY12" fmla="*/ 861643 h 2451267"/>
+                <a:gd name="connsiteX13" fmla="*/ 1218879 w 1789593"/>
+                <a:gd name="connsiteY13" fmla="*/ 1379352 h 2451267"/>
+                <a:gd name="connsiteX14" fmla="*/ 802388 w 1789593"/>
+                <a:gd name="connsiteY14" fmla="*/ 1843981 h 2451267"/>
+                <a:gd name="connsiteX15" fmla="*/ 569940 w 1789593"/>
+                <a:gd name="connsiteY15" fmla="*/ 2183757 h 2451267"/>
+                <a:gd name="connsiteX16" fmla="*/ 482416 w 1789593"/>
+                <a:gd name="connsiteY16" fmla="*/ 2451267 h 2451267"/>
+                <a:gd name="connsiteX0" fmla="*/ 1534080 w 1789593"/>
+                <a:gd name="connsiteY0" fmla="*/ 166462 h 2451267"/>
+                <a:gd name="connsiteX1" fmla="*/ 1531361 w 1789593"/>
+                <a:gd name="connsiteY1" fmla="*/ 174040 h 2451267"/>
+                <a:gd name="connsiteX2" fmla="*/ 1534080 w 1789593"/>
+                <a:gd name="connsiteY2" fmla="*/ 166462 h 2451267"/>
+                <a:gd name="connsiteX3" fmla="*/ 482416 w 1789593"/>
+                <a:gd name="connsiteY3" fmla="*/ 2451267 h 2451267"/>
+                <a:gd name="connsiteX4" fmla="*/ 489235 w 1789593"/>
+                <a:gd name="connsiteY4" fmla="*/ 2262557 h 2451267"/>
+                <a:gd name="connsiteX5" fmla="*/ 493039 w 1789593"/>
+                <a:gd name="connsiteY5" fmla="*/ 2192439 h 2451267"/>
+                <a:gd name="connsiteX6" fmla="*/ 413198 w 1789593"/>
+                <a:gd name="connsiteY6" fmla="*/ 2132224 h 2451267"/>
+                <a:gd name="connsiteX7" fmla="*/ 125366 w 1789593"/>
+                <a:gd name="connsiteY7" fmla="*/ 731046 h 2451267"/>
+                <a:gd name="connsiteX8" fmla="*/ 1429180 w 1789593"/>
+                <a:gd name="connsiteY8" fmla="*/ 142645 h 2451267"/>
+                <a:gd name="connsiteX9" fmla="*/ 1789593 w 1789593"/>
+                <a:gd name="connsiteY9" fmla="*/ 0 h 2451267"/>
+                <a:gd name="connsiteX10" fmla="*/ 1754694 w 1789593"/>
+                <a:gd name="connsiteY10" fmla="*/ 150052 h 2451267"/>
+                <a:gd name="connsiteX11" fmla="*/ 1522762 w 1789593"/>
+                <a:gd name="connsiteY11" fmla="*/ 861643 h 2451267"/>
+                <a:gd name="connsiteX12" fmla="*/ 1218879 w 1789593"/>
+                <a:gd name="connsiteY12" fmla="*/ 1379352 h 2451267"/>
+                <a:gd name="connsiteX13" fmla="*/ 802388 w 1789593"/>
+                <a:gd name="connsiteY13" fmla="*/ 1843981 h 2451267"/>
+                <a:gd name="connsiteX14" fmla="*/ 569940 w 1789593"/>
+                <a:gd name="connsiteY14" fmla="*/ 2183757 h 2451267"/>
+                <a:gd name="connsiteX15" fmla="*/ 482416 w 1789593"/>
+                <a:gd name="connsiteY15" fmla="*/ 2451267 h 2451267"/>
+                <a:gd name="connsiteX0" fmla="*/ 482416 w 1789593"/>
+                <a:gd name="connsiteY0" fmla="*/ 2451267 h 2451267"/>
+                <a:gd name="connsiteX1" fmla="*/ 489235 w 1789593"/>
+                <a:gd name="connsiteY1" fmla="*/ 2262557 h 2451267"/>
+                <a:gd name="connsiteX2" fmla="*/ 493039 w 1789593"/>
+                <a:gd name="connsiteY2" fmla="*/ 2192439 h 2451267"/>
+                <a:gd name="connsiteX3" fmla="*/ 413198 w 1789593"/>
+                <a:gd name="connsiteY3" fmla="*/ 2132224 h 2451267"/>
+                <a:gd name="connsiteX4" fmla="*/ 125366 w 1789593"/>
+                <a:gd name="connsiteY4" fmla="*/ 731046 h 2451267"/>
+                <a:gd name="connsiteX5" fmla="*/ 1429180 w 1789593"/>
+                <a:gd name="connsiteY5" fmla="*/ 142645 h 2451267"/>
+                <a:gd name="connsiteX6" fmla="*/ 1789593 w 1789593"/>
+                <a:gd name="connsiteY6" fmla="*/ 0 h 2451267"/>
+                <a:gd name="connsiteX7" fmla="*/ 1754694 w 1789593"/>
+                <a:gd name="connsiteY7" fmla="*/ 150052 h 2451267"/>
+                <a:gd name="connsiteX8" fmla="*/ 1522762 w 1789593"/>
+                <a:gd name="connsiteY8" fmla="*/ 861643 h 2451267"/>
+                <a:gd name="connsiteX9" fmla="*/ 1218879 w 1789593"/>
+                <a:gd name="connsiteY9" fmla="*/ 1379352 h 2451267"/>
+                <a:gd name="connsiteX10" fmla="*/ 802388 w 1789593"/>
+                <a:gd name="connsiteY10" fmla="*/ 1843981 h 2451267"/>
+                <a:gd name="connsiteX11" fmla="*/ 569940 w 1789593"/>
+                <a:gd name="connsiteY11" fmla="*/ 2183757 h 2451267"/>
+                <a:gd name="connsiteX12" fmla="*/ 482416 w 1789593"/>
+                <a:gd name="connsiteY12" fmla="*/ 2451267 h 2451267"/>
+              </a:gdLst>
+              <a:ahLst/>
+              <a:cxnLst>
+                <a:cxn ang="0">
+                  <a:pos x="connsiteX0" y="connsiteY0"/>
+                </a:cxn>
+                <a:cxn ang="0">
+                  <a:pos x="connsiteX1" y="connsiteY1"/>
+                </a:cxn>
+                <a:cxn ang="0">
+                  <a:pos x="connsiteX2" y="connsiteY2"/>
+                </a:cxn>
+                <a:cxn ang="0">
+                  <a:pos x="connsiteX3" y="connsiteY3"/>
+                </a:cxn>
+                <a:cxn ang="0">
+                  <a:pos x="connsiteX4" y="connsiteY4"/>
+                </a:cxn>
+                <a:cxn ang="0">
+                  <a:pos x="connsiteX5" y="connsiteY5"/>
+                </a:cxn>
+                <a:cxn ang="0">
+                  <a:pos x="connsiteX6" y="connsiteY6"/>
+                </a:cxn>
+                <a:cxn ang="0">
+                  <a:pos x="connsiteX7" y="connsiteY7"/>
+                </a:cxn>
+                <a:cxn ang="0">
+                  <a:pos x="connsiteX8" y="connsiteY8"/>
+                </a:cxn>
+                <a:cxn ang="0">
+                  <a:pos x="connsiteX9" y="connsiteY9"/>
+                </a:cxn>
+                <a:cxn ang="0">
+                  <a:pos x="connsiteX10" y="connsiteY10"/>
+                </a:cxn>
+                <a:cxn ang="0">
+                  <a:pos x="connsiteX11" y="connsiteY11"/>
+                </a:cxn>
+                <a:cxn ang="0">
+                  <a:pos x="connsiteX12" y="connsiteY12"/>
+                </a:cxn>
+              </a:cxnLst>
+              <a:rect l="l" t="t" r="r" b="b"/>
+              <a:pathLst>
+                <a:path w="1789593" h="2451267">
+                  <a:moveTo>
+                    <a:pt x="482416" y="2451267"/>
+                  </a:moveTo>
+                  <a:cubicBezTo>
+                    <a:pt x="484458" y="2416418"/>
+                    <a:pt x="485941" y="2342885"/>
+                    <a:pt x="489235" y="2262557"/>
+                  </a:cubicBezTo>
+                  <a:lnTo>
+                    <a:pt x="493039" y="2192439"/>
+                  </a:lnTo>
+                  <a:lnTo>
+                    <a:pt x="413198" y="2132224"/>
+                  </a:lnTo>
+                  <a:cubicBezTo>
+                    <a:pt x="4961" y="1793498"/>
+                    <a:pt x="-120162" y="1211859"/>
+                    <a:pt x="125366" y="731046"/>
+                  </a:cubicBezTo>
+                  <a:cubicBezTo>
+                    <a:pt x="370894" y="250232"/>
+                    <a:pt x="915425" y="10552"/>
+                    <a:pt x="1429180" y="142645"/>
+                  </a:cubicBezTo>
+                  <a:lnTo>
+                    <a:pt x="1789593" y="0"/>
+                  </a:lnTo>
+                  <a:lnTo>
+                    <a:pt x="1754694" y="150052"/>
+                  </a:lnTo>
+                  <a:cubicBezTo>
+                    <a:pt x="1683380" y="403405"/>
+                    <a:pt x="1612065" y="656759"/>
+                    <a:pt x="1522762" y="861643"/>
+                  </a:cubicBezTo>
+                  <a:cubicBezTo>
+                    <a:pt x="1433460" y="1066526"/>
+                    <a:pt x="1338941" y="1215629"/>
+                    <a:pt x="1218879" y="1379352"/>
+                  </a:cubicBezTo>
+                  <a:cubicBezTo>
+                    <a:pt x="1098817" y="1543075"/>
+                    <a:pt x="910545" y="1709914"/>
+                    <a:pt x="802388" y="1843981"/>
+                  </a:cubicBezTo>
+                  <a:cubicBezTo>
+                    <a:pt x="694232" y="1978049"/>
+                    <a:pt x="623268" y="2082543"/>
+                    <a:pt x="569940" y="2183757"/>
+                  </a:cubicBezTo>
+                  <a:cubicBezTo>
+                    <a:pt x="516612" y="2284972"/>
+                    <a:pt x="482416" y="2451267"/>
+                    <a:pt x="482416" y="2451267"/>
+                  </a:cubicBezTo>
+                  <a:close/>
+                </a:path>
+              </a:pathLst>
+            </a:custGeom>
+            <a:solidFill>
+              <a:srgbClr val="FFC000"/>
+            </a:solidFill>
+            <a:ln>
+              <a:noFill/>
+            </a:ln>
+          </p:spPr>
+          <p:style>
+            <a:lnRef idx="2">
+              <a:schemeClr val="accent1">
+                <a:shade val="50000"/>
+              </a:schemeClr>
+            </a:lnRef>
+            <a:fillRef idx="1">
+              <a:schemeClr val="accent1"/>
+            </a:fillRef>
+            <a:effectRef idx="0">
+              <a:schemeClr val="accent1"/>
+            </a:effectRef>
+            <a:fontRef idx="minor">
+              <a:schemeClr val="lt1"/>
+            </a:fontRef>
+          </p:style>
+          <p:txBody>
+            <a:bodyPr wrap="square" rtlCol="0" anchor="ctr">
+              <a:noAutofit/>
+            </a:bodyPr>
+            <a:lstStyle/>
+            <a:p>
+              <a:pPr algn="ctr"/>
+              <a:endParaRPr lang="en-US" dirty="0">
+                <a:solidFill>
+                  <a:schemeClr val="tx1"/>
+                </a:solidFill>
+              </a:endParaRPr>
+            </a:p>
+          </p:txBody>
+        </p:sp>
       </p:grpSp>
     </p:spTree>
     <p:extLst>

</xml_diff>